<commit_message>
Dan Comments complete, deleted empties. PPT updated.
</commit_message>
<xml_diff>
--- a/Project_1_Spotify_2023_Analysis.pptx
+++ b/Project_1_Spotify_2023_Analysis.pptx
@@ -115,6 +115,11 @@
       </a:defRPr>
     </a:lvl9pPr>
   </p:defaultTextStyle>
+  <p:extLst>
+    <p:ext uri="{EFAFB233-063F-42B5-8137-9DF3F51BA10A}">
+      <p15:sldGuideLst xmlns:p15="http://schemas.microsoft.com/office/powerpoint/2012/main"/>
+    </p:ext>
+  </p:extLst>
 </p:presentation>
 </file>
 
@@ -840,7 +845,7 @@
           <a:p>
             <a:fld id="{F24EF5F4-8F03-4ABB-88B3-7880A17E3B42}" type="datetimeFigureOut">
               <a:rPr lang="en-US" smtClean="0"/>
-              <a:t>2/11/2024</a:t>
+              <a:t>2/12/2024</a:t>
             </a:fld>
             <a:endParaRPr lang="en-US"/>
           </a:p>
@@ -1091,7 +1096,7 @@
           <a:p>
             <a:fld id="{F24EF5F4-8F03-4ABB-88B3-7880A17E3B42}" type="datetimeFigureOut">
               <a:rPr lang="en-US" smtClean="0"/>
-              <a:t>2/11/2024</a:t>
+              <a:t>2/12/2024</a:t>
             </a:fld>
             <a:endParaRPr lang="en-US"/>
           </a:p>
@@ -1405,7 +1410,7 @@
           <a:p>
             <a:fld id="{F24EF5F4-8F03-4ABB-88B3-7880A17E3B42}" type="datetimeFigureOut">
               <a:rPr lang="en-US" smtClean="0"/>
-              <a:t>2/11/2024</a:t>
+              <a:t>2/12/2024</a:t>
             </a:fld>
             <a:endParaRPr lang="en-US"/>
           </a:p>
@@ -1746,7 +1751,7 @@
           <a:p>
             <a:fld id="{F24EF5F4-8F03-4ABB-88B3-7880A17E3B42}" type="datetimeFigureOut">
               <a:rPr lang="en-US" smtClean="0"/>
-              <a:t>2/11/2024</a:t>
+              <a:t>2/12/2024</a:t>
             </a:fld>
             <a:endParaRPr lang="en-US"/>
           </a:p>
@@ -2060,7 +2065,7 @@
           <a:p>
             <a:fld id="{F24EF5F4-8F03-4ABB-88B3-7880A17E3B42}" type="datetimeFigureOut">
               <a:rPr lang="en-US" smtClean="0"/>
-              <a:t>2/11/2024</a:t>
+              <a:t>2/12/2024</a:t>
             </a:fld>
             <a:endParaRPr lang="en-US"/>
           </a:p>
@@ -2453,7 +2458,7 @@
           <a:p>
             <a:fld id="{F24EF5F4-8F03-4ABB-88B3-7880A17E3B42}" type="datetimeFigureOut">
               <a:rPr lang="en-US" smtClean="0"/>
-              <a:t>2/11/2024</a:t>
+              <a:t>2/12/2024</a:t>
             </a:fld>
             <a:endParaRPr lang="en-US"/>
           </a:p>
@@ -2623,7 +2628,7 @@
           <a:p>
             <a:fld id="{F24EF5F4-8F03-4ABB-88B3-7880A17E3B42}" type="datetimeFigureOut">
               <a:rPr lang="en-US" smtClean="0"/>
-              <a:t>2/11/2024</a:t>
+              <a:t>2/12/2024</a:t>
             </a:fld>
             <a:endParaRPr lang="en-US"/>
           </a:p>
@@ -2803,7 +2808,7 @@
           <a:p>
             <a:fld id="{F24EF5F4-8F03-4ABB-88B3-7880A17E3B42}" type="datetimeFigureOut">
               <a:rPr lang="en-US" smtClean="0"/>
-              <a:t>2/11/2024</a:t>
+              <a:t>2/12/2024</a:t>
             </a:fld>
             <a:endParaRPr lang="en-US"/>
           </a:p>
@@ -2979,7 +2984,7 @@
           <a:p>
             <a:fld id="{F24EF5F4-8F03-4ABB-88B3-7880A17E3B42}" type="datetimeFigureOut">
               <a:rPr lang="en-US" smtClean="0"/>
-              <a:t>2/11/2024</a:t>
+              <a:t>2/12/2024</a:t>
             </a:fld>
             <a:endParaRPr lang="en-US"/>
           </a:p>
@@ -3226,7 +3231,7 @@
           <a:p>
             <a:fld id="{F24EF5F4-8F03-4ABB-88B3-7880A17E3B42}" type="datetimeFigureOut">
               <a:rPr lang="en-US" smtClean="0"/>
-              <a:t>2/11/2024</a:t>
+              <a:t>2/12/2024</a:t>
             </a:fld>
             <a:endParaRPr lang="en-US"/>
           </a:p>
@@ -3458,7 +3463,7 @@
           <a:p>
             <a:fld id="{F24EF5F4-8F03-4ABB-88B3-7880A17E3B42}" type="datetimeFigureOut">
               <a:rPr lang="en-US" smtClean="0"/>
-              <a:t>2/11/2024</a:t>
+              <a:t>2/12/2024</a:t>
             </a:fld>
             <a:endParaRPr lang="en-US"/>
           </a:p>
@@ -3832,7 +3837,7 @@
           <a:p>
             <a:fld id="{F24EF5F4-8F03-4ABB-88B3-7880A17E3B42}" type="datetimeFigureOut">
               <a:rPr lang="en-US" smtClean="0"/>
-              <a:t>2/11/2024</a:t>
+              <a:t>2/12/2024</a:t>
             </a:fld>
             <a:endParaRPr lang="en-US"/>
           </a:p>
@@ -3955,7 +3960,7 @@
           <a:p>
             <a:fld id="{F24EF5F4-8F03-4ABB-88B3-7880A17E3B42}" type="datetimeFigureOut">
               <a:rPr lang="en-US" smtClean="0"/>
-              <a:t>2/11/2024</a:t>
+              <a:t>2/12/2024</a:t>
             </a:fld>
             <a:endParaRPr lang="en-US"/>
           </a:p>
@@ -4050,7 +4055,7 @@
           <a:p>
             <a:fld id="{F24EF5F4-8F03-4ABB-88B3-7880A17E3B42}" type="datetimeFigureOut">
               <a:rPr lang="en-US" smtClean="0"/>
-              <a:t>2/11/2024</a:t>
+              <a:t>2/12/2024</a:t>
             </a:fld>
             <a:endParaRPr lang="en-US"/>
           </a:p>
@@ -4305,7 +4310,7 @@
           <a:p>
             <a:fld id="{F24EF5F4-8F03-4ABB-88B3-7880A17E3B42}" type="datetimeFigureOut">
               <a:rPr lang="en-US" smtClean="0"/>
-              <a:t>2/11/2024</a:t>
+              <a:t>2/12/2024</a:t>
             </a:fld>
             <a:endParaRPr lang="en-US"/>
           </a:p>
@@ -4568,7 +4573,7 @@
           <a:p>
             <a:fld id="{F24EF5F4-8F03-4ABB-88B3-7880A17E3B42}" type="datetimeFigureOut">
               <a:rPr lang="en-US" smtClean="0"/>
-              <a:t>2/11/2024</a:t>
+              <a:t>2/12/2024</a:t>
             </a:fld>
             <a:endParaRPr lang="en-US"/>
           </a:p>
@@ -5311,7 +5316,7 @@
           <a:p>
             <a:fld id="{F24EF5F4-8F03-4ABB-88B3-7880A17E3B42}" type="datetimeFigureOut">
               <a:rPr lang="en-US" smtClean="0"/>
-              <a:t>2/11/2024</a:t>
+              <a:t>2/12/2024</a:t>
             </a:fld>
             <a:endParaRPr lang="en-US"/>
           </a:p>
@@ -6866,12 +6871,140 @@
           <a:chExt cx="0" cy="0"/>
         </a:xfrm>
       </p:grpSpPr>
+      <p:sp>
+        <p:nvSpPr>
+          <p:cNvPr id="2" name="Title 1">
+            <a:extLst>
+              <a:ext uri="{FF2B5EF4-FFF2-40B4-BE49-F238E27FC236}">
+                <a16:creationId xmlns:a16="http://schemas.microsoft.com/office/drawing/2014/main" id="{1B24E665-5B89-EB78-C0E2-7832422881BA}"/>
+              </a:ext>
+            </a:extLst>
+          </p:cNvPr>
+          <p:cNvSpPr>
+            <a:spLocks noGrp="1"/>
+          </p:cNvSpPr>
+          <p:nvPr>
+            <p:ph type="title"/>
+          </p:nvPr>
+        </p:nvSpPr>
+        <p:spPr/>
+        <p:txBody>
+          <a:bodyPr/>
+          <a:lstStyle/>
+          <a:p>
+            <a:r>
+              <a:rPr lang="en-US" dirty="0"/>
+              <a:t>Song Speeds (BPM – Beats Per Minute)</a:t>
+            </a:r>
+          </a:p>
+        </p:txBody>
+      </p:sp>
+      <p:sp>
+        <p:nvSpPr>
+          <p:cNvPr id="6" name="TextBox 5">
+            <a:extLst>
+              <a:ext uri="{FF2B5EF4-FFF2-40B4-BE49-F238E27FC236}">
+                <a16:creationId xmlns:a16="http://schemas.microsoft.com/office/drawing/2014/main" id="{642D8BB6-B6BA-F68E-72A4-85A48931554D}"/>
+              </a:ext>
+            </a:extLst>
+          </p:cNvPr>
+          <p:cNvSpPr txBox="1"/>
+          <p:nvPr/>
+        </p:nvSpPr>
+        <p:spPr>
+          <a:xfrm>
+            <a:off x="7956331" y="1690688"/>
+            <a:ext cx="4056994" cy="4524315"/>
+          </a:xfrm>
+          <a:prstGeom prst="rect">
+            <a:avLst/>
+          </a:prstGeom>
+          <a:noFill/>
+        </p:spPr>
+        <p:txBody>
+          <a:bodyPr wrap="square" rtlCol="0">
+            <a:spAutoFit/>
+          </a:bodyPr>
+          <a:lstStyle/>
+          <a:p>
+            <a:pPr marL="285750" indent="-285750">
+              <a:buFont typeface="Arial" panose="020B0604020202020204" pitchFamily="34" charset="0"/>
+              <a:buChar char="•"/>
+            </a:pPr>
+            <a:r>
+              <a:rPr lang="en-US" dirty="0"/>
+              <a:t>The Top 20 Artist sample is very similar in structure to the data population.</a:t>
+            </a:r>
+          </a:p>
+          <a:p>
+            <a:pPr marL="285750" indent="-285750">
+              <a:buFont typeface="Arial" panose="020B0604020202020204" pitchFamily="34" charset="0"/>
+              <a:buChar char="•"/>
+            </a:pPr>
+            <a:endParaRPr lang="en-US" dirty="0"/>
+          </a:p>
+          <a:p>
+            <a:pPr marL="285750" indent="-285750">
+              <a:buFont typeface="Arial" panose="020B0604020202020204" pitchFamily="34" charset="0"/>
+              <a:buChar char="•"/>
+            </a:pPr>
+            <a:r>
+              <a:rPr lang="en-US" dirty="0"/>
+              <a:t>The median BPM for the sample (120bpm) is extremely close to the median BPM of the population (121bpm).</a:t>
+            </a:r>
+          </a:p>
+          <a:p>
+            <a:pPr marL="285750" indent="-285750">
+              <a:buFont typeface="Arial" panose="020B0604020202020204" pitchFamily="34" charset="0"/>
+              <a:buChar char="•"/>
+            </a:pPr>
+            <a:endParaRPr lang="en-US" dirty="0"/>
+          </a:p>
+          <a:p>
+            <a:pPr marL="285750" indent="-285750">
+              <a:buFont typeface="Arial" panose="020B0604020202020204" pitchFamily="34" charset="0"/>
+              <a:buChar char="•"/>
+            </a:pPr>
+            <a:r>
+              <a:rPr lang="en-US" dirty="0"/>
+              <a:t>The mode for Top Artists is considerably lower</a:t>
+            </a:r>
+          </a:p>
+          <a:p>
+            <a:pPr marL="742950" lvl="1" indent="-285750">
+              <a:buFont typeface="Arial" panose="020B0604020202020204" pitchFamily="34" charset="0"/>
+              <a:buChar char="•"/>
+            </a:pPr>
+            <a:r>
+              <a:rPr lang="en-US" dirty="0"/>
+              <a:t>Top Artists Mode: 90bpm, 7 songs (2.7% of songs in sample)</a:t>
+            </a:r>
+          </a:p>
+          <a:p>
+            <a:pPr marL="742950" lvl="1" indent="-285750">
+              <a:buFont typeface="Arial" panose="020B0604020202020204" pitchFamily="34" charset="0"/>
+              <a:buChar char="•"/>
+            </a:pPr>
+            <a:endParaRPr lang="en-US" dirty="0"/>
+          </a:p>
+          <a:p>
+            <a:pPr marL="742950" lvl="1" indent="-285750">
+              <a:buFont typeface="Arial" panose="020B0604020202020204" pitchFamily="34" charset="0"/>
+              <a:buChar char="•"/>
+            </a:pPr>
+            <a:r>
+              <a:rPr lang="en-US" dirty="0"/>
+              <a:t>All Songs: 120bpm, 34 songs (3.6% of songs in population)</a:t>
+            </a:r>
+          </a:p>
+        </p:txBody>
+      </p:sp>
       <p:pic>
         <p:nvPicPr>
-          <p:cNvPr id="5" name="Content Placeholder 4">
+          <p:cNvPr id="8" name="Content Placeholder 7">
             <a:extLst>
               <a:ext uri="{FF2B5EF4-FFF2-40B4-BE49-F238E27FC236}">
-                <a16:creationId xmlns:a16="http://schemas.microsoft.com/office/drawing/2014/main" id="{72008266-F764-2423-D943-8480B6FA1FB5}"/>
+                <a16:creationId xmlns:a16="http://schemas.microsoft.com/office/drawing/2014/main" id="{04D86521-6FBA-DB49-BD3C-CAC4A64E1817}"/>
               </a:ext>
             </a:extLst>
           </p:cNvPr>
@@ -6896,45 +7029,17 @@
         </p:blipFill>
         <p:spPr>
           <a:xfrm>
-            <a:off x="0" y="901370"/>
-            <a:ext cx="8387256" cy="5591505"/>
+            <a:off x="677334" y="1331467"/>
+            <a:ext cx="6555910" cy="4916933"/>
           </a:xfrm>
         </p:spPr>
       </p:pic>
       <p:sp>
         <p:nvSpPr>
-          <p:cNvPr id="2" name="Title 1">
+          <p:cNvPr id="9" name="TextBox 8">
             <a:extLst>
               <a:ext uri="{FF2B5EF4-FFF2-40B4-BE49-F238E27FC236}">
-                <a16:creationId xmlns:a16="http://schemas.microsoft.com/office/drawing/2014/main" id="{1B24E665-5B89-EB78-C0E2-7832422881BA}"/>
-              </a:ext>
-            </a:extLst>
-          </p:cNvPr>
-          <p:cNvSpPr>
-            <a:spLocks noGrp="1"/>
-          </p:cNvSpPr>
-          <p:nvPr>
-            <p:ph type="title"/>
-          </p:nvPr>
-        </p:nvSpPr>
-        <p:spPr/>
-        <p:txBody>
-          <a:bodyPr/>
-          <a:lstStyle/>
-          <a:p>
-            <a:r>
-              <a:rPr lang="en-US" dirty="0"/>
-              <a:t>Song Speeds (BPM – Beats Per Minute)</a:t>
-            </a:r>
-          </a:p>
-        </p:txBody>
-      </p:sp>
-      <p:sp>
-        <p:nvSpPr>
-          <p:cNvPr id="6" name="TextBox 5">
-            <a:extLst>
-              <a:ext uri="{FF2B5EF4-FFF2-40B4-BE49-F238E27FC236}">
-                <a16:creationId xmlns:a16="http://schemas.microsoft.com/office/drawing/2014/main" id="{642D8BB6-B6BA-F68E-72A4-85A48931554D}"/>
+                <a16:creationId xmlns:a16="http://schemas.microsoft.com/office/drawing/2014/main" id="{1B766D9F-F1B3-8EE3-B481-5F93AE61601E}"/>
               </a:ext>
             </a:extLst>
           </p:cNvPr>
@@ -6943,8 +7048,8 @@
         </p:nvSpPr>
         <p:spPr>
           <a:xfrm>
-            <a:off x="7956331" y="1690688"/>
-            <a:ext cx="4056994" cy="4524315"/>
+            <a:off x="1075058" y="6248400"/>
+            <a:ext cx="7178565" cy="276999"/>
           </a:xfrm>
           <a:prstGeom prst="rect">
             <a:avLst/>
@@ -6957,75 +7062,18 @@
           </a:bodyPr>
           <a:lstStyle/>
           <a:p>
-            <a:pPr marL="285750" indent="-285750">
-              <a:buFont typeface="Arial" panose="020B0604020202020204" pitchFamily="34" charset="0"/>
-              <a:buChar char="•"/>
-            </a:pPr>
-            <a:r>
-              <a:rPr lang="en-US" dirty="0"/>
-              <a:t>The Top 20 Artist sample is very similar in structure to the data population.</a:t>
-            </a:r>
-          </a:p>
-          <a:p>
-            <a:pPr marL="285750" indent="-285750">
-              <a:buFont typeface="Arial" panose="020B0604020202020204" pitchFamily="34" charset="0"/>
-              <a:buChar char="•"/>
-            </a:pPr>
-            <a:endParaRPr lang="en-US" dirty="0"/>
-          </a:p>
-          <a:p>
-            <a:pPr marL="285750" indent="-285750">
-              <a:buFont typeface="Arial" panose="020B0604020202020204" pitchFamily="34" charset="0"/>
-              <a:buChar char="•"/>
-            </a:pPr>
-            <a:r>
-              <a:rPr lang="en-US" dirty="0"/>
-              <a:t>The median BPM for the sample (120bpm) is extremely close to the median BPM of the population (121bpm).</a:t>
-            </a:r>
-          </a:p>
-          <a:p>
-            <a:pPr marL="285750" indent="-285750">
-              <a:buFont typeface="Arial" panose="020B0604020202020204" pitchFamily="34" charset="0"/>
-              <a:buChar char="•"/>
-            </a:pPr>
-            <a:endParaRPr lang="en-US" dirty="0"/>
-          </a:p>
-          <a:p>
-            <a:pPr marL="285750" indent="-285750">
-              <a:buFont typeface="Arial" panose="020B0604020202020204" pitchFamily="34" charset="0"/>
-              <a:buChar char="•"/>
-            </a:pPr>
-            <a:r>
-              <a:rPr lang="en-US" dirty="0"/>
-              <a:t>The mode for Top Artists is considerably lower</a:t>
-            </a:r>
-          </a:p>
-          <a:p>
-            <a:pPr marL="742950" lvl="1" indent="-285750">
-              <a:buFont typeface="Arial" panose="020B0604020202020204" pitchFamily="34" charset="0"/>
-              <a:buChar char="•"/>
-            </a:pPr>
-            <a:r>
-              <a:rPr lang="en-US" dirty="0"/>
-              <a:t>Top Artists Mode: 90bpm, 7 songs (2.7% of songs in sample)</a:t>
-            </a:r>
-          </a:p>
-          <a:p>
-            <a:pPr marL="742950" lvl="1" indent="-285750">
-              <a:buFont typeface="Arial" panose="020B0604020202020204" pitchFamily="34" charset="0"/>
-              <a:buChar char="•"/>
-            </a:pPr>
-            <a:endParaRPr lang="en-US" dirty="0"/>
-          </a:p>
-          <a:p>
-            <a:pPr marL="742950" lvl="1" indent="-285750">
-              <a:buFont typeface="Arial" panose="020B0604020202020204" pitchFamily="34" charset="0"/>
-              <a:buChar char="•"/>
-            </a:pPr>
-            <a:r>
-              <a:rPr lang="en-US" dirty="0"/>
-              <a:t>All Songs: 120bpm, 34 songs (3.6% of songs in population)</a:t>
-            </a:r>
+            <a:r>
+              <a:rPr lang="en-US" sz="1200" b="0" i="0" dirty="0">
+                <a:effectLst/>
+                <a:ea typeface="Calibri" panose="020F0502020204030204" pitchFamily="34" charset="0"/>
+                <a:cs typeface="Calibri" panose="020F0502020204030204" pitchFamily="34" charset="0"/>
+              </a:rPr>
+              <a:t>Standard Deviation of tempos: 37.462117528776375. p-value=3.927199818891401e-06)</a:t>
+            </a:r>
+            <a:endParaRPr lang="en-US" sz="1200" dirty="0">
+              <a:ea typeface="Calibri" panose="020F0502020204030204" pitchFamily="34" charset="0"/>
+              <a:cs typeface="Calibri" panose="020F0502020204030204" pitchFamily="34" charset="0"/>
+            </a:endParaRPr>
           </a:p>
         </p:txBody>
       </p:sp>

</xml_diff>

<commit_message>
adding Austins final part
</commit_message>
<xml_diff>
--- a/Project_1_Spotify_2023_Analysis.pptx
+++ b/Project_1_Spotify_2023_Analysis.pptx
@@ -9,14 +9,21 @@
     <p:sldId id="257" r:id="rId3"/>
     <p:sldId id="258" r:id="rId4"/>
     <p:sldId id="259" r:id="rId5"/>
-    <p:sldId id="260" r:id="rId6"/>
-    <p:sldId id="261" r:id="rId7"/>
-    <p:sldId id="262" r:id="rId8"/>
-    <p:sldId id="263" r:id="rId9"/>
-    <p:sldId id="264" r:id="rId10"/>
-    <p:sldId id="265" r:id="rId11"/>
-    <p:sldId id="266" r:id="rId12"/>
-    <p:sldId id="267" r:id="rId13"/>
+    <p:sldId id="276" r:id="rId6"/>
+    <p:sldId id="268" r:id="rId7"/>
+    <p:sldId id="269" r:id="rId8"/>
+    <p:sldId id="271" r:id="rId9"/>
+    <p:sldId id="272" r:id="rId10"/>
+    <p:sldId id="274" r:id="rId11"/>
+    <p:sldId id="275" r:id="rId12"/>
+    <p:sldId id="260" r:id="rId13"/>
+    <p:sldId id="261" r:id="rId14"/>
+    <p:sldId id="262" r:id="rId15"/>
+    <p:sldId id="263" r:id="rId16"/>
+    <p:sldId id="264" r:id="rId17"/>
+    <p:sldId id="265" r:id="rId18"/>
+    <p:sldId id="266" r:id="rId19"/>
+    <p:sldId id="267" r:id="rId20"/>
   </p:sldIdLst>
   <p:sldSz cx="12192000" cy="6858000"/>
   <p:notesSz cx="6858000" cy="9144000"/>
@@ -121,6 +128,658 @@
     </p:ext>
   </p:extLst>
 </p:presentation>
+</file>
+
+<file path=ppt/revisionInfo.xml><?xml version="1.0" encoding="utf-8"?>
+<p1510:revInfo xmlns:a="http://schemas.openxmlformats.org/drawingml/2006/main" xmlns:r="http://schemas.openxmlformats.org/officeDocument/2006/relationships" xmlns:p1510="http://schemas.microsoft.com/office/powerpoint/2015/10/main">
+  <p1510:revLst>
+    <p1510:client id="{91229494-101C-44C6-A748-F2A87574BFCE}" v="1" dt="2024-02-14T01:09:39.889"/>
+  </p1510:revLst>
+</p1510:revInfo>
+</file>
+
+<file path=ppt/changesInfos/changesInfo1.xml><?xml version="1.0" encoding="utf-8"?>
+<pc:chgInfo xmlns:a="http://schemas.openxmlformats.org/drawingml/2006/main" xmlns:r="http://schemas.openxmlformats.org/officeDocument/2006/relationships" xmlns:ac="http://schemas.microsoft.com/office/drawing/2013/main/command" xmlns:pc="http://schemas.microsoft.com/office/powerpoint/2013/main/command">
+  <pc:docChgLst>
+    <pc:chgData name="Austin DeVore" userId="1a1bd4e882332d4a" providerId="LiveId" clId="{91229494-101C-44C6-A748-F2A87574BFCE}"/>
+    <pc:docChg chg="undo custSel addSld delSld modSld sldOrd">
+      <pc:chgData name="Austin DeVore" userId="1a1bd4e882332d4a" providerId="LiveId" clId="{91229494-101C-44C6-A748-F2A87574BFCE}" dt="2024-02-14T01:57:06.986" v="3585" actId="14100"/>
+      <pc:docMkLst>
+        <pc:docMk/>
+      </pc:docMkLst>
+      <pc:sldChg chg="modSp mod">
+        <pc:chgData name="Austin DeVore" userId="1a1bd4e882332d4a" providerId="LiveId" clId="{91229494-101C-44C6-A748-F2A87574BFCE}" dt="2024-02-14T01:26:54.872" v="3557" actId="20577"/>
+        <pc:sldMkLst>
+          <pc:docMk/>
+          <pc:sldMk cId="2072924615" sldId="259"/>
+        </pc:sldMkLst>
+        <pc:spChg chg="mod">
+          <ac:chgData name="Austin DeVore" userId="1a1bd4e882332d4a" providerId="LiveId" clId="{91229494-101C-44C6-A748-F2A87574BFCE}" dt="2024-02-14T01:26:54.872" v="3557" actId="20577"/>
+          <ac:spMkLst>
+            <pc:docMk/>
+            <pc:sldMk cId="2072924615" sldId="259"/>
+            <ac:spMk id="3" creationId="{34F528BB-A567-F207-F019-3F6A56503126}"/>
+          </ac:spMkLst>
+        </pc:spChg>
+      </pc:sldChg>
+      <pc:sldChg chg="addSp delSp modSp new mod setBg">
+        <pc:chgData name="Austin DeVore" userId="1a1bd4e882332d4a" providerId="LiveId" clId="{91229494-101C-44C6-A748-F2A87574BFCE}" dt="2024-02-14T00:37:32.067" v="693" actId="20577"/>
+        <pc:sldMkLst>
+          <pc:docMk/>
+          <pc:sldMk cId="3774306730" sldId="268"/>
+        </pc:sldMkLst>
+        <pc:spChg chg="mod">
+          <ac:chgData name="Austin DeVore" userId="1a1bd4e882332d4a" providerId="LiveId" clId="{91229494-101C-44C6-A748-F2A87574BFCE}" dt="2024-02-14T00:32:52.992" v="276" actId="26606"/>
+          <ac:spMkLst>
+            <pc:docMk/>
+            <pc:sldMk cId="3774306730" sldId="268"/>
+            <ac:spMk id="2" creationId="{AE3EFF52-92EE-6AFA-5501-50BCC84E4E24}"/>
+          </ac:spMkLst>
+        </pc:spChg>
+        <pc:spChg chg="del">
+          <ac:chgData name="Austin DeVore" userId="1a1bd4e882332d4a" providerId="LiveId" clId="{91229494-101C-44C6-A748-F2A87574BFCE}" dt="2024-02-14T00:32:37.069" v="274" actId="22"/>
+          <ac:spMkLst>
+            <pc:docMk/>
+            <pc:sldMk cId="3774306730" sldId="268"/>
+            <ac:spMk id="3" creationId="{0D49B01B-C359-CA94-6D5C-1413DE9F16AD}"/>
+          </ac:spMkLst>
+        </pc:spChg>
+        <pc:spChg chg="add mod">
+          <ac:chgData name="Austin DeVore" userId="1a1bd4e882332d4a" providerId="LiveId" clId="{91229494-101C-44C6-A748-F2A87574BFCE}" dt="2024-02-14T00:37:32.067" v="693" actId="20577"/>
+          <ac:spMkLst>
+            <pc:docMk/>
+            <pc:sldMk cId="3774306730" sldId="268"/>
+            <ac:spMk id="9" creationId="{57B7D185-E567-59AB-CBC1-214C760BECE8}"/>
+          </ac:spMkLst>
+        </pc:spChg>
+        <pc:picChg chg="add del mod ord">
+          <ac:chgData name="Austin DeVore" userId="1a1bd4e882332d4a" providerId="LiveId" clId="{91229494-101C-44C6-A748-F2A87574BFCE}" dt="2024-02-14T00:34:18.777" v="423" actId="478"/>
+          <ac:picMkLst>
+            <pc:docMk/>
+            <pc:sldMk cId="3774306730" sldId="268"/>
+            <ac:picMk id="5" creationId="{4E90E299-5373-F315-5D82-D376CE1F8215}"/>
+          </ac:picMkLst>
+        </pc:picChg>
+        <pc:picChg chg="add mod">
+          <ac:chgData name="Austin DeVore" userId="1a1bd4e882332d4a" providerId="LiveId" clId="{91229494-101C-44C6-A748-F2A87574BFCE}" dt="2024-02-14T00:34:40.084" v="428" actId="14100"/>
+          <ac:picMkLst>
+            <pc:docMk/>
+            <pc:sldMk cId="3774306730" sldId="268"/>
+            <ac:picMk id="7" creationId="{2E1F712F-B2CA-5276-62C0-B9D54E2FBFB9}"/>
+          </ac:picMkLst>
+        </pc:picChg>
+      </pc:sldChg>
+      <pc:sldChg chg="addSp delSp modSp new mod setBg setClrOvrMap">
+        <pc:chgData name="Austin DeVore" userId="1a1bd4e882332d4a" providerId="LiveId" clId="{91229494-101C-44C6-A748-F2A87574BFCE}" dt="2024-02-14T01:28:15.236" v="3565" actId="20577"/>
+        <pc:sldMkLst>
+          <pc:docMk/>
+          <pc:sldMk cId="2197544456" sldId="269"/>
+        </pc:sldMkLst>
+        <pc:spChg chg="mod">
+          <ac:chgData name="Austin DeVore" userId="1a1bd4e882332d4a" providerId="LiveId" clId="{91229494-101C-44C6-A748-F2A87574BFCE}" dt="2024-02-14T01:28:15.236" v="3565" actId="20577"/>
+          <ac:spMkLst>
+            <pc:docMk/>
+            <pc:sldMk cId="2197544456" sldId="269"/>
+            <ac:spMk id="2" creationId="{212A3A41-1023-C460-F3A8-8D132BE0025A}"/>
+          </ac:spMkLst>
+        </pc:spChg>
+        <pc:spChg chg="del mod">
+          <ac:chgData name="Austin DeVore" userId="1a1bd4e882332d4a" providerId="LiveId" clId="{91229494-101C-44C6-A748-F2A87574BFCE}" dt="2024-02-14T00:39:30.168" v="700" actId="22"/>
+          <ac:spMkLst>
+            <pc:docMk/>
+            <pc:sldMk cId="2197544456" sldId="269"/>
+            <ac:spMk id="3" creationId="{A5D5BB34-AF13-4D9D-F6FD-3F4BD8FEB02E}"/>
+          </ac:spMkLst>
+        </pc:spChg>
+        <pc:spChg chg="add del">
+          <ac:chgData name="Austin DeVore" userId="1a1bd4e882332d4a" providerId="LiveId" clId="{91229494-101C-44C6-A748-F2A87574BFCE}" dt="2024-02-14T00:37:55.150" v="696" actId="26606"/>
+          <ac:spMkLst>
+            <pc:docMk/>
+            <pc:sldMk cId="2197544456" sldId="269"/>
+            <ac:spMk id="8" creationId="{603AE127-802C-459A-A612-DB85B67F0DC0}"/>
+          </ac:spMkLst>
+        </pc:spChg>
+        <pc:spChg chg="add del">
+          <ac:chgData name="Austin DeVore" userId="1a1bd4e882332d4a" providerId="LiveId" clId="{91229494-101C-44C6-A748-F2A87574BFCE}" dt="2024-02-14T00:37:55.150" v="696" actId="26606"/>
+          <ac:spMkLst>
+            <pc:docMk/>
+            <pc:sldMk cId="2197544456" sldId="269"/>
+            <ac:spMk id="10" creationId="{9323D83D-50D6-4040-A58B-FCEA340F886A}"/>
+          </ac:spMkLst>
+        </pc:spChg>
+        <pc:spChg chg="add del">
+          <ac:chgData name="Austin DeVore" userId="1a1bd4e882332d4a" providerId="LiveId" clId="{91229494-101C-44C6-A748-F2A87574BFCE}" dt="2024-02-14T00:37:55.150" v="696" actId="26606"/>
+          <ac:spMkLst>
+            <pc:docMk/>
+            <pc:sldMk cId="2197544456" sldId="269"/>
+            <ac:spMk id="14" creationId="{F10FD715-4DCE-4779-B634-EC78315EA213}"/>
+          </ac:spMkLst>
+        </pc:spChg>
+        <pc:spChg chg="add del">
+          <ac:chgData name="Austin DeVore" userId="1a1bd4e882332d4a" providerId="LiveId" clId="{91229494-101C-44C6-A748-F2A87574BFCE}" dt="2024-02-14T00:37:56.753" v="698" actId="26606"/>
+          <ac:spMkLst>
+            <pc:docMk/>
+            <pc:sldMk cId="2197544456" sldId="269"/>
+            <ac:spMk id="16" creationId="{7E018740-5C2B-4A41-AC1A-7E68D1EC1954}"/>
+          </ac:spMkLst>
+        </pc:spChg>
+        <pc:spChg chg="add del">
+          <ac:chgData name="Austin DeVore" userId="1a1bd4e882332d4a" providerId="LiveId" clId="{91229494-101C-44C6-A748-F2A87574BFCE}" dt="2024-02-14T00:37:56.753" v="698" actId="26606"/>
+          <ac:spMkLst>
+            <pc:docMk/>
+            <pc:sldMk cId="2197544456" sldId="269"/>
+            <ac:spMk id="17" creationId="{A65AC7D1-EAA9-48F5-B509-60A7F50BF703}"/>
+          </ac:spMkLst>
+        </pc:spChg>
+        <pc:spChg chg="add del">
+          <ac:chgData name="Austin DeVore" userId="1a1bd4e882332d4a" providerId="LiveId" clId="{91229494-101C-44C6-A748-F2A87574BFCE}" dt="2024-02-14T00:37:56.753" v="698" actId="26606"/>
+          <ac:spMkLst>
+            <pc:docMk/>
+            <pc:sldMk cId="2197544456" sldId="269"/>
+            <ac:spMk id="18" creationId="{166F75A4-C475-4941-8EE2-B80A06A2C1BB}"/>
+          </ac:spMkLst>
+        </pc:spChg>
+        <pc:spChg chg="add del">
+          <ac:chgData name="Austin DeVore" userId="1a1bd4e882332d4a" providerId="LiveId" clId="{91229494-101C-44C6-A748-F2A87574BFCE}" dt="2024-02-14T00:37:56.753" v="698" actId="26606"/>
+          <ac:spMkLst>
+            <pc:docMk/>
+            <pc:sldMk cId="2197544456" sldId="269"/>
+            <ac:spMk id="19" creationId="{D6320AF9-619A-4175-865B-5663E1AEF4C5}"/>
+          </ac:spMkLst>
+        </pc:spChg>
+        <pc:spChg chg="add del">
+          <ac:chgData name="Austin DeVore" userId="1a1bd4e882332d4a" providerId="LiveId" clId="{91229494-101C-44C6-A748-F2A87574BFCE}" dt="2024-02-14T00:37:56.753" v="698" actId="26606"/>
+          <ac:spMkLst>
+            <pc:docMk/>
+            <pc:sldMk cId="2197544456" sldId="269"/>
+            <ac:spMk id="20" creationId="{A032553A-72E8-4B0D-8405-FF9771C9AF05}"/>
+          </ac:spMkLst>
+        </pc:spChg>
+        <pc:spChg chg="add del">
+          <ac:chgData name="Austin DeVore" userId="1a1bd4e882332d4a" providerId="LiveId" clId="{91229494-101C-44C6-A748-F2A87574BFCE}" dt="2024-02-14T00:37:56.753" v="698" actId="26606"/>
+          <ac:spMkLst>
+            <pc:docMk/>
+            <pc:sldMk cId="2197544456" sldId="269"/>
+            <ac:spMk id="22" creationId="{765800AC-C3B9-498E-87BC-29FAE4C76B21}"/>
+          </ac:spMkLst>
+        </pc:spChg>
+        <pc:spChg chg="add del">
+          <ac:chgData name="Austin DeVore" userId="1a1bd4e882332d4a" providerId="LiveId" clId="{91229494-101C-44C6-A748-F2A87574BFCE}" dt="2024-02-14T00:37:56.753" v="698" actId="26606"/>
+          <ac:spMkLst>
+            <pc:docMk/>
+            <pc:sldMk cId="2197544456" sldId="269"/>
+            <ac:spMk id="24" creationId="{1F9D6ACB-2FF4-49F9-978A-E0D5327FC635}"/>
+          </ac:spMkLst>
+        </pc:spChg>
+        <pc:spChg chg="add del">
+          <ac:chgData name="Austin DeVore" userId="1a1bd4e882332d4a" providerId="LiveId" clId="{91229494-101C-44C6-A748-F2A87574BFCE}" dt="2024-02-14T00:37:56.753" v="698" actId="26606"/>
+          <ac:spMkLst>
+            <pc:docMk/>
+            <pc:sldMk cId="2197544456" sldId="269"/>
+            <ac:spMk id="26" creationId="{142BFA2A-77A0-4F60-A32A-685681C84889}"/>
+          </ac:spMkLst>
+        </pc:spChg>
+        <pc:spChg chg="add del">
+          <ac:chgData name="Austin DeVore" userId="1a1bd4e882332d4a" providerId="LiveId" clId="{91229494-101C-44C6-A748-F2A87574BFCE}" dt="2024-02-14T00:39:34.210" v="701" actId="26606"/>
+          <ac:spMkLst>
+            <pc:docMk/>
+            <pc:sldMk cId="2197544456" sldId="269"/>
+            <ac:spMk id="28" creationId="{603AE127-802C-459A-A612-DB85B67F0DC0}"/>
+          </ac:spMkLst>
+        </pc:spChg>
+        <pc:spChg chg="add del">
+          <ac:chgData name="Austin DeVore" userId="1a1bd4e882332d4a" providerId="LiveId" clId="{91229494-101C-44C6-A748-F2A87574BFCE}" dt="2024-02-14T00:39:34.210" v="701" actId="26606"/>
+          <ac:spMkLst>
+            <pc:docMk/>
+            <pc:sldMk cId="2197544456" sldId="269"/>
+            <ac:spMk id="29" creationId="{9323D83D-50D6-4040-A58B-FCEA340F886A}"/>
+          </ac:spMkLst>
+        </pc:spChg>
+        <pc:spChg chg="add del">
+          <ac:chgData name="Austin DeVore" userId="1a1bd4e882332d4a" providerId="LiveId" clId="{91229494-101C-44C6-A748-F2A87574BFCE}" dt="2024-02-14T00:39:34.210" v="701" actId="26606"/>
+          <ac:spMkLst>
+            <pc:docMk/>
+            <pc:sldMk cId="2197544456" sldId="269"/>
+            <ac:spMk id="31" creationId="{F10FD715-4DCE-4779-B634-EC78315EA213}"/>
+          </ac:spMkLst>
+        </pc:spChg>
+        <pc:spChg chg="add mod">
+          <ac:chgData name="Austin DeVore" userId="1a1bd4e882332d4a" providerId="LiveId" clId="{91229494-101C-44C6-A748-F2A87574BFCE}" dt="2024-02-14T00:43:20.564" v="1307" actId="33524"/>
+          <ac:spMkLst>
+            <pc:docMk/>
+            <pc:sldMk cId="2197544456" sldId="269"/>
+            <ac:spMk id="35" creationId="{E1FF7612-EFEC-7661-C370-8255A55D531C}"/>
+          </ac:spMkLst>
+        </pc:spChg>
+        <pc:picChg chg="add mod ord">
+          <ac:chgData name="Austin DeVore" userId="1a1bd4e882332d4a" providerId="LiveId" clId="{91229494-101C-44C6-A748-F2A87574BFCE}" dt="2024-02-14T00:39:34.210" v="701" actId="26606"/>
+          <ac:picMkLst>
+            <pc:docMk/>
+            <pc:sldMk cId="2197544456" sldId="269"/>
+            <ac:picMk id="5" creationId="{AFD2A77D-32F8-CB1F-1139-91DFA382B985}"/>
+          </ac:picMkLst>
+        </pc:picChg>
+        <pc:cxnChg chg="add del">
+          <ac:chgData name="Austin DeVore" userId="1a1bd4e882332d4a" providerId="LiveId" clId="{91229494-101C-44C6-A748-F2A87574BFCE}" dt="2024-02-14T00:37:55.150" v="696" actId="26606"/>
+          <ac:cxnSpMkLst>
+            <pc:docMk/>
+            <pc:sldMk cId="2197544456" sldId="269"/>
+            <ac:cxnSpMk id="12" creationId="{1A1FE6BB-DFB2-4080-9B5E-076EF5DDE67B}"/>
+          </ac:cxnSpMkLst>
+        </pc:cxnChg>
+        <pc:cxnChg chg="add del">
+          <ac:chgData name="Austin DeVore" userId="1a1bd4e882332d4a" providerId="LiveId" clId="{91229494-101C-44C6-A748-F2A87574BFCE}" dt="2024-02-14T00:37:56.753" v="698" actId="26606"/>
+          <ac:cxnSpMkLst>
+            <pc:docMk/>
+            <pc:sldMk cId="2197544456" sldId="269"/>
+            <ac:cxnSpMk id="21" creationId="{063B6EC6-D752-4EE7-908B-F8F19E8C7FEA}"/>
+          </ac:cxnSpMkLst>
+        </pc:cxnChg>
+        <pc:cxnChg chg="add del">
+          <ac:chgData name="Austin DeVore" userId="1a1bd4e882332d4a" providerId="LiveId" clId="{91229494-101C-44C6-A748-F2A87574BFCE}" dt="2024-02-14T00:37:56.753" v="698" actId="26606"/>
+          <ac:cxnSpMkLst>
+            <pc:docMk/>
+            <pc:sldMk cId="2197544456" sldId="269"/>
+            <ac:cxnSpMk id="23" creationId="{EFECD4E8-AD3E-4228-82A2-9461958EA94D}"/>
+          </ac:cxnSpMkLst>
+        </pc:cxnChg>
+        <pc:cxnChg chg="add del">
+          <ac:chgData name="Austin DeVore" userId="1a1bd4e882332d4a" providerId="LiveId" clId="{91229494-101C-44C6-A748-F2A87574BFCE}" dt="2024-02-14T00:39:34.210" v="701" actId="26606"/>
+          <ac:cxnSpMkLst>
+            <pc:docMk/>
+            <pc:sldMk cId="2197544456" sldId="269"/>
+            <ac:cxnSpMk id="30" creationId="{1A1FE6BB-DFB2-4080-9B5E-076EF5DDE67B}"/>
+          </ac:cxnSpMkLst>
+        </pc:cxnChg>
+      </pc:sldChg>
+      <pc:sldChg chg="modSp new del mod">
+        <pc:chgData name="Austin DeVore" userId="1a1bd4e882332d4a" providerId="LiveId" clId="{91229494-101C-44C6-A748-F2A87574BFCE}" dt="2024-02-14T01:12:31.996" v="2581" actId="2696"/>
+        <pc:sldMkLst>
+          <pc:docMk/>
+          <pc:sldMk cId="2298259598" sldId="270"/>
+        </pc:sldMkLst>
+        <pc:spChg chg="mod">
+          <ac:chgData name="Austin DeVore" userId="1a1bd4e882332d4a" providerId="LiveId" clId="{91229494-101C-44C6-A748-F2A87574BFCE}" dt="2024-02-14T00:44:08.870" v="1418" actId="20577"/>
+          <ac:spMkLst>
+            <pc:docMk/>
+            <pc:sldMk cId="2298259598" sldId="270"/>
+            <ac:spMk id="2" creationId="{A1BB6D91-E348-DF84-BC67-C2573FFF37AE}"/>
+          </ac:spMkLst>
+        </pc:spChg>
+        <pc:spChg chg="mod">
+          <ac:chgData name="Austin DeVore" userId="1a1bd4e882332d4a" providerId="LiveId" clId="{91229494-101C-44C6-A748-F2A87574BFCE}" dt="2024-02-14T01:02:42.297" v="1746" actId="33524"/>
+          <ac:spMkLst>
+            <pc:docMk/>
+            <pc:sldMk cId="2298259598" sldId="270"/>
+            <ac:spMk id="3" creationId="{8ECA0A59-5D9E-EEFB-6B40-BC0FD419A05B}"/>
+          </ac:spMkLst>
+        </pc:spChg>
+      </pc:sldChg>
+      <pc:sldChg chg="addSp delSp modSp new mod setBg">
+        <pc:chgData name="Austin DeVore" userId="1a1bd4e882332d4a" providerId="LiveId" clId="{91229494-101C-44C6-A748-F2A87574BFCE}" dt="2024-02-14T01:57:06.986" v="3585" actId="14100"/>
+        <pc:sldMkLst>
+          <pc:docMk/>
+          <pc:sldMk cId="3355426526" sldId="271"/>
+        </pc:sldMkLst>
+        <pc:spChg chg="mod">
+          <ac:chgData name="Austin DeVore" userId="1a1bd4e882332d4a" providerId="LiveId" clId="{91229494-101C-44C6-A748-F2A87574BFCE}" dt="2024-02-14T01:04:20.944" v="1774" actId="20577"/>
+          <ac:spMkLst>
+            <pc:docMk/>
+            <pc:sldMk cId="3355426526" sldId="271"/>
+            <ac:spMk id="2" creationId="{30E640F4-F82F-8C11-1826-7EEF71E5BD38}"/>
+          </ac:spMkLst>
+        </pc:spChg>
+        <pc:spChg chg="del mod">
+          <ac:chgData name="Austin DeVore" userId="1a1bd4e882332d4a" providerId="LiveId" clId="{91229494-101C-44C6-A748-F2A87574BFCE}" dt="2024-02-14T01:03:58.417" v="1755" actId="22"/>
+          <ac:spMkLst>
+            <pc:docMk/>
+            <pc:sldMk cId="3355426526" sldId="271"/>
+            <ac:spMk id="3" creationId="{971AF2A3-5D8D-B8DD-2CB6-C5B21BEC3D9E}"/>
+          </ac:spMkLst>
+        </pc:spChg>
+        <pc:spChg chg="add del">
+          <ac:chgData name="Austin DeVore" userId="1a1bd4e882332d4a" providerId="LiveId" clId="{91229494-101C-44C6-A748-F2A87574BFCE}" dt="2024-02-14T01:03:06.265" v="1749" actId="26606"/>
+          <ac:spMkLst>
+            <pc:docMk/>
+            <pc:sldMk cId="3355426526" sldId="271"/>
+            <ac:spMk id="8" creationId="{603AE127-802C-459A-A612-DB85B67F0DC0}"/>
+          </ac:spMkLst>
+        </pc:spChg>
+        <pc:spChg chg="add del">
+          <ac:chgData name="Austin DeVore" userId="1a1bd4e882332d4a" providerId="LiveId" clId="{91229494-101C-44C6-A748-F2A87574BFCE}" dt="2024-02-14T01:03:06.265" v="1749" actId="26606"/>
+          <ac:spMkLst>
+            <pc:docMk/>
+            <pc:sldMk cId="3355426526" sldId="271"/>
+            <ac:spMk id="10" creationId="{9323D83D-50D6-4040-A58B-FCEA340F886A}"/>
+          </ac:spMkLst>
+        </pc:spChg>
+        <pc:spChg chg="add del">
+          <ac:chgData name="Austin DeVore" userId="1a1bd4e882332d4a" providerId="LiveId" clId="{91229494-101C-44C6-A748-F2A87574BFCE}" dt="2024-02-14T01:03:06.265" v="1749" actId="26606"/>
+          <ac:spMkLst>
+            <pc:docMk/>
+            <pc:sldMk cId="3355426526" sldId="271"/>
+            <ac:spMk id="14" creationId="{F10FD715-4DCE-4779-B634-EC78315EA213}"/>
+          </ac:spMkLst>
+        </pc:spChg>
+        <pc:spChg chg="add del">
+          <ac:chgData name="Austin DeVore" userId="1a1bd4e882332d4a" providerId="LiveId" clId="{91229494-101C-44C6-A748-F2A87574BFCE}" dt="2024-02-14T01:03:07.233" v="1751" actId="26606"/>
+          <ac:spMkLst>
+            <pc:docMk/>
+            <pc:sldMk cId="3355426526" sldId="271"/>
+            <ac:spMk id="16" creationId="{E80B86A7-A1EC-475B-9166-88902B033A38}"/>
+          </ac:spMkLst>
+        </pc:spChg>
+        <pc:spChg chg="add del">
+          <ac:chgData name="Austin DeVore" userId="1a1bd4e882332d4a" providerId="LiveId" clId="{91229494-101C-44C6-A748-F2A87574BFCE}" dt="2024-02-14T01:03:07.233" v="1751" actId="26606"/>
+          <ac:spMkLst>
+            <pc:docMk/>
+            <pc:sldMk cId="3355426526" sldId="271"/>
+            <ac:spMk id="17" creationId="{C2C29CB1-9F74-4879-A6AF-AEA67B6F1F4D}"/>
+          </ac:spMkLst>
+        </pc:spChg>
+        <pc:spChg chg="add del">
+          <ac:chgData name="Austin DeVore" userId="1a1bd4e882332d4a" providerId="LiveId" clId="{91229494-101C-44C6-A748-F2A87574BFCE}" dt="2024-02-14T01:03:07.233" v="1751" actId="26606"/>
+          <ac:spMkLst>
+            <pc:docMk/>
+            <pc:sldMk cId="3355426526" sldId="271"/>
+            <ac:spMk id="18" creationId="{7E2C7115-5336-410C-AD71-0F0952A2E5A7}"/>
+          </ac:spMkLst>
+        </pc:spChg>
+        <pc:spChg chg="add del">
+          <ac:chgData name="Austin DeVore" userId="1a1bd4e882332d4a" providerId="LiveId" clId="{91229494-101C-44C6-A748-F2A87574BFCE}" dt="2024-02-14T01:04:07.862" v="1756" actId="26606"/>
+          <ac:spMkLst>
+            <pc:docMk/>
+            <pc:sldMk cId="3355426526" sldId="271"/>
+            <ac:spMk id="22" creationId="{603AE127-802C-459A-A612-DB85B67F0DC0}"/>
+          </ac:spMkLst>
+        </pc:spChg>
+        <pc:spChg chg="add del">
+          <ac:chgData name="Austin DeVore" userId="1a1bd4e882332d4a" providerId="LiveId" clId="{91229494-101C-44C6-A748-F2A87574BFCE}" dt="2024-02-14T01:04:07.862" v="1756" actId="26606"/>
+          <ac:spMkLst>
+            <pc:docMk/>
+            <pc:sldMk cId="3355426526" sldId="271"/>
+            <ac:spMk id="23" creationId="{9323D83D-50D6-4040-A58B-FCEA340F886A}"/>
+          </ac:spMkLst>
+        </pc:spChg>
+        <pc:spChg chg="add del">
+          <ac:chgData name="Austin DeVore" userId="1a1bd4e882332d4a" providerId="LiveId" clId="{91229494-101C-44C6-A748-F2A87574BFCE}" dt="2024-02-14T01:04:07.862" v="1756" actId="26606"/>
+          <ac:spMkLst>
+            <pc:docMk/>
+            <pc:sldMk cId="3355426526" sldId="271"/>
+            <ac:spMk id="25" creationId="{F10FD715-4DCE-4779-B634-EC78315EA213}"/>
+          </ac:spMkLst>
+        </pc:spChg>
+        <pc:spChg chg="add mod">
+          <ac:chgData name="Austin DeVore" userId="1a1bd4e882332d4a" providerId="LiveId" clId="{91229494-101C-44C6-A748-F2A87574BFCE}" dt="2024-02-14T01:24:37.394" v="3524" actId="20577"/>
+          <ac:spMkLst>
+            <pc:docMk/>
+            <pc:sldMk cId="3355426526" sldId="271"/>
+            <ac:spMk id="29" creationId="{26F93B49-60C0-5FC7-3331-FC0AE489F089}"/>
+          </ac:spMkLst>
+        </pc:spChg>
+        <pc:picChg chg="add mod">
+          <ac:chgData name="Austin DeVore" userId="1a1bd4e882332d4a" providerId="LiveId" clId="{91229494-101C-44C6-A748-F2A87574BFCE}" dt="2024-02-14T01:57:06.986" v="3585" actId="14100"/>
+          <ac:picMkLst>
+            <pc:docMk/>
+            <pc:sldMk cId="3355426526" sldId="271"/>
+            <ac:picMk id="4" creationId="{6DEA3C44-D852-F48F-C51A-D01D5AC363BD}"/>
+          </ac:picMkLst>
+        </pc:picChg>
+        <pc:picChg chg="add del mod ord">
+          <ac:chgData name="Austin DeVore" userId="1a1bd4e882332d4a" providerId="LiveId" clId="{91229494-101C-44C6-A748-F2A87574BFCE}" dt="2024-02-14T01:57:00.592" v="3582" actId="478"/>
+          <ac:picMkLst>
+            <pc:docMk/>
+            <pc:sldMk cId="3355426526" sldId="271"/>
+            <ac:picMk id="5" creationId="{E4D12D67-E24D-48DF-3233-E0C26C02E663}"/>
+          </ac:picMkLst>
+        </pc:picChg>
+        <pc:cxnChg chg="add del">
+          <ac:chgData name="Austin DeVore" userId="1a1bd4e882332d4a" providerId="LiveId" clId="{91229494-101C-44C6-A748-F2A87574BFCE}" dt="2024-02-14T01:03:06.265" v="1749" actId="26606"/>
+          <ac:cxnSpMkLst>
+            <pc:docMk/>
+            <pc:sldMk cId="3355426526" sldId="271"/>
+            <ac:cxnSpMk id="12" creationId="{1A1FE6BB-DFB2-4080-9B5E-076EF5DDE67B}"/>
+          </ac:cxnSpMkLst>
+        </pc:cxnChg>
+        <pc:cxnChg chg="add del">
+          <ac:chgData name="Austin DeVore" userId="1a1bd4e882332d4a" providerId="LiveId" clId="{91229494-101C-44C6-A748-F2A87574BFCE}" dt="2024-02-14T01:03:39.953" v="1753" actId="26606"/>
+          <ac:cxnSpMkLst>
+            <pc:docMk/>
+            <pc:sldMk cId="3355426526" sldId="271"/>
+            <ac:cxnSpMk id="20" creationId="{0B5F7E3B-C5F1-40E0-A491-558BAFBC1127}"/>
+          </ac:cxnSpMkLst>
+        </pc:cxnChg>
+        <pc:cxnChg chg="add del">
+          <ac:chgData name="Austin DeVore" userId="1a1bd4e882332d4a" providerId="LiveId" clId="{91229494-101C-44C6-A748-F2A87574BFCE}" dt="2024-02-14T01:04:07.862" v="1756" actId="26606"/>
+          <ac:cxnSpMkLst>
+            <pc:docMk/>
+            <pc:sldMk cId="3355426526" sldId="271"/>
+            <ac:cxnSpMk id="24" creationId="{1A1FE6BB-DFB2-4080-9B5E-076EF5DDE67B}"/>
+          </ac:cxnSpMkLst>
+        </pc:cxnChg>
+      </pc:sldChg>
+      <pc:sldChg chg="addSp delSp modSp add mod">
+        <pc:chgData name="Austin DeVore" userId="1a1bd4e882332d4a" providerId="LiveId" clId="{91229494-101C-44C6-A748-F2A87574BFCE}" dt="2024-02-14T01:56:20.645" v="3581" actId="1076"/>
+        <pc:sldMkLst>
+          <pc:docMk/>
+          <pc:sldMk cId="305059005" sldId="272"/>
+        </pc:sldMkLst>
+        <pc:spChg chg="mod">
+          <ac:chgData name="Austin DeVore" userId="1a1bd4e882332d4a" providerId="LiveId" clId="{91229494-101C-44C6-A748-F2A87574BFCE}" dt="2024-02-14T01:07:16.316" v="2058" actId="20577"/>
+          <ac:spMkLst>
+            <pc:docMk/>
+            <pc:sldMk cId="305059005" sldId="272"/>
+            <ac:spMk id="2" creationId="{AC8776CB-E48F-AABE-ABA1-53FE4097FF13}"/>
+          </ac:spMkLst>
+        </pc:spChg>
+        <pc:spChg chg="mod">
+          <ac:chgData name="Austin DeVore" userId="1a1bd4e882332d4a" providerId="LiveId" clId="{91229494-101C-44C6-A748-F2A87574BFCE}" dt="2024-02-14T01:24:47.964" v="3525" actId="33524"/>
+          <ac:spMkLst>
+            <pc:docMk/>
+            <pc:sldMk cId="305059005" sldId="272"/>
+            <ac:spMk id="29" creationId="{5C96EF99-BB56-77F3-8EF8-A946DE2B0A1C}"/>
+          </ac:spMkLst>
+        </pc:spChg>
+        <pc:picChg chg="add del mod">
+          <ac:chgData name="Austin DeVore" userId="1a1bd4e882332d4a" providerId="LiveId" clId="{91229494-101C-44C6-A748-F2A87574BFCE}" dt="2024-02-14T01:56:09.776" v="3575" actId="478"/>
+          <ac:picMkLst>
+            <pc:docMk/>
+            <pc:sldMk cId="305059005" sldId="272"/>
+            <ac:picMk id="4" creationId="{1339CA8F-A50C-5D54-0422-EC0B0B877FCB}"/>
+          </ac:picMkLst>
+        </pc:picChg>
+        <pc:picChg chg="add mod">
+          <ac:chgData name="Austin DeVore" userId="1a1bd4e882332d4a" providerId="LiveId" clId="{91229494-101C-44C6-A748-F2A87574BFCE}" dt="2024-02-14T01:56:20.645" v="3581" actId="1076"/>
+          <ac:picMkLst>
+            <pc:docMk/>
+            <pc:sldMk cId="305059005" sldId="272"/>
+            <ac:picMk id="5" creationId="{8BE9A89E-1C1B-ED21-15CA-972669C3E39D}"/>
+          </ac:picMkLst>
+        </pc:picChg>
+        <pc:picChg chg="del">
+          <ac:chgData name="Austin DeVore" userId="1a1bd4e882332d4a" providerId="LiveId" clId="{91229494-101C-44C6-A748-F2A87574BFCE}" dt="2024-02-14T01:06:38.064" v="1985" actId="478"/>
+          <ac:picMkLst>
+            <pc:docMk/>
+            <pc:sldMk cId="305059005" sldId="272"/>
+            <ac:picMk id="5" creationId="{E28239E1-8868-F19B-8112-85B2FD821812}"/>
+          </ac:picMkLst>
+        </pc:picChg>
+      </pc:sldChg>
+      <pc:sldChg chg="addSp delSp modSp add del mod">
+        <pc:chgData name="Austin DeVore" userId="1a1bd4e882332d4a" providerId="LiveId" clId="{91229494-101C-44C6-A748-F2A87574BFCE}" dt="2024-02-14T01:09:55.797" v="2232" actId="2696"/>
+        <pc:sldMkLst>
+          <pc:docMk/>
+          <pc:sldMk cId="2834911284" sldId="273"/>
+        </pc:sldMkLst>
+        <pc:spChg chg="mod">
+          <ac:chgData name="Austin DeVore" userId="1a1bd4e882332d4a" providerId="LiveId" clId="{91229494-101C-44C6-A748-F2A87574BFCE}" dt="2024-02-14T01:09:50.478" v="2230" actId="21"/>
+          <ac:spMkLst>
+            <pc:docMk/>
+            <pc:sldMk cId="2834911284" sldId="273"/>
+            <ac:spMk id="2" creationId="{C1A724C2-F24D-E527-7575-BE8DD744BA12}"/>
+          </ac:spMkLst>
+        </pc:spChg>
+        <pc:spChg chg="mod">
+          <ac:chgData name="Austin DeVore" userId="1a1bd4e882332d4a" providerId="LiveId" clId="{91229494-101C-44C6-A748-F2A87574BFCE}" dt="2024-02-14T01:09:45.135" v="2229" actId="1076"/>
+          <ac:spMkLst>
+            <pc:docMk/>
+            <pc:sldMk cId="2834911284" sldId="273"/>
+            <ac:spMk id="29" creationId="{4202D2A6-FE0C-4E7E-56D3-2AF4CF674372}"/>
+          </ac:spMkLst>
+        </pc:spChg>
+        <pc:picChg chg="del">
+          <ac:chgData name="Austin DeVore" userId="1a1bd4e882332d4a" providerId="LiveId" clId="{91229494-101C-44C6-A748-F2A87574BFCE}" dt="2024-02-14T01:08:08.871" v="2141" actId="478"/>
+          <ac:picMkLst>
+            <pc:docMk/>
+            <pc:sldMk cId="2834911284" sldId="273"/>
+            <ac:picMk id="4" creationId="{EB080D05-B299-BB92-6A90-F44721C1A613}"/>
+          </ac:picMkLst>
+        </pc:picChg>
+        <pc:picChg chg="add del mod">
+          <ac:chgData name="Austin DeVore" userId="1a1bd4e882332d4a" providerId="LiveId" clId="{91229494-101C-44C6-A748-F2A87574BFCE}" dt="2024-02-14T01:09:38.139" v="2225" actId="21"/>
+          <ac:picMkLst>
+            <pc:docMk/>
+            <pc:sldMk cId="2834911284" sldId="273"/>
+            <ac:picMk id="5" creationId="{FB12D311-1A95-9350-0DC1-0CB2E25CB5A8}"/>
+          </ac:picMkLst>
+        </pc:picChg>
+      </pc:sldChg>
+      <pc:sldChg chg="addSp delSp modSp new mod setBg">
+        <pc:chgData name="Austin DeVore" userId="1a1bd4e882332d4a" providerId="LiveId" clId="{91229494-101C-44C6-A748-F2A87574BFCE}" dt="2024-02-14T01:55:29.885" v="3574" actId="1076"/>
+        <pc:sldMkLst>
+          <pc:docMk/>
+          <pc:sldMk cId="530585795" sldId="274"/>
+        </pc:sldMkLst>
+        <pc:spChg chg="mod">
+          <ac:chgData name="Austin DeVore" userId="1a1bd4e882332d4a" providerId="LiveId" clId="{91229494-101C-44C6-A748-F2A87574BFCE}" dt="2024-02-14T01:09:52.535" v="2231"/>
+          <ac:spMkLst>
+            <pc:docMk/>
+            <pc:sldMk cId="530585795" sldId="274"/>
+            <ac:spMk id="2" creationId="{769EA104-3516-110E-69FC-22CE74556295}"/>
+          </ac:spMkLst>
+        </pc:spChg>
+        <pc:spChg chg="del">
+          <ac:chgData name="Austin DeVore" userId="1a1bd4e882332d4a" providerId="LiveId" clId="{91229494-101C-44C6-A748-F2A87574BFCE}" dt="2024-02-14T01:09:39.888" v="2226"/>
+          <ac:spMkLst>
+            <pc:docMk/>
+            <pc:sldMk cId="530585795" sldId="274"/>
+            <ac:spMk id="3" creationId="{2C0ACBAF-DBA3-B455-B2B3-75D01ED5A1A3}"/>
+          </ac:spMkLst>
+        </pc:spChg>
+        <pc:spChg chg="add mod">
+          <ac:chgData name="Austin DeVore" userId="1a1bd4e882332d4a" providerId="LiveId" clId="{91229494-101C-44C6-A748-F2A87574BFCE}" dt="2024-02-14T01:10:54.860" v="2424" actId="20577"/>
+          <ac:spMkLst>
+            <pc:docMk/>
+            <pc:sldMk cId="530585795" sldId="274"/>
+            <ac:spMk id="9" creationId="{D36B9913-4A5B-B99A-C7C9-8F4970655EEC}"/>
+          </ac:spMkLst>
+        </pc:spChg>
+        <pc:picChg chg="add mod">
+          <ac:chgData name="Austin DeVore" userId="1a1bd4e882332d4a" providerId="LiveId" clId="{91229494-101C-44C6-A748-F2A87574BFCE}" dt="2024-02-14T01:55:29.885" v="3574" actId="1076"/>
+          <ac:picMkLst>
+            <pc:docMk/>
+            <pc:sldMk cId="530585795" sldId="274"/>
+            <ac:picMk id="4" creationId="{10A4B5A5-6CA9-1D8F-07A3-73F93BDF6F87}"/>
+          </ac:picMkLst>
+        </pc:picChg>
+        <pc:picChg chg="add del mod">
+          <ac:chgData name="Austin DeVore" userId="1a1bd4e882332d4a" providerId="LiveId" clId="{91229494-101C-44C6-A748-F2A87574BFCE}" dt="2024-02-14T01:55:21.193" v="3570" actId="478"/>
+          <ac:picMkLst>
+            <pc:docMk/>
+            <pc:sldMk cId="530585795" sldId="274"/>
+            <ac:picMk id="5" creationId="{FB12D311-1A95-9350-0DC1-0CB2E25CB5A8}"/>
+          </ac:picMkLst>
+        </pc:picChg>
+      </pc:sldChg>
+      <pc:sldChg chg="addSp delSp modSp add mod">
+        <pc:chgData name="Austin DeVore" userId="1a1bd4e882332d4a" providerId="LiveId" clId="{91229494-101C-44C6-A748-F2A87574BFCE}" dt="2024-02-14T01:54:55.912" v="3569" actId="14100"/>
+        <pc:sldMkLst>
+          <pc:docMk/>
+          <pc:sldMk cId="4040818844" sldId="275"/>
+        </pc:sldMkLst>
+        <pc:spChg chg="mod">
+          <ac:chgData name="Austin DeVore" userId="1a1bd4e882332d4a" providerId="LiveId" clId="{91229494-101C-44C6-A748-F2A87574BFCE}" dt="2024-02-14T01:11:35.526" v="2436" actId="20577"/>
+          <ac:spMkLst>
+            <pc:docMk/>
+            <pc:sldMk cId="4040818844" sldId="275"/>
+            <ac:spMk id="2" creationId="{49F0F6A6-8791-CFC7-6B6D-C845383634EC}"/>
+          </ac:spMkLst>
+        </pc:spChg>
+        <pc:spChg chg="mod">
+          <ac:chgData name="Austin DeVore" userId="1a1bd4e882332d4a" providerId="LiveId" clId="{91229494-101C-44C6-A748-F2A87574BFCE}" dt="2024-02-14T01:12:17.606" v="2580" actId="20577"/>
+          <ac:spMkLst>
+            <pc:docMk/>
+            <pc:sldMk cId="4040818844" sldId="275"/>
+            <ac:spMk id="9" creationId="{FA43E4AB-5AC6-EBDB-7171-22940288EC55}"/>
+          </ac:spMkLst>
+        </pc:spChg>
+        <pc:picChg chg="add del mod">
+          <ac:chgData name="Austin DeVore" userId="1a1bd4e882332d4a" providerId="LiveId" clId="{91229494-101C-44C6-A748-F2A87574BFCE}" dt="2024-02-14T01:54:50.604" v="3567" actId="478"/>
+          <ac:picMkLst>
+            <pc:docMk/>
+            <pc:sldMk cId="4040818844" sldId="275"/>
+            <ac:picMk id="4" creationId="{8A366BE4-F359-9145-B6B8-A2FF26BDCBF3}"/>
+          </ac:picMkLst>
+        </pc:picChg>
+        <pc:picChg chg="del">
+          <ac:chgData name="Austin DeVore" userId="1a1bd4e882332d4a" providerId="LiveId" clId="{91229494-101C-44C6-A748-F2A87574BFCE}" dt="2024-02-14T01:11:25.166" v="2427" actId="478"/>
+          <ac:picMkLst>
+            <pc:docMk/>
+            <pc:sldMk cId="4040818844" sldId="275"/>
+            <ac:picMk id="5" creationId="{052172F2-BD89-B907-EF9E-E39A27CD69BE}"/>
+          </ac:picMkLst>
+        </pc:picChg>
+        <pc:picChg chg="add mod">
+          <ac:chgData name="Austin DeVore" userId="1a1bd4e882332d4a" providerId="LiveId" clId="{91229494-101C-44C6-A748-F2A87574BFCE}" dt="2024-02-14T01:54:55.912" v="3569" actId="14100"/>
+          <ac:picMkLst>
+            <pc:docMk/>
+            <pc:sldMk cId="4040818844" sldId="275"/>
+            <ac:picMk id="5" creationId="{D8CD112F-B0EE-8DF0-1B13-ED7AEDDB3357}"/>
+          </ac:picMkLst>
+        </pc:picChg>
+      </pc:sldChg>
+      <pc:sldChg chg="addSp delSp modSp new mod ord setBg">
+        <pc:chgData name="Austin DeVore" userId="1a1bd4e882332d4a" providerId="LiveId" clId="{91229494-101C-44C6-A748-F2A87574BFCE}" dt="2024-02-14T01:27:25.644" v="3563" actId="20577"/>
+        <pc:sldMkLst>
+          <pc:docMk/>
+          <pc:sldMk cId="2819061766" sldId="276"/>
+        </pc:sldMkLst>
+        <pc:spChg chg="mod">
+          <ac:chgData name="Austin DeVore" userId="1a1bd4e882332d4a" providerId="LiveId" clId="{91229494-101C-44C6-A748-F2A87574BFCE}" dt="2024-02-14T01:27:25.644" v="3563" actId="20577"/>
+          <ac:spMkLst>
+            <pc:docMk/>
+            <pc:sldMk cId="2819061766" sldId="276"/>
+            <ac:spMk id="2" creationId="{A1BFCBFE-C5FF-CABC-4988-9A609A90B1ED}"/>
+          </ac:spMkLst>
+        </pc:spChg>
+        <pc:spChg chg="del">
+          <ac:chgData name="Austin DeVore" userId="1a1bd4e882332d4a" providerId="LiveId" clId="{91229494-101C-44C6-A748-F2A87574BFCE}" dt="2024-02-14T01:18:49.942" v="3124" actId="22"/>
+          <ac:spMkLst>
+            <pc:docMk/>
+            <pc:sldMk cId="2819061766" sldId="276"/>
+            <ac:spMk id="3" creationId="{9C9F5275-AAB6-B5CD-4305-C061F204D15D}"/>
+          </ac:spMkLst>
+        </pc:spChg>
+        <pc:spChg chg="add mod">
+          <ac:chgData name="Austin DeVore" userId="1a1bd4e882332d4a" providerId="LiveId" clId="{91229494-101C-44C6-A748-F2A87574BFCE}" dt="2024-02-14T01:25:27.692" v="3543" actId="20577"/>
+          <ac:spMkLst>
+            <pc:docMk/>
+            <pc:sldMk cId="2819061766" sldId="276"/>
+            <ac:spMk id="9" creationId="{C31A66E0-7F1F-910E-F8DB-C7500B528E4A}"/>
+          </ac:spMkLst>
+        </pc:spChg>
+        <pc:picChg chg="add mod ord">
+          <ac:chgData name="Austin DeVore" userId="1a1bd4e882332d4a" providerId="LiveId" clId="{91229494-101C-44C6-A748-F2A87574BFCE}" dt="2024-02-14T01:18:54.867" v="3126" actId="26606"/>
+          <ac:picMkLst>
+            <pc:docMk/>
+            <pc:sldMk cId="2819061766" sldId="276"/>
+            <ac:picMk id="5" creationId="{9AE1A3D4-9041-1C9A-AD0D-CFB398A7BE23}"/>
+          </ac:picMkLst>
+        </pc:picChg>
+      </pc:sldChg>
+    </pc:docChg>
+  </pc:docChgLst>
+</pc:chgInfo>
 </file>
 
 <file path=ppt/slideLayouts/slideLayout1.xml><?xml version="1.0" encoding="utf-8"?>
@@ -845,7 +1504,7 @@
           <a:p>
             <a:fld id="{F24EF5F4-8F03-4ABB-88B3-7880A17E3B42}" type="datetimeFigureOut">
               <a:rPr lang="en-US" smtClean="0"/>
-              <a:t>2/12/2024</a:t>
+              <a:t>2/13/2024</a:t>
             </a:fld>
             <a:endParaRPr lang="en-US"/>
           </a:p>
@@ -1096,7 +1755,7 @@
           <a:p>
             <a:fld id="{F24EF5F4-8F03-4ABB-88B3-7880A17E3B42}" type="datetimeFigureOut">
               <a:rPr lang="en-US" smtClean="0"/>
-              <a:t>2/12/2024</a:t>
+              <a:t>2/13/2024</a:t>
             </a:fld>
             <a:endParaRPr lang="en-US"/>
           </a:p>
@@ -1410,7 +2069,7 @@
           <a:p>
             <a:fld id="{F24EF5F4-8F03-4ABB-88B3-7880A17E3B42}" type="datetimeFigureOut">
               <a:rPr lang="en-US" smtClean="0"/>
-              <a:t>2/12/2024</a:t>
+              <a:t>2/13/2024</a:t>
             </a:fld>
             <a:endParaRPr lang="en-US"/>
           </a:p>
@@ -1751,7 +2410,7 @@
           <a:p>
             <a:fld id="{F24EF5F4-8F03-4ABB-88B3-7880A17E3B42}" type="datetimeFigureOut">
               <a:rPr lang="en-US" smtClean="0"/>
-              <a:t>2/12/2024</a:t>
+              <a:t>2/13/2024</a:t>
             </a:fld>
             <a:endParaRPr lang="en-US"/>
           </a:p>
@@ -2065,7 +2724,7 @@
           <a:p>
             <a:fld id="{F24EF5F4-8F03-4ABB-88B3-7880A17E3B42}" type="datetimeFigureOut">
               <a:rPr lang="en-US" smtClean="0"/>
-              <a:t>2/12/2024</a:t>
+              <a:t>2/13/2024</a:t>
             </a:fld>
             <a:endParaRPr lang="en-US"/>
           </a:p>
@@ -2458,7 +3117,7 @@
           <a:p>
             <a:fld id="{F24EF5F4-8F03-4ABB-88B3-7880A17E3B42}" type="datetimeFigureOut">
               <a:rPr lang="en-US" smtClean="0"/>
-              <a:t>2/12/2024</a:t>
+              <a:t>2/13/2024</a:t>
             </a:fld>
             <a:endParaRPr lang="en-US"/>
           </a:p>
@@ -2628,7 +3287,7 @@
           <a:p>
             <a:fld id="{F24EF5F4-8F03-4ABB-88B3-7880A17E3B42}" type="datetimeFigureOut">
               <a:rPr lang="en-US" smtClean="0"/>
-              <a:t>2/12/2024</a:t>
+              <a:t>2/13/2024</a:t>
             </a:fld>
             <a:endParaRPr lang="en-US"/>
           </a:p>
@@ -2808,7 +3467,7 @@
           <a:p>
             <a:fld id="{F24EF5F4-8F03-4ABB-88B3-7880A17E3B42}" type="datetimeFigureOut">
               <a:rPr lang="en-US" smtClean="0"/>
-              <a:t>2/12/2024</a:t>
+              <a:t>2/13/2024</a:t>
             </a:fld>
             <a:endParaRPr lang="en-US"/>
           </a:p>
@@ -2984,7 +3643,7 @@
           <a:p>
             <a:fld id="{F24EF5F4-8F03-4ABB-88B3-7880A17E3B42}" type="datetimeFigureOut">
               <a:rPr lang="en-US" smtClean="0"/>
-              <a:t>2/12/2024</a:t>
+              <a:t>2/13/2024</a:t>
             </a:fld>
             <a:endParaRPr lang="en-US"/>
           </a:p>
@@ -3231,7 +3890,7 @@
           <a:p>
             <a:fld id="{F24EF5F4-8F03-4ABB-88B3-7880A17E3B42}" type="datetimeFigureOut">
               <a:rPr lang="en-US" smtClean="0"/>
-              <a:t>2/12/2024</a:t>
+              <a:t>2/13/2024</a:t>
             </a:fld>
             <a:endParaRPr lang="en-US"/>
           </a:p>
@@ -3463,7 +4122,7 @@
           <a:p>
             <a:fld id="{F24EF5F4-8F03-4ABB-88B3-7880A17E3B42}" type="datetimeFigureOut">
               <a:rPr lang="en-US" smtClean="0"/>
-              <a:t>2/12/2024</a:t>
+              <a:t>2/13/2024</a:t>
             </a:fld>
             <a:endParaRPr lang="en-US"/>
           </a:p>
@@ -3837,7 +4496,7 @@
           <a:p>
             <a:fld id="{F24EF5F4-8F03-4ABB-88B3-7880A17E3B42}" type="datetimeFigureOut">
               <a:rPr lang="en-US" smtClean="0"/>
-              <a:t>2/12/2024</a:t>
+              <a:t>2/13/2024</a:t>
             </a:fld>
             <a:endParaRPr lang="en-US"/>
           </a:p>
@@ -3960,7 +4619,7 @@
           <a:p>
             <a:fld id="{F24EF5F4-8F03-4ABB-88B3-7880A17E3B42}" type="datetimeFigureOut">
               <a:rPr lang="en-US" smtClean="0"/>
-              <a:t>2/12/2024</a:t>
+              <a:t>2/13/2024</a:t>
             </a:fld>
             <a:endParaRPr lang="en-US"/>
           </a:p>
@@ -4055,7 +4714,7 @@
           <a:p>
             <a:fld id="{F24EF5F4-8F03-4ABB-88B3-7880A17E3B42}" type="datetimeFigureOut">
               <a:rPr lang="en-US" smtClean="0"/>
-              <a:t>2/12/2024</a:t>
+              <a:t>2/13/2024</a:t>
             </a:fld>
             <a:endParaRPr lang="en-US"/>
           </a:p>
@@ -4310,7 +4969,7 @@
           <a:p>
             <a:fld id="{F24EF5F4-8F03-4ABB-88B3-7880A17E3B42}" type="datetimeFigureOut">
               <a:rPr lang="en-US" smtClean="0"/>
-              <a:t>2/12/2024</a:t>
+              <a:t>2/13/2024</a:t>
             </a:fld>
             <a:endParaRPr lang="en-US"/>
           </a:p>
@@ -4573,7 +5232,7 @@
           <a:p>
             <a:fld id="{F24EF5F4-8F03-4ABB-88B3-7880A17E3B42}" type="datetimeFigureOut">
               <a:rPr lang="en-US" smtClean="0"/>
-              <a:t>2/12/2024</a:t>
+              <a:t>2/13/2024</a:t>
             </a:fld>
             <a:endParaRPr lang="en-US"/>
           </a:p>
@@ -5316,7 +5975,7 @@
           <a:p>
             <a:fld id="{F24EF5F4-8F03-4ABB-88B3-7880A17E3B42}" type="datetimeFigureOut">
               <a:rPr lang="en-US" smtClean="0"/>
-              <a:t>2/12/2024</a:t>
+              <a:t>2/13/2024</a:t>
             </a:fld>
             <a:endParaRPr lang="en-US"/>
           </a:p>
@@ -5933,6 +6592,1511 @@
 <file path=ppt/slides/slide10.xml><?xml version="1.0" encoding="utf-8"?>
 <p:sld xmlns:a="http://schemas.openxmlformats.org/drawingml/2006/main" xmlns:r="http://schemas.openxmlformats.org/officeDocument/2006/relationships" xmlns:p="http://schemas.openxmlformats.org/presentationml/2006/main">
   <p:cSld>
+    <p:bg>
+      <p:bgPr>
+        <a:solidFill>
+          <a:schemeClr val="bg1"/>
+        </a:solidFill>
+        <a:effectLst/>
+      </p:bgPr>
+    </p:bg>
+    <p:spTree>
+      <p:nvGrpSpPr>
+        <p:cNvPr id="1" name=""/>
+        <p:cNvGrpSpPr/>
+        <p:nvPr/>
+      </p:nvGrpSpPr>
+      <p:grpSpPr>
+        <a:xfrm>
+          <a:off x="0" y="0"/>
+          <a:ext cx="0" cy="0"/>
+          <a:chOff x="0" y="0"/>
+          <a:chExt cx="0" cy="0"/>
+        </a:xfrm>
+      </p:grpSpPr>
+      <p:sp>
+        <p:nvSpPr>
+          <p:cNvPr id="2" name="Title 1">
+            <a:extLst>
+              <a:ext uri="{FF2B5EF4-FFF2-40B4-BE49-F238E27FC236}">
+                <a16:creationId xmlns:a16="http://schemas.microsoft.com/office/drawing/2014/main" id="{769EA104-3516-110E-69FC-22CE74556295}"/>
+              </a:ext>
+            </a:extLst>
+          </p:cNvPr>
+          <p:cNvSpPr>
+            <a:spLocks noGrp="1"/>
+          </p:cNvSpPr>
+          <p:nvPr>
+            <p:ph type="title"/>
+          </p:nvPr>
+        </p:nvSpPr>
+        <p:spPr>
+          <a:xfrm>
+            <a:off x="677334" y="609600"/>
+            <a:ext cx="8596668" cy="1320800"/>
+          </a:xfrm>
+        </p:spPr>
+        <p:txBody>
+          <a:bodyPr anchor="t">
+            <a:normAutofit/>
+          </a:bodyPr>
+          <a:lstStyle/>
+          <a:p>
+            <a:r>
+              <a:rPr lang="en-US" dirty="0"/>
+              <a:t>Deezer Charts</a:t>
+            </a:r>
+          </a:p>
+        </p:txBody>
+      </p:sp>
+      <p:sp>
+        <p:nvSpPr>
+          <p:cNvPr id="9" name="Content Placeholder 8">
+            <a:extLst>
+              <a:ext uri="{FF2B5EF4-FFF2-40B4-BE49-F238E27FC236}">
+                <a16:creationId xmlns:a16="http://schemas.microsoft.com/office/drawing/2014/main" id="{D36B9913-4A5B-B99A-C7C9-8F4970655EEC}"/>
+              </a:ext>
+            </a:extLst>
+          </p:cNvPr>
+          <p:cNvSpPr>
+            <a:spLocks noGrp="1"/>
+          </p:cNvSpPr>
+          <p:nvPr>
+            <p:ph idx="1"/>
+          </p:nvPr>
+        </p:nvSpPr>
+        <p:spPr>
+          <a:xfrm>
+            <a:off x="6336287" y="2160589"/>
+            <a:ext cx="2934714" cy="3880773"/>
+          </a:xfrm>
+        </p:spPr>
+        <p:txBody>
+          <a:bodyPr>
+            <a:normAutofit/>
+          </a:bodyPr>
+          <a:lstStyle/>
+          <a:p>
+            <a:r>
+              <a:rPr lang="en-US" dirty="0"/>
+              <a:t>With songs that are on the platform Deezer, we can see there is a stronger correlation for when a song is higher on the chart compared to how many times a song is streamed.</a:t>
+            </a:r>
+          </a:p>
+        </p:txBody>
+      </p:sp>
+      <p:pic>
+        <p:nvPicPr>
+          <p:cNvPr id="4" name="Picture 3">
+            <a:extLst>
+              <a:ext uri="{FF2B5EF4-FFF2-40B4-BE49-F238E27FC236}">
+                <a16:creationId xmlns:a16="http://schemas.microsoft.com/office/drawing/2014/main" id="{10A4B5A5-6CA9-1D8F-07A3-73F93BDF6F87}"/>
+              </a:ext>
+            </a:extLst>
+          </p:cNvPr>
+          <p:cNvPicPr>
+            <a:picLocks noChangeAspect="1"/>
+          </p:cNvPicPr>
+          <p:nvPr/>
+        </p:nvPicPr>
+        <p:blipFill>
+          <a:blip r:embed="rId2"/>
+          <a:stretch>
+            <a:fillRect/>
+          </a:stretch>
+        </p:blipFill>
+        <p:spPr>
+          <a:xfrm>
+            <a:off x="506858" y="1982019"/>
+            <a:ext cx="5589142" cy="3707580"/>
+          </a:xfrm>
+          <a:prstGeom prst="rect">
+            <a:avLst/>
+          </a:prstGeom>
+        </p:spPr>
+      </p:pic>
+    </p:spTree>
+    <p:extLst>
+      <p:ext uri="{BB962C8B-B14F-4D97-AF65-F5344CB8AC3E}">
+        <p14:creationId xmlns:p14="http://schemas.microsoft.com/office/powerpoint/2010/main" val="530585795"/>
+      </p:ext>
+    </p:extLst>
+  </p:cSld>
+  <p:clrMapOvr>
+    <a:masterClrMapping/>
+  </p:clrMapOvr>
+</p:sld>
+</file>
+
+<file path=ppt/slides/slide11.xml><?xml version="1.0" encoding="utf-8"?>
+<p:sld xmlns:a="http://schemas.openxmlformats.org/drawingml/2006/main" xmlns:r="http://schemas.openxmlformats.org/officeDocument/2006/relationships" xmlns:p="http://schemas.openxmlformats.org/presentationml/2006/main">
+  <p:cSld>
+    <p:bg>
+      <p:bgPr>
+        <a:solidFill>
+          <a:schemeClr val="bg1"/>
+        </a:solidFill>
+        <a:effectLst/>
+      </p:bgPr>
+    </p:bg>
+    <p:spTree>
+      <p:nvGrpSpPr>
+        <p:cNvPr id="1" name="">
+          <a:extLst>
+            <a:ext uri="{FF2B5EF4-FFF2-40B4-BE49-F238E27FC236}">
+              <a16:creationId xmlns:a16="http://schemas.microsoft.com/office/drawing/2014/main" id="{2847D2D9-DF93-A8DD-9166-D13EC621CDA5}"/>
+            </a:ext>
+          </a:extLst>
+        </p:cNvPr>
+        <p:cNvGrpSpPr/>
+        <p:nvPr/>
+      </p:nvGrpSpPr>
+      <p:grpSpPr>
+        <a:xfrm>
+          <a:off x="0" y="0"/>
+          <a:ext cx="0" cy="0"/>
+          <a:chOff x="0" y="0"/>
+          <a:chExt cx="0" cy="0"/>
+        </a:xfrm>
+      </p:grpSpPr>
+      <p:sp>
+        <p:nvSpPr>
+          <p:cNvPr id="2" name="Title 1">
+            <a:extLst>
+              <a:ext uri="{FF2B5EF4-FFF2-40B4-BE49-F238E27FC236}">
+                <a16:creationId xmlns:a16="http://schemas.microsoft.com/office/drawing/2014/main" id="{49F0F6A6-8791-CFC7-6B6D-C845383634EC}"/>
+              </a:ext>
+            </a:extLst>
+          </p:cNvPr>
+          <p:cNvSpPr>
+            <a:spLocks noGrp="1"/>
+          </p:cNvSpPr>
+          <p:nvPr>
+            <p:ph type="title"/>
+          </p:nvPr>
+        </p:nvSpPr>
+        <p:spPr>
+          <a:xfrm>
+            <a:off x="677334" y="609600"/>
+            <a:ext cx="8596668" cy="1320800"/>
+          </a:xfrm>
+        </p:spPr>
+        <p:txBody>
+          <a:bodyPr anchor="t">
+            <a:normAutofit/>
+          </a:bodyPr>
+          <a:lstStyle/>
+          <a:p>
+            <a:r>
+              <a:rPr lang="en-US" dirty="0"/>
+              <a:t>Shazam Charts</a:t>
+            </a:r>
+          </a:p>
+        </p:txBody>
+      </p:sp>
+      <p:sp>
+        <p:nvSpPr>
+          <p:cNvPr id="9" name="Content Placeholder 8">
+            <a:extLst>
+              <a:ext uri="{FF2B5EF4-FFF2-40B4-BE49-F238E27FC236}">
+                <a16:creationId xmlns:a16="http://schemas.microsoft.com/office/drawing/2014/main" id="{FA43E4AB-5AC6-EBDB-7171-22940288EC55}"/>
+              </a:ext>
+            </a:extLst>
+          </p:cNvPr>
+          <p:cNvSpPr>
+            <a:spLocks noGrp="1"/>
+          </p:cNvSpPr>
+          <p:nvPr>
+            <p:ph idx="1"/>
+          </p:nvPr>
+        </p:nvSpPr>
+        <p:spPr>
+          <a:xfrm>
+            <a:off x="6336287" y="2160589"/>
+            <a:ext cx="2934714" cy="3880773"/>
+          </a:xfrm>
+        </p:spPr>
+        <p:txBody>
+          <a:bodyPr>
+            <a:normAutofit/>
+          </a:bodyPr>
+          <a:lstStyle/>
+          <a:p>
+            <a:r>
+              <a:rPr lang="en-US" dirty="0"/>
+              <a:t>Finally, with shazam, this gives us a strong correlation that shows a song higher rated on the chart, the more the song is streamed.</a:t>
+            </a:r>
+          </a:p>
+        </p:txBody>
+      </p:sp>
+      <p:pic>
+        <p:nvPicPr>
+          <p:cNvPr id="5" name="Picture 4">
+            <a:extLst>
+              <a:ext uri="{FF2B5EF4-FFF2-40B4-BE49-F238E27FC236}">
+                <a16:creationId xmlns:a16="http://schemas.microsoft.com/office/drawing/2014/main" id="{D8CD112F-B0EE-8DF0-1B13-ED7AEDDB3357}"/>
+              </a:ext>
+            </a:extLst>
+          </p:cNvPr>
+          <p:cNvPicPr>
+            <a:picLocks noChangeAspect="1"/>
+          </p:cNvPicPr>
+          <p:nvPr/>
+        </p:nvPicPr>
+        <p:blipFill>
+          <a:blip r:embed="rId2"/>
+          <a:stretch>
+            <a:fillRect/>
+          </a:stretch>
+        </p:blipFill>
+        <p:spPr>
+          <a:xfrm>
+            <a:off x="677335" y="1562208"/>
+            <a:ext cx="5642774" cy="3880773"/>
+          </a:xfrm>
+          <a:prstGeom prst="rect">
+            <a:avLst/>
+          </a:prstGeom>
+        </p:spPr>
+      </p:pic>
+    </p:spTree>
+    <p:extLst>
+      <p:ext uri="{BB962C8B-B14F-4D97-AF65-F5344CB8AC3E}">
+        <p14:creationId xmlns:p14="http://schemas.microsoft.com/office/powerpoint/2010/main" val="4040818844"/>
+      </p:ext>
+    </p:extLst>
+  </p:cSld>
+  <p:clrMapOvr>
+    <a:masterClrMapping/>
+  </p:clrMapOvr>
+</p:sld>
+</file>
+
+<file path=ppt/slides/slide12.xml><?xml version="1.0" encoding="utf-8"?>
+<p:sld xmlns:a="http://schemas.openxmlformats.org/drawingml/2006/main" xmlns:r="http://schemas.openxmlformats.org/officeDocument/2006/relationships" xmlns:p="http://schemas.openxmlformats.org/presentationml/2006/main">
+  <p:cSld>
+    <p:spTree>
+      <p:nvGrpSpPr>
+        <p:cNvPr id="1" name=""/>
+        <p:cNvGrpSpPr/>
+        <p:nvPr/>
+      </p:nvGrpSpPr>
+      <p:grpSpPr>
+        <a:xfrm>
+          <a:off x="0" y="0"/>
+          <a:ext cx="0" cy="0"/>
+          <a:chOff x="0" y="0"/>
+          <a:chExt cx="0" cy="0"/>
+        </a:xfrm>
+      </p:grpSpPr>
+      <p:sp>
+        <p:nvSpPr>
+          <p:cNvPr id="2" name="Title 1">
+            <a:extLst>
+              <a:ext uri="{FF2B5EF4-FFF2-40B4-BE49-F238E27FC236}">
+                <a16:creationId xmlns:a16="http://schemas.microsoft.com/office/drawing/2014/main" id="{C3D942C1-F821-163F-7497-06F9A11642B9}"/>
+              </a:ext>
+            </a:extLst>
+          </p:cNvPr>
+          <p:cNvSpPr>
+            <a:spLocks noGrp="1"/>
+          </p:cNvSpPr>
+          <p:nvPr>
+            <p:ph type="title"/>
+          </p:nvPr>
+        </p:nvSpPr>
+        <p:spPr/>
+        <p:txBody>
+          <a:bodyPr/>
+          <a:lstStyle/>
+          <a:p>
+            <a:r>
+              <a:rPr lang="en-US" dirty="0"/>
+              <a:t>Analysis of Musical Characteristics</a:t>
+            </a:r>
+          </a:p>
+        </p:txBody>
+      </p:sp>
+      <p:sp>
+        <p:nvSpPr>
+          <p:cNvPr id="3" name="Content Placeholder 2">
+            <a:extLst>
+              <a:ext uri="{FF2B5EF4-FFF2-40B4-BE49-F238E27FC236}">
+                <a16:creationId xmlns:a16="http://schemas.microsoft.com/office/drawing/2014/main" id="{AD1D5CB7-F90B-DA38-79C8-2A61393B40B9}"/>
+              </a:ext>
+            </a:extLst>
+          </p:cNvPr>
+          <p:cNvSpPr>
+            <a:spLocks noGrp="1"/>
+          </p:cNvSpPr>
+          <p:nvPr>
+            <p:ph idx="1"/>
+          </p:nvPr>
+        </p:nvSpPr>
+        <p:spPr/>
+        <p:txBody>
+          <a:bodyPr/>
+          <a:lstStyle/>
+          <a:p>
+            <a:r>
+              <a:rPr lang="en-US" dirty="0"/>
+              <a:t>Comparing the Top 20 Most Streamed Artists vs. the Entire Dataset</a:t>
+            </a:r>
+          </a:p>
+          <a:p>
+            <a:pPr lvl="1"/>
+            <a:r>
+              <a:rPr lang="en-US" dirty="0"/>
+              <a:t>Top Artists account for approximately 27% of included tracks, but received over 36% of streams</a:t>
+            </a:r>
+          </a:p>
+          <a:p>
+            <a:pPr lvl="1"/>
+            <a:endParaRPr lang="en-US" dirty="0"/>
+          </a:p>
+          <a:p>
+            <a:pPr lvl="1"/>
+            <a:r>
+              <a:rPr lang="en-US" dirty="0"/>
+              <a:t>Do Top Artists mimic the population, or forge their own path?</a:t>
+            </a:r>
+          </a:p>
+          <a:p>
+            <a:pPr lvl="1"/>
+            <a:endParaRPr lang="en-US" dirty="0"/>
+          </a:p>
+          <a:p>
+            <a:r>
+              <a:rPr lang="en-US" dirty="0"/>
+              <a:t>Considering Averages</a:t>
+            </a:r>
+          </a:p>
+          <a:p>
+            <a:pPr lvl="1"/>
+            <a:r>
+              <a:rPr lang="en-US" dirty="0"/>
+              <a:t>Due to the nature of songs as discrete pieces of content, analysis focuses on median and mode averages vs. mean calculations</a:t>
+            </a:r>
+          </a:p>
+        </p:txBody>
+      </p:sp>
+    </p:spTree>
+    <p:extLst>
+      <p:ext uri="{BB962C8B-B14F-4D97-AF65-F5344CB8AC3E}">
+        <p14:creationId xmlns:p14="http://schemas.microsoft.com/office/powerpoint/2010/main" val="855427616"/>
+      </p:ext>
+    </p:extLst>
+  </p:cSld>
+  <p:clrMapOvr>
+    <a:masterClrMapping/>
+  </p:clrMapOvr>
+</p:sld>
+</file>
+
+<file path=ppt/slides/slide13.xml><?xml version="1.0" encoding="utf-8"?>
+<p:sld xmlns:a="http://schemas.openxmlformats.org/drawingml/2006/main" xmlns:r="http://schemas.openxmlformats.org/officeDocument/2006/relationships" xmlns:p="http://schemas.openxmlformats.org/presentationml/2006/main">
+  <p:cSld>
+    <p:spTree>
+      <p:nvGrpSpPr>
+        <p:cNvPr id="1" name=""/>
+        <p:cNvGrpSpPr/>
+        <p:nvPr/>
+      </p:nvGrpSpPr>
+      <p:grpSpPr>
+        <a:xfrm>
+          <a:off x="0" y="0"/>
+          <a:ext cx="0" cy="0"/>
+          <a:chOff x="0" y="0"/>
+          <a:chExt cx="0" cy="0"/>
+        </a:xfrm>
+      </p:grpSpPr>
+      <p:sp>
+        <p:nvSpPr>
+          <p:cNvPr id="2" name="Title 1">
+            <a:extLst>
+              <a:ext uri="{FF2B5EF4-FFF2-40B4-BE49-F238E27FC236}">
+                <a16:creationId xmlns:a16="http://schemas.microsoft.com/office/drawing/2014/main" id="{1B24E665-5B89-EB78-C0E2-7832422881BA}"/>
+              </a:ext>
+            </a:extLst>
+          </p:cNvPr>
+          <p:cNvSpPr>
+            <a:spLocks noGrp="1"/>
+          </p:cNvSpPr>
+          <p:nvPr>
+            <p:ph type="title"/>
+          </p:nvPr>
+        </p:nvSpPr>
+        <p:spPr/>
+        <p:txBody>
+          <a:bodyPr/>
+          <a:lstStyle/>
+          <a:p>
+            <a:r>
+              <a:rPr lang="en-US" dirty="0"/>
+              <a:t>Song Speeds (BPM – Beats Per Minute)</a:t>
+            </a:r>
+          </a:p>
+        </p:txBody>
+      </p:sp>
+      <p:sp>
+        <p:nvSpPr>
+          <p:cNvPr id="6" name="TextBox 5">
+            <a:extLst>
+              <a:ext uri="{FF2B5EF4-FFF2-40B4-BE49-F238E27FC236}">
+                <a16:creationId xmlns:a16="http://schemas.microsoft.com/office/drawing/2014/main" id="{642D8BB6-B6BA-F68E-72A4-85A48931554D}"/>
+              </a:ext>
+            </a:extLst>
+          </p:cNvPr>
+          <p:cNvSpPr txBox="1"/>
+          <p:nvPr/>
+        </p:nvSpPr>
+        <p:spPr>
+          <a:xfrm>
+            <a:off x="7956331" y="1690688"/>
+            <a:ext cx="4056994" cy="4524315"/>
+          </a:xfrm>
+          <a:prstGeom prst="rect">
+            <a:avLst/>
+          </a:prstGeom>
+          <a:noFill/>
+        </p:spPr>
+        <p:txBody>
+          <a:bodyPr wrap="square" rtlCol="0">
+            <a:spAutoFit/>
+          </a:bodyPr>
+          <a:lstStyle/>
+          <a:p>
+            <a:pPr marL="285750" indent="-285750">
+              <a:buFont typeface="Arial" panose="020B0604020202020204" pitchFamily="34" charset="0"/>
+              <a:buChar char="•"/>
+            </a:pPr>
+            <a:r>
+              <a:rPr lang="en-US" dirty="0"/>
+              <a:t>The Top 20 Artist sample is very similar in structure to the data population.</a:t>
+            </a:r>
+          </a:p>
+          <a:p>
+            <a:pPr marL="285750" indent="-285750">
+              <a:buFont typeface="Arial" panose="020B0604020202020204" pitchFamily="34" charset="0"/>
+              <a:buChar char="•"/>
+            </a:pPr>
+            <a:endParaRPr lang="en-US" dirty="0"/>
+          </a:p>
+          <a:p>
+            <a:pPr marL="285750" indent="-285750">
+              <a:buFont typeface="Arial" panose="020B0604020202020204" pitchFamily="34" charset="0"/>
+              <a:buChar char="•"/>
+            </a:pPr>
+            <a:r>
+              <a:rPr lang="en-US" dirty="0"/>
+              <a:t>The median BPM for the sample (120bpm) is extremely close to the median BPM of the population (121bpm).</a:t>
+            </a:r>
+          </a:p>
+          <a:p>
+            <a:pPr marL="285750" indent="-285750">
+              <a:buFont typeface="Arial" panose="020B0604020202020204" pitchFamily="34" charset="0"/>
+              <a:buChar char="•"/>
+            </a:pPr>
+            <a:endParaRPr lang="en-US" dirty="0"/>
+          </a:p>
+          <a:p>
+            <a:pPr marL="285750" indent="-285750">
+              <a:buFont typeface="Arial" panose="020B0604020202020204" pitchFamily="34" charset="0"/>
+              <a:buChar char="•"/>
+            </a:pPr>
+            <a:r>
+              <a:rPr lang="en-US" dirty="0"/>
+              <a:t>The mode for Top Artists is considerably lower</a:t>
+            </a:r>
+          </a:p>
+          <a:p>
+            <a:pPr marL="742950" lvl="1" indent="-285750">
+              <a:buFont typeface="Arial" panose="020B0604020202020204" pitchFamily="34" charset="0"/>
+              <a:buChar char="•"/>
+            </a:pPr>
+            <a:r>
+              <a:rPr lang="en-US" dirty="0"/>
+              <a:t>Top Artists Mode: 90bpm, 7 songs (2.7% of songs in sample)</a:t>
+            </a:r>
+          </a:p>
+          <a:p>
+            <a:pPr marL="742950" lvl="1" indent="-285750">
+              <a:buFont typeface="Arial" panose="020B0604020202020204" pitchFamily="34" charset="0"/>
+              <a:buChar char="•"/>
+            </a:pPr>
+            <a:endParaRPr lang="en-US" dirty="0"/>
+          </a:p>
+          <a:p>
+            <a:pPr marL="742950" lvl="1" indent="-285750">
+              <a:buFont typeface="Arial" panose="020B0604020202020204" pitchFamily="34" charset="0"/>
+              <a:buChar char="•"/>
+            </a:pPr>
+            <a:r>
+              <a:rPr lang="en-US" dirty="0"/>
+              <a:t>All Songs: 120bpm, 34 songs (3.6% of songs in population)</a:t>
+            </a:r>
+          </a:p>
+        </p:txBody>
+      </p:sp>
+      <p:pic>
+        <p:nvPicPr>
+          <p:cNvPr id="8" name="Content Placeholder 7">
+            <a:extLst>
+              <a:ext uri="{FF2B5EF4-FFF2-40B4-BE49-F238E27FC236}">
+                <a16:creationId xmlns:a16="http://schemas.microsoft.com/office/drawing/2014/main" id="{04D86521-6FBA-DB49-BD3C-CAC4A64E1817}"/>
+              </a:ext>
+            </a:extLst>
+          </p:cNvPr>
+          <p:cNvPicPr>
+            <a:picLocks noGrp="1" noChangeAspect="1"/>
+          </p:cNvPicPr>
+          <p:nvPr>
+            <p:ph idx="1"/>
+          </p:nvPr>
+        </p:nvPicPr>
+        <p:blipFill>
+          <a:blip r:embed="rId2">
+            <a:extLst>
+              <a:ext uri="{28A0092B-C50C-407E-A947-70E740481C1C}">
+                <a14:useLocalDpi xmlns:a14="http://schemas.microsoft.com/office/drawing/2010/main" val="0"/>
+              </a:ext>
+            </a:extLst>
+          </a:blip>
+          <a:stretch>
+            <a:fillRect/>
+          </a:stretch>
+        </p:blipFill>
+        <p:spPr>
+          <a:xfrm>
+            <a:off x="677334" y="1331467"/>
+            <a:ext cx="6555910" cy="4916933"/>
+          </a:xfrm>
+        </p:spPr>
+      </p:pic>
+      <p:sp>
+        <p:nvSpPr>
+          <p:cNvPr id="9" name="TextBox 8">
+            <a:extLst>
+              <a:ext uri="{FF2B5EF4-FFF2-40B4-BE49-F238E27FC236}">
+                <a16:creationId xmlns:a16="http://schemas.microsoft.com/office/drawing/2014/main" id="{1B766D9F-F1B3-8EE3-B481-5F93AE61601E}"/>
+              </a:ext>
+            </a:extLst>
+          </p:cNvPr>
+          <p:cNvSpPr txBox="1"/>
+          <p:nvPr/>
+        </p:nvSpPr>
+        <p:spPr>
+          <a:xfrm>
+            <a:off x="1075058" y="6248400"/>
+            <a:ext cx="7178565" cy="276999"/>
+          </a:xfrm>
+          <a:prstGeom prst="rect">
+            <a:avLst/>
+          </a:prstGeom>
+          <a:noFill/>
+        </p:spPr>
+        <p:txBody>
+          <a:bodyPr wrap="square" rtlCol="0">
+            <a:spAutoFit/>
+          </a:bodyPr>
+          <a:lstStyle/>
+          <a:p>
+            <a:r>
+              <a:rPr lang="en-US" sz="1200" b="0" i="0" dirty="0">
+                <a:effectLst/>
+                <a:ea typeface="Calibri" panose="020F0502020204030204" pitchFamily="34" charset="0"/>
+                <a:cs typeface="Calibri" panose="020F0502020204030204" pitchFamily="34" charset="0"/>
+              </a:rPr>
+              <a:t>Standard Deviation of tempos: 37.462117528776375. p-value=3.927199818891401e-06)</a:t>
+            </a:r>
+            <a:endParaRPr lang="en-US" sz="1200" dirty="0">
+              <a:ea typeface="Calibri" panose="020F0502020204030204" pitchFamily="34" charset="0"/>
+              <a:cs typeface="Calibri" panose="020F0502020204030204" pitchFamily="34" charset="0"/>
+            </a:endParaRPr>
+          </a:p>
+        </p:txBody>
+      </p:sp>
+    </p:spTree>
+    <p:extLst>
+      <p:ext uri="{BB962C8B-B14F-4D97-AF65-F5344CB8AC3E}">
+        <p14:creationId xmlns:p14="http://schemas.microsoft.com/office/powerpoint/2010/main" val="1136602678"/>
+      </p:ext>
+    </p:extLst>
+  </p:cSld>
+  <p:clrMapOvr>
+    <a:masterClrMapping/>
+  </p:clrMapOvr>
+</p:sld>
+</file>
+
+<file path=ppt/slides/slide14.xml><?xml version="1.0" encoding="utf-8"?>
+<p:sld xmlns:a="http://schemas.openxmlformats.org/drawingml/2006/main" xmlns:r="http://schemas.openxmlformats.org/officeDocument/2006/relationships" xmlns:p="http://schemas.openxmlformats.org/presentationml/2006/main">
+  <p:cSld>
+    <p:spTree>
+      <p:nvGrpSpPr>
+        <p:cNvPr id="1" name=""/>
+        <p:cNvGrpSpPr/>
+        <p:nvPr/>
+      </p:nvGrpSpPr>
+      <p:grpSpPr>
+        <a:xfrm>
+          <a:off x="0" y="0"/>
+          <a:ext cx="0" cy="0"/>
+          <a:chOff x="0" y="0"/>
+          <a:chExt cx="0" cy="0"/>
+        </a:xfrm>
+      </p:grpSpPr>
+      <p:sp>
+        <p:nvSpPr>
+          <p:cNvPr id="2" name="Title 1">
+            <a:extLst>
+              <a:ext uri="{FF2B5EF4-FFF2-40B4-BE49-F238E27FC236}">
+                <a16:creationId xmlns:a16="http://schemas.microsoft.com/office/drawing/2014/main" id="{EAEE6358-0693-987A-8D91-0A483DB12C51}"/>
+              </a:ext>
+            </a:extLst>
+          </p:cNvPr>
+          <p:cNvSpPr>
+            <a:spLocks noGrp="1"/>
+          </p:cNvSpPr>
+          <p:nvPr>
+            <p:ph type="title"/>
+          </p:nvPr>
+        </p:nvSpPr>
+        <p:spPr/>
+        <p:txBody>
+          <a:bodyPr/>
+          <a:lstStyle/>
+          <a:p>
+            <a:r>
+              <a:rPr lang="en-US" dirty="0"/>
+              <a:t>Song Modality – Major vs. Minor</a:t>
+            </a:r>
+          </a:p>
+        </p:txBody>
+      </p:sp>
+      <p:sp>
+        <p:nvSpPr>
+          <p:cNvPr id="3" name="Content Placeholder 2">
+            <a:extLst>
+              <a:ext uri="{FF2B5EF4-FFF2-40B4-BE49-F238E27FC236}">
+                <a16:creationId xmlns:a16="http://schemas.microsoft.com/office/drawing/2014/main" id="{44D48737-E3BB-F424-6E9D-86B47B73F6D4}"/>
+              </a:ext>
+            </a:extLst>
+          </p:cNvPr>
+          <p:cNvSpPr>
+            <a:spLocks noGrp="1"/>
+          </p:cNvSpPr>
+          <p:nvPr>
+            <p:ph idx="1"/>
+          </p:nvPr>
+        </p:nvSpPr>
+        <p:spPr/>
+        <p:txBody>
+          <a:bodyPr>
+            <a:normAutofit lnSpcReduction="10000"/>
+          </a:bodyPr>
+          <a:lstStyle/>
+          <a:p>
+            <a:r>
+              <a:rPr lang="en-US" dirty="0"/>
+              <a:t>“Major” Associations:</a:t>
+            </a:r>
+          </a:p>
+          <a:p>
+            <a:pPr lvl="1"/>
+            <a:r>
+              <a:rPr lang="en-US" dirty="0"/>
+              <a:t>Upbeat</a:t>
+            </a:r>
+          </a:p>
+          <a:p>
+            <a:pPr lvl="1"/>
+            <a:r>
+              <a:rPr lang="en-US" dirty="0"/>
+              <a:t>Positive</a:t>
+            </a:r>
+          </a:p>
+          <a:p>
+            <a:pPr lvl="1"/>
+            <a:r>
+              <a:rPr lang="en-US" dirty="0"/>
+              <a:t>Happy</a:t>
+            </a:r>
+          </a:p>
+          <a:p>
+            <a:pPr lvl="1"/>
+            <a:r>
+              <a:rPr lang="en-US" dirty="0"/>
+              <a:t>Bright</a:t>
+            </a:r>
+          </a:p>
+          <a:p>
+            <a:pPr lvl="1"/>
+            <a:endParaRPr lang="en-US" dirty="0"/>
+          </a:p>
+          <a:p>
+            <a:r>
+              <a:rPr lang="en-US" dirty="0"/>
+              <a:t>“Minor” Associations:</a:t>
+            </a:r>
+          </a:p>
+          <a:p>
+            <a:pPr lvl="1"/>
+            <a:r>
+              <a:rPr lang="en-US" dirty="0"/>
+              <a:t>Slower</a:t>
+            </a:r>
+          </a:p>
+          <a:p>
+            <a:pPr lvl="1"/>
+            <a:r>
+              <a:rPr lang="en-US" dirty="0"/>
+              <a:t>Sad</a:t>
+            </a:r>
+          </a:p>
+          <a:p>
+            <a:pPr lvl="1"/>
+            <a:r>
+              <a:rPr lang="en-US" dirty="0"/>
+              <a:t>Dark</a:t>
+            </a:r>
+          </a:p>
+          <a:p>
+            <a:pPr lvl="1"/>
+            <a:r>
+              <a:rPr lang="en-US" dirty="0"/>
+              <a:t>Mysterious</a:t>
+            </a:r>
+          </a:p>
+        </p:txBody>
+      </p:sp>
+    </p:spTree>
+    <p:extLst>
+      <p:ext uri="{BB962C8B-B14F-4D97-AF65-F5344CB8AC3E}">
+        <p14:creationId xmlns:p14="http://schemas.microsoft.com/office/powerpoint/2010/main" val="2640556589"/>
+      </p:ext>
+    </p:extLst>
+  </p:cSld>
+  <p:clrMapOvr>
+    <a:masterClrMapping/>
+  </p:clrMapOvr>
+</p:sld>
+</file>
+
+<file path=ppt/slides/slide15.xml><?xml version="1.0" encoding="utf-8"?>
+<p:sld xmlns:a="http://schemas.openxmlformats.org/drawingml/2006/main" xmlns:r="http://schemas.openxmlformats.org/officeDocument/2006/relationships" xmlns:p="http://schemas.openxmlformats.org/presentationml/2006/main">
+  <p:cSld>
+    <p:spTree>
+      <p:nvGrpSpPr>
+        <p:cNvPr id="1" name=""/>
+        <p:cNvGrpSpPr/>
+        <p:nvPr/>
+      </p:nvGrpSpPr>
+      <p:grpSpPr>
+        <a:xfrm>
+          <a:off x="0" y="0"/>
+          <a:ext cx="0" cy="0"/>
+          <a:chOff x="0" y="0"/>
+          <a:chExt cx="0" cy="0"/>
+        </a:xfrm>
+      </p:grpSpPr>
+      <p:sp>
+        <p:nvSpPr>
+          <p:cNvPr id="2" name="Title 1">
+            <a:extLst>
+              <a:ext uri="{FF2B5EF4-FFF2-40B4-BE49-F238E27FC236}">
+                <a16:creationId xmlns:a16="http://schemas.microsoft.com/office/drawing/2014/main" id="{999EA004-2536-63B6-7DE8-F16DC8AEE1FF}"/>
+              </a:ext>
+            </a:extLst>
+          </p:cNvPr>
+          <p:cNvSpPr>
+            <a:spLocks noGrp="1"/>
+          </p:cNvSpPr>
+          <p:nvPr>
+            <p:ph type="title"/>
+          </p:nvPr>
+        </p:nvSpPr>
+        <p:spPr/>
+        <p:txBody>
+          <a:bodyPr/>
+          <a:lstStyle/>
+          <a:p>
+            <a:r>
+              <a:rPr lang="en-US" dirty="0"/>
+              <a:t>Spotify 2023 Modality Breakdown</a:t>
+            </a:r>
+          </a:p>
+        </p:txBody>
+      </p:sp>
+      <p:pic>
+        <p:nvPicPr>
+          <p:cNvPr id="5" name="Content Placeholder 4">
+            <a:extLst>
+              <a:ext uri="{FF2B5EF4-FFF2-40B4-BE49-F238E27FC236}">
+                <a16:creationId xmlns:a16="http://schemas.microsoft.com/office/drawing/2014/main" id="{6B307C1B-101F-E427-6E0A-0B69FA7B47F7}"/>
+              </a:ext>
+            </a:extLst>
+          </p:cNvPr>
+          <p:cNvPicPr>
+            <a:picLocks noGrp="1" noChangeAspect="1"/>
+          </p:cNvPicPr>
+          <p:nvPr>
+            <p:ph idx="1"/>
+          </p:nvPr>
+        </p:nvPicPr>
+        <p:blipFill>
+          <a:blip r:embed="rId2">
+            <a:extLst>
+              <a:ext uri="{28A0092B-C50C-407E-A947-70E740481C1C}">
+                <a14:useLocalDpi xmlns:a14="http://schemas.microsoft.com/office/drawing/2010/main" val="0"/>
+              </a:ext>
+            </a:extLst>
+          </a:blip>
+          <a:stretch>
+            <a:fillRect/>
+          </a:stretch>
+        </p:blipFill>
+        <p:spPr>
+          <a:xfrm>
+            <a:off x="269022" y="1690767"/>
+            <a:ext cx="5801784" cy="4351338"/>
+          </a:xfrm>
+        </p:spPr>
+      </p:pic>
+      <p:sp>
+        <p:nvSpPr>
+          <p:cNvPr id="8" name="TextBox 7">
+            <a:extLst>
+              <a:ext uri="{FF2B5EF4-FFF2-40B4-BE49-F238E27FC236}">
+                <a16:creationId xmlns:a16="http://schemas.microsoft.com/office/drawing/2014/main" id="{FA3AEE96-CCC5-9002-4022-336902D94B88}"/>
+              </a:ext>
+            </a:extLst>
+          </p:cNvPr>
+          <p:cNvSpPr txBox="1"/>
+          <p:nvPr/>
+        </p:nvSpPr>
+        <p:spPr>
+          <a:xfrm>
+            <a:off x="677334" y="6089063"/>
+            <a:ext cx="10457350" cy="646331"/>
+          </a:xfrm>
+          <a:prstGeom prst="rect">
+            <a:avLst/>
+          </a:prstGeom>
+          <a:noFill/>
+        </p:spPr>
+        <p:txBody>
+          <a:bodyPr wrap="none" rtlCol="0">
+            <a:spAutoFit/>
+          </a:bodyPr>
+          <a:lstStyle/>
+          <a:p>
+            <a:r>
+              <a:rPr lang="en-US" dirty="0"/>
+              <a:t>Major modality is more popular across both sample and population. The most streamed artists had </a:t>
+            </a:r>
+          </a:p>
+          <a:p>
+            <a:r>
+              <a:rPr lang="en-US" dirty="0"/>
+              <a:t>a further share of major modality.</a:t>
+            </a:r>
+          </a:p>
+        </p:txBody>
+      </p:sp>
+      <p:pic>
+        <p:nvPicPr>
+          <p:cNvPr id="7" name="Picture 6">
+            <a:extLst>
+              <a:ext uri="{FF2B5EF4-FFF2-40B4-BE49-F238E27FC236}">
+                <a16:creationId xmlns:a16="http://schemas.microsoft.com/office/drawing/2014/main" id="{FE582FD2-C079-6B70-8508-AF7E33FDE84C}"/>
+              </a:ext>
+            </a:extLst>
+          </p:cNvPr>
+          <p:cNvPicPr>
+            <a:picLocks noChangeAspect="1"/>
+          </p:cNvPicPr>
+          <p:nvPr/>
+        </p:nvPicPr>
+        <p:blipFill>
+          <a:blip r:embed="rId3">
+            <a:extLst>
+              <a:ext uri="{28A0092B-C50C-407E-A947-70E740481C1C}">
+                <a14:useLocalDpi xmlns:a14="http://schemas.microsoft.com/office/drawing/2010/main" val="0"/>
+              </a:ext>
+            </a:extLst>
+          </a:blip>
+          <a:stretch>
+            <a:fillRect/>
+          </a:stretch>
+        </p:blipFill>
+        <p:spPr>
+          <a:xfrm>
+            <a:off x="5501628" y="1652976"/>
+            <a:ext cx="5852172" cy="4389129"/>
+          </a:xfrm>
+          <a:prstGeom prst="rect">
+            <a:avLst/>
+          </a:prstGeom>
+        </p:spPr>
+      </p:pic>
+    </p:spTree>
+    <p:extLst>
+      <p:ext uri="{BB962C8B-B14F-4D97-AF65-F5344CB8AC3E}">
+        <p14:creationId xmlns:p14="http://schemas.microsoft.com/office/powerpoint/2010/main" val="1105713490"/>
+      </p:ext>
+    </p:extLst>
+  </p:cSld>
+  <p:clrMapOvr>
+    <a:masterClrMapping/>
+  </p:clrMapOvr>
+</p:sld>
+</file>
+
+<file path=ppt/slides/slide16.xml><?xml version="1.0" encoding="utf-8"?>
+<p:sld xmlns:a="http://schemas.openxmlformats.org/drawingml/2006/main" xmlns:r="http://schemas.openxmlformats.org/officeDocument/2006/relationships" xmlns:p="http://schemas.openxmlformats.org/presentationml/2006/main">
+  <p:cSld>
+    <p:spTree>
+      <p:nvGrpSpPr>
+        <p:cNvPr id="1" name=""/>
+        <p:cNvGrpSpPr/>
+        <p:nvPr/>
+      </p:nvGrpSpPr>
+      <p:grpSpPr>
+        <a:xfrm>
+          <a:off x="0" y="0"/>
+          <a:ext cx="0" cy="0"/>
+          <a:chOff x="0" y="0"/>
+          <a:chExt cx="0" cy="0"/>
+        </a:xfrm>
+      </p:grpSpPr>
+      <p:sp>
+        <p:nvSpPr>
+          <p:cNvPr id="2" name="Title 1">
+            <a:extLst>
+              <a:ext uri="{FF2B5EF4-FFF2-40B4-BE49-F238E27FC236}">
+                <a16:creationId xmlns:a16="http://schemas.microsoft.com/office/drawing/2014/main" id="{D21C9EA1-6248-6908-2C97-4D32ECF06B99}"/>
+              </a:ext>
+            </a:extLst>
+          </p:cNvPr>
+          <p:cNvSpPr>
+            <a:spLocks noGrp="1"/>
+          </p:cNvSpPr>
+          <p:nvPr>
+            <p:ph type="title"/>
+          </p:nvPr>
+        </p:nvSpPr>
+        <p:spPr/>
+        <p:txBody>
+          <a:bodyPr/>
+          <a:lstStyle/>
+          <a:p>
+            <a:r>
+              <a:rPr lang="en-US" dirty="0"/>
+              <a:t>Musical Characteristics</a:t>
+            </a:r>
+          </a:p>
+        </p:txBody>
+      </p:sp>
+      <p:sp>
+        <p:nvSpPr>
+          <p:cNvPr id="3" name="Content Placeholder 2">
+            <a:extLst>
+              <a:ext uri="{FF2B5EF4-FFF2-40B4-BE49-F238E27FC236}">
+                <a16:creationId xmlns:a16="http://schemas.microsoft.com/office/drawing/2014/main" id="{8CF5B4B8-585F-616D-A8A5-526CEB066679}"/>
+              </a:ext>
+            </a:extLst>
+          </p:cNvPr>
+          <p:cNvSpPr>
+            <a:spLocks noGrp="1"/>
+          </p:cNvSpPr>
+          <p:nvPr>
+            <p:ph idx="1"/>
+          </p:nvPr>
+        </p:nvSpPr>
+        <p:spPr/>
+        <p:txBody>
+          <a:bodyPr>
+            <a:normAutofit fontScale="70000" lnSpcReduction="20000"/>
+          </a:bodyPr>
+          <a:lstStyle/>
+          <a:p>
+            <a:r>
+              <a:rPr lang="en-US" dirty="0"/>
+              <a:t>Elements of the track as defined by Spotify:</a:t>
+            </a:r>
+          </a:p>
+          <a:p>
+            <a:pPr lvl="1"/>
+            <a:endParaRPr kumimoji="0" lang="en-US" altLang="en-US" sz="2400" b="1" i="0" u="none" strike="noStrike" cap="none" normalizeH="0" baseline="0" dirty="0">
+              <a:ln>
+                <a:noFill/>
+              </a:ln>
+              <a:solidFill>
+                <a:schemeClr val="tx1"/>
+              </a:solidFill>
+              <a:effectLst/>
+              <a:latin typeface="Arial" panose="020B0604020202020204" pitchFamily="34" charset="0"/>
+            </a:endParaRPr>
+          </a:p>
+          <a:p>
+            <a:pPr lvl="1"/>
+            <a:r>
+              <a:rPr kumimoji="0" lang="en-US" altLang="en-US" sz="2400" b="1" i="0" u="none" strike="noStrike" cap="none" normalizeH="0" baseline="0" dirty="0">
+                <a:ln>
+                  <a:noFill/>
+                </a:ln>
+                <a:solidFill>
+                  <a:schemeClr val="tx1"/>
+                </a:solidFill>
+                <a:effectLst/>
+                <a:latin typeface="Arial" panose="020B0604020202020204" pitchFamily="34" charset="0"/>
+              </a:rPr>
+              <a:t>danceability_%</a:t>
+            </a:r>
+            <a:r>
+              <a:rPr kumimoji="0" lang="en-US" altLang="en-US" sz="2400" b="0" i="0" u="none" strike="noStrike" cap="none" normalizeH="0" baseline="0" dirty="0">
+                <a:ln>
+                  <a:noFill/>
+                </a:ln>
+                <a:solidFill>
+                  <a:schemeClr val="tx1"/>
+                </a:solidFill>
+                <a:effectLst/>
+                <a:latin typeface="Arial" panose="020B0604020202020204" pitchFamily="34" charset="0"/>
+              </a:rPr>
+              <a:t>: </a:t>
+            </a:r>
+            <a:r>
+              <a:rPr kumimoji="0" lang="en-US" altLang="en-US" sz="2400" b="0" i="1" u="none" strike="noStrike" cap="none" normalizeH="0" baseline="0" dirty="0">
+                <a:ln>
+                  <a:noFill/>
+                </a:ln>
+                <a:solidFill>
+                  <a:schemeClr val="tx1"/>
+                </a:solidFill>
+                <a:effectLst/>
+                <a:latin typeface="Arial" panose="020B0604020202020204" pitchFamily="34" charset="0"/>
+              </a:rPr>
+              <a:t>Percentage indicating how suitable the song is for dancing</a:t>
+            </a:r>
+            <a:r>
+              <a:rPr kumimoji="0" lang="en-US" altLang="en-US" sz="2400" b="0" i="0" u="none" strike="noStrike" cap="none" normalizeH="0" baseline="0" dirty="0">
+                <a:ln>
+                  <a:noFill/>
+                </a:ln>
+                <a:solidFill>
+                  <a:schemeClr val="tx1"/>
+                </a:solidFill>
+                <a:effectLst/>
+                <a:latin typeface="Arial" panose="020B0604020202020204" pitchFamily="34" charset="0"/>
+              </a:rPr>
+              <a:t> </a:t>
+            </a:r>
+          </a:p>
+          <a:p>
+            <a:pPr lvl="1"/>
+            <a:r>
+              <a:rPr kumimoji="0" lang="en-US" altLang="en-US" sz="2400" b="1" i="0" u="none" strike="noStrike" cap="none" normalizeH="0" baseline="0" dirty="0">
+                <a:ln>
+                  <a:noFill/>
+                </a:ln>
+                <a:solidFill>
+                  <a:schemeClr val="tx1"/>
+                </a:solidFill>
+                <a:effectLst/>
+                <a:latin typeface="Arial" panose="020B0604020202020204" pitchFamily="34" charset="0"/>
+              </a:rPr>
+              <a:t>valence_%</a:t>
+            </a:r>
+            <a:r>
+              <a:rPr kumimoji="0" lang="en-US" altLang="en-US" sz="2400" b="0" i="0" u="none" strike="noStrike" cap="none" normalizeH="0" baseline="0" dirty="0">
+                <a:ln>
+                  <a:noFill/>
+                </a:ln>
+                <a:solidFill>
+                  <a:schemeClr val="tx1"/>
+                </a:solidFill>
+                <a:effectLst/>
+                <a:latin typeface="Arial" panose="020B0604020202020204" pitchFamily="34" charset="0"/>
+              </a:rPr>
+              <a:t>: </a:t>
+            </a:r>
+            <a:r>
+              <a:rPr kumimoji="0" lang="en-US" altLang="en-US" sz="2400" b="0" i="1" u="none" strike="noStrike" cap="none" normalizeH="0" baseline="0" dirty="0">
+                <a:ln>
+                  <a:noFill/>
+                </a:ln>
+                <a:solidFill>
+                  <a:schemeClr val="tx1"/>
+                </a:solidFill>
+                <a:effectLst/>
+                <a:latin typeface="Arial" panose="020B0604020202020204" pitchFamily="34" charset="0"/>
+              </a:rPr>
+              <a:t>Positivity of the song's musical content</a:t>
+            </a:r>
+            <a:r>
+              <a:rPr kumimoji="0" lang="en-US" altLang="en-US" sz="2400" b="0" i="0" u="none" strike="noStrike" cap="none" normalizeH="0" baseline="0" dirty="0">
+                <a:ln>
+                  <a:noFill/>
+                </a:ln>
+                <a:solidFill>
+                  <a:schemeClr val="tx1"/>
+                </a:solidFill>
+                <a:effectLst/>
+                <a:latin typeface="Arial" panose="020B0604020202020204" pitchFamily="34" charset="0"/>
+              </a:rPr>
+              <a:t> </a:t>
+            </a:r>
+          </a:p>
+          <a:p>
+            <a:pPr lvl="1"/>
+            <a:r>
+              <a:rPr kumimoji="0" lang="en-US" altLang="en-US" sz="2400" b="1" i="0" u="none" strike="noStrike" cap="none" normalizeH="0" baseline="0" dirty="0">
+                <a:ln>
+                  <a:noFill/>
+                </a:ln>
+                <a:solidFill>
+                  <a:schemeClr val="tx1"/>
+                </a:solidFill>
+                <a:effectLst/>
+                <a:latin typeface="Arial" panose="020B0604020202020204" pitchFamily="34" charset="0"/>
+              </a:rPr>
+              <a:t>energy_%</a:t>
+            </a:r>
+            <a:r>
+              <a:rPr kumimoji="0" lang="en-US" altLang="en-US" sz="2400" b="0" i="0" u="none" strike="noStrike" cap="none" normalizeH="0" baseline="0" dirty="0">
+                <a:ln>
+                  <a:noFill/>
+                </a:ln>
+                <a:solidFill>
+                  <a:schemeClr val="tx1"/>
+                </a:solidFill>
+                <a:effectLst/>
+                <a:latin typeface="Arial" panose="020B0604020202020204" pitchFamily="34" charset="0"/>
+              </a:rPr>
+              <a:t>: </a:t>
+            </a:r>
+            <a:r>
+              <a:rPr kumimoji="0" lang="en-US" altLang="en-US" sz="2400" b="0" i="1" u="none" strike="noStrike" cap="none" normalizeH="0" baseline="0" dirty="0">
+                <a:ln>
+                  <a:noFill/>
+                </a:ln>
+                <a:solidFill>
+                  <a:schemeClr val="tx1"/>
+                </a:solidFill>
+                <a:effectLst/>
+                <a:latin typeface="Arial" panose="020B0604020202020204" pitchFamily="34" charset="0"/>
+              </a:rPr>
+              <a:t>Perceived energy level of the song</a:t>
+            </a:r>
+            <a:r>
+              <a:rPr kumimoji="0" lang="en-US" altLang="en-US" sz="2400" b="0" i="0" u="none" strike="noStrike" cap="none" normalizeH="0" baseline="0" dirty="0">
+                <a:ln>
+                  <a:noFill/>
+                </a:ln>
+                <a:solidFill>
+                  <a:schemeClr val="tx1"/>
+                </a:solidFill>
+                <a:effectLst/>
+                <a:latin typeface="Arial" panose="020B0604020202020204" pitchFamily="34" charset="0"/>
+              </a:rPr>
+              <a:t> </a:t>
+            </a:r>
+          </a:p>
+          <a:p>
+            <a:pPr lvl="1"/>
+            <a:r>
+              <a:rPr kumimoji="0" lang="en-US" altLang="en-US" sz="2400" b="1" i="0" u="none" strike="noStrike" cap="none" normalizeH="0" baseline="0" dirty="0" err="1">
+                <a:ln>
+                  <a:noFill/>
+                </a:ln>
+                <a:solidFill>
+                  <a:schemeClr val="tx1"/>
+                </a:solidFill>
+                <a:effectLst/>
+                <a:latin typeface="Arial" panose="020B0604020202020204" pitchFamily="34" charset="0"/>
+              </a:rPr>
+              <a:t>acousticness</a:t>
+            </a:r>
+            <a:r>
+              <a:rPr kumimoji="0" lang="en-US" altLang="en-US" sz="2400" b="1" i="0" u="none" strike="noStrike" cap="none" normalizeH="0" baseline="0" dirty="0">
+                <a:ln>
+                  <a:noFill/>
+                </a:ln>
+                <a:solidFill>
+                  <a:schemeClr val="tx1"/>
+                </a:solidFill>
+                <a:effectLst/>
+                <a:latin typeface="Arial" panose="020B0604020202020204" pitchFamily="34" charset="0"/>
+              </a:rPr>
+              <a:t>_%</a:t>
+            </a:r>
+            <a:r>
+              <a:rPr kumimoji="0" lang="en-US" altLang="en-US" sz="2400" b="0" i="0" u="none" strike="noStrike" cap="none" normalizeH="0" baseline="0" dirty="0">
+                <a:ln>
+                  <a:noFill/>
+                </a:ln>
+                <a:solidFill>
+                  <a:schemeClr val="tx1"/>
+                </a:solidFill>
+                <a:effectLst/>
+                <a:latin typeface="Arial" panose="020B0604020202020204" pitchFamily="34" charset="0"/>
+              </a:rPr>
+              <a:t>: </a:t>
+            </a:r>
+            <a:r>
+              <a:rPr kumimoji="0" lang="en-US" altLang="en-US" sz="2400" b="0" i="1" u="none" strike="noStrike" cap="none" normalizeH="0" baseline="0" dirty="0">
+                <a:ln>
+                  <a:noFill/>
+                </a:ln>
+                <a:solidFill>
+                  <a:schemeClr val="tx1"/>
+                </a:solidFill>
+                <a:effectLst/>
+                <a:latin typeface="Arial" panose="020B0604020202020204" pitchFamily="34" charset="0"/>
+              </a:rPr>
+              <a:t>Amount of acoustic sound in the song</a:t>
+            </a:r>
+            <a:r>
+              <a:rPr kumimoji="0" lang="en-US" altLang="en-US" sz="2400" b="0" i="0" u="none" strike="noStrike" cap="none" normalizeH="0" baseline="0" dirty="0">
+                <a:ln>
+                  <a:noFill/>
+                </a:ln>
+                <a:solidFill>
+                  <a:schemeClr val="tx1"/>
+                </a:solidFill>
+                <a:effectLst/>
+                <a:latin typeface="Arial" panose="020B0604020202020204" pitchFamily="34" charset="0"/>
+              </a:rPr>
+              <a:t> </a:t>
+            </a:r>
+          </a:p>
+          <a:p>
+            <a:pPr lvl="1"/>
+            <a:r>
+              <a:rPr kumimoji="0" lang="en-US" altLang="en-US" sz="2400" b="1" i="0" u="none" strike="noStrike" cap="none" normalizeH="0" baseline="0" dirty="0" err="1">
+                <a:ln>
+                  <a:noFill/>
+                </a:ln>
+                <a:solidFill>
+                  <a:schemeClr val="tx1"/>
+                </a:solidFill>
+                <a:effectLst/>
+                <a:latin typeface="Arial" panose="020B0604020202020204" pitchFamily="34" charset="0"/>
+              </a:rPr>
+              <a:t>instrumentalness</a:t>
+            </a:r>
+            <a:r>
+              <a:rPr kumimoji="0" lang="en-US" altLang="en-US" sz="2400" b="1" i="0" u="none" strike="noStrike" cap="none" normalizeH="0" baseline="0" dirty="0">
+                <a:ln>
+                  <a:noFill/>
+                </a:ln>
+                <a:solidFill>
+                  <a:schemeClr val="tx1"/>
+                </a:solidFill>
+                <a:effectLst/>
+                <a:latin typeface="Arial" panose="020B0604020202020204" pitchFamily="34" charset="0"/>
+              </a:rPr>
+              <a:t>_%</a:t>
+            </a:r>
+            <a:r>
+              <a:rPr kumimoji="0" lang="en-US" altLang="en-US" sz="2400" b="0" i="0" u="none" strike="noStrike" cap="none" normalizeH="0" baseline="0" dirty="0">
+                <a:ln>
+                  <a:noFill/>
+                </a:ln>
+                <a:solidFill>
+                  <a:schemeClr val="tx1"/>
+                </a:solidFill>
+                <a:effectLst/>
+                <a:latin typeface="Arial" panose="020B0604020202020204" pitchFamily="34" charset="0"/>
+              </a:rPr>
+              <a:t>: </a:t>
+            </a:r>
+            <a:r>
+              <a:rPr kumimoji="0" lang="en-US" altLang="en-US" sz="2400" b="0" i="1" u="none" strike="noStrike" cap="none" normalizeH="0" baseline="0" dirty="0">
+                <a:ln>
+                  <a:noFill/>
+                </a:ln>
+                <a:solidFill>
+                  <a:schemeClr val="tx1"/>
+                </a:solidFill>
+                <a:effectLst/>
+                <a:latin typeface="Arial" panose="020B0604020202020204" pitchFamily="34" charset="0"/>
+              </a:rPr>
+              <a:t>Amount of instrumental content in the song</a:t>
+            </a:r>
+            <a:r>
+              <a:rPr kumimoji="0" lang="en-US" altLang="en-US" sz="2400" b="0" i="0" u="none" strike="noStrike" cap="none" normalizeH="0" baseline="0" dirty="0">
+                <a:ln>
+                  <a:noFill/>
+                </a:ln>
+                <a:solidFill>
+                  <a:schemeClr val="tx1"/>
+                </a:solidFill>
+                <a:effectLst/>
+                <a:latin typeface="Arial" panose="020B0604020202020204" pitchFamily="34" charset="0"/>
+              </a:rPr>
+              <a:t> </a:t>
+            </a:r>
+          </a:p>
+          <a:p>
+            <a:pPr lvl="1"/>
+            <a:r>
+              <a:rPr kumimoji="0" lang="en-US" altLang="en-US" sz="2400" b="1" i="0" u="none" strike="noStrike" cap="none" normalizeH="0" baseline="0" dirty="0">
+                <a:ln>
+                  <a:noFill/>
+                </a:ln>
+                <a:solidFill>
+                  <a:schemeClr val="tx1"/>
+                </a:solidFill>
+                <a:effectLst/>
+                <a:latin typeface="Arial" panose="020B0604020202020204" pitchFamily="34" charset="0"/>
+              </a:rPr>
+              <a:t>liveness_%</a:t>
+            </a:r>
+            <a:r>
+              <a:rPr kumimoji="0" lang="en-US" altLang="en-US" sz="2400" b="0" i="0" u="none" strike="noStrike" cap="none" normalizeH="0" baseline="0" dirty="0">
+                <a:ln>
+                  <a:noFill/>
+                </a:ln>
+                <a:solidFill>
+                  <a:schemeClr val="tx1"/>
+                </a:solidFill>
+                <a:effectLst/>
+                <a:latin typeface="Arial" panose="020B0604020202020204" pitchFamily="34" charset="0"/>
+              </a:rPr>
+              <a:t>: </a:t>
+            </a:r>
+            <a:r>
+              <a:rPr kumimoji="0" lang="en-US" altLang="en-US" sz="2400" b="0" i="1" u="none" strike="noStrike" cap="none" normalizeH="0" baseline="0" dirty="0">
+                <a:ln>
+                  <a:noFill/>
+                </a:ln>
+                <a:solidFill>
+                  <a:schemeClr val="tx1"/>
+                </a:solidFill>
+                <a:effectLst/>
+                <a:latin typeface="Arial" panose="020B0604020202020204" pitchFamily="34" charset="0"/>
+              </a:rPr>
+              <a:t>Presence of live performance elements</a:t>
+            </a:r>
+            <a:r>
+              <a:rPr kumimoji="0" lang="en-US" altLang="en-US" sz="2400" b="0" i="0" u="none" strike="noStrike" cap="none" normalizeH="0" baseline="0" dirty="0">
+                <a:ln>
+                  <a:noFill/>
+                </a:ln>
+                <a:solidFill>
+                  <a:schemeClr val="tx1"/>
+                </a:solidFill>
+                <a:effectLst/>
+                <a:latin typeface="Arial" panose="020B0604020202020204" pitchFamily="34" charset="0"/>
+              </a:rPr>
+              <a:t> </a:t>
+            </a:r>
+          </a:p>
+          <a:p>
+            <a:pPr lvl="1"/>
+            <a:r>
+              <a:rPr kumimoji="0" lang="en-US" altLang="en-US" sz="2400" b="1" i="0" u="none" strike="noStrike" cap="none" normalizeH="0" baseline="0" dirty="0" err="1">
+                <a:ln>
+                  <a:noFill/>
+                </a:ln>
+                <a:solidFill>
+                  <a:schemeClr val="tx1"/>
+                </a:solidFill>
+                <a:effectLst/>
+                <a:latin typeface="Arial" panose="020B0604020202020204" pitchFamily="34" charset="0"/>
+              </a:rPr>
+              <a:t>speechiness</a:t>
+            </a:r>
+            <a:r>
+              <a:rPr kumimoji="0" lang="en-US" altLang="en-US" sz="2400" b="1" i="0" u="none" strike="noStrike" cap="none" normalizeH="0" baseline="0" dirty="0">
+                <a:ln>
+                  <a:noFill/>
+                </a:ln>
+                <a:solidFill>
+                  <a:schemeClr val="tx1"/>
+                </a:solidFill>
+                <a:effectLst/>
+                <a:latin typeface="Arial" panose="020B0604020202020204" pitchFamily="34" charset="0"/>
+              </a:rPr>
+              <a:t>_%</a:t>
+            </a:r>
+            <a:r>
+              <a:rPr kumimoji="0" lang="en-US" altLang="en-US" sz="2400" b="0" i="0" u="none" strike="noStrike" cap="none" normalizeH="0" baseline="0" dirty="0">
+                <a:ln>
+                  <a:noFill/>
+                </a:ln>
+                <a:solidFill>
+                  <a:schemeClr val="tx1"/>
+                </a:solidFill>
+                <a:effectLst/>
+                <a:latin typeface="Arial" panose="020B0604020202020204" pitchFamily="34" charset="0"/>
+              </a:rPr>
+              <a:t>: </a:t>
+            </a:r>
+            <a:r>
+              <a:rPr kumimoji="0" lang="en-US" altLang="en-US" sz="2400" b="0" i="1" u="none" strike="noStrike" cap="none" normalizeH="0" baseline="0" dirty="0">
+                <a:ln>
+                  <a:noFill/>
+                </a:ln>
+                <a:solidFill>
+                  <a:schemeClr val="tx1"/>
+                </a:solidFill>
+                <a:effectLst/>
+                <a:latin typeface="Arial" panose="020B0604020202020204" pitchFamily="34" charset="0"/>
+              </a:rPr>
+              <a:t>Amount of spoken words in the song</a:t>
+            </a:r>
+            <a:endParaRPr kumimoji="0" lang="en-US" altLang="en-US" sz="2400" b="0" i="0" u="none" strike="noStrike" cap="none" normalizeH="0" baseline="0" dirty="0">
+              <a:ln>
+                <a:noFill/>
+              </a:ln>
+              <a:solidFill>
+                <a:schemeClr val="tx1"/>
+              </a:solidFill>
+              <a:effectLst/>
+              <a:latin typeface="Arial" panose="020B0604020202020204" pitchFamily="34" charset="0"/>
+            </a:endParaRPr>
+          </a:p>
+          <a:p>
+            <a:pPr lvl="1"/>
+            <a:endParaRPr lang="en-US" dirty="0"/>
+          </a:p>
+          <a:p>
+            <a:r>
+              <a:rPr lang="en-US" dirty="0"/>
+              <a:t>Given a number representing percentage of presence in a given track</a:t>
+            </a:r>
+          </a:p>
+          <a:p>
+            <a:pPr lvl="1"/>
+            <a:r>
+              <a:rPr lang="en-US" dirty="0"/>
+              <a:t>This percentage is also assigned via Spotify</a:t>
+            </a:r>
+          </a:p>
+          <a:p>
+            <a:endParaRPr lang="en-US" dirty="0"/>
+          </a:p>
+        </p:txBody>
+      </p:sp>
+    </p:spTree>
+    <p:extLst>
+      <p:ext uri="{BB962C8B-B14F-4D97-AF65-F5344CB8AC3E}">
+        <p14:creationId xmlns:p14="http://schemas.microsoft.com/office/powerpoint/2010/main" val="3339136056"/>
+      </p:ext>
+    </p:extLst>
+  </p:cSld>
+  <p:clrMapOvr>
+    <a:masterClrMapping/>
+  </p:clrMapOvr>
+</p:sld>
+</file>
+
+<file path=ppt/slides/slide17.xml><?xml version="1.0" encoding="utf-8"?>
+<p:sld xmlns:a="http://schemas.openxmlformats.org/drawingml/2006/main" xmlns:r="http://schemas.openxmlformats.org/officeDocument/2006/relationships" xmlns:p="http://schemas.openxmlformats.org/presentationml/2006/main">
+  <p:cSld>
     <p:spTree>
       <p:nvGrpSpPr>
         <p:cNvPr id="1" name=""/>
@@ -6101,7 +8265,7 @@
 </p:sld>
 </file>
 
-<file path=ppt/slides/slide11.xml><?xml version="1.0" encoding="utf-8"?>
+<file path=ppt/slides/slide18.xml><?xml version="1.0" encoding="utf-8"?>
 <p:sld xmlns:a="http://schemas.openxmlformats.org/drawingml/2006/main" xmlns:r="http://schemas.openxmlformats.org/officeDocument/2006/relationships" xmlns:p="http://schemas.openxmlformats.org/presentationml/2006/main">
   <p:cSld>
     <p:spTree>
@@ -6222,7 +8386,7 @@
 </p:sld>
 </file>
 
-<file path=ppt/slides/slide12.xml><?xml version="1.0" encoding="utf-8"?>
+<file path=ppt/slides/slide19.xml><?xml version="1.0" encoding="utf-8"?>
 <p:sld xmlns:a="http://schemas.openxmlformats.org/drawingml/2006/main" xmlns:r="http://schemas.openxmlformats.org/officeDocument/2006/relationships" xmlns:p="http://schemas.openxmlformats.org/presentationml/2006/main">
   <p:cSld>
     <p:spTree>
@@ -6716,7 +8880,22 @@
           <a:bodyPr/>
           <a:lstStyle/>
           <a:p>
-            <a:endParaRPr lang="en-US"/>
+            <a:r>
+              <a:rPr lang="en-US" dirty="0"/>
+              <a:t>This portion of the project, we wanted to look at the effects that playlists and charts have on how often a song is streamed.</a:t>
+            </a:r>
+          </a:p>
+          <a:p>
+            <a:r>
+              <a:rPr lang="en-US" dirty="0"/>
+              <a:t>The dataset gave us the count of times a song appears in a playlist for the platforms Spotify, Apple, and Deezer.</a:t>
+            </a:r>
+          </a:p>
+          <a:p>
+            <a:r>
+              <a:rPr lang="en-US" dirty="0"/>
+              <a:t>The dataset also gave us the ranking of a song on their charts in their respective platform.  The platforms are Spotify, Apple, Deezer, and Shazam</a:t>
+            </a:r>
           </a:p>
         </p:txBody>
       </p:sp>
@@ -6736,6 +8915,14 @@
 <file path=ppt/slides/slide5.xml><?xml version="1.0" encoding="utf-8"?>
 <p:sld xmlns:a="http://schemas.openxmlformats.org/drawingml/2006/main" xmlns:r="http://schemas.openxmlformats.org/officeDocument/2006/relationships" xmlns:p="http://schemas.openxmlformats.org/presentationml/2006/main">
   <p:cSld>
+    <p:bg>
+      <p:bgPr>
+        <a:solidFill>
+          <a:schemeClr val="bg1"/>
+        </a:solidFill>
+        <a:effectLst/>
+      </p:bgPr>
+    </p:bg>
     <p:spTree>
       <p:nvGrpSpPr>
         <p:cNvPr id="1" name=""/>
@@ -6755,7 +8942,7 @@
           <p:cNvPr id="2" name="Title 1">
             <a:extLst>
               <a:ext uri="{FF2B5EF4-FFF2-40B4-BE49-F238E27FC236}">
-                <a16:creationId xmlns:a16="http://schemas.microsoft.com/office/drawing/2014/main" id="{C3D942C1-F821-163F-7497-06F9A11642B9}"/>
+                <a16:creationId xmlns:a16="http://schemas.microsoft.com/office/drawing/2014/main" id="{A1BFCBFE-C5FF-CABC-4988-9A609A90B1ED}"/>
               </a:ext>
             </a:extLst>
           </p:cNvPr>
@@ -6766,27 +8953,64 @@
             <p:ph type="title"/>
           </p:nvPr>
         </p:nvSpPr>
-        <p:spPr/>
-        <p:txBody>
-          <a:bodyPr/>
+        <p:spPr>
+          <a:xfrm>
+            <a:off x="677334" y="609600"/>
+            <a:ext cx="8596668" cy="1320800"/>
+          </a:xfrm>
+        </p:spPr>
+        <p:txBody>
+          <a:bodyPr anchor="t">
+            <a:normAutofit/>
+          </a:bodyPr>
           <a:lstStyle/>
           <a:p>
             <a:r>
               <a:rPr lang="en-US" dirty="0"/>
-              <a:t>Analysis of Musical Characteristics</a:t>
-            </a:r>
-          </a:p>
-        </p:txBody>
-      </p:sp>
-      <p:sp>
-        <p:nvSpPr>
-          <p:cNvPr id="3" name="Content Placeholder 2">
+              <a:t>Top 100 streamed songs vs the number of playlists they appear in</a:t>
+            </a:r>
+          </a:p>
+        </p:txBody>
+      </p:sp>
+      <p:pic>
+        <p:nvPicPr>
+          <p:cNvPr id="5" name="Content Placeholder 4">
             <a:extLst>
               <a:ext uri="{FF2B5EF4-FFF2-40B4-BE49-F238E27FC236}">
-                <a16:creationId xmlns:a16="http://schemas.microsoft.com/office/drawing/2014/main" id="{AD1D5CB7-F90B-DA38-79C8-2A61393B40B9}"/>
+                <a16:creationId xmlns:a16="http://schemas.microsoft.com/office/drawing/2014/main" id="{9AE1A3D4-9041-1C9A-AD0D-CFB398A7BE23}"/>
               </a:ext>
             </a:extLst>
           </p:cNvPr>
+          <p:cNvPicPr>
+            <a:picLocks noChangeAspect="1"/>
+          </p:cNvPicPr>
+          <p:nvPr/>
+        </p:nvPicPr>
+        <p:blipFill>
+          <a:blip r:embed="rId2"/>
+          <a:stretch>
+            <a:fillRect/>
+          </a:stretch>
+        </p:blipFill>
+        <p:spPr>
+          <a:xfrm>
+            <a:off x="817474" y="2159331"/>
+            <a:ext cx="5283289" cy="3486970"/>
+          </a:xfrm>
+          <a:prstGeom prst="rect">
+            <a:avLst/>
+          </a:prstGeom>
+        </p:spPr>
+      </p:pic>
+      <p:sp>
+        <p:nvSpPr>
+          <p:cNvPr id="9" name="Content Placeholder 8">
+            <a:extLst>
+              <a:ext uri="{FF2B5EF4-FFF2-40B4-BE49-F238E27FC236}">
+                <a16:creationId xmlns:a16="http://schemas.microsoft.com/office/drawing/2014/main" id="{C31A66E0-7F1F-910E-F8DB-C7500B528E4A}"/>
+              </a:ext>
+            </a:extLst>
+          </p:cNvPr>
           <p:cNvSpPr>
             <a:spLocks noGrp="1"/>
           </p:cNvSpPr>
@@ -6794,49 +9018,42 @@
             <p:ph idx="1"/>
           </p:nvPr>
         </p:nvSpPr>
-        <p:spPr/>
-        <p:txBody>
-          <a:bodyPr/>
-          <a:lstStyle/>
-          <a:p>
-            <a:r>
-              <a:rPr lang="en-US" dirty="0"/>
-              <a:t>Comparing the Top 20 Most Streamed Artists vs. the Entire Dataset</a:t>
-            </a:r>
-          </a:p>
-          <a:p>
-            <a:pPr lvl="1"/>
-            <a:r>
-              <a:rPr lang="en-US" dirty="0"/>
-              <a:t>Top Artists account for approximately 27% of included tracks, but received over 36% of streams</a:t>
-            </a:r>
-          </a:p>
-          <a:p>
-            <a:pPr lvl="1"/>
-            <a:endParaRPr lang="en-US" dirty="0"/>
-          </a:p>
-          <a:p>
-            <a:pPr lvl="1"/>
-            <a:r>
-              <a:rPr lang="en-US" dirty="0"/>
-              <a:t>Do Top Artists mimic the population, or forge their own path?</a:t>
-            </a:r>
-          </a:p>
-          <a:p>
-            <a:pPr lvl="1"/>
-            <a:endParaRPr lang="en-US" dirty="0"/>
-          </a:p>
-          <a:p>
-            <a:r>
-              <a:rPr lang="en-US" dirty="0"/>
-              <a:t>Considering Averages</a:t>
-            </a:r>
-          </a:p>
-          <a:p>
-            <a:pPr lvl="1"/>
-            <a:r>
-              <a:rPr lang="en-US" dirty="0"/>
-              <a:t>Due to the nature of songs as discrete pieces of content, analysis focuses on median and mode averages vs. mean calculations</a:t>
+        <p:spPr>
+          <a:xfrm>
+            <a:off x="6416039" y="2160589"/>
+            <a:ext cx="2927185" cy="3880773"/>
+          </a:xfrm>
+        </p:spPr>
+        <p:txBody>
+          <a:bodyPr>
+            <a:normAutofit/>
+          </a:bodyPr>
+          <a:lstStyle/>
+          <a:p>
+            <a:r>
+              <a:rPr lang="en-US" sz="1500" dirty="0"/>
+              <a:t>I took the top 100 streamed songs of the dataset and compared how many playlists they appear in.</a:t>
+            </a:r>
+          </a:p>
+          <a:p>
+            <a:r>
+              <a:rPr lang="en-US" sz="1600" dirty="0"/>
+              <a:t>The Person correlation is 0.335 and </a:t>
+            </a:r>
+            <a:r>
+              <a:rPr lang="en-US" sz="1600" dirty="0" err="1"/>
+              <a:t>r-value</a:t>
+            </a:r>
+            <a:r>
+              <a:rPr lang="en-US" sz="1600" dirty="0"/>
+              <a:t> is 0.111.</a:t>
+            </a:r>
+            <a:endParaRPr lang="en-US" sz="1500" dirty="0"/>
+          </a:p>
+          <a:p>
+            <a:r>
+              <a:rPr lang="en-US" sz="1500" dirty="0"/>
+              <a:t>We can see there is a weak positive correlation between how many times a song appears in a playlist against how many times the song is streamed.</a:t>
             </a:r>
           </a:p>
         </p:txBody>
@@ -6844,7 +9061,7 @@
     </p:spTree>
     <p:extLst>
       <p:ext uri="{BB962C8B-B14F-4D97-AF65-F5344CB8AC3E}">
-        <p14:creationId xmlns:p14="http://schemas.microsoft.com/office/powerpoint/2010/main" val="855427616"/>
+        <p14:creationId xmlns:p14="http://schemas.microsoft.com/office/powerpoint/2010/main" val="2819061766"/>
       </p:ext>
     </p:extLst>
   </p:cSld>
@@ -6857,6 +9074,14 @@
 <file path=ppt/slides/slide6.xml><?xml version="1.0" encoding="utf-8"?>
 <p:sld xmlns:a="http://schemas.openxmlformats.org/drawingml/2006/main" xmlns:r="http://schemas.openxmlformats.org/officeDocument/2006/relationships" xmlns:p="http://schemas.openxmlformats.org/presentationml/2006/main">
   <p:cSld>
+    <p:bg>
+      <p:bgPr>
+        <a:solidFill>
+          <a:schemeClr val="bg1"/>
+        </a:solidFill>
+        <a:effectLst/>
+      </p:bgPr>
+    </p:bg>
     <p:spTree>
       <p:nvGrpSpPr>
         <p:cNvPr id="1" name=""/>
@@ -6876,7 +9101,7 @@
           <p:cNvPr id="2" name="Title 1">
             <a:extLst>
               <a:ext uri="{FF2B5EF4-FFF2-40B4-BE49-F238E27FC236}">
-                <a16:creationId xmlns:a16="http://schemas.microsoft.com/office/drawing/2014/main" id="{1B24E665-5B89-EB78-C0E2-7832422881BA}"/>
+                <a16:creationId xmlns:a16="http://schemas.microsoft.com/office/drawing/2014/main" id="{AE3EFF52-92EE-6AFA-5501-50BCC84E4E24}"/>
               </a:ext>
             </a:extLst>
           </p:cNvPr>
@@ -6887,200 +9112,114 @@
             <p:ph type="title"/>
           </p:nvPr>
         </p:nvSpPr>
-        <p:spPr/>
-        <p:txBody>
-          <a:bodyPr/>
-          <a:lstStyle/>
-          <a:p>
-            <a:r>
-              <a:rPr lang="en-US" dirty="0"/>
-              <a:t>Song Speeds (BPM – Beats Per Minute)</a:t>
-            </a:r>
-          </a:p>
-        </p:txBody>
-      </p:sp>
-      <p:sp>
-        <p:nvSpPr>
-          <p:cNvPr id="6" name="TextBox 5">
+        <p:spPr>
+          <a:xfrm>
+            <a:off x="677334" y="609600"/>
+            <a:ext cx="8596668" cy="1320800"/>
+          </a:xfrm>
+        </p:spPr>
+        <p:txBody>
+          <a:bodyPr anchor="t">
+            <a:normAutofit/>
+          </a:bodyPr>
+          <a:lstStyle/>
+          <a:p>
+            <a:r>
+              <a:rPr lang="en-US" sz="3300"/>
+              <a:t>How many times a song is on a playlist vs. how many times the song is streamed</a:t>
+            </a:r>
+          </a:p>
+        </p:txBody>
+      </p:sp>
+      <p:sp>
+        <p:nvSpPr>
+          <p:cNvPr id="9" name="Content Placeholder 8">
             <a:extLst>
               <a:ext uri="{FF2B5EF4-FFF2-40B4-BE49-F238E27FC236}">
-                <a16:creationId xmlns:a16="http://schemas.microsoft.com/office/drawing/2014/main" id="{642D8BB6-B6BA-F68E-72A4-85A48931554D}"/>
+                <a16:creationId xmlns:a16="http://schemas.microsoft.com/office/drawing/2014/main" id="{57B7D185-E567-59AB-CBC1-214C760BECE8}"/>
               </a:ext>
             </a:extLst>
           </p:cNvPr>
-          <p:cNvSpPr txBox="1"/>
-          <p:nvPr/>
+          <p:cNvSpPr>
+            <a:spLocks noGrp="1"/>
+          </p:cNvSpPr>
+          <p:nvPr>
+            <p:ph idx="1"/>
+          </p:nvPr>
         </p:nvSpPr>
         <p:spPr>
           <a:xfrm>
-            <a:off x="7956331" y="1690688"/>
-            <a:ext cx="4056994" cy="4524315"/>
+            <a:off x="6336287" y="2160589"/>
+            <a:ext cx="4367006" cy="3880773"/>
           </a:xfrm>
-          <a:prstGeom prst="rect">
-            <a:avLst/>
-          </a:prstGeom>
-          <a:noFill/>
         </p:spPr>
         <p:txBody>
-          <a:bodyPr wrap="square" rtlCol="0">
-            <a:spAutoFit/>
+          <a:bodyPr>
+            <a:normAutofit/>
           </a:bodyPr>
           <a:lstStyle/>
           <a:p>
-            <a:pPr marL="285750" indent="-285750">
-              <a:buFont typeface="Arial" panose="020B0604020202020204" pitchFamily="34" charset="0"/>
-              <a:buChar char="•"/>
-            </a:pPr>
             <a:r>
               <a:rPr lang="en-US" dirty="0"/>
-              <a:t>The Top 20 Artist sample is very similar in structure to the data population.</a:t>
-            </a:r>
-          </a:p>
-          <a:p>
-            <a:pPr marL="285750" indent="-285750">
-              <a:buFont typeface="Arial" panose="020B0604020202020204" pitchFamily="34" charset="0"/>
-              <a:buChar char="•"/>
-            </a:pPr>
-            <a:endParaRPr lang="en-US" dirty="0"/>
-          </a:p>
-          <a:p>
-            <a:pPr marL="285750" indent="-285750">
-              <a:buFont typeface="Arial" panose="020B0604020202020204" pitchFamily="34" charset="0"/>
-              <a:buChar char="•"/>
-            </a:pPr>
+              <a:t>This scatterplot represents the top 100 songs that appeared in playlists from Spotify, Apple, and Deezer.</a:t>
+            </a:r>
+          </a:p>
+          <a:p>
             <a:r>
               <a:rPr lang="en-US" dirty="0"/>
-              <a:t>The median BPM for the sample (120bpm) is extremely close to the median BPM of the population (121bpm).</a:t>
-            </a:r>
-          </a:p>
-          <a:p>
-            <a:pPr marL="285750" indent="-285750">
-              <a:buFont typeface="Arial" panose="020B0604020202020204" pitchFamily="34" charset="0"/>
-              <a:buChar char="•"/>
-            </a:pPr>
-            <a:endParaRPr lang="en-US" dirty="0"/>
-          </a:p>
-          <a:p>
-            <a:pPr marL="285750" indent="-285750">
-              <a:buFont typeface="Arial" panose="020B0604020202020204" pitchFamily="34" charset="0"/>
-              <a:buChar char="•"/>
-            </a:pPr>
+              <a:t>The Person correlation is 0.145 and </a:t>
+            </a:r>
+            <a:r>
+              <a:rPr lang="en-US" dirty="0" err="1"/>
+              <a:t>r-value</a:t>
+            </a:r>
             <a:r>
               <a:rPr lang="en-US" dirty="0"/>
-              <a:t>The mode for Top Artists is considerably lower</a:t>
-            </a:r>
-          </a:p>
-          <a:p>
-            <a:pPr marL="742950" lvl="1" indent="-285750">
-              <a:buFont typeface="Arial" panose="020B0604020202020204" pitchFamily="34" charset="0"/>
-              <a:buChar char="•"/>
-            </a:pPr>
+              <a:t> is 0.021.</a:t>
+            </a:r>
+          </a:p>
+          <a:p>
             <a:r>
               <a:rPr lang="en-US" dirty="0"/>
-              <a:t>Top Artists Mode: 90bpm, 7 songs (2.7% of songs in sample)</a:t>
-            </a:r>
-          </a:p>
-          <a:p>
-            <a:pPr marL="742950" lvl="1" indent="-285750">
-              <a:buFont typeface="Arial" panose="020B0604020202020204" pitchFamily="34" charset="0"/>
-              <a:buChar char="•"/>
-            </a:pPr>
-            <a:endParaRPr lang="en-US" dirty="0"/>
-          </a:p>
-          <a:p>
-            <a:pPr marL="742950" lvl="1" indent="-285750">
-              <a:buFont typeface="Arial" panose="020B0604020202020204" pitchFamily="34" charset="0"/>
-              <a:buChar char="•"/>
-            </a:pPr>
-            <a:r>
-              <a:rPr lang="en-US" dirty="0"/>
-              <a:t>All Songs: 120bpm, 34 songs (3.6% of songs in population)</a:t>
+              <a:t>This gives a weak positive correlation that if a song is on more playlists, the song will be streamed more as well.</a:t>
             </a:r>
           </a:p>
         </p:txBody>
       </p:sp>
       <p:pic>
         <p:nvPicPr>
-          <p:cNvPr id="8" name="Content Placeholder 7">
+          <p:cNvPr id="7" name="Picture 6">
             <a:extLst>
               <a:ext uri="{FF2B5EF4-FFF2-40B4-BE49-F238E27FC236}">
-                <a16:creationId xmlns:a16="http://schemas.microsoft.com/office/drawing/2014/main" id="{04D86521-6FBA-DB49-BD3C-CAC4A64E1817}"/>
+                <a16:creationId xmlns:a16="http://schemas.microsoft.com/office/drawing/2014/main" id="{2E1F712F-B2CA-5276-62C0-B9D54E2FBFB9}"/>
               </a:ext>
             </a:extLst>
           </p:cNvPr>
           <p:cNvPicPr>
-            <a:picLocks noGrp="1" noChangeAspect="1"/>
+            <a:picLocks noChangeAspect="1"/>
           </p:cNvPicPr>
-          <p:nvPr>
-            <p:ph idx="1"/>
-          </p:nvPr>
+          <p:nvPr/>
         </p:nvPicPr>
         <p:blipFill>
-          <a:blip r:embed="rId2">
-            <a:extLst>
-              <a:ext uri="{28A0092B-C50C-407E-A947-70E740481C1C}">
-                <a14:useLocalDpi xmlns:a14="http://schemas.microsoft.com/office/drawing/2010/main" val="0"/>
-              </a:ext>
-            </a:extLst>
-          </a:blip>
+          <a:blip r:embed="rId2"/>
           <a:stretch>
             <a:fillRect/>
           </a:stretch>
         </p:blipFill>
         <p:spPr>
           <a:xfrm>
-            <a:off x="677334" y="1331467"/>
-            <a:ext cx="6555910" cy="4916933"/>
-          </a:xfrm>
-        </p:spPr>
-      </p:pic>
-      <p:sp>
-        <p:nvSpPr>
-          <p:cNvPr id="9" name="TextBox 8">
-            <a:extLst>
-              <a:ext uri="{FF2B5EF4-FFF2-40B4-BE49-F238E27FC236}">
-                <a16:creationId xmlns:a16="http://schemas.microsoft.com/office/drawing/2014/main" id="{1B766D9F-F1B3-8EE3-B481-5F93AE61601E}"/>
-              </a:ext>
-            </a:extLst>
-          </p:cNvPr>
-          <p:cNvSpPr txBox="1"/>
-          <p:nvPr/>
-        </p:nvSpPr>
-        <p:spPr>
-          <a:xfrm>
-            <a:off x="1075058" y="6248400"/>
-            <a:ext cx="7178565" cy="276999"/>
+            <a:off x="677334" y="1944804"/>
+            <a:ext cx="5418666" cy="4752232"/>
           </a:xfrm>
           <a:prstGeom prst="rect">
             <a:avLst/>
           </a:prstGeom>
-          <a:noFill/>
         </p:spPr>
-        <p:txBody>
-          <a:bodyPr wrap="square" rtlCol="0">
-            <a:spAutoFit/>
-          </a:bodyPr>
-          <a:lstStyle/>
-          <a:p>
-            <a:r>
-              <a:rPr lang="en-US" sz="1200" b="0" i="0" dirty="0">
-                <a:effectLst/>
-                <a:ea typeface="Calibri" panose="020F0502020204030204" pitchFamily="34" charset="0"/>
-                <a:cs typeface="Calibri" panose="020F0502020204030204" pitchFamily="34" charset="0"/>
-              </a:rPr>
-              <a:t>Standard Deviation of tempos: 37.462117528776375. p-value=3.927199818891401e-06)</a:t>
-            </a:r>
-            <a:endParaRPr lang="en-US" sz="1200" dirty="0">
-              <a:ea typeface="Calibri" panose="020F0502020204030204" pitchFamily="34" charset="0"/>
-              <a:cs typeface="Calibri" panose="020F0502020204030204" pitchFamily="34" charset="0"/>
-            </a:endParaRPr>
-          </a:p>
-        </p:txBody>
-      </p:sp>
+      </p:pic>
     </p:spTree>
     <p:extLst>
       <p:ext uri="{BB962C8B-B14F-4D97-AF65-F5344CB8AC3E}">
-        <p14:creationId xmlns:p14="http://schemas.microsoft.com/office/powerpoint/2010/main" val="1136602678"/>
+        <p14:creationId xmlns:p14="http://schemas.microsoft.com/office/powerpoint/2010/main" val="3774306730"/>
       </p:ext>
     </p:extLst>
   </p:cSld>
@@ -7093,6 +9232,14 @@
 <file path=ppt/slides/slide7.xml><?xml version="1.0" encoding="utf-8"?>
 <p:sld xmlns:a="http://schemas.openxmlformats.org/drawingml/2006/main" xmlns:r="http://schemas.openxmlformats.org/officeDocument/2006/relationships" xmlns:p="http://schemas.openxmlformats.org/presentationml/2006/main">
   <p:cSld>
+    <p:bg>
+      <p:bgPr>
+        <a:solidFill>
+          <a:schemeClr val="bg1"/>
+        </a:solidFill>
+        <a:effectLst/>
+      </p:bgPr>
+    </p:bg>
     <p:spTree>
       <p:nvGrpSpPr>
         <p:cNvPr id="1" name=""/>
@@ -7112,7 +9259,7 @@
           <p:cNvPr id="2" name="Title 1">
             <a:extLst>
               <a:ext uri="{FF2B5EF4-FFF2-40B4-BE49-F238E27FC236}">
-                <a16:creationId xmlns:a16="http://schemas.microsoft.com/office/drawing/2014/main" id="{EAEE6358-0693-987A-8D91-0A483DB12C51}"/>
+                <a16:creationId xmlns:a16="http://schemas.microsoft.com/office/drawing/2014/main" id="{212A3A41-1023-C460-F3A8-8D132BE0025A}"/>
               </a:ext>
             </a:extLst>
           </p:cNvPr>
@@ -7123,27 +9270,64 @@
             <p:ph type="title"/>
           </p:nvPr>
         </p:nvSpPr>
-        <p:spPr/>
-        <p:txBody>
-          <a:bodyPr/>
+        <p:spPr>
+          <a:xfrm>
+            <a:off x="677334" y="609600"/>
+            <a:ext cx="8596668" cy="1320800"/>
+          </a:xfrm>
+        </p:spPr>
+        <p:txBody>
+          <a:bodyPr anchor="t">
+            <a:normAutofit/>
+          </a:bodyPr>
           <a:lstStyle/>
           <a:p>
             <a:r>
               <a:rPr lang="en-US" dirty="0"/>
-              <a:t>Song Modality – Major vs. Minor</a:t>
-            </a:r>
-          </a:p>
-        </p:txBody>
-      </p:sp>
-      <p:sp>
-        <p:nvSpPr>
-          <p:cNvPr id="3" name="Content Placeholder 2">
+              <a:t>Top 100 songs in playlists vs bottom 100 songs in playlists</a:t>
+            </a:r>
+          </a:p>
+        </p:txBody>
+      </p:sp>
+      <p:pic>
+        <p:nvPicPr>
+          <p:cNvPr id="5" name="Content Placeholder 4">
             <a:extLst>
               <a:ext uri="{FF2B5EF4-FFF2-40B4-BE49-F238E27FC236}">
-                <a16:creationId xmlns:a16="http://schemas.microsoft.com/office/drawing/2014/main" id="{44D48737-E3BB-F424-6E9D-86B47B73F6D4}"/>
+                <a16:creationId xmlns:a16="http://schemas.microsoft.com/office/drawing/2014/main" id="{AFD2A77D-32F8-CB1F-1139-91DFA382B985}"/>
               </a:ext>
             </a:extLst>
           </p:cNvPr>
+          <p:cNvPicPr>
+            <a:picLocks noChangeAspect="1"/>
+          </p:cNvPicPr>
+          <p:nvPr/>
+        </p:nvPicPr>
+        <p:blipFill>
+          <a:blip r:embed="rId2"/>
+          <a:stretch>
+            <a:fillRect/>
+          </a:stretch>
+        </p:blipFill>
+        <p:spPr>
+          <a:xfrm>
+            <a:off x="994127" y="2159331"/>
+            <a:ext cx="4929983" cy="3882362"/>
+          </a:xfrm>
+          <a:prstGeom prst="rect">
+            <a:avLst/>
+          </a:prstGeom>
+        </p:spPr>
+      </p:pic>
+      <p:sp>
+        <p:nvSpPr>
+          <p:cNvPr id="35" name="Content Placeholder 34">
+            <a:extLst>
+              <a:ext uri="{FF2B5EF4-FFF2-40B4-BE49-F238E27FC236}">
+                <a16:creationId xmlns:a16="http://schemas.microsoft.com/office/drawing/2014/main" id="{E1FF7612-EFEC-7661-C370-8255A55D531C}"/>
+              </a:ext>
+            </a:extLst>
+          </p:cNvPr>
           <p:cNvSpPr>
             <a:spLocks noGrp="1"/>
           </p:cNvSpPr>
@@ -7151,82 +9335,33 @@
             <p:ph idx="1"/>
           </p:nvPr>
         </p:nvSpPr>
-        <p:spPr/>
+        <p:spPr>
+          <a:xfrm>
+            <a:off x="6416039" y="2160589"/>
+            <a:ext cx="2927185" cy="3880773"/>
+          </a:xfrm>
+        </p:spPr>
         <p:txBody>
           <a:bodyPr>
-            <a:normAutofit lnSpcReduction="10000"/>
+            <a:normAutofit/>
           </a:bodyPr>
           <a:lstStyle/>
           <a:p>
             <a:r>
-              <a:rPr lang="en-US" dirty="0"/>
-              <a:t>“Major” Associations:</a:t>
-            </a:r>
-          </a:p>
-          <a:p>
-            <a:pPr lvl="1"/>
-            <a:r>
-              <a:rPr lang="en-US" dirty="0"/>
-              <a:t>Upbeat</a:t>
-            </a:r>
-          </a:p>
-          <a:p>
-            <a:pPr lvl="1"/>
-            <a:r>
-              <a:rPr lang="en-US" dirty="0"/>
-              <a:t>Positive</a:t>
-            </a:r>
-          </a:p>
-          <a:p>
-            <a:pPr lvl="1"/>
-            <a:r>
-              <a:rPr lang="en-US" dirty="0"/>
-              <a:t>Happy</a:t>
-            </a:r>
-          </a:p>
-          <a:p>
-            <a:pPr lvl="1"/>
-            <a:r>
-              <a:rPr lang="en-US" dirty="0"/>
-              <a:t>Bright</a:t>
-            </a:r>
-          </a:p>
-          <a:p>
-            <a:pPr lvl="1"/>
-            <a:endParaRPr lang="en-US" dirty="0"/>
-          </a:p>
-          <a:p>
-            <a:r>
-              <a:rPr lang="en-US" dirty="0"/>
-              <a:t>“Minor” Associations:</a:t>
-            </a:r>
-          </a:p>
-          <a:p>
-            <a:pPr lvl="1"/>
-            <a:r>
-              <a:rPr lang="en-US" dirty="0"/>
-              <a:t>Slower</a:t>
-            </a:r>
-          </a:p>
-          <a:p>
-            <a:pPr lvl="1"/>
-            <a:r>
-              <a:rPr lang="en-US" dirty="0"/>
-              <a:t>Sad</a:t>
-            </a:r>
-          </a:p>
-          <a:p>
-            <a:pPr lvl="1"/>
-            <a:r>
-              <a:rPr lang="en-US" dirty="0"/>
-              <a:t>Dark</a:t>
-            </a:r>
-          </a:p>
-          <a:p>
-            <a:pPr lvl="1"/>
-            <a:r>
-              <a:rPr lang="en-US" dirty="0"/>
-              <a:t>Mysterious</a:t>
+              <a:rPr lang="en-US" sz="1500" dirty="0"/>
+              <a:t>This plot represents the top 100 songs in playlists (in blue) and the bottom 100 songs in playlists (in orange).</a:t>
+            </a:r>
+          </a:p>
+          <a:p>
+            <a:r>
+              <a:rPr lang="en-US" sz="1500" dirty="0"/>
+              <a:t>This shows as the plots are more to the right and on more playlists, they are streamed more as well.</a:t>
+            </a:r>
+          </a:p>
+          <a:p>
+            <a:r>
+              <a:rPr lang="en-US" sz="1500" dirty="0"/>
+              <a:t>Songs that are less to be on playlists are streamed less as the top streamed song does not reach 1 billion streams.  </a:t>
             </a:r>
           </a:p>
         </p:txBody>
@@ -7234,7 +9369,7 @@
     </p:spTree>
     <p:extLst>
       <p:ext uri="{BB962C8B-B14F-4D97-AF65-F5344CB8AC3E}">
-        <p14:creationId xmlns:p14="http://schemas.microsoft.com/office/powerpoint/2010/main" val="2640556589"/>
+        <p14:creationId xmlns:p14="http://schemas.microsoft.com/office/powerpoint/2010/main" val="2197544456"/>
       </p:ext>
     </p:extLst>
   </p:cSld>
@@ -7247,6 +9382,14 @@
 <file path=ppt/slides/slide8.xml><?xml version="1.0" encoding="utf-8"?>
 <p:sld xmlns:a="http://schemas.openxmlformats.org/drawingml/2006/main" xmlns:r="http://schemas.openxmlformats.org/officeDocument/2006/relationships" xmlns:p="http://schemas.openxmlformats.org/presentationml/2006/main">
   <p:cSld>
+    <p:bg>
+      <p:bgPr>
+        <a:solidFill>
+          <a:schemeClr val="bg1"/>
+        </a:solidFill>
+        <a:effectLst/>
+      </p:bgPr>
+    </p:bg>
     <p:spTree>
       <p:nvGrpSpPr>
         <p:cNvPr id="1" name=""/>
@@ -7266,7 +9409,7 @@
           <p:cNvPr id="2" name="Title 1">
             <a:extLst>
               <a:ext uri="{FF2B5EF4-FFF2-40B4-BE49-F238E27FC236}">
-                <a16:creationId xmlns:a16="http://schemas.microsoft.com/office/drawing/2014/main" id="{999EA004-2536-63B6-7DE8-F16DC8AEE1FF}"/>
+                <a16:creationId xmlns:a16="http://schemas.microsoft.com/office/drawing/2014/main" id="{30E640F4-F82F-8C11-1826-7EEF71E5BD38}"/>
               </a:ext>
             </a:extLst>
           </p:cNvPr>
@@ -7277,100 +9420,66 @@
             <p:ph type="title"/>
           </p:nvPr>
         </p:nvSpPr>
-        <p:spPr/>
-        <p:txBody>
-          <a:bodyPr/>
+        <p:spPr>
+          <a:xfrm>
+            <a:off x="677334" y="609600"/>
+            <a:ext cx="8596668" cy="1320800"/>
+          </a:xfrm>
+        </p:spPr>
+        <p:txBody>
+          <a:bodyPr anchor="t">
+            <a:normAutofit/>
+          </a:bodyPr>
           <a:lstStyle/>
           <a:p>
             <a:r>
               <a:rPr lang="en-US" dirty="0"/>
-              <a:t>Spotify 2023 Modality Breakdown</a:t>
-            </a:r>
-          </a:p>
-        </p:txBody>
-      </p:sp>
-      <p:pic>
-        <p:nvPicPr>
-          <p:cNvPr id="5" name="Content Placeholder 4">
+              <a:t>Spotify Charts</a:t>
+            </a:r>
+          </a:p>
+        </p:txBody>
+      </p:sp>
+      <p:sp>
+        <p:nvSpPr>
+          <p:cNvPr id="29" name="Content Placeholder 28">
             <a:extLst>
               <a:ext uri="{FF2B5EF4-FFF2-40B4-BE49-F238E27FC236}">
-                <a16:creationId xmlns:a16="http://schemas.microsoft.com/office/drawing/2014/main" id="{6B307C1B-101F-E427-6E0A-0B69FA7B47F7}"/>
+                <a16:creationId xmlns:a16="http://schemas.microsoft.com/office/drawing/2014/main" id="{26F93B49-60C0-5FC7-3331-FC0AE489F089}"/>
               </a:ext>
             </a:extLst>
           </p:cNvPr>
-          <p:cNvPicPr>
-            <a:picLocks noGrp="1" noChangeAspect="1"/>
-          </p:cNvPicPr>
+          <p:cNvSpPr>
+            <a:spLocks noGrp="1"/>
+          </p:cNvSpPr>
           <p:nvPr>
             <p:ph idx="1"/>
           </p:nvPr>
-        </p:nvPicPr>
-        <p:blipFill>
-          <a:blip r:embed="rId2">
-            <a:extLst>
-              <a:ext uri="{28A0092B-C50C-407E-A947-70E740481C1C}">
-                <a14:useLocalDpi xmlns:a14="http://schemas.microsoft.com/office/drawing/2010/main" val="0"/>
-              </a:ext>
-            </a:extLst>
-          </a:blip>
-          <a:stretch>
-            <a:fillRect/>
-          </a:stretch>
-        </p:blipFill>
+        </p:nvSpPr>
         <p:spPr>
           <a:xfrm>
-            <a:off x="269022" y="1690767"/>
-            <a:ext cx="5801784" cy="4351338"/>
+            <a:off x="6336287" y="2160589"/>
+            <a:ext cx="2934714" cy="3880773"/>
           </a:xfrm>
         </p:spPr>
-      </p:pic>
-      <p:sp>
-        <p:nvSpPr>
-          <p:cNvPr id="8" name="TextBox 7">
+        <p:txBody>
+          <a:bodyPr>
+            <a:normAutofit/>
+          </a:bodyPr>
+          <a:lstStyle/>
+          <a:p>
+            <a:r>
+              <a:rPr lang="en-US" dirty="0"/>
+              <a:t>As we can see with songs that are higher on the charts (more to the left), they are for the most part have more streams.</a:t>
+            </a:r>
+          </a:p>
+        </p:txBody>
+      </p:sp>
+      <p:pic>
+        <p:nvPicPr>
+          <p:cNvPr id="4" name="Picture 3">
             <a:extLst>
               <a:ext uri="{FF2B5EF4-FFF2-40B4-BE49-F238E27FC236}">
-                <a16:creationId xmlns:a16="http://schemas.microsoft.com/office/drawing/2014/main" id="{FA3AEE96-CCC5-9002-4022-336902D94B88}"/>
-              </a:ext>
-            </a:extLst>
-          </p:cNvPr>
-          <p:cNvSpPr txBox="1"/>
-          <p:nvPr/>
-        </p:nvSpPr>
-        <p:spPr>
-          <a:xfrm>
-            <a:off x="677334" y="6089063"/>
-            <a:ext cx="10457350" cy="646331"/>
-          </a:xfrm>
-          <a:prstGeom prst="rect">
-            <a:avLst/>
-          </a:prstGeom>
-          <a:noFill/>
-        </p:spPr>
-        <p:txBody>
-          <a:bodyPr wrap="none" rtlCol="0">
-            <a:spAutoFit/>
-          </a:bodyPr>
-          <a:lstStyle/>
-          <a:p>
-            <a:r>
-              <a:rPr lang="en-US" dirty="0"/>
-              <a:t>Major modality is more popular across both sample and population. The most streamed artists had </a:t>
-            </a:r>
-          </a:p>
-          <a:p>
-            <a:r>
-              <a:rPr lang="en-US" dirty="0"/>
-              <a:t>a further share of major modality.</a:t>
-            </a:r>
-          </a:p>
-        </p:txBody>
-      </p:sp>
-      <p:pic>
-        <p:nvPicPr>
-          <p:cNvPr id="7" name="Picture 6">
-            <a:extLst>
-              <a:ext uri="{FF2B5EF4-FFF2-40B4-BE49-F238E27FC236}">
-                <a16:creationId xmlns:a16="http://schemas.microsoft.com/office/drawing/2014/main" id="{FE582FD2-C079-6B70-8508-AF7E33FDE84C}"/>
+                <a16:creationId xmlns:a16="http://schemas.microsoft.com/office/drawing/2014/main" id="{6DEA3C44-D852-F48F-C51A-D01D5AC363BD}"/>
               </a:ext>
             </a:extLst>
           </p:cNvPr>
@@ -7380,21 +9489,15 @@
           <p:nvPr/>
         </p:nvPicPr>
         <p:blipFill>
-          <a:blip r:embed="rId3">
-            <a:extLst>
-              <a:ext uri="{28A0092B-C50C-407E-A947-70E740481C1C}">
-                <a14:useLocalDpi xmlns:a14="http://schemas.microsoft.com/office/drawing/2010/main" val="0"/>
-              </a:ext>
-            </a:extLst>
-          </a:blip>
+          <a:blip r:embed="rId2"/>
           <a:stretch>
             <a:fillRect/>
           </a:stretch>
         </p:blipFill>
         <p:spPr>
           <a:xfrm>
-            <a:off x="5501628" y="1652976"/>
-            <a:ext cx="5852172" cy="4389129"/>
+            <a:off x="677334" y="1773301"/>
+            <a:ext cx="5584263" cy="3668854"/>
           </a:xfrm>
           <a:prstGeom prst="rect">
             <a:avLst/>
@@ -7404,7 +9507,7 @@
     </p:spTree>
     <p:extLst>
       <p:ext uri="{BB962C8B-B14F-4D97-AF65-F5344CB8AC3E}">
-        <p14:creationId xmlns:p14="http://schemas.microsoft.com/office/powerpoint/2010/main" val="1105713490"/>
+        <p14:creationId xmlns:p14="http://schemas.microsoft.com/office/powerpoint/2010/main" val="3355426526"/>
       </p:ext>
     </p:extLst>
   </p:cSld>
@@ -7417,9 +9520,23 @@
 <file path=ppt/slides/slide9.xml><?xml version="1.0" encoding="utf-8"?>
 <p:sld xmlns:a="http://schemas.openxmlformats.org/drawingml/2006/main" xmlns:r="http://schemas.openxmlformats.org/officeDocument/2006/relationships" xmlns:p="http://schemas.openxmlformats.org/presentationml/2006/main">
   <p:cSld>
+    <p:bg>
+      <p:bgPr>
+        <a:solidFill>
+          <a:schemeClr val="bg1"/>
+        </a:solidFill>
+        <a:effectLst/>
+      </p:bgPr>
+    </p:bg>
     <p:spTree>
       <p:nvGrpSpPr>
-        <p:cNvPr id="1" name=""/>
+        <p:cNvPr id="1" name="">
+          <a:extLst>
+            <a:ext uri="{FF2B5EF4-FFF2-40B4-BE49-F238E27FC236}">
+              <a16:creationId xmlns:a16="http://schemas.microsoft.com/office/drawing/2014/main" id="{38749352-931C-BF0F-6EB3-9033CA54A748}"/>
+            </a:ext>
+          </a:extLst>
+        </p:cNvPr>
         <p:cNvGrpSpPr/>
         <p:nvPr/>
       </p:nvGrpSpPr>
@@ -7436,7 +9553,7 @@
           <p:cNvPr id="2" name="Title 1">
             <a:extLst>
               <a:ext uri="{FF2B5EF4-FFF2-40B4-BE49-F238E27FC236}">
-                <a16:creationId xmlns:a16="http://schemas.microsoft.com/office/drawing/2014/main" id="{D21C9EA1-6248-6908-2C97-4D32ECF06B99}"/>
+                <a16:creationId xmlns:a16="http://schemas.microsoft.com/office/drawing/2014/main" id="{AC8776CB-E48F-AABE-ABA1-53FE4097FF13}"/>
               </a:ext>
             </a:extLst>
           </p:cNvPr>
@@ -7447,24 +9564,31 @@
             <p:ph type="title"/>
           </p:nvPr>
         </p:nvSpPr>
-        <p:spPr/>
-        <p:txBody>
-          <a:bodyPr/>
+        <p:spPr>
+          <a:xfrm>
+            <a:off x="677334" y="609600"/>
+            <a:ext cx="8596668" cy="1320800"/>
+          </a:xfrm>
+        </p:spPr>
+        <p:txBody>
+          <a:bodyPr anchor="t">
+            <a:normAutofit/>
+          </a:bodyPr>
           <a:lstStyle/>
           <a:p>
             <a:r>
               <a:rPr lang="en-US" dirty="0"/>
-              <a:t>Musical Characteristics</a:t>
-            </a:r>
-          </a:p>
-        </p:txBody>
-      </p:sp>
-      <p:sp>
-        <p:nvSpPr>
-          <p:cNvPr id="3" name="Content Placeholder 2">
+              <a:t>Apple Charts</a:t>
+            </a:r>
+          </a:p>
+        </p:txBody>
+      </p:sp>
+      <p:sp>
+        <p:nvSpPr>
+          <p:cNvPr id="29" name="Content Placeholder 28">
             <a:extLst>
               <a:ext uri="{FF2B5EF4-FFF2-40B4-BE49-F238E27FC236}">
-                <a16:creationId xmlns:a16="http://schemas.microsoft.com/office/drawing/2014/main" id="{8CF5B4B8-585F-616D-A8A5-526CEB066679}"/>
+                <a16:creationId xmlns:a16="http://schemas.microsoft.com/office/drawing/2014/main" id="{5C96EF99-BB56-77F3-8EF8-A946DE2B0A1C}"/>
               </a:ext>
             </a:extLst>
           </p:cNvPr>
@@ -7475,478 +9599,59 @@
             <p:ph idx="1"/>
           </p:nvPr>
         </p:nvSpPr>
-        <p:spPr/>
+        <p:spPr>
+          <a:xfrm>
+            <a:off x="6336287" y="2160589"/>
+            <a:ext cx="2934714" cy="3880773"/>
+          </a:xfrm>
+        </p:spPr>
         <p:txBody>
           <a:bodyPr>
-            <a:normAutofit fontScale="70000" lnSpcReduction="20000"/>
+            <a:normAutofit/>
           </a:bodyPr>
           <a:lstStyle/>
           <a:p>
             <a:r>
               <a:rPr lang="en-US" dirty="0"/>
-              <a:t>Elements of the track as defined by Spotify:</a:t>
-            </a:r>
-          </a:p>
-          <a:p>
-            <a:pPr lvl="1"/>
-            <a:endParaRPr kumimoji="0" lang="en-US" altLang="en-US" sz="2400" b="1" i="0" u="none" strike="noStrike" cap="none" normalizeH="0" baseline="0" dirty="0">
-              <a:ln>
-                <a:noFill/>
-              </a:ln>
-              <a:solidFill>
-                <a:schemeClr val="tx1"/>
-              </a:solidFill>
-              <a:effectLst/>
-              <a:latin typeface="Arial" panose="020B0604020202020204" pitchFamily="34" charset="0"/>
-            </a:endParaRPr>
-          </a:p>
-          <a:p>
-            <a:pPr lvl="1"/>
-            <a:r>
-              <a:rPr kumimoji="0" lang="en-US" altLang="en-US" sz="2400" b="1" i="0" u="none" strike="noStrike" cap="none" normalizeH="0" baseline="0" dirty="0">
-                <a:ln>
-                  <a:noFill/>
-                </a:ln>
-                <a:solidFill>
-                  <a:schemeClr val="tx1"/>
-                </a:solidFill>
-                <a:effectLst/>
-                <a:latin typeface="Arial" panose="020B0604020202020204" pitchFamily="34" charset="0"/>
-              </a:rPr>
-              <a:t>danceability_%</a:t>
-            </a:r>
-            <a:r>
-              <a:rPr kumimoji="0" lang="en-US" altLang="en-US" sz="2400" b="0" i="0" u="none" strike="noStrike" cap="none" normalizeH="0" baseline="0" dirty="0">
-                <a:ln>
-                  <a:noFill/>
-                </a:ln>
-                <a:solidFill>
-                  <a:schemeClr val="tx1"/>
-                </a:solidFill>
-                <a:effectLst/>
-                <a:latin typeface="Arial" panose="020B0604020202020204" pitchFamily="34" charset="0"/>
-              </a:rPr>
-              <a:t>: </a:t>
-            </a:r>
-            <a:r>
-              <a:rPr kumimoji="0" lang="en-US" altLang="en-US" sz="2400" b="0" i="1" u="none" strike="noStrike" cap="none" normalizeH="0" baseline="0" dirty="0">
-                <a:ln>
-                  <a:noFill/>
-                </a:ln>
-                <a:solidFill>
-                  <a:schemeClr val="tx1"/>
-                </a:solidFill>
-                <a:effectLst/>
-                <a:latin typeface="Arial" panose="020B0604020202020204" pitchFamily="34" charset="0"/>
-              </a:rPr>
-              <a:t>Percentage indicating how suitable the song is for dancing</a:t>
-            </a:r>
-            <a:r>
-              <a:rPr kumimoji="0" lang="en-US" altLang="en-US" sz="2400" b="0" i="0" u="none" strike="noStrike" cap="none" normalizeH="0" baseline="0" dirty="0">
-                <a:ln>
-                  <a:noFill/>
-                </a:ln>
-                <a:solidFill>
-                  <a:schemeClr val="tx1"/>
-                </a:solidFill>
-                <a:effectLst/>
-                <a:latin typeface="Arial" panose="020B0604020202020204" pitchFamily="34" charset="0"/>
-              </a:rPr>
-              <a:t> </a:t>
-            </a:r>
-          </a:p>
-          <a:p>
-            <a:pPr lvl="1"/>
-            <a:r>
-              <a:rPr kumimoji="0" lang="en-US" altLang="en-US" sz="2400" b="1" i="0" u="none" strike="noStrike" cap="none" normalizeH="0" baseline="0" dirty="0">
-                <a:ln>
-                  <a:noFill/>
-                </a:ln>
-                <a:solidFill>
-                  <a:schemeClr val="tx1"/>
-                </a:solidFill>
-                <a:effectLst/>
-                <a:latin typeface="Arial" panose="020B0604020202020204" pitchFamily="34" charset="0"/>
-              </a:rPr>
-              <a:t>valence_%</a:t>
-            </a:r>
-            <a:r>
-              <a:rPr kumimoji="0" lang="en-US" altLang="en-US" sz="2400" b="0" i="0" u="none" strike="noStrike" cap="none" normalizeH="0" baseline="0" dirty="0">
-                <a:ln>
-                  <a:noFill/>
-                </a:ln>
-                <a:solidFill>
-                  <a:schemeClr val="tx1"/>
-                </a:solidFill>
-                <a:effectLst/>
-                <a:latin typeface="Arial" panose="020B0604020202020204" pitchFamily="34" charset="0"/>
-              </a:rPr>
-              <a:t>: </a:t>
-            </a:r>
-            <a:r>
-              <a:rPr kumimoji="0" lang="en-US" altLang="en-US" sz="2400" b="0" i="1" u="none" strike="noStrike" cap="none" normalizeH="0" baseline="0" dirty="0">
-                <a:ln>
-                  <a:noFill/>
-                </a:ln>
-                <a:solidFill>
-                  <a:schemeClr val="tx1"/>
-                </a:solidFill>
-                <a:effectLst/>
-                <a:latin typeface="Arial" panose="020B0604020202020204" pitchFamily="34" charset="0"/>
-              </a:rPr>
-              <a:t>Positivity of the song's musical content</a:t>
-            </a:r>
-            <a:r>
-              <a:rPr kumimoji="0" lang="en-US" altLang="en-US" sz="2400" b="0" i="0" u="none" strike="noStrike" cap="none" normalizeH="0" baseline="0" dirty="0">
-                <a:ln>
-                  <a:noFill/>
-                </a:ln>
-                <a:solidFill>
-                  <a:schemeClr val="tx1"/>
-                </a:solidFill>
-                <a:effectLst/>
-                <a:latin typeface="Arial" panose="020B0604020202020204" pitchFamily="34" charset="0"/>
-              </a:rPr>
-              <a:t> </a:t>
-            </a:r>
-          </a:p>
-          <a:p>
-            <a:pPr lvl="1"/>
-            <a:r>
-              <a:rPr kumimoji="0" lang="en-US" altLang="en-US" sz="2400" b="1" i="0" u="none" strike="noStrike" cap="none" normalizeH="0" baseline="0" dirty="0">
-                <a:ln>
-                  <a:noFill/>
-                </a:ln>
-                <a:solidFill>
-                  <a:schemeClr val="tx1"/>
-                </a:solidFill>
-                <a:effectLst/>
-                <a:latin typeface="Arial" panose="020B0604020202020204" pitchFamily="34" charset="0"/>
-              </a:rPr>
-              <a:t>energy_%</a:t>
-            </a:r>
-            <a:r>
-              <a:rPr kumimoji="0" lang="en-US" altLang="en-US" sz="2400" b="0" i="0" u="none" strike="noStrike" cap="none" normalizeH="0" baseline="0" dirty="0">
-                <a:ln>
-                  <a:noFill/>
-                </a:ln>
-                <a:solidFill>
-                  <a:schemeClr val="tx1"/>
-                </a:solidFill>
-                <a:effectLst/>
-                <a:latin typeface="Arial" panose="020B0604020202020204" pitchFamily="34" charset="0"/>
-              </a:rPr>
-              <a:t>: </a:t>
-            </a:r>
-            <a:r>
-              <a:rPr kumimoji="0" lang="en-US" altLang="en-US" sz="2400" b="0" i="1" u="none" strike="noStrike" cap="none" normalizeH="0" baseline="0" dirty="0">
-                <a:ln>
-                  <a:noFill/>
-                </a:ln>
-                <a:solidFill>
-                  <a:schemeClr val="tx1"/>
-                </a:solidFill>
-                <a:effectLst/>
-                <a:latin typeface="Arial" panose="020B0604020202020204" pitchFamily="34" charset="0"/>
-              </a:rPr>
-              <a:t>Perceived energy level of the song</a:t>
-            </a:r>
-            <a:r>
-              <a:rPr kumimoji="0" lang="en-US" altLang="en-US" sz="2400" b="0" i="0" u="none" strike="noStrike" cap="none" normalizeH="0" baseline="0" dirty="0">
-                <a:ln>
-                  <a:noFill/>
-                </a:ln>
-                <a:solidFill>
-                  <a:schemeClr val="tx1"/>
-                </a:solidFill>
-                <a:effectLst/>
-                <a:latin typeface="Arial" panose="020B0604020202020204" pitchFamily="34" charset="0"/>
-              </a:rPr>
-              <a:t> </a:t>
-            </a:r>
-          </a:p>
-          <a:p>
-            <a:pPr lvl="1"/>
-            <a:r>
-              <a:rPr kumimoji="0" lang="en-US" altLang="en-US" sz="2400" b="1" i="0" u="none" strike="noStrike" cap="none" normalizeH="0" baseline="0" dirty="0" err="1">
-                <a:ln>
-                  <a:noFill/>
-                </a:ln>
-                <a:solidFill>
-                  <a:schemeClr val="tx1"/>
-                </a:solidFill>
-                <a:effectLst/>
-                <a:latin typeface="Arial" panose="020B0604020202020204" pitchFamily="34" charset="0"/>
-              </a:rPr>
-              <a:t>acousticness</a:t>
-            </a:r>
-            <a:r>
-              <a:rPr kumimoji="0" lang="en-US" altLang="en-US" sz="2400" b="1" i="0" u="none" strike="noStrike" cap="none" normalizeH="0" baseline="0" dirty="0">
-                <a:ln>
-                  <a:noFill/>
-                </a:ln>
-                <a:solidFill>
-                  <a:schemeClr val="tx1"/>
-                </a:solidFill>
-                <a:effectLst/>
-                <a:latin typeface="Arial" panose="020B0604020202020204" pitchFamily="34" charset="0"/>
-              </a:rPr>
-              <a:t>_%</a:t>
-            </a:r>
-            <a:r>
-              <a:rPr kumimoji="0" lang="en-US" altLang="en-US" sz="2400" b="0" i="0" u="none" strike="noStrike" cap="none" normalizeH="0" baseline="0" dirty="0">
-                <a:ln>
-                  <a:noFill/>
-                </a:ln>
-                <a:solidFill>
-                  <a:schemeClr val="tx1"/>
-                </a:solidFill>
-                <a:effectLst/>
-                <a:latin typeface="Arial" panose="020B0604020202020204" pitchFamily="34" charset="0"/>
-              </a:rPr>
-              <a:t>: </a:t>
-            </a:r>
-            <a:r>
-              <a:rPr kumimoji="0" lang="en-US" altLang="en-US" sz="2400" b="0" i="1" u="none" strike="noStrike" cap="none" normalizeH="0" baseline="0" dirty="0">
-                <a:ln>
-                  <a:noFill/>
-                </a:ln>
-                <a:solidFill>
-                  <a:schemeClr val="tx1"/>
-                </a:solidFill>
-                <a:effectLst/>
-                <a:latin typeface="Arial" panose="020B0604020202020204" pitchFamily="34" charset="0"/>
-              </a:rPr>
-              <a:t>Amount of acoustic sound in the song</a:t>
-            </a:r>
-            <a:r>
-              <a:rPr kumimoji="0" lang="en-US" altLang="en-US" sz="2400" b="0" i="0" u="none" strike="noStrike" cap="none" normalizeH="0" baseline="0" dirty="0">
-                <a:ln>
-                  <a:noFill/>
-                </a:ln>
-                <a:solidFill>
-                  <a:schemeClr val="tx1"/>
-                </a:solidFill>
-                <a:effectLst/>
-                <a:latin typeface="Arial" panose="020B0604020202020204" pitchFamily="34" charset="0"/>
-              </a:rPr>
-              <a:t> </a:t>
-            </a:r>
-          </a:p>
-          <a:p>
-            <a:pPr lvl="1"/>
-            <a:r>
-              <a:rPr kumimoji="0" lang="en-US" altLang="en-US" sz="2400" b="1" i="0" u="none" strike="noStrike" cap="none" normalizeH="0" baseline="0" dirty="0" err="1">
-                <a:ln>
-                  <a:noFill/>
-                </a:ln>
-                <a:solidFill>
-                  <a:schemeClr val="tx1"/>
-                </a:solidFill>
-                <a:effectLst/>
-                <a:latin typeface="Arial" panose="020B0604020202020204" pitchFamily="34" charset="0"/>
-              </a:rPr>
-              <a:t>instrumentalness</a:t>
-            </a:r>
-            <a:r>
-              <a:rPr kumimoji="0" lang="en-US" altLang="en-US" sz="2400" b="1" i="0" u="none" strike="noStrike" cap="none" normalizeH="0" baseline="0" dirty="0">
-                <a:ln>
-                  <a:noFill/>
-                </a:ln>
-                <a:solidFill>
-                  <a:schemeClr val="tx1"/>
-                </a:solidFill>
-                <a:effectLst/>
-                <a:latin typeface="Arial" panose="020B0604020202020204" pitchFamily="34" charset="0"/>
-              </a:rPr>
-              <a:t>_%</a:t>
-            </a:r>
-            <a:r>
-              <a:rPr kumimoji="0" lang="en-US" altLang="en-US" sz="2400" b="0" i="0" u="none" strike="noStrike" cap="none" normalizeH="0" baseline="0" dirty="0">
-                <a:ln>
-                  <a:noFill/>
-                </a:ln>
-                <a:solidFill>
-                  <a:schemeClr val="tx1"/>
-                </a:solidFill>
-                <a:effectLst/>
-                <a:latin typeface="Arial" panose="020B0604020202020204" pitchFamily="34" charset="0"/>
-              </a:rPr>
-              <a:t>: </a:t>
-            </a:r>
-            <a:r>
-              <a:rPr kumimoji="0" lang="en-US" altLang="en-US" sz="2400" b="0" i="1" u="none" strike="noStrike" cap="none" normalizeH="0" baseline="0" dirty="0">
-                <a:ln>
-                  <a:noFill/>
-                </a:ln>
-                <a:solidFill>
-                  <a:schemeClr val="tx1"/>
-                </a:solidFill>
-                <a:effectLst/>
-                <a:latin typeface="Arial" panose="020B0604020202020204" pitchFamily="34" charset="0"/>
-              </a:rPr>
-              <a:t>Amount of instrumental content in the song</a:t>
-            </a:r>
-            <a:r>
-              <a:rPr kumimoji="0" lang="en-US" altLang="en-US" sz="2400" b="0" i="0" u="none" strike="noStrike" cap="none" normalizeH="0" baseline="0" dirty="0">
-                <a:ln>
-                  <a:noFill/>
-                </a:ln>
-                <a:solidFill>
-                  <a:schemeClr val="tx1"/>
-                </a:solidFill>
-                <a:effectLst/>
-                <a:latin typeface="Arial" panose="020B0604020202020204" pitchFamily="34" charset="0"/>
-              </a:rPr>
-              <a:t> </a:t>
-            </a:r>
-          </a:p>
-          <a:p>
-            <a:pPr lvl="1"/>
-            <a:r>
-              <a:rPr kumimoji="0" lang="en-US" altLang="en-US" sz="2400" b="1" i="0" u="none" strike="noStrike" cap="none" normalizeH="0" baseline="0" dirty="0">
-                <a:ln>
-                  <a:noFill/>
-                </a:ln>
-                <a:solidFill>
-                  <a:schemeClr val="tx1"/>
-                </a:solidFill>
-                <a:effectLst/>
-                <a:latin typeface="Arial" panose="020B0604020202020204" pitchFamily="34" charset="0"/>
-              </a:rPr>
-              <a:t>liveness_%</a:t>
-            </a:r>
-            <a:r>
-              <a:rPr kumimoji="0" lang="en-US" altLang="en-US" sz="2400" b="0" i="0" u="none" strike="noStrike" cap="none" normalizeH="0" baseline="0" dirty="0">
-                <a:ln>
-                  <a:noFill/>
-                </a:ln>
-                <a:solidFill>
-                  <a:schemeClr val="tx1"/>
-                </a:solidFill>
-                <a:effectLst/>
-                <a:latin typeface="Arial" panose="020B0604020202020204" pitchFamily="34" charset="0"/>
-              </a:rPr>
-              <a:t>: </a:t>
-            </a:r>
-            <a:r>
-              <a:rPr kumimoji="0" lang="en-US" altLang="en-US" sz="2400" b="0" i="1" u="none" strike="noStrike" cap="none" normalizeH="0" baseline="0" dirty="0">
-                <a:ln>
-                  <a:noFill/>
-                </a:ln>
-                <a:solidFill>
-                  <a:schemeClr val="tx1"/>
-                </a:solidFill>
-                <a:effectLst/>
-                <a:latin typeface="Arial" panose="020B0604020202020204" pitchFamily="34" charset="0"/>
-              </a:rPr>
-              <a:t>Presence of live performance elements</a:t>
-            </a:r>
-            <a:r>
-              <a:rPr kumimoji="0" lang="en-US" altLang="en-US" sz="2400" b="0" i="0" u="none" strike="noStrike" cap="none" normalizeH="0" baseline="0" dirty="0">
-                <a:ln>
-                  <a:noFill/>
-                </a:ln>
-                <a:solidFill>
-                  <a:schemeClr val="tx1"/>
-                </a:solidFill>
-                <a:effectLst/>
-                <a:latin typeface="Arial" panose="020B0604020202020204" pitchFamily="34" charset="0"/>
-              </a:rPr>
-              <a:t> </a:t>
-            </a:r>
-          </a:p>
-          <a:p>
-            <a:pPr lvl="1"/>
-            <a:r>
-              <a:rPr kumimoji="0" lang="en-US" altLang="en-US" sz="2400" b="1" i="0" u="none" strike="noStrike" cap="none" normalizeH="0" baseline="0" dirty="0" err="1">
-                <a:ln>
-                  <a:noFill/>
-                </a:ln>
-                <a:solidFill>
-                  <a:schemeClr val="tx1"/>
-                </a:solidFill>
-                <a:effectLst/>
-                <a:latin typeface="Arial" panose="020B0604020202020204" pitchFamily="34" charset="0"/>
-              </a:rPr>
-              <a:t>speechiness</a:t>
-            </a:r>
-            <a:r>
-              <a:rPr kumimoji="0" lang="en-US" altLang="en-US" sz="2400" b="1" i="0" u="none" strike="noStrike" cap="none" normalizeH="0" baseline="0" dirty="0">
-                <a:ln>
-                  <a:noFill/>
-                </a:ln>
-                <a:solidFill>
-                  <a:schemeClr val="tx1"/>
-                </a:solidFill>
-                <a:effectLst/>
-                <a:latin typeface="Arial" panose="020B0604020202020204" pitchFamily="34" charset="0"/>
-              </a:rPr>
-              <a:t>_%</a:t>
-            </a:r>
-            <a:r>
-              <a:rPr kumimoji="0" lang="en-US" altLang="en-US" sz="2400" b="0" i="0" u="none" strike="noStrike" cap="none" normalizeH="0" baseline="0" dirty="0">
-                <a:ln>
-                  <a:noFill/>
-                </a:ln>
-                <a:solidFill>
-                  <a:schemeClr val="tx1"/>
-                </a:solidFill>
-                <a:effectLst/>
-                <a:latin typeface="Arial" panose="020B0604020202020204" pitchFamily="34" charset="0"/>
-              </a:rPr>
-              <a:t>: </a:t>
-            </a:r>
-            <a:r>
-              <a:rPr kumimoji="0" lang="en-US" altLang="en-US" sz="2400" b="0" i="1" u="none" strike="noStrike" cap="none" normalizeH="0" baseline="0" dirty="0">
-                <a:ln>
-                  <a:noFill/>
-                </a:ln>
-                <a:solidFill>
-                  <a:schemeClr val="tx1"/>
-                </a:solidFill>
-                <a:effectLst/>
-                <a:latin typeface="Arial" panose="020B0604020202020204" pitchFamily="34" charset="0"/>
-              </a:rPr>
-              <a:t>Amount of spoken words in the song</a:t>
-            </a:r>
-            <a:endParaRPr kumimoji="0" lang="en-US" altLang="en-US" sz="2400" b="0" i="0" u="none" strike="noStrike" cap="none" normalizeH="0" baseline="0" dirty="0">
-              <a:ln>
-                <a:noFill/>
-              </a:ln>
-              <a:solidFill>
-                <a:schemeClr val="tx1"/>
-              </a:solidFill>
-              <a:effectLst/>
-              <a:latin typeface="Arial" panose="020B0604020202020204" pitchFamily="34" charset="0"/>
-            </a:endParaRPr>
-          </a:p>
-          <a:p>
-            <a:pPr lvl="1"/>
-            <a:endParaRPr lang="en-US" dirty="0"/>
-          </a:p>
-          <a:p>
-            <a:r>
-              <a:rPr lang="en-US" dirty="0"/>
-              <a:t>Given a number representing percentage of presence in a given track</a:t>
-            </a:r>
-          </a:p>
-          <a:p>
-            <a:pPr lvl="1"/>
-            <a:r>
-              <a:rPr lang="en-US" dirty="0"/>
-              <a:t>This percentage is also assigned via Spotify</a:t>
-            </a:r>
-          </a:p>
-          <a:p>
-            <a:endParaRPr lang="en-US" dirty="0"/>
-          </a:p>
-        </p:txBody>
-      </p:sp>
+              <a:t>With Apple it appears to be more spread out as to their placement in the charts vs. the number of times a song is streamed.</a:t>
+            </a:r>
+          </a:p>
+        </p:txBody>
+      </p:sp>
+      <p:pic>
+        <p:nvPicPr>
+          <p:cNvPr id="5" name="Picture 4">
+            <a:extLst>
+              <a:ext uri="{FF2B5EF4-FFF2-40B4-BE49-F238E27FC236}">
+                <a16:creationId xmlns:a16="http://schemas.microsoft.com/office/drawing/2014/main" id="{8BE9A89E-1C1B-ED21-15CA-972669C3E39D}"/>
+              </a:ext>
+            </a:extLst>
+          </p:cNvPr>
+          <p:cNvPicPr>
+            <a:picLocks noChangeAspect="1"/>
+          </p:cNvPicPr>
+          <p:nvPr/>
+        </p:nvPicPr>
+        <p:blipFill>
+          <a:blip r:embed="rId2"/>
+          <a:stretch>
+            <a:fillRect/>
+          </a:stretch>
+        </p:blipFill>
+        <p:spPr>
+          <a:xfrm>
+            <a:off x="548647" y="2033127"/>
+            <a:ext cx="5787640" cy="3880773"/>
+          </a:xfrm>
+          <a:prstGeom prst="rect">
+            <a:avLst/>
+          </a:prstGeom>
+        </p:spPr>
+      </p:pic>
     </p:spTree>
     <p:extLst>
       <p:ext uri="{BB962C8B-B14F-4D97-AF65-F5344CB8AC3E}">
-        <p14:creationId xmlns:p14="http://schemas.microsoft.com/office/powerpoint/2010/main" val="3339136056"/>
+        <p14:creationId xmlns:p14="http://schemas.microsoft.com/office/powerpoint/2010/main" val="305059005"/>
       </p:ext>
     </p:extLst>
   </p:cSld>

</xml_diff>

<commit_message>
ppt and quick fixes
</commit_message>
<xml_diff>
--- a/Project_1_Spotify_2023_Analysis.pptx
+++ b/Project_1_Spotify_2023_Analysis.pptx
@@ -7,16 +7,21 @@
   <p:sldIdLst>
     <p:sldId id="256" r:id="rId2"/>
     <p:sldId id="257" r:id="rId3"/>
-    <p:sldId id="258" r:id="rId4"/>
-    <p:sldId id="259" r:id="rId5"/>
-    <p:sldId id="260" r:id="rId6"/>
-    <p:sldId id="261" r:id="rId7"/>
-    <p:sldId id="262" r:id="rId8"/>
-    <p:sldId id="263" r:id="rId9"/>
-    <p:sldId id="264" r:id="rId10"/>
-    <p:sldId id="265" r:id="rId11"/>
-    <p:sldId id="266" r:id="rId12"/>
-    <p:sldId id="267" r:id="rId13"/>
+    <p:sldId id="268" r:id="rId4"/>
+    <p:sldId id="269" r:id="rId5"/>
+    <p:sldId id="258" r:id="rId6"/>
+    <p:sldId id="270" r:id="rId7"/>
+    <p:sldId id="271" r:id="rId8"/>
+    <p:sldId id="272" r:id="rId9"/>
+    <p:sldId id="259" r:id="rId10"/>
+    <p:sldId id="260" r:id="rId11"/>
+    <p:sldId id="261" r:id="rId12"/>
+    <p:sldId id="262" r:id="rId13"/>
+    <p:sldId id="263" r:id="rId14"/>
+    <p:sldId id="264" r:id="rId15"/>
+    <p:sldId id="265" r:id="rId16"/>
+    <p:sldId id="266" r:id="rId17"/>
+    <p:sldId id="267" r:id="rId18"/>
   </p:sldIdLst>
   <p:sldSz cx="12192000" cy="6858000"/>
   <p:notesSz cx="6858000" cy="9144000"/>
@@ -845,7 +850,7 @@
           <a:p>
             <a:fld id="{F24EF5F4-8F03-4ABB-88B3-7880A17E3B42}" type="datetimeFigureOut">
               <a:rPr lang="en-US" smtClean="0"/>
-              <a:t>2/12/2024</a:t>
+              <a:t>2/13/2024</a:t>
             </a:fld>
             <a:endParaRPr lang="en-US"/>
           </a:p>
@@ -1096,7 +1101,7 @@
           <a:p>
             <a:fld id="{F24EF5F4-8F03-4ABB-88B3-7880A17E3B42}" type="datetimeFigureOut">
               <a:rPr lang="en-US" smtClean="0"/>
-              <a:t>2/12/2024</a:t>
+              <a:t>2/13/2024</a:t>
             </a:fld>
             <a:endParaRPr lang="en-US"/>
           </a:p>
@@ -1410,7 +1415,7 @@
           <a:p>
             <a:fld id="{F24EF5F4-8F03-4ABB-88B3-7880A17E3B42}" type="datetimeFigureOut">
               <a:rPr lang="en-US" smtClean="0"/>
-              <a:t>2/12/2024</a:t>
+              <a:t>2/13/2024</a:t>
             </a:fld>
             <a:endParaRPr lang="en-US"/>
           </a:p>
@@ -1751,7 +1756,7 @@
           <a:p>
             <a:fld id="{F24EF5F4-8F03-4ABB-88B3-7880A17E3B42}" type="datetimeFigureOut">
               <a:rPr lang="en-US" smtClean="0"/>
-              <a:t>2/12/2024</a:t>
+              <a:t>2/13/2024</a:t>
             </a:fld>
             <a:endParaRPr lang="en-US"/>
           </a:p>
@@ -2065,7 +2070,7 @@
           <a:p>
             <a:fld id="{F24EF5F4-8F03-4ABB-88B3-7880A17E3B42}" type="datetimeFigureOut">
               <a:rPr lang="en-US" smtClean="0"/>
-              <a:t>2/12/2024</a:t>
+              <a:t>2/13/2024</a:t>
             </a:fld>
             <a:endParaRPr lang="en-US"/>
           </a:p>
@@ -2458,7 +2463,7 @@
           <a:p>
             <a:fld id="{F24EF5F4-8F03-4ABB-88B3-7880A17E3B42}" type="datetimeFigureOut">
               <a:rPr lang="en-US" smtClean="0"/>
-              <a:t>2/12/2024</a:t>
+              <a:t>2/13/2024</a:t>
             </a:fld>
             <a:endParaRPr lang="en-US"/>
           </a:p>
@@ -2628,7 +2633,7 @@
           <a:p>
             <a:fld id="{F24EF5F4-8F03-4ABB-88B3-7880A17E3B42}" type="datetimeFigureOut">
               <a:rPr lang="en-US" smtClean="0"/>
-              <a:t>2/12/2024</a:t>
+              <a:t>2/13/2024</a:t>
             </a:fld>
             <a:endParaRPr lang="en-US"/>
           </a:p>
@@ -2808,7 +2813,7 @@
           <a:p>
             <a:fld id="{F24EF5F4-8F03-4ABB-88B3-7880A17E3B42}" type="datetimeFigureOut">
               <a:rPr lang="en-US" smtClean="0"/>
-              <a:t>2/12/2024</a:t>
+              <a:t>2/13/2024</a:t>
             </a:fld>
             <a:endParaRPr lang="en-US"/>
           </a:p>
@@ -2984,7 +2989,7 @@
           <a:p>
             <a:fld id="{F24EF5F4-8F03-4ABB-88B3-7880A17E3B42}" type="datetimeFigureOut">
               <a:rPr lang="en-US" smtClean="0"/>
-              <a:t>2/12/2024</a:t>
+              <a:t>2/13/2024</a:t>
             </a:fld>
             <a:endParaRPr lang="en-US"/>
           </a:p>
@@ -3231,7 +3236,7 @@
           <a:p>
             <a:fld id="{F24EF5F4-8F03-4ABB-88B3-7880A17E3B42}" type="datetimeFigureOut">
               <a:rPr lang="en-US" smtClean="0"/>
-              <a:t>2/12/2024</a:t>
+              <a:t>2/13/2024</a:t>
             </a:fld>
             <a:endParaRPr lang="en-US"/>
           </a:p>
@@ -3463,7 +3468,7 @@
           <a:p>
             <a:fld id="{F24EF5F4-8F03-4ABB-88B3-7880A17E3B42}" type="datetimeFigureOut">
               <a:rPr lang="en-US" smtClean="0"/>
-              <a:t>2/12/2024</a:t>
+              <a:t>2/13/2024</a:t>
             </a:fld>
             <a:endParaRPr lang="en-US"/>
           </a:p>
@@ -3837,7 +3842,7 @@
           <a:p>
             <a:fld id="{F24EF5F4-8F03-4ABB-88B3-7880A17E3B42}" type="datetimeFigureOut">
               <a:rPr lang="en-US" smtClean="0"/>
-              <a:t>2/12/2024</a:t>
+              <a:t>2/13/2024</a:t>
             </a:fld>
             <a:endParaRPr lang="en-US"/>
           </a:p>
@@ -3960,7 +3965,7 @@
           <a:p>
             <a:fld id="{F24EF5F4-8F03-4ABB-88B3-7880A17E3B42}" type="datetimeFigureOut">
               <a:rPr lang="en-US" smtClean="0"/>
-              <a:t>2/12/2024</a:t>
+              <a:t>2/13/2024</a:t>
             </a:fld>
             <a:endParaRPr lang="en-US"/>
           </a:p>
@@ -4055,7 +4060,7 @@
           <a:p>
             <a:fld id="{F24EF5F4-8F03-4ABB-88B3-7880A17E3B42}" type="datetimeFigureOut">
               <a:rPr lang="en-US" smtClean="0"/>
-              <a:t>2/12/2024</a:t>
+              <a:t>2/13/2024</a:t>
             </a:fld>
             <a:endParaRPr lang="en-US"/>
           </a:p>
@@ -4310,7 +4315,7 @@
           <a:p>
             <a:fld id="{F24EF5F4-8F03-4ABB-88B3-7880A17E3B42}" type="datetimeFigureOut">
               <a:rPr lang="en-US" smtClean="0"/>
-              <a:t>2/12/2024</a:t>
+              <a:t>2/13/2024</a:t>
             </a:fld>
             <a:endParaRPr lang="en-US"/>
           </a:p>
@@ -4573,7 +4578,7 @@
           <a:p>
             <a:fld id="{F24EF5F4-8F03-4ABB-88B3-7880A17E3B42}" type="datetimeFigureOut">
               <a:rPr lang="en-US" smtClean="0"/>
-              <a:t>2/12/2024</a:t>
+              <a:t>2/13/2024</a:t>
             </a:fld>
             <a:endParaRPr lang="en-US"/>
           </a:p>
@@ -5316,7 +5321,7 @@
           <a:p>
             <a:fld id="{F24EF5F4-8F03-4ABB-88B3-7880A17E3B42}" type="datetimeFigureOut">
               <a:rPr lang="en-US" smtClean="0"/>
-              <a:t>2/12/2024</a:t>
+              <a:t>2/13/2024</a:t>
             </a:fld>
             <a:endParaRPr lang="en-US"/>
           </a:p>
@@ -5947,6 +5952,1229 @@
           <a:chExt cx="0" cy="0"/>
         </a:xfrm>
       </p:grpSpPr>
+      <p:sp>
+        <p:nvSpPr>
+          <p:cNvPr id="2" name="Title 1">
+            <a:extLst>
+              <a:ext uri="{FF2B5EF4-FFF2-40B4-BE49-F238E27FC236}">
+                <a16:creationId xmlns:a16="http://schemas.microsoft.com/office/drawing/2014/main" id="{C3D942C1-F821-163F-7497-06F9A11642B9}"/>
+              </a:ext>
+            </a:extLst>
+          </p:cNvPr>
+          <p:cNvSpPr>
+            <a:spLocks noGrp="1"/>
+          </p:cNvSpPr>
+          <p:nvPr>
+            <p:ph type="title"/>
+          </p:nvPr>
+        </p:nvSpPr>
+        <p:spPr/>
+        <p:txBody>
+          <a:bodyPr/>
+          <a:lstStyle/>
+          <a:p>
+            <a:r>
+              <a:rPr lang="en-US" dirty="0"/>
+              <a:t>Analysis of Musical Characteristics</a:t>
+            </a:r>
+          </a:p>
+        </p:txBody>
+      </p:sp>
+      <p:sp>
+        <p:nvSpPr>
+          <p:cNvPr id="3" name="Content Placeholder 2">
+            <a:extLst>
+              <a:ext uri="{FF2B5EF4-FFF2-40B4-BE49-F238E27FC236}">
+                <a16:creationId xmlns:a16="http://schemas.microsoft.com/office/drawing/2014/main" id="{AD1D5CB7-F90B-DA38-79C8-2A61393B40B9}"/>
+              </a:ext>
+            </a:extLst>
+          </p:cNvPr>
+          <p:cNvSpPr>
+            <a:spLocks noGrp="1"/>
+          </p:cNvSpPr>
+          <p:nvPr>
+            <p:ph idx="1"/>
+          </p:nvPr>
+        </p:nvSpPr>
+        <p:spPr/>
+        <p:txBody>
+          <a:bodyPr/>
+          <a:lstStyle/>
+          <a:p>
+            <a:r>
+              <a:rPr lang="en-US" dirty="0"/>
+              <a:t>Comparing the Top 20 Most Streamed Artists vs. the Entire Dataset</a:t>
+            </a:r>
+          </a:p>
+          <a:p>
+            <a:pPr lvl="1"/>
+            <a:r>
+              <a:rPr lang="en-US" dirty="0"/>
+              <a:t>Top Artists account for approximately 27% of included tracks, but received over 36% of streams</a:t>
+            </a:r>
+          </a:p>
+          <a:p>
+            <a:pPr lvl="1"/>
+            <a:endParaRPr lang="en-US" dirty="0"/>
+          </a:p>
+          <a:p>
+            <a:pPr lvl="1"/>
+            <a:r>
+              <a:rPr lang="en-US" dirty="0"/>
+              <a:t>Do Top Artists mimic the population, or forge their own path?</a:t>
+            </a:r>
+          </a:p>
+          <a:p>
+            <a:pPr lvl="1"/>
+            <a:endParaRPr lang="en-US" dirty="0"/>
+          </a:p>
+          <a:p>
+            <a:r>
+              <a:rPr lang="en-US" dirty="0"/>
+              <a:t>Considering Averages</a:t>
+            </a:r>
+          </a:p>
+          <a:p>
+            <a:pPr lvl="1"/>
+            <a:r>
+              <a:rPr lang="en-US" dirty="0"/>
+              <a:t>Due to the nature of songs as discrete pieces of content, analysis focuses on median and mode averages vs. mean calculations</a:t>
+            </a:r>
+          </a:p>
+        </p:txBody>
+      </p:sp>
+    </p:spTree>
+    <p:extLst>
+      <p:ext uri="{BB962C8B-B14F-4D97-AF65-F5344CB8AC3E}">
+        <p14:creationId xmlns:p14="http://schemas.microsoft.com/office/powerpoint/2010/main" val="855427616"/>
+      </p:ext>
+    </p:extLst>
+  </p:cSld>
+  <p:clrMapOvr>
+    <a:masterClrMapping/>
+  </p:clrMapOvr>
+</p:sld>
+</file>
+
+<file path=ppt/slides/slide11.xml><?xml version="1.0" encoding="utf-8"?>
+<p:sld xmlns:a="http://schemas.openxmlformats.org/drawingml/2006/main" xmlns:r="http://schemas.openxmlformats.org/officeDocument/2006/relationships" xmlns:p="http://schemas.openxmlformats.org/presentationml/2006/main">
+  <p:cSld>
+    <p:spTree>
+      <p:nvGrpSpPr>
+        <p:cNvPr id="1" name=""/>
+        <p:cNvGrpSpPr/>
+        <p:nvPr/>
+      </p:nvGrpSpPr>
+      <p:grpSpPr>
+        <a:xfrm>
+          <a:off x="0" y="0"/>
+          <a:ext cx="0" cy="0"/>
+          <a:chOff x="0" y="0"/>
+          <a:chExt cx="0" cy="0"/>
+        </a:xfrm>
+      </p:grpSpPr>
+      <p:sp>
+        <p:nvSpPr>
+          <p:cNvPr id="2" name="Title 1">
+            <a:extLst>
+              <a:ext uri="{FF2B5EF4-FFF2-40B4-BE49-F238E27FC236}">
+                <a16:creationId xmlns:a16="http://schemas.microsoft.com/office/drawing/2014/main" id="{1B24E665-5B89-EB78-C0E2-7832422881BA}"/>
+              </a:ext>
+            </a:extLst>
+          </p:cNvPr>
+          <p:cNvSpPr>
+            <a:spLocks noGrp="1"/>
+          </p:cNvSpPr>
+          <p:nvPr>
+            <p:ph type="title"/>
+          </p:nvPr>
+        </p:nvSpPr>
+        <p:spPr/>
+        <p:txBody>
+          <a:bodyPr/>
+          <a:lstStyle/>
+          <a:p>
+            <a:r>
+              <a:rPr lang="en-US" dirty="0"/>
+              <a:t>Song Speeds (BPM – Beats Per Minute)</a:t>
+            </a:r>
+          </a:p>
+        </p:txBody>
+      </p:sp>
+      <p:sp>
+        <p:nvSpPr>
+          <p:cNvPr id="6" name="TextBox 5">
+            <a:extLst>
+              <a:ext uri="{FF2B5EF4-FFF2-40B4-BE49-F238E27FC236}">
+                <a16:creationId xmlns:a16="http://schemas.microsoft.com/office/drawing/2014/main" id="{642D8BB6-B6BA-F68E-72A4-85A48931554D}"/>
+              </a:ext>
+            </a:extLst>
+          </p:cNvPr>
+          <p:cNvSpPr txBox="1"/>
+          <p:nvPr/>
+        </p:nvSpPr>
+        <p:spPr>
+          <a:xfrm>
+            <a:off x="7956331" y="1690688"/>
+            <a:ext cx="4056994" cy="4524315"/>
+          </a:xfrm>
+          <a:prstGeom prst="rect">
+            <a:avLst/>
+          </a:prstGeom>
+          <a:noFill/>
+        </p:spPr>
+        <p:txBody>
+          <a:bodyPr wrap="square" rtlCol="0">
+            <a:spAutoFit/>
+          </a:bodyPr>
+          <a:lstStyle/>
+          <a:p>
+            <a:pPr marL="285750" indent="-285750">
+              <a:buFont typeface="Arial" panose="020B0604020202020204" pitchFamily="34" charset="0"/>
+              <a:buChar char="•"/>
+            </a:pPr>
+            <a:r>
+              <a:rPr lang="en-US" dirty="0"/>
+              <a:t>The Top 20 Artist sample is very similar in structure to the data population.</a:t>
+            </a:r>
+          </a:p>
+          <a:p>
+            <a:pPr marL="285750" indent="-285750">
+              <a:buFont typeface="Arial" panose="020B0604020202020204" pitchFamily="34" charset="0"/>
+              <a:buChar char="•"/>
+            </a:pPr>
+            <a:endParaRPr lang="en-US" dirty="0"/>
+          </a:p>
+          <a:p>
+            <a:pPr marL="285750" indent="-285750">
+              <a:buFont typeface="Arial" panose="020B0604020202020204" pitchFamily="34" charset="0"/>
+              <a:buChar char="•"/>
+            </a:pPr>
+            <a:r>
+              <a:rPr lang="en-US" dirty="0"/>
+              <a:t>The median BPM for the sample (120bpm) is extremely close to the median BPM of the population (121bpm).</a:t>
+            </a:r>
+          </a:p>
+          <a:p>
+            <a:pPr marL="285750" indent="-285750">
+              <a:buFont typeface="Arial" panose="020B0604020202020204" pitchFamily="34" charset="0"/>
+              <a:buChar char="•"/>
+            </a:pPr>
+            <a:endParaRPr lang="en-US" dirty="0"/>
+          </a:p>
+          <a:p>
+            <a:pPr marL="285750" indent="-285750">
+              <a:buFont typeface="Arial" panose="020B0604020202020204" pitchFamily="34" charset="0"/>
+              <a:buChar char="•"/>
+            </a:pPr>
+            <a:r>
+              <a:rPr lang="en-US" dirty="0"/>
+              <a:t>The mode for Top Artists is considerably lower</a:t>
+            </a:r>
+          </a:p>
+          <a:p>
+            <a:pPr marL="742950" lvl="1" indent="-285750">
+              <a:buFont typeface="Arial" panose="020B0604020202020204" pitchFamily="34" charset="0"/>
+              <a:buChar char="•"/>
+            </a:pPr>
+            <a:r>
+              <a:rPr lang="en-US" dirty="0"/>
+              <a:t>Top Artists Mode: 90bpm, 7 songs (2.7% of songs in sample)</a:t>
+            </a:r>
+          </a:p>
+          <a:p>
+            <a:pPr marL="742950" lvl="1" indent="-285750">
+              <a:buFont typeface="Arial" panose="020B0604020202020204" pitchFamily="34" charset="0"/>
+              <a:buChar char="•"/>
+            </a:pPr>
+            <a:endParaRPr lang="en-US" dirty="0"/>
+          </a:p>
+          <a:p>
+            <a:pPr marL="742950" lvl="1" indent="-285750">
+              <a:buFont typeface="Arial" panose="020B0604020202020204" pitchFamily="34" charset="0"/>
+              <a:buChar char="•"/>
+            </a:pPr>
+            <a:r>
+              <a:rPr lang="en-US" dirty="0"/>
+              <a:t>All Songs: 120bpm, 34 songs (3.6% of songs in population)</a:t>
+            </a:r>
+          </a:p>
+        </p:txBody>
+      </p:sp>
+      <p:pic>
+        <p:nvPicPr>
+          <p:cNvPr id="8" name="Content Placeholder 7">
+            <a:extLst>
+              <a:ext uri="{FF2B5EF4-FFF2-40B4-BE49-F238E27FC236}">
+                <a16:creationId xmlns:a16="http://schemas.microsoft.com/office/drawing/2014/main" id="{04D86521-6FBA-DB49-BD3C-CAC4A64E1817}"/>
+              </a:ext>
+            </a:extLst>
+          </p:cNvPr>
+          <p:cNvPicPr>
+            <a:picLocks noGrp="1" noChangeAspect="1"/>
+          </p:cNvPicPr>
+          <p:nvPr>
+            <p:ph idx="1"/>
+          </p:nvPr>
+        </p:nvPicPr>
+        <p:blipFill>
+          <a:blip r:embed="rId2">
+            <a:extLst>
+              <a:ext uri="{28A0092B-C50C-407E-A947-70E740481C1C}">
+                <a14:useLocalDpi xmlns:a14="http://schemas.microsoft.com/office/drawing/2010/main" val="0"/>
+              </a:ext>
+            </a:extLst>
+          </a:blip>
+          <a:stretch>
+            <a:fillRect/>
+          </a:stretch>
+        </p:blipFill>
+        <p:spPr>
+          <a:xfrm>
+            <a:off x="677334" y="1331467"/>
+            <a:ext cx="6555910" cy="4916933"/>
+          </a:xfrm>
+        </p:spPr>
+      </p:pic>
+      <p:sp>
+        <p:nvSpPr>
+          <p:cNvPr id="9" name="TextBox 8">
+            <a:extLst>
+              <a:ext uri="{FF2B5EF4-FFF2-40B4-BE49-F238E27FC236}">
+                <a16:creationId xmlns:a16="http://schemas.microsoft.com/office/drawing/2014/main" id="{1B766D9F-F1B3-8EE3-B481-5F93AE61601E}"/>
+              </a:ext>
+            </a:extLst>
+          </p:cNvPr>
+          <p:cNvSpPr txBox="1"/>
+          <p:nvPr/>
+        </p:nvSpPr>
+        <p:spPr>
+          <a:xfrm>
+            <a:off x="1075058" y="6248400"/>
+            <a:ext cx="7178565" cy="276999"/>
+          </a:xfrm>
+          <a:prstGeom prst="rect">
+            <a:avLst/>
+          </a:prstGeom>
+          <a:noFill/>
+        </p:spPr>
+        <p:txBody>
+          <a:bodyPr wrap="square" rtlCol="0">
+            <a:spAutoFit/>
+          </a:bodyPr>
+          <a:lstStyle/>
+          <a:p>
+            <a:r>
+              <a:rPr lang="en-US" sz="1200" b="0" i="0" dirty="0">
+                <a:effectLst/>
+                <a:ea typeface="Calibri" panose="020F0502020204030204" pitchFamily="34" charset="0"/>
+                <a:cs typeface="Calibri" panose="020F0502020204030204" pitchFamily="34" charset="0"/>
+              </a:rPr>
+              <a:t>Standard Deviation of tempos: 37.462117528776375. p-value=3.927199818891401e-06)</a:t>
+            </a:r>
+            <a:endParaRPr lang="en-US" sz="1200" dirty="0">
+              <a:ea typeface="Calibri" panose="020F0502020204030204" pitchFamily="34" charset="0"/>
+              <a:cs typeface="Calibri" panose="020F0502020204030204" pitchFamily="34" charset="0"/>
+            </a:endParaRPr>
+          </a:p>
+        </p:txBody>
+      </p:sp>
+    </p:spTree>
+    <p:extLst>
+      <p:ext uri="{BB962C8B-B14F-4D97-AF65-F5344CB8AC3E}">
+        <p14:creationId xmlns:p14="http://schemas.microsoft.com/office/powerpoint/2010/main" val="1136602678"/>
+      </p:ext>
+    </p:extLst>
+  </p:cSld>
+  <p:clrMapOvr>
+    <a:masterClrMapping/>
+  </p:clrMapOvr>
+</p:sld>
+</file>
+
+<file path=ppt/slides/slide12.xml><?xml version="1.0" encoding="utf-8"?>
+<p:sld xmlns:a="http://schemas.openxmlformats.org/drawingml/2006/main" xmlns:r="http://schemas.openxmlformats.org/officeDocument/2006/relationships" xmlns:p="http://schemas.openxmlformats.org/presentationml/2006/main">
+  <p:cSld>
+    <p:spTree>
+      <p:nvGrpSpPr>
+        <p:cNvPr id="1" name=""/>
+        <p:cNvGrpSpPr/>
+        <p:nvPr/>
+      </p:nvGrpSpPr>
+      <p:grpSpPr>
+        <a:xfrm>
+          <a:off x="0" y="0"/>
+          <a:ext cx="0" cy="0"/>
+          <a:chOff x="0" y="0"/>
+          <a:chExt cx="0" cy="0"/>
+        </a:xfrm>
+      </p:grpSpPr>
+      <p:sp>
+        <p:nvSpPr>
+          <p:cNvPr id="2" name="Title 1">
+            <a:extLst>
+              <a:ext uri="{FF2B5EF4-FFF2-40B4-BE49-F238E27FC236}">
+                <a16:creationId xmlns:a16="http://schemas.microsoft.com/office/drawing/2014/main" id="{EAEE6358-0693-987A-8D91-0A483DB12C51}"/>
+              </a:ext>
+            </a:extLst>
+          </p:cNvPr>
+          <p:cNvSpPr>
+            <a:spLocks noGrp="1"/>
+          </p:cNvSpPr>
+          <p:nvPr>
+            <p:ph type="title"/>
+          </p:nvPr>
+        </p:nvSpPr>
+        <p:spPr/>
+        <p:txBody>
+          <a:bodyPr/>
+          <a:lstStyle/>
+          <a:p>
+            <a:r>
+              <a:rPr lang="en-US" dirty="0"/>
+              <a:t>Song Modality – Major vs. Minor</a:t>
+            </a:r>
+          </a:p>
+        </p:txBody>
+      </p:sp>
+      <p:sp>
+        <p:nvSpPr>
+          <p:cNvPr id="3" name="Content Placeholder 2">
+            <a:extLst>
+              <a:ext uri="{FF2B5EF4-FFF2-40B4-BE49-F238E27FC236}">
+                <a16:creationId xmlns:a16="http://schemas.microsoft.com/office/drawing/2014/main" id="{44D48737-E3BB-F424-6E9D-86B47B73F6D4}"/>
+              </a:ext>
+            </a:extLst>
+          </p:cNvPr>
+          <p:cNvSpPr>
+            <a:spLocks noGrp="1"/>
+          </p:cNvSpPr>
+          <p:nvPr>
+            <p:ph idx="1"/>
+          </p:nvPr>
+        </p:nvSpPr>
+        <p:spPr/>
+        <p:txBody>
+          <a:bodyPr>
+            <a:normAutofit lnSpcReduction="10000"/>
+          </a:bodyPr>
+          <a:lstStyle/>
+          <a:p>
+            <a:r>
+              <a:rPr lang="en-US" dirty="0"/>
+              <a:t>“Major” Associations:</a:t>
+            </a:r>
+          </a:p>
+          <a:p>
+            <a:pPr lvl="1"/>
+            <a:r>
+              <a:rPr lang="en-US" dirty="0"/>
+              <a:t>Upbeat</a:t>
+            </a:r>
+          </a:p>
+          <a:p>
+            <a:pPr lvl="1"/>
+            <a:r>
+              <a:rPr lang="en-US" dirty="0"/>
+              <a:t>Positive</a:t>
+            </a:r>
+          </a:p>
+          <a:p>
+            <a:pPr lvl="1"/>
+            <a:r>
+              <a:rPr lang="en-US" dirty="0"/>
+              <a:t>Happy</a:t>
+            </a:r>
+          </a:p>
+          <a:p>
+            <a:pPr lvl="1"/>
+            <a:r>
+              <a:rPr lang="en-US" dirty="0"/>
+              <a:t>Bright</a:t>
+            </a:r>
+          </a:p>
+          <a:p>
+            <a:pPr lvl="1"/>
+            <a:endParaRPr lang="en-US" dirty="0"/>
+          </a:p>
+          <a:p>
+            <a:r>
+              <a:rPr lang="en-US" dirty="0"/>
+              <a:t>“Minor” Associations:</a:t>
+            </a:r>
+          </a:p>
+          <a:p>
+            <a:pPr lvl="1"/>
+            <a:r>
+              <a:rPr lang="en-US" dirty="0"/>
+              <a:t>Slower</a:t>
+            </a:r>
+          </a:p>
+          <a:p>
+            <a:pPr lvl="1"/>
+            <a:r>
+              <a:rPr lang="en-US" dirty="0"/>
+              <a:t>Sad</a:t>
+            </a:r>
+          </a:p>
+          <a:p>
+            <a:pPr lvl="1"/>
+            <a:r>
+              <a:rPr lang="en-US" dirty="0"/>
+              <a:t>Dark</a:t>
+            </a:r>
+          </a:p>
+          <a:p>
+            <a:pPr lvl="1"/>
+            <a:r>
+              <a:rPr lang="en-US" dirty="0"/>
+              <a:t>Mysterious</a:t>
+            </a:r>
+          </a:p>
+        </p:txBody>
+      </p:sp>
+    </p:spTree>
+    <p:extLst>
+      <p:ext uri="{BB962C8B-B14F-4D97-AF65-F5344CB8AC3E}">
+        <p14:creationId xmlns:p14="http://schemas.microsoft.com/office/powerpoint/2010/main" val="2640556589"/>
+      </p:ext>
+    </p:extLst>
+  </p:cSld>
+  <p:clrMapOvr>
+    <a:masterClrMapping/>
+  </p:clrMapOvr>
+</p:sld>
+</file>
+
+<file path=ppt/slides/slide13.xml><?xml version="1.0" encoding="utf-8"?>
+<p:sld xmlns:a="http://schemas.openxmlformats.org/drawingml/2006/main" xmlns:r="http://schemas.openxmlformats.org/officeDocument/2006/relationships" xmlns:p="http://schemas.openxmlformats.org/presentationml/2006/main">
+  <p:cSld>
+    <p:spTree>
+      <p:nvGrpSpPr>
+        <p:cNvPr id="1" name=""/>
+        <p:cNvGrpSpPr/>
+        <p:nvPr/>
+      </p:nvGrpSpPr>
+      <p:grpSpPr>
+        <a:xfrm>
+          <a:off x="0" y="0"/>
+          <a:ext cx="0" cy="0"/>
+          <a:chOff x="0" y="0"/>
+          <a:chExt cx="0" cy="0"/>
+        </a:xfrm>
+      </p:grpSpPr>
+      <p:sp>
+        <p:nvSpPr>
+          <p:cNvPr id="2" name="Title 1">
+            <a:extLst>
+              <a:ext uri="{FF2B5EF4-FFF2-40B4-BE49-F238E27FC236}">
+                <a16:creationId xmlns:a16="http://schemas.microsoft.com/office/drawing/2014/main" id="{999EA004-2536-63B6-7DE8-F16DC8AEE1FF}"/>
+              </a:ext>
+            </a:extLst>
+          </p:cNvPr>
+          <p:cNvSpPr>
+            <a:spLocks noGrp="1"/>
+          </p:cNvSpPr>
+          <p:nvPr>
+            <p:ph type="title"/>
+          </p:nvPr>
+        </p:nvSpPr>
+        <p:spPr/>
+        <p:txBody>
+          <a:bodyPr/>
+          <a:lstStyle/>
+          <a:p>
+            <a:r>
+              <a:rPr lang="en-US" dirty="0"/>
+              <a:t>Spotify 2023 Modality Breakdown</a:t>
+            </a:r>
+          </a:p>
+        </p:txBody>
+      </p:sp>
+      <p:pic>
+        <p:nvPicPr>
+          <p:cNvPr id="5" name="Content Placeholder 4">
+            <a:extLst>
+              <a:ext uri="{FF2B5EF4-FFF2-40B4-BE49-F238E27FC236}">
+                <a16:creationId xmlns:a16="http://schemas.microsoft.com/office/drawing/2014/main" id="{6B307C1B-101F-E427-6E0A-0B69FA7B47F7}"/>
+              </a:ext>
+            </a:extLst>
+          </p:cNvPr>
+          <p:cNvPicPr>
+            <a:picLocks noGrp="1" noChangeAspect="1"/>
+          </p:cNvPicPr>
+          <p:nvPr>
+            <p:ph idx="1"/>
+          </p:nvPr>
+        </p:nvPicPr>
+        <p:blipFill>
+          <a:blip r:embed="rId2">
+            <a:extLst>
+              <a:ext uri="{28A0092B-C50C-407E-A947-70E740481C1C}">
+                <a14:useLocalDpi xmlns:a14="http://schemas.microsoft.com/office/drawing/2010/main" val="0"/>
+              </a:ext>
+            </a:extLst>
+          </a:blip>
+          <a:stretch>
+            <a:fillRect/>
+          </a:stretch>
+        </p:blipFill>
+        <p:spPr>
+          <a:xfrm>
+            <a:off x="269022" y="1690767"/>
+            <a:ext cx="5801784" cy="4351338"/>
+          </a:xfrm>
+        </p:spPr>
+      </p:pic>
+      <p:sp>
+        <p:nvSpPr>
+          <p:cNvPr id="8" name="TextBox 7">
+            <a:extLst>
+              <a:ext uri="{FF2B5EF4-FFF2-40B4-BE49-F238E27FC236}">
+                <a16:creationId xmlns:a16="http://schemas.microsoft.com/office/drawing/2014/main" id="{FA3AEE96-CCC5-9002-4022-336902D94B88}"/>
+              </a:ext>
+            </a:extLst>
+          </p:cNvPr>
+          <p:cNvSpPr txBox="1"/>
+          <p:nvPr/>
+        </p:nvSpPr>
+        <p:spPr>
+          <a:xfrm>
+            <a:off x="677334" y="6089063"/>
+            <a:ext cx="10457350" cy="646331"/>
+          </a:xfrm>
+          <a:prstGeom prst="rect">
+            <a:avLst/>
+          </a:prstGeom>
+          <a:noFill/>
+        </p:spPr>
+        <p:txBody>
+          <a:bodyPr wrap="none" rtlCol="0">
+            <a:spAutoFit/>
+          </a:bodyPr>
+          <a:lstStyle/>
+          <a:p>
+            <a:r>
+              <a:rPr lang="en-US" dirty="0"/>
+              <a:t>Major modality is more popular across both sample and population. The most streamed artists had </a:t>
+            </a:r>
+          </a:p>
+          <a:p>
+            <a:r>
+              <a:rPr lang="en-US" dirty="0"/>
+              <a:t>a further share of major modality.</a:t>
+            </a:r>
+          </a:p>
+        </p:txBody>
+      </p:sp>
+      <p:pic>
+        <p:nvPicPr>
+          <p:cNvPr id="7" name="Picture 6">
+            <a:extLst>
+              <a:ext uri="{FF2B5EF4-FFF2-40B4-BE49-F238E27FC236}">
+                <a16:creationId xmlns:a16="http://schemas.microsoft.com/office/drawing/2014/main" id="{FE582FD2-C079-6B70-8508-AF7E33FDE84C}"/>
+              </a:ext>
+            </a:extLst>
+          </p:cNvPr>
+          <p:cNvPicPr>
+            <a:picLocks noChangeAspect="1"/>
+          </p:cNvPicPr>
+          <p:nvPr/>
+        </p:nvPicPr>
+        <p:blipFill>
+          <a:blip r:embed="rId3">
+            <a:extLst>
+              <a:ext uri="{28A0092B-C50C-407E-A947-70E740481C1C}">
+                <a14:useLocalDpi xmlns:a14="http://schemas.microsoft.com/office/drawing/2010/main" val="0"/>
+              </a:ext>
+            </a:extLst>
+          </a:blip>
+          <a:stretch>
+            <a:fillRect/>
+          </a:stretch>
+        </p:blipFill>
+        <p:spPr>
+          <a:xfrm>
+            <a:off x="5501628" y="1652976"/>
+            <a:ext cx="5852172" cy="4389129"/>
+          </a:xfrm>
+          <a:prstGeom prst="rect">
+            <a:avLst/>
+          </a:prstGeom>
+        </p:spPr>
+      </p:pic>
+    </p:spTree>
+    <p:extLst>
+      <p:ext uri="{BB962C8B-B14F-4D97-AF65-F5344CB8AC3E}">
+        <p14:creationId xmlns:p14="http://schemas.microsoft.com/office/powerpoint/2010/main" val="1105713490"/>
+      </p:ext>
+    </p:extLst>
+  </p:cSld>
+  <p:clrMapOvr>
+    <a:masterClrMapping/>
+  </p:clrMapOvr>
+</p:sld>
+</file>
+
+<file path=ppt/slides/slide14.xml><?xml version="1.0" encoding="utf-8"?>
+<p:sld xmlns:a="http://schemas.openxmlformats.org/drawingml/2006/main" xmlns:r="http://schemas.openxmlformats.org/officeDocument/2006/relationships" xmlns:p="http://schemas.openxmlformats.org/presentationml/2006/main">
+  <p:cSld>
+    <p:spTree>
+      <p:nvGrpSpPr>
+        <p:cNvPr id="1" name=""/>
+        <p:cNvGrpSpPr/>
+        <p:nvPr/>
+      </p:nvGrpSpPr>
+      <p:grpSpPr>
+        <a:xfrm>
+          <a:off x="0" y="0"/>
+          <a:ext cx="0" cy="0"/>
+          <a:chOff x="0" y="0"/>
+          <a:chExt cx="0" cy="0"/>
+        </a:xfrm>
+      </p:grpSpPr>
+      <p:sp>
+        <p:nvSpPr>
+          <p:cNvPr id="2" name="Title 1">
+            <a:extLst>
+              <a:ext uri="{FF2B5EF4-FFF2-40B4-BE49-F238E27FC236}">
+                <a16:creationId xmlns:a16="http://schemas.microsoft.com/office/drawing/2014/main" id="{D21C9EA1-6248-6908-2C97-4D32ECF06B99}"/>
+              </a:ext>
+            </a:extLst>
+          </p:cNvPr>
+          <p:cNvSpPr>
+            <a:spLocks noGrp="1"/>
+          </p:cNvSpPr>
+          <p:nvPr>
+            <p:ph type="title"/>
+          </p:nvPr>
+        </p:nvSpPr>
+        <p:spPr/>
+        <p:txBody>
+          <a:bodyPr/>
+          <a:lstStyle/>
+          <a:p>
+            <a:r>
+              <a:rPr lang="en-US" dirty="0"/>
+              <a:t>Musical Characteristics</a:t>
+            </a:r>
+          </a:p>
+        </p:txBody>
+      </p:sp>
+      <p:sp>
+        <p:nvSpPr>
+          <p:cNvPr id="3" name="Content Placeholder 2">
+            <a:extLst>
+              <a:ext uri="{FF2B5EF4-FFF2-40B4-BE49-F238E27FC236}">
+                <a16:creationId xmlns:a16="http://schemas.microsoft.com/office/drawing/2014/main" id="{8CF5B4B8-585F-616D-A8A5-526CEB066679}"/>
+              </a:ext>
+            </a:extLst>
+          </p:cNvPr>
+          <p:cNvSpPr>
+            <a:spLocks noGrp="1"/>
+          </p:cNvSpPr>
+          <p:nvPr>
+            <p:ph idx="1"/>
+          </p:nvPr>
+        </p:nvSpPr>
+        <p:spPr/>
+        <p:txBody>
+          <a:bodyPr>
+            <a:normAutofit fontScale="70000" lnSpcReduction="20000"/>
+          </a:bodyPr>
+          <a:lstStyle/>
+          <a:p>
+            <a:r>
+              <a:rPr lang="en-US" dirty="0"/>
+              <a:t>Elements of the track as defined by Spotify:</a:t>
+            </a:r>
+          </a:p>
+          <a:p>
+            <a:pPr lvl="1"/>
+            <a:endParaRPr kumimoji="0" lang="en-US" altLang="en-US" sz="2400" b="1" i="0" u="none" strike="noStrike" cap="none" normalizeH="0" baseline="0" dirty="0">
+              <a:ln>
+                <a:noFill/>
+              </a:ln>
+              <a:solidFill>
+                <a:schemeClr val="tx1"/>
+              </a:solidFill>
+              <a:effectLst/>
+              <a:latin typeface="Arial" panose="020B0604020202020204" pitchFamily="34" charset="0"/>
+            </a:endParaRPr>
+          </a:p>
+          <a:p>
+            <a:pPr lvl="1"/>
+            <a:r>
+              <a:rPr kumimoji="0" lang="en-US" altLang="en-US" sz="2400" b="1" i="0" u="none" strike="noStrike" cap="none" normalizeH="0" baseline="0" dirty="0">
+                <a:ln>
+                  <a:noFill/>
+                </a:ln>
+                <a:solidFill>
+                  <a:schemeClr val="tx1"/>
+                </a:solidFill>
+                <a:effectLst/>
+                <a:latin typeface="Arial" panose="020B0604020202020204" pitchFamily="34" charset="0"/>
+              </a:rPr>
+              <a:t>danceability_%</a:t>
+            </a:r>
+            <a:r>
+              <a:rPr kumimoji="0" lang="en-US" altLang="en-US" sz="2400" b="0" i="0" u="none" strike="noStrike" cap="none" normalizeH="0" baseline="0" dirty="0">
+                <a:ln>
+                  <a:noFill/>
+                </a:ln>
+                <a:solidFill>
+                  <a:schemeClr val="tx1"/>
+                </a:solidFill>
+                <a:effectLst/>
+                <a:latin typeface="Arial" panose="020B0604020202020204" pitchFamily="34" charset="0"/>
+              </a:rPr>
+              <a:t>: </a:t>
+            </a:r>
+            <a:r>
+              <a:rPr kumimoji="0" lang="en-US" altLang="en-US" sz="2400" b="0" i="1" u="none" strike="noStrike" cap="none" normalizeH="0" baseline="0" dirty="0">
+                <a:ln>
+                  <a:noFill/>
+                </a:ln>
+                <a:solidFill>
+                  <a:schemeClr val="tx1"/>
+                </a:solidFill>
+                <a:effectLst/>
+                <a:latin typeface="Arial" panose="020B0604020202020204" pitchFamily="34" charset="0"/>
+              </a:rPr>
+              <a:t>Percentage indicating how suitable the song is for dancing</a:t>
+            </a:r>
+            <a:r>
+              <a:rPr kumimoji="0" lang="en-US" altLang="en-US" sz="2400" b="0" i="0" u="none" strike="noStrike" cap="none" normalizeH="0" baseline="0" dirty="0">
+                <a:ln>
+                  <a:noFill/>
+                </a:ln>
+                <a:solidFill>
+                  <a:schemeClr val="tx1"/>
+                </a:solidFill>
+                <a:effectLst/>
+                <a:latin typeface="Arial" panose="020B0604020202020204" pitchFamily="34" charset="0"/>
+              </a:rPr>
+              <a:t> </a:t>
+            </a:r>
+          </a:p>
+          <a:p>
+            <a:pPr lvl="1"/>
+            <a:r>
+              <a:rPr kumimoji="0" lang="en-US" altLang="en-US" sz="2400" b="1" i="0" u="none" strike="noStrike" cap="none" normalizeH="0" baseline="0" dirty="0">
+                <a:ln>
+                  <a:noFill/>
+                </a:ln>
+                <a:solidFill>
+                  <a:schemeClr val="tx1"/>
+                </a:solidFill>
+                <a:effectLst/>
+                <a:latin typeface="Arial" panose="020B0604020202020204" pitchFamily="34" charset="0"/>
+              </a:rPr>
+              <a:t>valence_%</a:t>
+            </a:r>
+            <a:r>
+              <a:rPr kumimoji="0" lang="en-US" altLang="en-US" sz="2400" b="0" i="0" u="none" strike="noStrike" cap="none" normalizeH="0" baseline="0" dirty="0">
+                <a:ln>
+                  <a:noFill/>
+                </a:ln>
+                <a:solidFill>
+                  <a:schemeClr val="tx1"/>
+                </a:solidFill>
+                <a:effectLst/>
+                <a:latin typeface="Arial" panose="020B0604020202020204" pitchFamily="34" charset="0"/>
+              </a:rPr>
+              <a:t>: </a:t>
+            </a:r>
+            <a:r>
+              <a:rPr kumimoji="0" lang="en-US" altLang="en-US" sz="2400" b="0" i="1" u="none" strike="noStrike" cap="none" normalizeH="0" baseline="0" dirty="0">
+                <a:ln>
+                  <a:noFill/>
+                </a:ln>
+                <a:solidFill>
+                  <a:schemeClr val="tx1"/>
+                </a:solidFill>
+                <a:effectLst/>
+                <a:latin typeface="Arial" panose="020B0604020202020204" pitchFamily="34" charset="0"/>
+              </a:rPr>
+              <a:t>Positivity of the song's musical content</a:t>
+            </a:r>
+            <a:r>
+              <a:rPr kumimoji="0" lang="en-US" altLang="en-US" sz="2400" b="0" i="0" u="none" strike="noStrike" cap="none" normalizeH="0" baseline="0" dirty="0">
+                <a:ln>
+                  <a:noFill/>
+                </a:ln>
+                <a:solidFill>
+                  <a:schemeClr val="tx1"/>
+                </a:solidFill>
+                <a:effectLst/>
+                <a:latin typeface="Arial" panose="020B0604020202020204" pitchFamily="34" charset="0"/>
+              </a:rPr>
+              <a:t> </a:t>
+            </a:r>
+          </a:p>
+          <a:p>
+            <a:pPr lvl="1"/>
+            <a:r>
+              <a:rPr kumimoji="0" lang="en-US" altLang="en-US" sz="2400" b="1" i="0" u="none" strike="noStrike" cap="none" normalizeH="0" baseline="0" dirty="0">
+                <a:ln>
+                  <a:noFill/>
+                </a:ln>
+                <a:solidFill>
+                  <a:schemeClr val="tx1"/>
+                </a:solidFill>
+                <a:effectLst/>
+                <a:latin typeface="Arial" panose="020B0604020202020204" pitchFamily="34" charset="0"/>
+              </a:rPr>
+              <a:t>energy_%</a:t>
+            </a:r>
+            <a:r>
+              <a:rPr kumimoji="0" lang="en-US" altLang="en-US" sz="2400" b="0" i="0" u="none" strike="noStrike" cap="none" normalizeH="0" baseline="0" dirty="0">
+                <a:ln>
+                  <a:noFill/>
+                </a:ln>
+                <a:solidFill>
+                  <a:schemeClr val="tx1"/>
+                </a:solidFill>
+                <a:effectLst/>
+                <a:latin typeface="Arial" panose="020B0604020202020204" pitchFamily="34" charset="0"/>
+              </a:rPr>
+              <a:t>: </a:t>
+            </a:r>
+            <a:r>
+              <a:rPr kumimoji="0" lang="en-US" altLang="en-US" sz="2400" b="0" i="1" u="none" strike="noStrike" cap="none" normalizeH="0" baseline="0" dirty="0">
+                <a:ln>
+                  <a:noFill/>
+                </a:ln>
+                <a:solidFill>
+                  <a:schemeClr val="tx1"/>
+                </a:solidFill>
+                <a:effectLst/>
+                <a:latin typeface="Arial" panose="020B0604020202020204" pitchFamily="34" charset="0"/>
+              </a:rPr>
+              <a:t>Perceived energy level of the song</a:t>
+            </a:r>
+            <a:r>
+              <a:rPr kumimoji="0" lang="en-US" altLang="en-US" sz="2400" b="0" i="0" u="none" strike="noStrike" cap="none" normalizeH="0" baseline="0" dirty="0">
+                <a:ln>
+                  <a:noFill/>
+                </a:ln>
+                <a:solidFill>
+                  <a:schemeClr val="tx1"/>
+                </a:solidFill>
+                <a:effectLst/>
+                <a:latin typeface="Arial" panose="020B0604020202020204" pitchFamily="34" charset="0"/>
+              </a:rPr>
+              <a:t> </a:t>
+            </a:r>
+          </a:p>
+          <a:p>
+            <a:pPr lvl="1"/>
+            <a:r>
+              <a:rPr kumimoji="0" lang="en-US" altLang="en-US" sz="2400" b="1" i="0" u="none" strike="noStrike" cap="none" normalizeH="0" baseline="0" dirty="0" err="1">
+                <a:ln>
+                  <a:noFill/>
+                </a:ln>
+                <a:solidFill>
+                  <a:schemeClr val="tx1"/>
+                </a:solidFill>
+                <a:effectLst/>
+                <a:latin typeface="Arial" panose="020B0604020202020204" pitchFamily="34" charset="0"/>
+              </a:rPr>
+              <a:t>acousticness</a:t>
+            </a:r>
+            <a:r>
+              <a:rPr kumimoji="0" lang="en-US" altLang="en-US" sz="2400" b="1" i="0" u="none" strike="noStrike" cap="none" normalizeH="0" baseline="0" dirty="0">
+                <a:ln>
+                  <a:noFill/>
+                </a:ln>
+                <a:solidFill>
+                  <a:schemeClr val="tx1"/>
+                </a:solidFill>
+                <a:effectLst/>
+                <a:latin typeface="Arial" panose="020B0604020202020204" pitchFamily="34" charset="0"/>
+              </a:rPr>
+              <a:t>_%</a:t>
+            </a:r>
+            <a:r>
+              <a:rPr kumimoji="0" lang="en-US" altLang="en-US" sz="2400" b="0" i="0" u="none" strike="noStrike" cap="none" normalizeH="0" baseline="0" dirty="0">
+                <a:ln>
+                  <a:noFill/>
+                </a:ln>
+                <a:solidFill>
+                  <a:schemeClr val="tx1"/>
+                </a:solidFill>
+                <a:effectLst/>
+                <a:latin typeface="Arial" panose="020B0604020202020204" pitchFamily="34" charset="0"/>
+              </a:rPr>
+              <a:t>: </a:t>
+            </a:r>
+            <a:r>
+              <a:rPr kumimoji="0" lang="en-US" altLang="en-US" sz="2400" b="0" i="1" u="none" strike="noStrike" cap="none" normalizeH="0" baseline="0" dirty="0">
+                <a:ln>
+                  <a:noFill/>
+                </a:ln>
+                <a:solidFill>
+                  <a:schemeClr val="tx1"/>
+                </a:solidFill>
+                <a:effectLst/>
+                <a:latin typeface="Arial" panose="020B0604020202020204" pitchFamily="34" charset="0"/>
+              </a:rPr>
+              <a:t>Amount of acoustic sound in the song</a:t>
+            </a:r>
+            <a:r>
+              <a:rPr kumimoji="0" lang="en-US" altLang="en-US" sz="2400" b="0" i="0" u="none" strike="noStrike" cap="none" normalizeH="0" baseline="0" dirty="0">
+                <a:ln>
+                  <a:noFill/>
+                </a:ln>
+                <a:solidFill>
+                  <a:schemeClr val="tx1"/>
+                </a:solidFill>
+                <a:effectLst/>
+                <a:latin typeface="Arial" panose="020B0604020202020204" pitchFamily="34" charset="0"/>
+              </a:rPr>
+              <a:t> </a:t>
+            </a:r>
+          </a:p>
+          <a:p>
+            <a:pPr lvl="1"/>
+            <a:r>
+              <a:rPr kumimoji="0" lang="en-US" altLang="en-US" sz="2400" b="1" i="0" u="none" strike="noStrike" cap="none" normalizeH="0" baseline="0" dirty="0" err="1">
+                <a:ln>
+                  <a:noFill/>
+                </a:ln>
+                <a:solidFill>
+                  <a:schemeClr val="tx1"/>
+                </a:solidFill>
+                <a:effectLst/>
+                <a:latin typeface="Arial" panose="020B0604020202020204" pitchFamily="34" charset="0"/>
+              </a:rPr>
+              <a:t>instrumentalness</a:t>
+            </a:r>
+            <a:r>
+              <a:rPr kumimoji="0" lang="en-US" altLang="en-US" sz="2400" b="1" i="0" u="none" strike="noStrike" cap="none" normalizeH="0" baseline="0" dirty="0">
+                <a:ln>
+                  <a:noFill/>
+                </a:ln>
+                <a:solidFill>
+                  <a:schemeClr val="tx1"/>
+                </a:solidFill>
+                <a:effectLst/>
+                <a:latin typeface="Arial" panose="020B0604020202020204" pitchFamily="34" charset="0"/>
+              </a:rPr>
+              <a:t>_%</a:t>
+            </a:r>
+            <a:r>
+              <a:rPr kumimoji="0" lang="en-US" altLang="en-US" sz="2400" b="0" i="0" u="none" strike="noStrike" cap="none" normalizeH="0" baseline="0" dirty="0">
+                <a:ln>
+                  <a:noFill/>
+                </a:ln>
+                <a:solidFill>
+                  <a:schemeClr val="tx1"/>
+                </a:solidFill>
+                <a:effectLst/>
+                <a:latin typeface="Arial" panose="020B0604020202020204" pitchFamily="34" charset="0"/>
+              </a:rPr>
+              <a:t>: </a:t>
+            </a:r>
+            <a:r>
+              <a:rPr kumimoji="0" lang="en-US" altLang="en-US" sz="2400" b="0" i="1" u="none" strike="noStrike" cap="none" normalizeH="0" baseline="0" dirty="0">
+                <a:ln>
+                  <a:noFill/>
+                </a:ln>
+                <a:solidFill>
+                  <a:schemeClr val="tx1"/>
+                </a:solidFill>
+                <a:effectLst/>
+                <a:latin typeface="Arial" panose="020B0604020202020204" pitchFamily="34" charset="0"/>
+              </a:rPr>
+              <a:t>Amount of instrumental content in the song</a:t>
+            </a:r>
+            <a:r>
+              <a:rPr kumimoji="0" lang="en-US" altLang="en-US" sz="2400" b="0" i="0" u="none" strike="noStrike" cap="none" normalizeH="0" baseline="0" dirty="0">
+                <a:ln>
+                  <a:noFill/>
+                </a:ln>
+                <a:solidFill>
+                  <a:schemeClr val="tx1"/>
+                </a:solidFill>
+                <a:effectLst/>
+                <a:latin typeface="Arial" panose="020B0604020202020204" pitchFamily="34" charset="0"/>
+              </a:rPr>
+              <a:t> </a:t>
+            </a:r>
+          </a:p>
+          <a:p>
+            <a:pPr lvl="1"/>
+            <a:r>
+              <a:rPr kumimoji="0" lang="en-US" altLang="en-US" sz="2400" b="1" i="0" u="none" strike="noStrike" cap="none" normalizeH="0" baseline="0" dirty="0">
+                <a:ln>
+                  <a:noFill/>
+                </a:ln>
+                <a:solidFill>
+                  <a:schemeClr val="tx1"/>
+                </a:solidFill>
+                <a:effectLst/>
+                <a:latin typeface="Arial" panose="020B0604020202020204" pitchFamily="34" charset="0"/>
+              </a:rPr>
+              <a:t>liveness_%</a:t>
+            </a:r>
+            <a:r>
+              <a:rPr kumimoji="0" lang="en-US" altLang="en-US" sz="2400" b="0" i="0" u="none" strike="noStrike" cap="none" normalizeH="0" baseline="0" dirty="0">
+                <a:ln>
+                  <a:noFill/>
+                </a:ln>
+                <a:solidFill>
+                  <a:schemeClr val="tx1"/>
+                </a:solidFill>
+                <a:effectLst/>
+                <a:latin typeface="Arial" panose="020B0604020202020204" pitchFamily="34" charset="0"/>
+              </a:rPr>
+              <a:t>: </a:t>
+            </a:r>
+            <a:r>
+              <a:rPr kumimoji="0" lang="en-US" altLang="en-US" sz="2400" b="0" i="1" u="none" strike="noStrike" cap="none" normalizeH="0" baseline="0" dirty="0">
+                <a:ln>
+                  <a:noFill/>
+                </a:ln>
+                <a:solidFill>
+                  <a:schemeClr val="tx1"/>
+                </a:solidFill>
+                <a:effectLst/>
+                <a:latin typeface="Arial" panose="020B0604020202020204" pitchFamily="34" charset="0"/>
+              </a:rPr>
+              <a:t>Presence of live performance elements</a:t>
+            </a:r>
+            <a:r>
+              <a:rPr kumimoji="0" lang="en-US" altLang="en-US" sz="2400" b="0" i="0" u="none" strike="noStrike" cap="none" normalizeH="0" baseline="0" dirty="0">
+                <a:ln>
+                  <a:noFill/>
+                </a:ln>
+                <a:solidFill>
+                  <a:schemeClr val="tx1"/>
+                </a:solidFill>
+                <a:effectLst/>
+                <a:latin typeface="Arial" panose="020B0604020202020204" pitchFamily="34" charset="0"/>
+              </a:rPr>
+              <a:t> </a:t>
+            </a:r>
+          </a:p>
+          <a:p>
+            <a:pPr lvl="1"/>
+            <a:r>
+              <a:rPr kumimoji="0" lang="en-US" altLang="en-US" sz="2400" b="1" i="0" u="none" strike="noStrike" cap="none" normalizeH="0" baseline="0" dirty="0" err="1">
+                <a:ln>
+                  <a:noFill/>
+                </a:ln>
+                <a:solidFill>
+                  <a:schemeClr val="tx1"/>
+                </a:solidFill>
+                <a:effectLst/>
+                <a:latin typeface="Arial" panose="020B0604020202020204" pitchFamily="34" charset="0"/>
+              </a:rPr>
+              <a:t>speechiness</a:t>
+            </a:r>
+            <a:r>
+              <a:rPr kumimoji="0" lang="en-US" altLang="en-US" sz="2400" b="1" i="0" u="none" strike="noStrike" cap="none" normalizeH="0" baseline="0" dirty="0">
+                <a:ln>
+                  <a:noFill/>
+                </a:ln>
+                <a:solidFill>
+                  <a:schemeClr val="tx1"/>
+                </a:solidFill>
+                <a:effectLst/>
+                <a:latin typeface="Arial" panose="020B0604020202020204" pitchFamily="34" charset="0"/>
+              </a:rPr>
+              <a:t>_%</a:t>
+            </a:r>
+            <a:r>
+              <a:rPr kumimoji="0" lang="en-US" altLang="en-US" sz="2400" b="0" i="0" u="none" strike="noStrike" cap="none" normalizeH="0" baseline="0" dirty="0">
+                <a:ln>
+                  <a:noFill/>
+                </a:ln>
+                <a:solidFill>
+                  <a:schemeClr val="tx1"/>
+                </a:solidFill>
+                <a:effectLst/>
+                <a:latin typeface="Arial" panose="020B0604020202020204" pitchFamily="34" charset="0"/>
+              </a:rPr>
+              <a:t>: </a:t>
+            </a:r>
+            <a:r>
+              <a:rPr kumimoji="0" lang="en-US" altLang="en-US" sz="2400" b="0" i="1" u="none" strike="noStrike" cap="none" normalizeH="0" baseline="0" dirty="0">
+                <a:ln>
+                  <a:noFill/>
+                </a:ln>
+                <a:solidFill>
+                  <a:schemeClr val="tx1"/>
+                </a:solidFill>
+                <a:effectLst/>
+                <a:latin typeface="Arial" panose="020B0604020202020204" pitchFamily="34" charset="0"/>
+              </a:rPr>
+              <a:t>Amount of spoken words in the song</a:t>
+            </a:r>
+            <a:endParaRPr kumimoji="0" lang="en-US" altLang="en-US" sz="2400" b="0" i="0" u="none" strike="noStrike" cap="none" normalizeH="0" baseline="0" dirty="0">
+              <a:ln>
+                <a:noFill/>
+              </a:ln>
+              <a:solidFill>
+                <a:schemeClr val="tx1"/>
+              </a:solidFill>
+              <a:effectLst/>
+              <a:latin typeface="Arial" panose="020B0604020202020204" pitchFamily="34" charset="0"/>
+            </a:endParaRPr>
+          </a:p>
+          <a:p>
+            <a:pPr lvl="1"/>
+            <a:endParaRPr lang="en-US" dirty="0"/>
+          </a:p>
+          <a:p>
+            <a:r>
+              <a:rPr lang="en-US" dirty="0"/>
+              <a:t>Given a number representing percentage of presence in a given track</a:t>
+            </a:r>
+          </a:p>
+          <a:p>
+            <a:pPr lvl="1"/>
+            <a:r>
+              <a:rPr lang="en-US" dirty="0"/>
+              <a:t>This percentage is also assigned via Spotify</a:t>
+            </a:r>
+          </a:p>
+          <a:p>
+            <a:endParaRPr lang="en-US" dirty="0"/>
+          </a:p>
+        </p:txBody>
+      </p:sp>
+    </p:spTree>
+    <p:extLst>
+      <p:ext uri="{BB962C8B-B14F-4D97-AF65-F5344CB8AC3E}">
+        <p14:creationId xmlns:p14="http://schemas.microsoft.com/office/powerpoint/2010/main" val="3339136056"/>
+      </p:ext>
+    </p:extLst>
+  </p:cSld>
+  <p:clrMapOvr>
+    <a:masterClrMapping/>
+  </p:clrMapOvr>
+</p:sld>
+</file>
+
+<file path=ppt/slides/slide15.xml><?xml version="1.0" encoding="utf-8"?>
+<p:sld xmlns:a="http://schemas.openxmlformats.org/drawingml/2006/main" xmlns:r="http://schemas.openxmlformats.org/officeDocument/2006/relationships" xmlns:p="http://schemas.openxmlformats.org/presentationml/2006/main">
+  <p:cSld>
+    <p:spTree>
+      <p:nvGrpSpPr>
+        <p:cNvPr id="1" name=""/>
+        <p:cNvGrpSpPr/>
+        <p:nvPr/>
+      </p:nvGrpSpPr>
+      <p:grpSpPr>
+        <a:xfrm>
+          <a:off x="0" y="0"/>
+          <a:ext cx="0" cy="0"/>
+          <a:chOff x="0" y="0"/>
+          <a:chExt cx="0" cy="0"/>
+        </a:xfrm>
+      </p:grpSpPr>
       <p:pic>
         <p:nvPicPr>
           <p:cNvPr id="5" name="Content Placeholder 4">
@@ -6101,7 +7329,7 @@
 </p:sld>
 </file>
 
-<file path=ppt/slides/slide11.xml><?xml version="1.0" encoding="utf-8"?>
+<file path=ppt/slides/slide16.xml><?xml version="1.0" encoding="utf-8"?>
 <p:sld xmlns:a="http://schemas.openxmlformats.org/drawingml/2006/main" xmlns:r="http://schemas.openxmlformats.org/officeDocument/2006/relationships" xmlns:p="http://schemas.openxmlformats.org/presentationml/2006/main">
   <p:cSld>
     <p:spTree>
@@ -6222,7 +7450,7 @@
 </p:sld>
 </file>
 
-<file path=ppt/slides/slide12.xml><?xml version="1.0" encoding="utf-8"?>
+<file path=ppt/slides/slide17.xml><?xml version="1.0" encoding="utf-8"?>
 <p:sld xmlns:a="http://schemas.openxmlformats.org/drawingml/2006/main" xmlns:r="http://schemas.openxmlformats.org/officeDocument/2006/relationships" xmlns:p="http://schemas.openxmlformats.org/presentationml/2006/main">
   <p:cSld>
     <p:spTree>
@@ -6572,7 +7800,13 @@
   <p:cSld>
     <p:spTree>
       <p:nvGrpSpPr>
-        <p:cNvPr id="1" name=""/>
+        <p:cNvPr id="1" name="">
+          <a:extLst>
+            <a:ext uri="{FF2B5EF4-FFF2-40B4-BE49-F238E27FC236}">
+              <a16:creationId xmlns:a16="http://schemas.microsoft.com/office/drawing/2014/main" id="{A6456A4E-F149-8B7A-7145-6E298E6C72D2}"/>
+            </a:ext>
+          </a:extLst>
+        </p:cNvPr>
         <p:cNvGrpSpPr/>
         <p:nvPr/>
       </p:nvGrpSpPr>
@@ -6589,7 +7823,7 @@
           <p:cNvPr id="2" name="Title 1">
             <a:extLst>
               <a:ext uri="{FF2B5EF4-FFF2-40B4-BE49-F238E27FC236}">
-                <a16:creationId xmlns:a16="http://schemas.microsoft.com/office/drawing/2014/main" id="{58F6C283-FEB8-7D5D-9068-A5C216F8AD45}"/>
+                <a16:creationId xmlns:a16="http://schemas.microsoft.com/office/drawing/2014/main" id="{B61C3A81-D136-54BE-4904-3A5F97764E75}"/>
               </a:ext>
             </a:extLst>
           </p:cNvPr>
@@ -6612,35 +7846,92 @@
           </a:p>
         </p:txBody>
       </p:sp>
-      <p:sp>
-        <p:nvSpPr>
-          <p:cNvPr id="3" name="Content Placeholder 2">
+      <p:pic>
+        <p:nvPicPr>
+          <p:cNvPr id="5" name="Content Placeholder 4">
             <a:extLst>
               <a:ext uri="{FF2B5EF4-FFF2-40B4-BE49-F238E27FC236}">
-                <a16:creationId xmlns:a16="http://schemas.microsoft.com/office/drawing/2014/main" id="{00A115CD-0CD7-93EA-0029-A24E341E3D8B}"/>
+                <a16:creationId xmlns:a16="http://schemas.microsoft.com/office/drawing/2014/main" id="{55C9C96B-C612-0029-B270-DBF2ED7A2430}"/>
               </a:ext>
             </a:extLst>
           </p:cNvPr>
-          <p:cNvSpPr>
-            <a:spLocks noGrp="1"/>
-          </p:cNvSpPr>
-          <p:nvPr>
-            <p:ph idx="1"/>
-          </p:nvPr>
-        </p:nvSpPr>
-        <p:spPr/>
+          <p:cNvPicPr>
+            <a:picLocks noGrp="1" noChangeAspect="1"/>
+          </p:cNvPicPr>
+          <p:nvPr>
+            <p:ph sz="half" idx="1"/>
+          </p:nvPr>
+        </p:nvPicPr>
+        <p:blipFill>
+          <a:blip r:embed="rId2">
+            <a:extLst>
+              <a:ext uri="{28A0092B-C50C-407E-A947-70E740481C1C}">
+                <a14:useLocalDpi xmlns:a14="http://schemas.microsoft.com/office/drawing/2010/main" val="0"/>
+              </a:ext>
+            </a:extLst>
+          </a:blip>
+          <a:stretch>
+            <a:fillRect/>
+          </a:stretch>
+        </p:blipFill>
+        <p:spPr>
+          <a:xfrm>
+            <a:off x="345771" y="1930400"/>
+            <a:ext cx="4951304" cy="3713478"/>
+          </a:xfrm>
+        </p:spPr>
+      </p:pic>
+      <p:sp>
+        <p:nvSpPr>
+          <p:cNvPr id="7" name="Content Placeholder 6">
+            <a:extLst>
+              <a:ext uri="{FF2B5EF4-FFF2-40B4-BE49-F238E27FC236}">
+                <a16:creationId xmlns:a16="http://schemas.microsoft.com/office/drawing/2014/main" id="{0440479D-D52D-597D-F48D-F4B442920112}"/>
+              </a:ext>
+            </a:extLst>
+          </p:cNvPr>
+          <p:cNvSpPr>
+            <a:spLocks noGrp="1"/>
+          </p:cNvSpPr>
+          <p:nvPr>
+            <p:ph sz="half" idx="2"/>
+          </p:nvPr>
+        </p:nvSpPr>
+        <p:spPr>
+          <a:xfrm>
+            <a:off x="5408198" y="2325745"/>
+            <a:ext cx="4184034" cy="3880773"/>
+          </a:xfrm>
+        </p:spPr>
         <p:txBody>
           <a:bodyPr/>
           <a:lstStyle/>
           <a:p>
-            <a:endParaRPr lang="en-US"/>
+            <a:r>
+              <a:rPr lang="en-US" dirty="0"/>
+              <a:t>Songs in the Sample</a:t>
+            </a:r>
+          </a:p>
+          <a:p>
+            <a:pPr lvl="1"/>
+            <a:r>
+              <a:rPr lang="en-US" dirty="0"/>
+              <a:t>952 songs</a:t>
+            </a:r>
+          </a:p>
+          <a:p>
+            <a:pPr lvl="1"/>
+            <a:r>
+              <a:rPr lang="en-US" dirty="0"/>
+              <a:t>802 unique artists</a:t>
+            </a:r>
           </a:p>
         </p:txBody>
       </p:sp>
     </p:spTree>
     <p:extLst>
       <p:ext uri="{BB962C8B-B14F-4D97-AF65-F5344CB8AC3E}">
-        <p14:creationId xmlns:p14="http://schemas.microsoft.com/office/powerpoint/2010/main" val="2613100583"/>
+        <p14:creationId xmlns:p14="http://schemas.microsoft.com/office/powerpoint/2010/main" val="2767989472"/>
       </p:ext>
     </p:extLst>
   </p:cSld>
@@ -6672,7 +7963,7 @@
           <p:cNvPr id="2" name="Title 1">
             <a:extLst>
               <a:ext uri="{FF2B5EF4-FFF2-40B4-BE49-F238E27FC236}">
-                <a16:creationId xmlns:a16="http://schemas.microsoft.com/office/drawing/2014/main" id="{1E3020E4-13AD-D731-20D0-237E1C1B2DF1}"/>
+                <a16:creationId xmlns:a16="http://schemas.microsoft.com/office/drawing/2014/main" id="{3708A23A-0F6D-EC8F-AB62-CFB7D4384151}"/>
               </a:ext>
             </a:extLst>
           </p:cNvPr>
@@ -6690,40 +7981,103 @@
           <a:p>
             <a:r>
               <a:rPr lang="en-US" dirty="0"/>
-              <a:t>The Effect of Charts and Playlists</a:t>
-            </a:r>
-          </a:p>
-        </p:txBody>
-      </p:sp>
-      <p:sp>
-        <p:nvSpPr>
-          <p:cNvPr id="3" name="Content Placeholder 2">
+              <a:t>Artist Popularity</a:t>
+            </a:r>
+          </a:p>
+        </p:txBody>
+      </p:sp>
+      <p:pic>
+        <p:nvPicPr>
+          <p:cNvPr id="5" name="Content Placeholder 4">
             <a:extLst>
               <a:ext uri="{FF2B5EF4-FFF2-40B4-BE49-F238E27FC236}">
-                <a16:creationId xmlns:a16="http://schemas.microsoft.com/office/drawing/2014/main" id="{34F528BB-A567-F207-F019-3F6A56503126}"/>
+                <a16:creationId xmlns:a16="http://schemas.microsoft.com/office/drawing/2014/main" id="{DF07D2E1-0C5E-E36D-D65E-8545547D6A26}"/>
               </a:ext>
             </a:extLst>
           </p:cNvPr>
-          <p:cNvSpPr>
-            <a:spLocks noGrp="1"/>
-          </p:cNvSpPr>
-          <p:nvPr>
-            <p:ph idx="1"/>
-          </p:nvPr>
-        </p:nvSpPr>
-        <p:spPr/>
+          <p:cNvPicPr>
+            <a:picLocks noGrp="1" noChangeAspect="1"/>
+          </p:cNvPicPr>
+          <p:nvPr>
+            <p:ph sz="half" idx="1"/>
+          </p:nvPr>
+        </p:nvPicPr>
+        <p:blipFill>
+          <a:blip r:embed="rId2">
+            <a:extLst>
+              <a:ext uri="{28A0092B-C50C-407E-A947-70E740481C1C}">
+                <a14:useLocalDpi xmlns:a14="http://schemas.microsoft.com/office/drawing/2010/main" val="0"/>
+              </a:ext>
+            </a:extLst>
+          </a:blip>
+          <a:stretch>
+            <a:fillRect/>
+          </a:stretch>
+        </p:blipFill>
+        <p:spPr>
+          <a:xfrm>
+            <a:off x="459215" y="1831262"/>
+            <a:ext cx="5091636" cy="3818726"/>
+          </a:xfrm>
+        </p:spPr>
+      </p:pic>
+      <p:sp>
+        <p:nvSpPr>
+          <p:cNvPr id="6" name="Content Placeholder 5">
+            <a:extLst>
+              <a:ext uri="{FF2B5EF4-FFF2-40B4-BE49-F238E27FC236}">
+                <a16:creationId xmlns:a16="http://schemas.microsoft.com/office/drawing/2014/main" id="{453A14E1-DCEF-779D-47FD-81A27CA19EA3}"/>
+              </a:ext>
+            </a:extLst>
+          </p:cNvPr>
+          <p:cNvSpPr>
+            <a:spLocks noGrp="1"/>
+          </p:cNvSpPr>
+          <p:nvPr>
+            <p:ph sz="half" idx="2"/>
+          </p:nvPr>
+        </p:nvSpPr>
+        <p:spPr>
+          <a:xfrm>
+            <a:off x="5550850" y="2486873"/>
+            <a:ext cx="4184034" cy="3880773"/>
+          </a:xfrm>
+        </p:spPr>
         <p:txBody>
           <a:bodyPr/>
           <a:lstStyle/>
           <a:p>
-            <a:endParaRPr lang="en-US"/>
+            <a:r>
+              <a:rPr lang="en-US" dirty="0"/>
+              <a:t>Songs with over 1 billion streams</a:t>
+            </a:r>
+          </a:p>
+          <a:p>
+            <a:pPr lvl="1"/>
+            <a:r>
+              <a:rPr lang="en-US" dirty="0"/>
+              <a:t>152 songs</a:t>
+            </a:r>
+          </a:p>
+          <a:p>
+            <a:pPr lvl="1"/>
+            <a:r>
+              <a:rPr lang="en-US" dirty="0"/>
+              <a:t>137 unique artists </a:t>
+            </a:r>
+          </a:p>
+          <a:p>
+            <a:pPr marL="457200" lvl="1" indent="0">
+              <a:buNone/>
+            </a:pPr>
+            <a:endParaRPr lang="en-US" dirty="0"/>
           </a:p>
         </p:txBody>
       </p:sp>
     </p:spTree>
     <p:extLst>
       <p:ext uri="{BB962C8B-B14F-4D97-AF65-F5344CB8AC3E}">
-        <p14:creationId xmlns:p14="http://schemas.microsoft.com/office/powerpoint/2010/main" val="2072924615"/>
+        <p14:creationId xmlns:p14="http://schemas.microsoft.com/office/powerpoint/2010/main" val="3016040021"/>
       </p:ext>
     </p:extLst>
   </p:cSld>
@@ -6755,7 +8109,7 @@
           <p:cNvPr id="2" name="Title 1">
             <a:extLst>
               <a:ext uri="{FF2B5EF4-FFF2-40B4-BE49-F238E27FC236}">
-                <a16:creationId xmlns:a16="http://schemas.microsoft.com/office/drawing/2014/main" id="{C3D942C1-F821-163F-7497-06F9A11642B9}"/>
+                <a16:creationId xmlns:a16="http://schemas.microsoft.com/office/drawing/2014/main" id="{58F6C283-FEB8-7D5D-9068-A5C216F8AD45}"/>
               </a:ext>
             </a:extLst>
           </p:cNvPr>
@@ -6773,78 +8127,122 @@
           <a:p>
             <a:r>
               <a:rPr lang="en-US" dirty="0"/>
-              <a:t>Analysis of Musical Characteristics</a:t>
-            </a:r>
-          </a:p>
-        </p:txBody>
-      </p:sp>
-      <p:sp>
-        <p:nvSpPr>
-          <p:cNvPr id="3" name="Content Placeholder 2">
+              <a:t>Artist Popularity</a:t>
+            </a:r>
+          </a:p>
+        </p:txBody>
+      </p:sp>
+      <p:pic>
+        <p:nvPicPr>
+          <p:cNvPr id="11" name="Content Placeholder 10">
             <a:extLst>
               <a:ext uri="{FF2B5EF4-FFF2-40B4-BE49-F238E27FC236}">
-                <a16:creationId xmlns:a16="http://schemas.microsoft.com/office/drawing/2014/main" id="{AD1D5CB7-F90B-DA38-79C8-2A61393B40B9}"/>
+                <a16:creationId xmlns:a16="http://schemas.microsoft.com/office/drawing/2014/main" id="{5B0A9B2C-AFE0-8A18-964E-32D2B5504E81}"/>
               </a:ext>
             </a:extLst>
           </p:cNvPr>
-          <p:cNvSpPr>
-            <a:spLocks noGrp="1"/>
-          </p:cNvSpPr>
-          <p:nvPr>
-            <p:ph idx="1"/>
-          </p:nvPr>
-        </p:nvSpPr>
-        <p:spPr/>
+          <p:cNvPicPr>
+            <a:picLocks noGrp="1" noChangeAspect="1"/>
+          </p:cNvPicPr>
+          <p:nvPr>
+            <p:ph sz="half" idx="1"/>
+          </p:nvPr>
+        </p:nvPicPr>
+        <p:blipFill>
+          <a:blip r:embed="rId2">
+            <a:extLst>
+              <a:ext uri="{28A0092B-C50C-407E-A947-70E740481C1C}">
+                <a14:useLocalDpi xmlns:a14="http://schemas.microsoft.com/office/drawing/2010/main" val="0"/>
+              </a:ext>
+            </a:extLst>
+          </a:blip>
+          <a:stretch>
+            <a:fillRect/>
+          </a:stretch>
+        </p:blipFill>
+        <p:spPr>
+          <a:xfrm>
+            <a:off x="308597" y="1814164"/>
+            <a:ext cx="5157661" cy="3868245"/>
+          </a:xfrm>
+        </p:spPr>
+      </p:pic>
+      <p:sp>
+        <p:nvSpPr>
+          <p:cNvPr id="15" name="Content Placeholder 14">
+            <a:extLst>
+              <a:ext uri="{FF2B5EF4-FFF2-40B4-BE49-F238E27FC236}">
+                <a16:creationId xmlns:a16="http://schemas.microsoft.com/office/drawing/2014/main" id="{03B4DEB2-CD3D-5670-1DF5-E89517D0F88F}"/>
+              </a:ext>
+            </a:extLst>
+          </p:cNvPr>
+          <p:cNvSpPr>
+            <a:spLocks noGrp="1"/>
+          </p:cNvSpPr>
+          <p:nvPr>
+            <p:ph sz="half" idx="2"/>
+          </p:nvPr>
+        </p:nvSpPr>
+        <p:spPr>
+          <a:xfrm>
+            <a:off x="5375972" y="2015574"/>
+            <a:ext cx="4184034" cy="3880773"/>
+          </a:xfrm>
+        </p:spPr>
         <p:txBody>
           <a:bodyPr/>
           <a:lstStyle/>
           <a:p>
             <a:r>
               <a:rPr lang="en-US" dirty="0"/>
-              <a:t>Comparing the Top 20 Most Streamed Artists vs. the Entire Dataset</a:t>
+              <a:t>Songs with over 2 billion streams</a:t>
             </a:r>
           </a:p>
           <a:p>
             <a:pPr lvl="1"/>
             <a:r>
               <a:rPr lang="en-US" dirty="0"/>
-              <a:t>Top Artists account for approximately 27% of included tracks, but received over 36% of streams</a:t>
-            </a:r>
+              <a:t>31 songs</a:t>
+            </a:r>
+          </a:p>
+          <a:p>
+            <a:pPr lvl="1"/>
+            <a:r>
+              <a:rPr lang="en-US" dirty="0"/>
+              <a:t>33 unique artists</a:t>
+            </a:r>
+          </a:p>
+          <a:p>
+            <a:endParaRPr lang="en-US" dirty="0"/>
+          </a:p>
+          <a:p>
+            <a:r>
+              <a:rPr lang="en-US" dirty="0"/>
+              <a:t>Most streamed song:</a:t>
+            </a:r>
+          </a:p>
+          <a:p>
+            <a:pPr lvl="1"/>
+            <a:r>
+              <a:rPr lang="en-US" dirty="0"/>
+              <a:t>Blinding Lights by The </a:t>
+            </a:r>
+            <a:r>
+              <a:rPr lang="en-US" dirty="0" err="1"/>
+              <a:t>Weeknd</a:t>
+            </a:r>
+            <a:endParaRPr lang="en-US" dirty="0"/>
           </a:p>
           <a:p>
             <a:pPr lvl="1"/>
             <a:endParaRPr lang="en-US" dirty="0"/>
-          </a:p>
-          <a:p>
-            <a:pPr lvl="1"/>
-            <a:r>
-              <a:rPr lang="en-US" dirty="0"/>
-              <a:t>Do Top Artists mimic the population, or forge their own path?</a:t>
-            </a:r>
-          </a:p>
-          <a:p>
-            <a:pPr lvl="1"/>
-            <a:endParaRPr lang="en-US" dirty="0"/>
-          </a:p>
-          <a:p>
-            <a:r>
-              <a:rPr lang="en-US" dirty="0"/>
-              <a:t>Considering Averages</a:t>
-            </a:r>
-          </a:p>
-          <a:p>
-            <a:pPr lvl="1"/>
-            <a:r>
-              <a:rPr lang="en-US" dirty="0"/>
-              <a:t>Due to the nature of songs as discrete pieces of content, analysis focuses on median and mode averages vs. mean calculations</a:t>
-            </a:r>
           </a:p>
         </p:txBody>
       </p:sp>
     </p:spTree>
     <p:extLst>
       <p:ext uri="{BB962C8B-B14F-4D97-AF65-F5344CB8AC3E}">
-        <p14:creationId xmlns:p14="http://schemas.microsoft.com/office/powerpoint/2010/main" val="855427616"/>
+        <p14:creationId xmlns:p14="http://schemas.microsoft.com/office/powerpoint/2010/main" val="2613100583"/>
       </p:ext>
     </p:extLst>
   </p:cSld>
@@ -6873,10 +8271,10 @@
       </p:grpSpPr>
       <p:sp>
         <p:nvSpPr>
-          <p:cNvPr id="2" name="Title 1">
+          <p:cNvPr id="4" name="Title 3">
             <a:extLst>
               <a:ext uri="{FF2B5EF4-FFF2-40B4-BE49-F238E27FC236}">
-                <a16:creationId xmlns:a16="http://schemas.microsoft.com/office/drawing/2014/main" id="{1B24E665-5B89-EB78-C0E2-7832422881BA}"/>
+                <a16:creationId xmlns:a16="http://schemas.microsoft.com/office/drawing/2014/main" id="{64B241C1-2226-457D-A9FA-1063C18817E7}"/>
               </a:ext>
             </a:extLst>
           </p:cNvPr>
@@ -6894,117 +8292,24 @@
           <a:p>
             <a:r>
               <a:rPr lang="en-US" dirty="0"/>
-              <a:t>Song Speeds (BPM – Beats Per Minute)</a:t>
-            </a:r>
-          </a:p>
-        </p:txBody>
-      </p:sp>
-      <p:sp>
-        <p:nvSpPr>
-          <p:cNvPr id="6" name="TextBox 5">
+              <a:t>Distribution of Streams by Year</a:t>
+            </a:r>
+            <a:br>
+              <a:rPr lang="en-US" dirty="0"/>
+            </a:br>
+            <a:r>
+              <a:rPr lang="en-US" dirty="0"/>
+              <a:t>Total Sample</a:t>
+            </a:r>
+          </a:p>
+        </p:txBody>
+      </p:sp>
+      <p:pic>
+        <p:nvPicPr>
+          <p:cNvPr id="10" name="Content Placeholder 9">
             <a:extLst>
               <a:ext uri="{FF2B5EF4-FFF2-40B4-BE49-F238E27FC236}">
-                <a16:creationId xmlns:a16="http://schemas.microsoft.com/office/drawing/2014/main" id="{642D8BB6-B6BA-F68E-72A4-85A48931554D}"/>
-              </a:ext>
-            </a:extLst>
-          </p:cNvPr>
-          <p:cNvSpPr txBox="1"/>
-          <p:nvPr/>
-        </p:nvSpPr>
-        <p:spPr>
-          <a:xfrm>
-            <a:off x="7956331" y="1690688"/>
-            <a:ext cx="4056994" cy="4524315"/>
-          </a:xfrm>
-          <a:prstGeom prst="rect">
-            <a:avLst/>
-          </a:prstGeom>
-          <a:noFill/>
-        </p:spPr>
-        <p:txBody>
-          <a:bodyPr wrap="square" rtlCol="0">
-            <a:spAutoFit/>
-          </a:bodyPr>
-          <a:lstStyle/>
-          <a:p>
-            <a:pPr marL="285750" indent="-285750">
-              <a:buFont typeface="Arial" panose="020B0604020202020204" pitchFamily="34" charset="0"/>
-              <a:buChar char="•"/>
-            </a:pPr>
-            <a:r>
-              <a:rPr lang="en-US" dirty="0"/>
-              <a:t>The Top 20 Artist sample is very similar in structure to the data population.</a:t>
-            </a:r>
-          </a:p>
-          <a:p>
-            <a:pPr marL="285750" indent="-285750">
-              <a:buFont typeface="Arial" panose="020B0604020202020204" pitchFamily="34" charset="0"/>
-              <a:buChar char="•"/>
-            </a:pPr>
-            <a:endParaRPr lang="en-US" dirty="0"/>
-          </a:p>
-          <a:p>
-            <a:pPr marL="285750" indent="-285750">
-              <a:buFont typeface="Arial" panose="020B0604020202020204" pitchFamily="34" charset="0"/>
-              <a:buChar char="•"/>
-            </a:pPr>
-            <a:r>
-              <a:rPr lang="en-US" dirty="0"/>
-              <a:t>The median BPM for the sample (120bpm) is extremely close to the median BPM of the population (121bpm).</a:t>
-            </a:r>
-          </a:p>
-          <a:p>
-            <a:pPr marL="285750" indent="-285750">
-              <a:buFont typeface="Arial" panose="020B0604020202020204" pitchFamily="34" charset="0"/>
-              <a:buChar char="•"/>
-            </a:pPr>
-            <a:endParaRPr lang="en-US" dirty="0"/>
-          </a:p>
-          <a:p>
-            <a:pPr marL="285750" indent="-285750">
-              <a:buFont typeface="Arial" panose="020B0604020202020204" pitchFamily="34" charset="0"/>
-              <a:buChar char="•"/>
-            </a:pPr>
-            <a:r>
-              <a:rPr lang="en-US" dirty="0"/>
-              <a:t>The mode for Top Artists is considerably lower</a:t>
-            </a:r>
-          </a:p>
-          <a:p>
-            <a:pPr marL="742950" lvl="1" indent="-285750">
-              <a:buFont typeface="Arial" panose="020B0604020202020204" pitchFamily="34" charset="0"/>
-              <a:buChar char="•"/>
-            </a:pPr>
-            <a:r>
-              <a:rPr lang="en-US" dirty="0"/>
-              <a:t>Top Artists Mode: 90bpm, 7 songs (2.7% of songs in sample)</a:t>
-            </a:r>
-          </a:p>
-          <a:p>
-            <a:pPr marL="742950" lvl="1" indent="-285750">
-              <a:buFont typeface="Arial" panose="020B0604020202020204" pitchFamily="34" charset="0"/>
-              <a:buChar char="•"/>
-            </a:pPr>
-            <a:endParaRPr lang="en-US" dirty="0"/>
-          </a:p>
-          <a:p>
-            <a:pPr marL="742950" lvl="1" indent="-285750">
-              <a:buFont typeface="Arial" panose="020B0604020202020204" pitchFamily="34" charset="0"/>
-              <a:buChar char="•"/>
-            </a:pPr>
-            <a:r>
-              <a:rPr lang="en-US" dirty="0"/>
-              <a:t>All Songs: 120bpm, 34 songs (3.6% of songs in population)</a:t>
-            </a:r>
-          </a:p>
-        </p:txBody>
-      </p:sp>
-      <p:pic>
-        <p:nvPicPr>
-          <p:cNvPr id="8" name="Content Placeholder 7">
-            <a:extLst>
-              <a:ext uri="{FF2B5EF4-FFF2-40B4-BE49-F238E27FC236}">
-                <a16:creationId xmlns:a16="http://schemas.microsoft.com/office/drawing/2014/main" id="{04D86521-6FBA-DB49-BD3C-CAC4A64E1817}"/>
+                <a16:creationId xmlns:a16="http://schemas.microsoft.com/office/drawing/2014/main" id="{1A009D60-BD8D-17DB-6799-D03C8E95742D}"/>
               </a:ext>
             </a:extLst>
           </p:cNvPr>
@@ -7012,7 +8317,7 @@
             <a:picLocks noGrp="1" noChangeAspect="1"/>
           </p:cNvPicPr>
           <p:nvPr>
-            <p:ph idx="1"/>
+            <p:ph sz="half" idx="1"/>
           </p:nvPr>
         </p:nvPicPr>
         <p:blipFill>
@@ -7029,58 +8334,50 @@
         </p:blipFill>
         <p:spPr>
           <a:xfrm>
-            <a:off x="677334" y="1331467"/>
-            <a:ext cx="6555910" cy="4916933"/>
+            <a:off x="442976" y="2356493"/>
+            <a:ext cx="4417949" cy="3313461"/>
           </a:xfrm>
         </p:spPr>
       </p:pic>
-      <p:sp>
-        <p:nvSpPr>
-          <p:cNvPr id="9" name="TextBox 8">
+      <p:pic>
+        <p:nvPicPr>
+          <p:cNvPr id="12" name="Content Placeholder 11">
             <a:extLst>
               <a:ext uri="{FF2B5EF4-FFF2-40B4-BE49-F238E27FC236}">
-                <a16:creationId xmlns:a16="http://schemas.microsoft.com/office/drawing/2014/main" id="{1B766D9F-F1B3-8EE3-B481-5F93AE61601E}"/>
+                <a16:creationId xmlns:a16="http://schemas.microsoft.com/office/drawing/2014/main" id="{8A0461F6-65B6-1EFB-FDB9-951F84715E9C}"/>
               </a:ext>
             </a:extLst>
           </p:cNvPr>
-          <p:cNvSpPr txBox="1"/>
-          <p:nvPr/>
-        </p:nvSpPr>
+          <p:cNvPicPr>
+            <a:picLocks noGrp="1" noChangeAspect="1"/>
+          </p:cNvPicPr>
+          <p:nvPr>
+            <p:ph sz="half" idx="2"/>
+          </p:nvPr>
+        </p:nvPicPr>
+        <p:blipFill>
+          <a:blip r:embed="rId3">
+            <a:extLst>
+              <a:ext uri="{28A0092B-C50C-407E-A947-70E740481C1C}">
+                <a14:useLocalDpi xmlns:a14="http://schemas.microsoft.com/office/drawing/2010/main" val="0"/>
+              </a:ext>
+            </a:extLst>
+          </a:blip>
+          <a:stretch>
+            <a:fillRect/>
+          </a:stretch>
+        </p:blipFill>
         <p:spPr>
           <a:xfrm>
-            <a:off x="1075058" y="6248400"/>
-            <a:ext cx="7178565" cy="276999"/>
+            <a:off x="5016560" y="2477339"/>
+            <a:ext cx="4257615" cy="3193211"/>
           </a:xfrm>
-          <a:prstGeom prst="rect">
-            <a:avLst/>
-          </a:prstGeom>
-          <a:noFill/>
         </p:spPr>
-        <p:txBody>
-          <a:bodyPr wrap="square" rtlCol="0">
-            <a:spAutoFit/>
-          </a:bodyPr>
-          <a:lstStyle/>
-          <a:p>
-            <a:r>
-              <a:rPr lang="en-US" sz="1200" b="0" i="0" dirty="0">
-                <a:effectLst/>
-                <a:ea typeface="Calibri" panose="020F0502020204030204" pitchFamily="34" charset="0"/>
-                <a:cs typeface="Calibri" panose="020F0502020204030204" pitchFamily="34" charset="0"/>
-              </a:rPr>
-              <a:t>Standard Deviation of tempos: 37.462117528776375. p-value=3.927199818891401e-06)</a:t>
-            </a:r>
-            <a:endParaRPr lang="en-US" sz="1200" dirty="0">
-              <a:ea typeface="Calibri" panose="020F0502020204030204" pitchFamily="34" charset="0"/>
-              <a:cs typeface="Calibri" panose="020F0502020204030204" pitchFamily="34" charset="0"/>
-            </a:endParaRPr>
-          </a:p>
-        </p:txBody>
-      </p:sp>
+      </p:pic>
     </p:spTree>
     <p:extLst>
       <p:ext uri="{BB962C8B-B14F-4D97-AF65-F5344CB8AC3E}">
-        <p14:creationId xmlns:p14="http://schemas.microsoft.com/office/powerpoint/2010/main" val="1136602678"/>
+        <p14:creationId xmlns:p14="http://schemas.microsoft.com/office/powerpoint/2010/main" val="3450215092"/>
       </p:ext>
     </p:extLst>
   </p:cSld>
@@ -7112,7 +8409,7 @@
           <p:cNvPr id="2" name="Title 1">
             <a:extLst>
               <a:ext uri="{FF2B5EF4-FFF2-40B4-BE49-F238E27FC236}">
-                <a16:creationId xmlns:a16="http://schemas.microsoft.com/office/drawing/2014/main" id="{EAEE6358-0693-987A-8D91-0A483DB12C51}"/>
+                <a16:creationId xmlns:a16="http://schemas.microsoft.com/office/drawing/2014/main" id="{3E1B9736-7512-5349-9B14-884B0F10BE08}"/>
               </a:ext>
             </a:extLst>
           </p:cNvPr>
@@ -7130,111 +8427,92 @@
           <a:p>
             <a:r>
               <a:rPr lang="en-US" dirty="0"/>
-              <a:t>Song Modality – Major vs. Minor</a:t>
-            </a:r>
-          </a:p>
-        </p:txBody>
-      </p:sp>
-      <p:sp>
-        <p:nvSpPr>
-          <p:cNvPr id="3" name="Content Placeholder 2">
+              <a:t>Distribution of Streams by Year</a:t>
+            </a:r>
+            <a:br>
+              <a:rPr lang="en-US" dirty="0"/>
+            </a:br>
+            <a:r>
+              <a:rPr lang="en-US" dirty="0"/>
+              <a:t>Streams over 1 Billion</a:t>
+            </a:r>
+          </a:p>
+        </p:txBody>
+      </p:sp>
+      <p:pic>
+        <p:nvPicPr>
+          <p:cNvPr id="6" name="Content Placeholder 5">
             <a:extLst>
               <a:ext uri="{FF2B5EF4-FFF2-40B4-BE49-F238E27FC236}">
-                <a16:creationId xmlns:a16="http://schemas.microsoft.com/office/drawing/2014/main" id="{44D48737-E3BB-F424-6E9D-86B47B73F6D4}"/>
+                <a16:creationId xmlns:a16="http://schemas.microsoft.com/office/drawing/2014/main" id="{D14AECA5-2F00-7B99-CC1E-903A48B2E56E}"/>
               </a:ext>
             </a:extLst>
           </p:cNvPr>
-          <p:cNvSpPr>
-            <a:spLocks noGrp="1"/>
-          </p:cNvSpPr>
-          <p:nvPr>
-            <p:ph idx="1"/>
-          </p:nvPr>
-        </p:nvSpPr>
-        <p:spPr/>
-        <p:txBody>
-          <a:bodyPr>
-            <a:normAutofit lnSpcReduction="10000"/>
-          </a:bodyPr>
-          <a:lstStyle/>
-          <a:p>
-            <a:r>
-              <a:rPr lang="en-US" dirty="0"/>
-              <a:t>“Major” Associations:</a:t>
-            </a:r>
-          </a:p>
-          <a:p>
-            <a:pPr lvl="1"/>
-            <a:r>
-              <a:rPr lang="en-US" dirty="0"/>
-              <a:t>Upbeat</a:t>
-            </a:r>
-          </a:p>
-          <a:p>
-            <a:pPr lvl="1"/>
-            <a:r>
-              <a:rPr lang="en-US" dirty="0"/>
-              <a:t>Positive</a:t>
-            </a:r>
-          </a:p>
-          <a:p>
-            <a:pPr lvl="1"/>
-            <a:r>
-              <a:rPr lang="en-US" dirty="0"/>
-              <a:t>Happy</a:t>
-            </a:r>
-          </a:p>
-          <a:p>
-            <a:pPr lvl="1"/>
-            <a:r>
-              <a:rPr lang="en-US" dirty="0"/>
-              <a:t>Bright</a:t>
-            </a:r>
-          </a:p>
-          <a:p>
-            <a:pPr lvl="1"/>
-            <a:endParaRPr lang="en-US" dirty="0"/>
-          </a:p>
-          <a:p>
-            <a:r>
-              <a:rPr lang="en-US" dirty="0"/>
-              <a:t>“Minor” Associations:</a:t>
-            </a:r>
-          </a:p>
-          <a:p>
-            <a:pPr lvl="1"/>
-            <a:r>
-              <a:rPr lang="en-US" dirty="0"/>
-              <a:t>Slower</a:t>
-            </a:r>
-          </a:p>
-          <a:p>
-            <a:pPr lvl="1"/>
-            <a:r>
-              <a:rPr lang="en-US" dirty="0"/>
-              <a:t>Sad</a:t>
-            </a:r>
-          </a:p>
-          <a:p>
-            <a:pPr lvl="1"/>
-            <a:r>
-              <a:rPr lang="en-US" dirty="0"/>
-              <a:t>Dark</a:t>
-            </a:r>
-          </a:p>
-          <a:p>
-            <a:pPr lvl="1"/>
-            <a:r>
-              <a:rPr lang="en-US" dirty="0"/>
-              <a:t>Mysterious</a:t>
-            </a:r>
-          </a:p>
-        </p:txBody>
-      </p:sp>
+          <p:cNvPicPr>
+            <a:picLocks noGrp="1" noChangeAspect="1"/>
+          </p:cNvPicPr>
+          <p:nvPr>
+            <p:ph sz="half" idx="1"/>
+          </p:nvPr>
+        </p:nvPicPr>
+        <p:blipFill>
+          <a:blip r:embed="rId2">
+            <a:extLst>
+              <a:ext uri="{28A0092B-C50C-407E-A947-70E740481C1C}">
+                <a14:useLocalDpi xmlns:a14="http://schemas.microsoft.com/office/drawing/2010/main" val="0"/>
+              </a:ext>
+            </a:extLst>
+          </a:blip>
+          <a:stretch>
+            <a:fillRect/>
+          </a:stretch>
+        </p:blipFill>
+        <p:spPr>
+          <a:xfrm>
+            <a:off x="318228" y="2262931"/>
+            <a:ext cx="4542698" cy="3407023"/>
+          </a:xfrm>
+        </p:spPr>
+      </p:pic>
+      <p:pic>
+        <p:nvPicPr>
+          <p:cNvPr id="8" name="Content Placeholder 7">
+            <a:extLst>
+              <a:ext uri="{FF2B5EF4-FFF2-40B4-BE49-F238E27FC236}">
+                <a16:creationId xmlns:a16="http://schemas.microsoft.com/office/drawing/2014/main" id="{8BD7F944-A7C1-CFFC-A56D-B43691DD0E10}"/>
+              </a:ext>
+            </a:extLst>
+          </p:cNvPr>
+          <p:cNvPicPr>
+            <a:picLocks noGrp="1" noChangeAspect="1"/>
+          </p:cNvPicPr>
+          <p:nvPr>
+            <p:ph sz="half" idx="2"/>
+          </p:nvPr>
+        </p:nvPicPr>
+        <p:blipFill>
+          <a:blip r:embed="rId3">
+            <a:extLst>
+              <a:ext uri="{28A0092B-C50C-407E-A947-70E740481C1C}">
+                <a14:useLocalDpi xmlns:a14="http://schemas.microsoft.com/office/drawing/2010/main" val="0"/>
+              </a:ext>
+            </a:extLst>
+          </a:blip>
+          <a:stretch>
+            <a:fillRect/>
+          </a:stretch>
+        </p:blipFill>
+        <p:spPr>
+          <a:xfrm>
+            <a:off x="4995076" y="2461227"/>
+            <a:ext cx="4279099" cy="3209324"/>
+          </a:xfrm>
+        </p:spPr>
+      </p:pic>
     </p:spTree>
     <p:extLst>
       <p:ext uri="{BB962C8B-B14F-4D97-AF65-F5344CB8AC3E}">
-        <p14:creationId xmlns:p14="http://schemas.microsoft.com/office/powerpoint/2010/main" val="2640556589"/>
+        <p14:creationId xmlns:p14="http://schemas.microsoft.com/office/powerpoint/2010/main" val="1147069204"/>
       </p:ext>
     </p:extLst>
   </p:cSld>
@@ -7266,7 +8544,7 @@
           <p:cNvPr id="2" name="Title 1">
             <a:extLst>
               <a:ext uri="{FF2B5EF4-FFF2-40B4-BE49-F238E27FC236}">
-                <a16:creationId xmlns:a16="http://schemas.microsoft.com/office/drawing/2014/main" id="{999EA004-2536-63B6-7DE8-F16DC8AEE1FF}"/>
+                <a16:creationId xmlns:a16="http://schemas.microsoft.com/office/drawing/2014/main" id="{587C39AB-38F1-C60C-97E3-C7278D9CFF4B}"/>
               </a:ext>
             </a:extLst>
           </p:cNvPr>
@@ -7284,17 +8562,24 @@
           <a:p>
             <a:r>
               <a:rPr lang="en-US" dirty="0"/>
-              <a:t>Spotify 2023 Modality Breakdown</a:t>
+              <a:t>Distribution of Streams by Year</a:t>
+            </a:r>
+            <a:br>
+              <a:rPr lang="en-US" dirty="0"/>
+            </a:br>
+            <a:r>
+              <a:rPr lang="en-US" dirty="0"/>
+              <a:t>Streams over 2 Billion</a:t>
             </a:r>
           </a:p>
         </p:txBody>
       </p:sp>
       <p:pic>
         <p:nvPicPr>
-          <p:cNvPr id="5" name="Content Placeholder 4">
+          <p:cNvPr id="8" name="Content Placeholder 7">
             <a:extLst>
               <a:ext uri="{FF2B5EF4-FFF2-40B4-BE49-F238E27FC236}">
-                <a16:creationId xmlns:a16="http://schemas.microsoft.com/office/drawing/2014/main" id="{6B307C1B-101F-E427-6E0A-0B69FA7B47F7}"/>
+                <a16:creationId xmlns:a16="http://schemas.microsoft.com/office/drawing/2014/main" id="{0D57B322-741C-A656-A135-B419EF0FB936}"/>
               </a:ext>
             </a:extLst>
           </p:cNvPr>
@@ -7302,7 +8587,7 @@
             <a:picLocks noGrp="1" noChangeAspect="1"/>
           </p:cNvPicPr>
           <p:nvPr>
-            <p:ph idx="1"/>
+            <p:ph sz="half" idx="2"/>
           </p:nvPr>
         </p:nvPicPr>
         <p:blipFill>
@@ -7319,65 +8604,26 @@
         </p:blipFill>
         <p:spPr>
           <a:xfrm>
-            <a:off x="269022" y="1690767"/>
-            <a:ext cx="5801784" cy="4351338"/>
+            <a:off x="4898284" y="2388633"/>
+            <a:ext cx="4375891" cy="3281918"/>
           </a:xfrm>
         </p:spPr>
       </p:pic>
-      <p:sp>
-        <p:nvSpPr>
-          <p:cNvPr id="8" name="TextBox 7">
+      <p:pic>
+        <p:nvPicPr>
+          <p:cNvPr id="7" name="Content Placeholder 6">
             <a:extLst>
               <a:ext uri="{FF2B5EF4-FFF2-40B4-BE49-F238E27FC236}">
-                <a16:creationId xmlns:a16="http://schemas.microsoft.com/office/drawing/2014/main" id="{FA3AEE96-CCC5-9002-4022-336902D94B88}"/>
-              </a:ext>
-            </a:extLst>
-          </p:cNvPr>
-          <p:cNvSpPr txBox="1"/>
-          <p:nvPr/>
-        </p:nvSpPr>
-        <p:spPr>
-          <a:xfrm>
-            <a:off x="677334" y="6089063"/>
-            <a:ext cx="10457350" cy="646331"/>
-          </a:xfrm>
-          <a:prstGeom prst="rect">
-            <a:avLst/>
-          </a:prstGeom>
-          <a:noFill/>
-        </p:spPr>
-        <p:txBody>
-          <a:bodyPr wrap="none" rtlCol="0">
-            <a:spAutoFit/>
-          </a:bodyPr>
-          <a:lstStyle/>
-          <a:p>
-            <a:r>
-              <a:rPr lang="en-US" dirty="0"/>
-              <a:t>Major modality is more popular across both sample and population. The most streamed artists had </a:t>
-            </a:r>
-          </a:p>
-          <a:p>
-            <a:r>
-              <a:rPr lang="en-US" dirty="0"/>
-              <a:t>a further share of major modality.</a:t>
-            </a:r>
-          </a:p>
-        </p:txBody>
-      </p:sp>
-      <p:pic>
-        <p:nvPicPr>
-          <p:cNvPr id="7" name="Picture 6">
-            <a:extLst>
-              <a:ext uri="{FF2B5EF4-FFF2-40B4-BE49-F238E27FC236}">
-                <a16:creationId xmlns:a16="http://schemas.microsoft.com/office/drawing/2014/main" id="{FE582FD2-C079-6B70-8508-AF7E33FDE84C}"/>
+                <a16:creationId xmlns:a16="http://schemas.microsoft.com/office/drawing/2014/main" id="{BD7DAF19-D0F6-E2FA-1A42-75E96B70285D}"/>
               </a:ext>
             </a:extLst>
           </p:cNvPr>
           <p:cNvPicPr>
-            <a:picLocks noChangeAspect="1"/>
+            <a:picLocks noGrp="1" noChangeAspect="1"/>
           </p:cNvPicPr>
-          <p:nvPr/>
+          <p:nvPr>
+            <p:ph sz="half" idx="1"/>
+          </p:nvPr>
         </p:nvPicPr>
         <p:blipFill>
           <a:blip r:embed="rId3">
@@ -7393,18 +8639,15 @@
         </p:blipFill>
         <p:spPr>
           <a:xfrm>
-            <a:off x="5501628" y="1652976"/>
-            <a:ext cx="5852172" cy="4389129"/>
+            <a:off x="364208" y="2230542"/>
+            <a:ext cx="4581309" cy="3435981"/>
           </a:xfrm>
-          <a:prstGeom prst="rect">
-            <a:avLst/>
-          </a:prstGeom>
         </p:spPr>
       </p:pic>
     </p:spTree>
     <p:extLst>
       <p:ext uri="{BB962C8B-B14F-4D97-AF65-F5344CB8AC3E}">
-        <p14:creationId xmlns:p14="http://schemas.microsoft.com/office/powerpoint/2010/main" val="1105713490"/>
+        <p14:creationId xmlns:p14="http://schemas.microsoft.com/office/powerpoint/2010/main" val="1774457953"/>
       </p:ext>
     </p:extLst>
   </p:cSld>
@@ -7436,7 +8679,7 @@
           <p:cNvPr id="2" name="Title 1">
             <a:extLst>
               <a:ext uri="{FF2B5EF4-FFF2-40B4-BE49-F238E27FC236}">
-                <a16:creationId xmlns:a16="http://schemas.microsoft.com/office/drawing/2014/main" id="{D21C9EA1-6248-6908-2C97-4D32ECF06B99}"/>
+                <a16:creationId xmlns:a16="http://schemas.microsoft.com/office/drawing/2014/main" id="{1E3020E4-13AD-D731-20D0-237E1C1B2DF1}"/>
               </a:ext>
             </a:extLst>
           </p:cNvPr>
@@ -7454,7 +8697,7 @@
           <a:p>
             <a:r>
               <a:rPr lang="en-US" dirty="0"/>
-              <a:t>Musical Characteristics</a:t>
+              <a:t>The Effect of Charts and Playlists</a:t>
             </a:r>
           </a:p>
         </p:txBody>
@@ -7464,7 +8707,7 @@
           <p:cNvPr id="3" name="Content Placeholder 2">
             <a:extLst>
               <a:ext uri="{FF2B5EF4-FFF2-40B4-BE49-F238E27FC236}">
-                <a16:creationId xmlns:a16="http://schemas.microsoft.com/office/drawing/2014/main" id="{8CF5B4B8-585F-616D-A8A5-526CEB066679}"/>
+                <a16:creationId xmlns:a16="http://schemas.microsoft.com/office/drawing/2014/main" id="{34F528BB-A567-F207-F019-3F6A56503126}"/>
               </a:ext>
             </a:extLst>
           </p:cNvPr>
@@ -7477,476 +8720,17 @@
         </p:nvSpPr>
         <p:spPr/>
         <p:txBody>
-          <a:bodyPr>
-            <a:normAutofit fontScale="70000" lnSpcReduction="20000"/>
-          </a:bodyPr>
-          <a:lstStyle/>
-          <a:p>
-            <a:r>
-              <a:rPr lang="en-US" dirty="0"/>
-              <a:t>Elements of the track as defined by Spotify:</a:t>
-            </a:r>
-          </a:p>
-          <a:p>
-            <a:pPr lvl="1"/>
-            <a:endParaRPr kumimoji="0" lang="en-US" altLang="en-US" sz="2400" b="1" i="0" u="none" strike="noStrike" cap="none" normalizeH="0" baseline="0" dirty="0">
-              <a:ln>
-                <a:noFill/>
-              </a:ln>
-              <a:solidFill>
-                <a:schemeClr val="tx1"/>
-              </a:solidFill>
-              <a:effectLst/>
-              <a:latin typeface="Arial" panose="020B0604020202020204" pitchFamily="34" charset="0"/>
-            </a:endParaRPr>
-          </a:p>
-          <a:p>
-            <a:pPr lvl="1"/>
-            <a:r>
-              <a:rPr kumimoji="0" lang="en-US" altLang="en-US" sz="2400" b="1" i="0" u="none" strike="noStrike" cap="none" normalizeH="0" baseline="0" dirty="0">
-                <a:ln>
-                  <a:noFill/>
-                </a:ln>
-                <a:solidFill>
-                  <a:schemeClr val="tx1"/>
-                </a:solidFill>
-                <a:effectLst/>
-                <a:latin typeface="Arial" panose="020B0604020202020204" pitchFamily="34" charset="0"/>
-              </a:rPr>
-              <a:t>danceability_%</a:t>
-            </a:r>
-            <a:r>
-              <a:rPr kumimoji="0" lang="en-US" altLang="en-US" sz="2400" b="0" i="0" u="none" strike="noStrike" cap="none" normalizeH="0" baseline="0" dirty="0">
-                <a:ln>
-                  <a:noFill/>
-                </a:ln>
-                <a:solidFill>
-                  <a:schemeClr val="tx1"/>
-                </a:solidFill>
-                <a:effectLst/>
-                <a:latin typeface="Arial" panose="020B0604020202020204" pitchFamily="34" charset="0"/>
-              </a:rPr>
-              <a:t>: </a:t>
-            </a:r>
-            <a:r>
-              <a:rPr kumimoji="0" lang="en-US" altLang="en-US" sz="2400" b="0" i="1" u="none" strike="noStrike" cap="none" normalizeH="0" baseline="0" dirty="0">
-                <a:ln>
-                  <a:noFill/>
-                </a:ln>
-                <a:solidFill>
-                  <a:schemeClr val="tx1"/>
-                </a:solidFill>
-                <a:effectLst/>
-                <a:latin typeface="Arial" panose="020B0604020202020204" pitchFamily="34" charset="0"/>
-              </a:rPr>
-              <a:t>Percentage indicating how suitable the song is for dancing</a:t>
-            </a:r>
-            <a:r>
-              <a:rPr kumimoji="0" lang="en-US" altLang="en-US" sz="2400" b="0" i="0" u="none" strike="noStrike" cap="none" normalizeH="0" baseline="0" dirty="0">
-                <a:ln>
-                  <a:noFill/>
-                </a:ln>
-                <a:solidFill>
-                  <a:schemeClr val="tx1"/>
-                </a:solidFill>
-                <a:effectLst/>
-                <a:latin typeface="Arial" panose="020B0604020202020204" pitchFamily="34" charset="0"/>
-              </a:rPr>
-              <a:t> </a:t>
-            </a:r>
-          </a:p>
-          <a:p>
-            <a:pPr lvl="1"/>
-            <a:r>
-              <a:rPr kumimoji="0" lang="en-US" altLang="en-US" sz="2400" b="1" i="0" u="none" strike="noStrike" cap="none" normalizeH="0" baseline="0" dirty="0">
-                <a:ln>
-                  <a:noFill/>
-                </a:ln>
-                <a:solidFill>
-                  <a:schemeClr val="tx1"/>
-                </a:solidFill>
-                <a:effectLst/>
-                <a:latin typeface="Arial" panose="020B0604020202020204" pitchFamily="34" charset="0"/>
-              </a:rPr>
-              <a:t>valence_%</a:t>
-            </a:r>
-            <a:r>
-              <a:rPr kumimoji="0" lang="en-US" altLang="en-US" sz="2400" b="0" i="0" u="none" strike="noStrike" cap="none" normalizeH="0" baseline="0" dirty="0">
-                <a:ln>
-                  <a:noFill/>
-                </a:ln>
-                <a:solidFill>
-                  <a:schemeClr val="tx1"/>
-                </a:solidFill>
-                <a:effectLst/>
-                <a:latin typeface="Arial" panose="020B0604020202020204" pitchFamily="34" charset="0"/>
-              </a:rPr>
-              <a:t>: </a:t>
-            </a:r>
-            <a:r>
-              <a:rPr kumimoji="0" lang="en-US" altLang="en-US" sz="2400" b="0" i="1" u="none" strike="noStrike" cap="none" normalizeH="0" baseline="0" dirty="0">
-                <a:ln>
-                  <a:noFill/>
-                </a:ln>
-                <a:solidFill>
-                  <a:schemeClr val="tx1"/>
-                </a:solidFill>
-                <a:effectLst/>
-                <a:latin typeface="Arial" panose="020B0604020202020204" pitchFamily="34" charset="0"/>
-              </a:rPr>
-              <a:t>Positivity of the song's musical content</a:t>
-            </a:r>
-            <a:r>
-              <a:rPr kumimoji="0" lang="en-US" altLang="en-US" sz="2400" b="0" i="0" u="none" strike="noStrike" cap="none" normalizeH="0" baseline="0" dirty="0">
-                <a:ln>
-                  <a:noFill/>
-                </a:ln>
-                <a:solidFill>
-                  <a:schemeClr val="tx1"/>
-                </a:solidFill>
-                <a:effectLst/>
-                <a:latin typeface="Arial" panose="020B0604020202020204" pitchFamily="34" charset="0"/>
-              </a:rPr>
-              <a:t> </a:t>
-            </a:r>
-          </a:p>
-          <a:p>
-            <a:pPr lvl="1"/>
-            <a:r>
-              <a:rPr kumimoji="0" lang="en-US" altLang="en-US" sz="2400" b="1" i="0" u="none" strike="noStrike" cap="none" normalizeH="0" baseline="0" dirty="0">
-                <a:ln>
-                  <a:noFill/>
-                </a:ln>
-                <a:solidFill>
-                  <a:schemeClr val="tx1"/>
-                </a:solidFill>
-                <a:effectLst/>
-                <a:latin typeface="Arial" panose="020B0604020202020204" pitchFamily="34" charset="0"/>
-              </a:rPr>
-              <a:t>energy_%</a:t>
-            </a:r>
-            <a:r>
-              <a:rPr kumimoji="0" lang="en-US" altLang="en-US" sz="2400" b="0" i="0" u="none" strike="noStrike" cap="none" normalizeH="0" baseline="0" dirty="0">
-                <a:ln>
-                  <a:noFill/>
-                </a:ln>
-                <a:solidFill>
-                  <a:schemeClr val="tx1"/>
-                </a:solidFill>
-                <a:effectLst/>
-                <a:latin typeface="Arial" panose="020B0604020202020204" pitchFamily="34" charset="0"/>
-              </a:rPr>
-              <a:t>: </a:t>
-            </a:r>
-            <a:r>
-              <a:rPr kumimoji="0" lang="en-US" altLang="en-US" sz="2400" b="0" i="1" u="none" strike="noStrike" cap="none" normalizeH="0" baseline="0" dirty="0">
-                <a:ln>
-                  <a:noFill/>
-                </a:ln>
-                <a:solidFill>
-                  <a:schemeClr val="tx1"/>
-                </a:solidFill>
-                <a:effectLst/>
-                <a:latin typeface="Arial" panose="020B0604020202020204" pitchFamily="34" charset="0"/>
-              </a:rPr>
-              <a:t>Perceived energy level of the song</a:t>
-            </a:r>
-            <a:r>
-              <a:rPr kumimoji="0" lang="en-US" altLang="en-US" sz="2400" b="0" i="0" u="none" strike="noStrike" cap="none" normalizeH="0" baseline="0" dirty="0">
-                <a:ln>
-                  <a:noFill/>
-                </a:ln>
-                <a:solidFill>
-                  <a:schemeClr val="tx1"/>
-                </a:solidFill>
-                <a:effectLst/>
-                <a:latin typeface="Arial" panose="020B0604020202020204" pitchFamily="34" charset="0"/>
-              </a:rPr>
-              <a:t> </a:t>
-            </a:r>
-          </a:p>
-          <a:p>
-            <a:pPr lvl="1"/>
-            <a:r>
-              <a:rPr kumimoji="0" lang="en-US" altLang="en-US" sz="2400" b="1" i="0" u="none" strike="noStrike" cap="none" normalizeH="0" baseline="0" dirty="0" err="1">
-                <a:ln>
-                  <a:noFill/>
-                </a:ln>
-                <a:solidFill>
-                  <a:schemeClr val="tx1"/>
-                </a:solidFill>
-                <a:effectLst/>
-                <a:latin typeface="Arial" panose="020B0604020202020204" pitchFamily="34" charset="0"/>
-              </a:rPr>
-              <a:t>acousticness</a:t>
-            </a:r>
-            <a:r>
-              <a:rPr kumimoji="0" lang="en-US" altLang="en-US" sz="2400" b="1" i="0" u="none" strike="noStrike" cap="none" normalizeH="0" baseline="0" dirty="0">
-                <a:ln>
-                  <a:noFill/>
-                </a:ln>
-                <a:solidFill>
-                  <a:schemeClr val="tx1"/>
-                </a:solidFill>
-                <a:effectLst/>
-                <a:latin typeface="Arial" panose="020B0604020202020204" pitchFamily="34" charset="0"/>
-              </a:rPr>
-              <a:t>_%</a:t>
-            </a:r>
-            <a:r>
-              <a:rPr kumimoji="0" lang="en-US" altLang="en-US" sz="2400" b="0" i="0" u="none" strike="noStrike" cap="none" normalizeH="0" baseline="0" dirty="0">
-                <a:ln>
-                  <a:noFill/>
-                </a:ln>
-                <a:solidFill>
-                  <a:schemeClr val="tx1"/>
-                </a:solidFill>
-                <a:effectLst/>
-                <a:latin typeface="Arial" panose="020B0604020202020204" pitchFamily="34" charset="0"/>
-              </a:rPr>
-              <a:t>: </a:t>
-            </a:r>
-            <a:r>
-              <a:rPr kumimoji="0" lang="en-US" altLang="en-US" sz="2400" b="0" i="1" u="none" strike="noStrike" cap="none" normalizeH="0" baseline="0" dirty="0">
-                <a:ln>
-                  <a:noFill/>
-                </a:ln>
-                <a:solidFill>
-                  <a:schemeClr val="tx1"/>
-                </a:solidFill>
-                <a:effectLst/>
-                <a:latin typeface="Arial" panose="020B0604020202020204" pitchFamily="34" charset="0"/>
-              </a:rPr>
-              <a:t>Amount of acoustic sound in the song</a:t>
-            </a:r>
-            <a:r>
-              <a:rPr kumimoji="0" lang="en-US" altLang="en-US" sz="2400" b="0" i="0" u="none" strike="noStrike" cap="none" normalizeH="0" baseline="0" dirty="0">
-                <a:ln>
-                  <a:noFill/>
-                </a:ln>
-                <a:solidFill>
-                  <a:schemeClr val="tx1"/>
-                </a:solidFill>
-                <a:effectLst/>
-                <a:latin typeface="Arial" panose="020B0604020202020204" pitchFamily="34" charset="0"/>
-              </a:rPr>
-              <a:t> </a:t>
-            </a:r>
-          </a:p>
-          <a:p>
-            <a:pPr lvl="1"/>
-            <a:r>
-              <a:rPr kumimoji="0" lang="en-US" altLang="en-US" sz="2400" b="1" i="0" u="none" strike="noStrike" cap="none" normalizeH="0" baseline="0" dirty="0" err="1">
-                <a:ln>
-                  <a:noFill/>
-                </a:ln>
-                <a:solidFill>
-                  <a:schemeClr val="tx1"/>
-                </a:solidFill>
-                <a:effectLst/>
-                <a:latin typeface="Arial" panose="020B0604020202020204" pitchFamily="34" charset="0"/>
-              </a:rPr>
-              <a:t>instrumentalness</a:t>
-            </a:r>
-            <a:r>
-              <a:rPr kumimoji="0" lang="en-US" altLang="en-US" sz="2400" b="1" i="0" u="none" strike="noStrike" cap="none" normalizeH="0" baseline="0" dirty="0">
-                <a:ln>
-                  <a:noFill/>
-                </a:ln>
-                <a:solidFill>
-                  <a:schemeClr val="tx1"/>
-                </a:solidFill>
-                <a:effectLst/>
-                <a:latin typeface="Arial" panose="020B0604020202020204" pitchFamily="34" charset="0"/>
-              </a:rPr>
-              <a:t>_%</a:t>
-            </a:r>
-            <a:r>
-              <a:rPr kumimoji="0" lang="en-US" altLang="en-US" sz="2400" b="0" i="0" u="none" strike="noStrike" cap="none" normalizeH="0" baseline="0" dirty="0">
-                <a:ln>
-                  <a:noFill/>
-                </a:ln>
-                <a:solidFill>
-                  <a:schemeClr val="tx1"/>
-                </a:solidFill>
-                <a:effectLst/>
-                <a:latin typeface="Arial" panose="020B0604020202020204" pitchFamily="34" charset="0"/>
-              </a:rPr>
-              <a:t>: </a:t>
-            </a:r>
-            <a:r>
-              <a:rPr kumimoji="0" lang="en-US" altLang="en-US" sz="2400" b="0" i="1" u="none" strike="noStrike" cap="none" normalizeH="0" baseline="0" dirty="0">
-                <a:ln>
-                  <a:noFill/>
-                </a:ln>
-                <a:solidFill>
-                  <a:schemeClr val="tx1"/>
-                </a:solidFill>
-                <a:effectLst/>
-                <a:latin typeface="Arial" panose="020B0604020202020204" pitchFamily="34" charset="0"/>
-              </a:rPr>
-              <a:t>Amount of instrumental content in the song</a:t>
-            </a:r>
-            <a:r>
-              <a:rPr kumimoji="0" lang="en-US" altLang="en-US" sz="2400" b="0" i="0" u="none" strike="noStrike" cap="none" normalizeH="0" baseline="0" dirty="0">
-                <a:ln>
-                  <a:noFill/>
-                </a:ln>
-                <a:solidFill>
-                  <a:schemeClr val="tx1"/>
-                </a:solidFill>
-                <a:effectLst/>
-                <a:latin typeface="Arial" panose="020B0604020202020204" pitchFamily="34" charset="0"/>
-              </a:rPr>
-              <a:t> </a:t>
-            </a:r>
-          </a:p>
-          <a:p>
-            <a:pPr lvl="1"/>
-            <a:r>
-              <a:rPr kumimoji="0" lang="en-US" altLang="en-US" sz="2400" b="1" i="0" u="none" strike="noStrike" cap="none" normalizeH="0" baseline="0" dirty="0">
-                <a:ln>
-                  <a:noFill/>
-                </a:ln>
-                <a:solidFill>
-                  <a:schemeClr val="tx1"/>
-                </a:solidFill>
-                <a:effectLst/>
-                <a:latin typeface="Arial" panose="020B0604020202020204" pitchFamily="34" charset="0"/>
-              </a:rPr>
-              <a:t>liveness_%</a:t>
-            </a:r>
-            <a:r>
-              <a:rPr kumimoji="0" lang="en-US" altLang="en-US" sz="2400" b="0" i="0" u="none" strike="noStrike" cap="none" normalizeH="0" baseline="0" dirty="0">
-                <a:ln>
-                  <a:noFill/>
-                </a:ln>
-                <a:solidFill>
-                  <a:schemeClr val="tx1"/>
-                </a:solidFill>
-                <a:effectLst/>
-                <a:latin typeface="Arial" panose="020B0604020202020204" pitchFamily="34" charset="0"/>
-              </a:rPr>
-              <a:t>: </a:t>
-            </a:r>
-            <a:r>
-              <a:rPr kumimoji="0" lang="en-US" altLang="en-US" sz="2400" b="0" i="1" u="none" strike="noStrike" cap="none" normalizeH="0" baseline="0" dirty="0">
-                <a:ln>
-                  <a:noFill/>
-                </a:ln>
-                <a:solidFill>
-                  <a:schemeClr val="tx1"/>
-                </a:solidFill>
-                <a:effectLst/>
-                <a:latin typeface="Arial" panose="020B0604020202020204" pitchFamily="34" charset="0"/>
-              </a:rPr>
-              <a:t>Presence of live performance elements</a:t>
-            </a:r>
-            <a:r>
-              <a:rPr kumimoji="0" lang="en-US" altLang="en-US" sz="2400" b="0" i="0" u="none" strike="noStrike" cap="none" normalizeH="0" baseline="0" dirty="0">
-                <a:ln>
-                  <a:noFill/>
-                </a:ln>
-                <a:solidFill>
-                  <a:schemeClr val="tx1"/>
-                </a:solidFill>
-                <a:effectLst/>
-                <a:latin typeface="Arial" panose="020B0604020202020204" pitchFamily="34" charset="0"/>
-              </a:rPr>
-              <a:t> </a:t>
-            </a:r>
-          </a:p>
-          <a:p>
-            <a:pPr lvl="1"/>
-            <a:r>
-              <a:rPr kumimoji="0" lang="en-US" altLang="en-US" sz="2400" b="1" i="0" u="none" strike="noStrike" cap="none" normalizeH="0" baseline="0" dirty="0" err="1">
-                <a:ln>
-                  <a:noFill/>
-                </a:ln>
-                <a:solidFill>
-                  <a:schemeClr val="tx1"/>
-                </a:solidFill>
-                <a:effectLst/>
-                <a:latin typeface="Arial" panose="020B0604020202020204" pitchFamily="34" charset="0"/>
-              </a:rPr>
-              <a:t>speechiness</a:t>
-            </a:r>
-            <a:r>
-              <a:rPr kumimoji="0" lang="en-US" altLang="en-US" sz="2400" b="1" i="0" u="none" strike="noStrike" cap="none" normalizeH="0" baseline="0" dirty="0">
-                <a:ln>
-                  <a:noFill/>
-                </a:ln>
-                <a:solidFill>
-                  <a:schemeClr val="tx1"/>
-                </a:solidFill>
-                <a:effectLst/>
-                <a:latin typeface="Arial" panose="020B0604020202020204" pitchFamily="34" charset="0"/>
-              </a:rPr>
-              <a:t>_%</a:t>
-            </a:r>
-            <a:r>
-              <a:rPr kumimoji="0" lang="en-US" altLang="en-US" sz="2400" b="0" i="0" u="none" strike="noStrike" cap="none" normalizeH="0" baseline="0" dirty="0">
-                <a:ln>
-                  <a:noFill/>
-                </a:ln>
-                <a:solidFill>
-                  <a:schemeClr val="tx1"/>
-                </a:solidFill>
-                <a:effectLst/>
-                <a:latin typeface="Arial" panose="020B0604020202020204" pitchFamily="34" charset="0"/>
-              </a:rPr>
-              <a:t>: </a:t>
-            </a:r>
-            <a:r>
-              <a:rPr kumimoji="0" lang="en-US" altLang="en-US" sz="2400" b="0" i="1" u="none" strike="noStrike" cap="none" normalizeH="0" baseline="0" dirty="0">
-                <a:ln>
-                  <a:noFill/>
-                </a:ln>
-                <a:solidFill>
-                  <a:schemeClr val="tx1"/>
-                </a:solidFill>
-                <a:effectLst/>
-                <a:latin typeface="Arial" panose="020B0604020202020204" pitchFamily="34" charset="0"/>
-              </a:rPr>
-              <a:t>Amount of spoken words in the song</a:t>
-            </a:r>
-            <a:endParaRPr kumimoji="0" lang="en-US" altLang="en-US" sz="2400" b="0" i="0" u="none" strike="noStrike" cap="none" normalizeH="0" baseline="0" dirty="0">
-              <a:ln>
-                <a:noFill/>
-              </a:ln>
-              <a:solidFill>
-                <a:schemeClr val="tx1"/>
-              </a:solidFill>
-              <a:effectLst/>
-              <a:latin typeface="Arial" panose="020B0604020202020204" pitchFamily="34" charset="0"/>
-            </a:endParaRPr>
-          </a:p>
-          <a:p>
-            <a:pPr lvl="1"/>
-            <a:endParaRPr lang="en-US" dirty="0"/>
-          </a:p>
-          <a:p>
-            <a:r>
-              <a:rPr lang="en-US" dirty="0"/>
-              <a:t>Given a number representing percentage of presence in a given track</a:t>
-            </a:r>
-          </a:p>
-          <a:p>
-            <a:pPr lvl="1"/>
-            <a:r>
-              <a:rPr lang="en-US" dirty="0"/>
-              <a:t>This percentage is also assigned via Spotify</a:t>
-            </a:r>
-          </a:p>
-          <a:p>
-            <a:endParaRPr lang="en-US" dirty="0"/>
+          <a:bodyPr/>
+          <a:lstStyle/>
+          <a:p>
+            <a:endParaRPr lang="en-US"/>
           </a:p>
         </p:txBody>
       </p:sp>
     </p:spTree>
     <p:extLst>
       <p:ext uri="{BB962C8B-B14F-4D97-AF65-F5344CB8AC3E}">
-        <p14:creationId xmlns:p14="http://schemas.microsoft.com/office/powerpoint/2010/main" val="3339136056"/>
+        <p14:creationId xmlns:p14="http://schemas.microsoft.com/office/powerpoint/2010/main" val="2072924615"/>
       </p:ext>
     </p:extLst>
   </p:cSld>

</xml_diff>

<commit_message>
README edits, ppt and notebook edits
</commit_message>
<xml_diff>
--- a/Project_1_Spotify_2023_Analysis.pptx
+++ b/Project_1_Spotify_2023_Analysis.pptx
@@ -845,7 +845,7 @@
           <a:p>
             <a:fld id="{F24EF5F4-8F03-4ABB-88B3-7880A17E3B42}" type="datetimeFigureOut">
               <a:rPr lang="en-US" smtClean="0"/>
-              <a:t>2/12/2024</a:t>
+              <a:t>2/14/2024</a:t>
             </a:fld>
             <a:endParaRPr lang="en-US"/>
           </a:p>
@@ -1096,7 +1096,7 @@
           <a:p>
             <a:fld id="{F24EF5F4-8F03-4ABB-88B3-7880A17E3B42}" type="datetimeFigureOut">
               <a:rPr lang="en-US" smtClean="0"/>
-              <a:t>2/12/2024</a:t>
+              <a:t>2/14/2024</a:t>
             </a:fld>
             <a:endParaRPr lang="en-US"/>
           </a:p>
@@ -1410,7 +1410,7 @@
           <a:p>
             <a:fld id="{F24EF5F4-8F03-4ABB-88B3-7880A17E3B42}" type="datetimeFigureOut">
               <a:rPr lang="en-US" smtClean="0"/>
-              <a:t>2/12/2024</a:t>
+              <a:t>2/14/2024</a:t>
             </a:fld>
             <a:endParaRPr lang="en-US"/>
           </a:p>
@@ -1751,7 +1751,7 @@
           <a:p>
             <a:fld id="{F24EF5F4-8F03-4ABB-88B3-7880A17E3B42}" type="datetimeFigureOut">
               <a:rPr lang="en-US" smtClean="0"/>
-              <a:t>2/12/2024</a:t>
+              <a:t>2/14/2024</a:t>
             </a:fld>
             <a:endParaRPr lang="en-US"/>
           </a:p>
@@ -2065,7 +2065,7 @@
           <a:p>
             <a:fld id="{F24EF5F4-8F03-4ABB-88B3-7880A17E3B42}" type="datetimeFigureOut">
               <a:rPr lang="en-US" smtClean="0"/>
-              <a:t>2/12/2024</a:t>
+              <a:t>2/14/2024</a:t>
             </a:fld>
             <a:endParaRPr lang="en-US"/>
           </a:p>
@@ -2458,7 +2458,7 @@
           <a:p>
             <a:fld id="{F24EF5F4-8F03-4ABB-88B3-7880A17E3B42}" type="datetimeFigureOut">
               <a:rPr lang="en-US" smtClean="0"/>
-              <a:t>2/12/2024</a:t>
+              <a:t>2/14/2024</a:t>
             </a:fld>
             <a:endParaRPr lang="en-US"/>
           </a:p>
@@ -2628,7 +2628,7 @@
           <a:p>
             <a:fld id="{F24EF5F4-8F03-4ABB-88B3-7880A17E3B42}" type="datetimeFigureOut">
               <a:rPr lang="en-US" smtClean="0"/>
-              <a:t>2/12/2024</a:t>
+              <a:t>2/14/2024</a:t>
             </a:fld>
             <a:endParaRPr lang="en-US"/>
           </a:p>
@@ -2808,7 +2808,7 @@
           <a:p>
             <a:fld id="{F24EF5F4-8F03-4ABB-88B3-7880A17E3B42}" type="datetimeFigureOut">
               <a:rPr lang="en-US" smtClean="0"/>
-              <a:t>2/12/2024</a:t>
+              <a:t>2/14/2024</a:t>
             </a:fld>
             <a:endParaRPr lang="en-US"/>
           </a:p>
@@ -2984,7 +2984,7 @@
           <a:p>
             <a:fld id="{F24EF5F4-8F03-4ABB-88B3-7880A17E3B42}" type="datetimeFigureOut">
               <a:rPr lang="en-US" smtClean="0"/>
-              <a:t>2/12/2024</a:t>
+              <a:t>2/14/2024</a:t>
             </a:fld>
             <a:endParaRPr lang="en-US"/>
           </a:p>
@@ -3231,7 +3231,7 @@
           <a:p>
             <a:fld id="{F24EF5F4-8F03-4ABB-88B3-7880A17E3B42}" type="datetimeFigureOut">
               <a:rPr lang="en-US" smtClean="0"/>
-              <a:t>2/12/2024</a:t>
+              <a:t>2/14/2024</a:t>
             </a:fld>
             <a:endParaRPr lang="en-US"/>
           </a:p>
@@ -3463,7 +3463,7 @@
           <a:p>
             <a:fld id="{F24EF5F4-8F03-4ABB-88B3-7880A17E3B42}" type="datetimeFigureOut">
               <a:rPr lang="en-US" smtClean="0"/>
-              <a:t>2/12/2024</a:t>
+              <a:t>2/14/2024</a:t>
             </a:fld>
             <a:endParaRPr lang="en-US"/>
           </a:p>
@@ -3837,7 +3837,7 @@
           <a:p>
             <a:fld id="{F24EF5F4-8F03-4ABB-88B3-7880A17E3B42}" type="datetimeFigureOut">
               <a:rPr lang="en-US" smtClean="0"/>
-              <a:t>2/12/2024</a:t>
+              <a:t>2/14/2024</a:t>
             </a:fld>
             <a:endParaRPr lang="en-US"/>
           </a:p>
@@ -3960,7 +3960,7 @@
           <a:p>
             <a:fld id="{F24EF5F4-8F03-4ABB-88B3-7880A17E3B42}" type="datetimeFigureOut">
               <a:rPr lang="en-US" smtClean="0"/>
-              <a:t>2/12/2024</a:t>
+              <a:t>2/14/2024</a:t>
             </a:fld>
             <a:endParaRPr lang="en-US"/>
           </a:p>
@@ -4055,7 +4055,7 @@
           <a:p>
             <a:fld id="{F24EF5F4-8F03-4ABB-88B3-7880A17E3B42}" type="datetimeFigureOut">
               <a:rPr lang="en-US" smtClean="0"/>
-              <a:t>2/12/2024</a:t>
+              <a:t>2/14/2024</a:t>
             </a:fld>
             <a:endParaRPr lang="en-US"/>
           </a:p>
@@ -4310,7 +4310,7 @@
           <a:p>
             <a:fld id="{F24EF5F4-8F03-4ABB-88B3-7880A17E3B42}" type="datetimeFigureOut">
               <a:rPr lang="en-US" smtClean="0"/>
-              <a:t>2/12/2024</a:t>
+              <a:t>2/14/2024</a:t>
             </a:fld>
             <a:endParaRPr lang="en-US"/>
           </a:p>
@@ -4573,7 +4573,7 @@
           <a:p>
             <a:fld id="{F24EF5F4-8F03-4ABB-88B3-7880A17E3B42}" type="datetimeFigureOut">
               <a:rPr lang="en-US" smtClean="0"/>
-              <a:t>2/12/2024</a:t>
+              <a:t>2/14/2024</a:t>
             </a:fld>
             <a:endParaRPr lang="en-US"/>
           </a:p>
@@ -5316,7 +5316,7 @@
           <a:p>
             <a:fld id="{F24EF5F4-8F03-4ABB-88B3-7880A17E3B42}" type="datetimeFigureOut">
               <a:rPr lang="en-US" smtClean="0"/>
-              <a:t>2/12/2024</a:t>
+              <a:t>2/14/2024</a:t>
             </a:fld>
             <a:endParaRPr lang="en-US"/>
           </a:p>
@@ -6283,10 +6283,15 @@
             <p:ph idx="1"/>
           </p:nvPr>
         </p:nvSpPr>
-        <p:spPr/>
+        <p:spPr>
+          <a:xfrm>
+            <a:off x="677333" y="1555531"/>
+            <a:ext cx="9044735" cy="4330262"/>
+          </a:xfrm>
+        </p:spPr>
         <p:txBody>
           <a:bodyPr>
-            <a:normAutofit fontScale="77500" lnSpcReduction="20000"/>
+            <a:normAutofit fontScale="85000" lnSpcReduction="20000"/>
           </a:bodyPr>
           <a:lstStyle/>
           <a:p>
@@ -6310,21 +6315,17 @@
             </a:r>
           </a:p>
           <a:p>
-            <a:pPr marL="457200" lvl="1" indent="0">
-              <a:buNone/>
-            </a:pPr>
+            <a:pPr lvl="1"/>
             <a:r>
               <a:rPr lang="en-US" dirty="0"/>
               <a:t>Study specific artists’ data entries more specifically in comparison to the population</a:t>
             </a:r>
           </a:p>
           <a:p>
-            <a:pPr marL="457200" lvl="1" indent="0">
-              <a:buNone/>
-            </a:pPr>
+            <a:pPr lvl="2"/>
             <a:r>
               <a:rPr lang="en-US" dirty="0"/>
-              <a:t>	Example: Fully analyze all Taylor Swift or the </a:t>
+              <a:t>Example: Fully analyze all Taylor Swift or the </a:t>
             </a:r>
             <a:r>
               <a:rPr lang="en-US" dirty="0" err="1"/>
@@ -6336,6 +6337,27 @@
             </a:r>
           </a:p>
           <a:p>
+            <a:pPr lvl="1"/>
+            <a:r>
+              <a:rPr lang="en-US" dirty="0"/>
+              <a:t>Further Analysis of Tempo Selection Normal Distribution</a:t>
+            </a:r>
+          </a:p>
+          <a:p>
+            <a:pPr lvl="2"/>
+            <a:r>
+              <a:rPr lang="en-US" dirty="0"/>
+              <a:t>Study songs outside the standard deviations and how they compare in popularity</a:t>
+            </a:r>
+          </a:p>
+          <a:p>
+            <a:pPr lvl="2"/>
+            <a:r>
+              <a:rPr lang="en-US" dirty="0"/>
+              <a:t>Cross reference to most popular artists/songs</a:t>
+            </a:r>
+          </a:p>
+          <a:p>
             <a:pPr marL="457200" lvl="1" indent="0">
               <a:buNone/>
             </a:pPr>
@@ -6372,7 +6394,7 @@
             <a:pPr lvl="2"/>
             <a:r>
               <a:rPr lang="en-US" dirty="0"/>
-              <a:t>Cannot correlate song choices to activities</a:t>
+              <a:t>Qualitative data and/or user surveys could be helpful in this case</a:t>
             </a:r>
           </a:p>
           <a:p>
@@ -6380,13 +6402,6 @@
             <a:r>
               <a:rPr lang="en-US" dirty="0"/>
               <a:t>This leads to assumptions of why certain characteristics are more popular than others</a:t>
-            </a:r>
-          </a:p>
-          <a:p>
-            <a:pPr lvl="2"/>
-            <a:r>
-              <a:rPr lang="en-US" dirty="0"/>
-              <a:t>Qualitative data and/or user surveys could be helpful in this case</a:t>
             </a:r>
           </a:p>
         </p:txBody>

</xml_diff>

<commit_message>
small edits made after pull
</commit_message>
<xml_diff>
--- a/Project_1_Spotify_2023_Analysis.pptx
+++ b/Project_1_Spotify_2023_Analysis.pptx
@@ -1504,7 +1504,7 @@
           <a:p>
             <a:fld id="{F24EF5F4-8F03-4ABB-88B3-7880A17E3B42}" type="datetimeFigureOut">
               <a:rPr lang="en-US" smtClean="0"/>
-              <a:t>2/13/2024</a:t>
+              <a:t>2/14/2024</a:t>
             </a:fld>
             <a:endParaRPr lang="en-US"/>
           </a:p>
@@ -1755,7 +1755,7 @@
           <a:p>
             <a:fld id="{F24EF5F4-8F03-4ABB-88B3-7880A17E3B42}" type="datetimeFigureOut">
               <a:rPr lang="en-US" smtClean="0"/>
-              <a:t>2/13/2024</a:t>
+              <a:t>2/14/2024</a:t>
             </a:fld>
             <a:endParaRPr lang="en-US"/>
           </a:p>
@@ -2069,7 +2069,7 @@
           <a:p>
             <a:fld id="{F24EF5F4-8F03-4ABB-88B3-7880A17E3B42}" type="datetimeFigureOut">
               <a:rPr lang="en-US" smtClean="0"/>
-              <a:t>2/13/2024</a:t>
+              <a:t>2/14/2024</a:t>
             </a:fld>
             <a:endParaRPr lang="en-US"/>
           </a:p>
@@ -2410,7 +2410,7 @@
           <a:p>
             <a:fld id="{F24EF5F4-8F03-4ABB-88B3-7880A17E3B42}" type="datetimeFigureOut">
               <a:rPr lang="en-US" smtClean="0"/>
-              <a:t>2/13/2024</a:t>
+              <a:t>2/14/2024</a:t>
             </a:fld>
             <a:endParaRPr lang="en-US"/>
           </a:p>
@@ -2724,7 +2724,7 @@
           <a:p>
             <a:fld id="{F24EF5F4-8F03-4ABB-88B3-7880A17E3B42}" type="datetimeFigureOut">
               <a:rPr lang="en-US" smtClean="0"/>
-              <a:t>2/13/2024</a:t>
+              <a:t>2/14/2024</a:t>
             </a:fld>
             <a:endParaRPr lang="en-US"/>
           </a:p>
@@ -3117,7 +3117,7 @@
           <a:p>
             <a:fld id="{F24EF5F4-8F03-4ABB-88B3-7880A17E3B42}" type="datetimeFigureOut">
               <a:rPr lang="en-US" smtClean="0"/>
-              <a:t>2/13/2024</a:t>
+              <a:t>2/14/2024</a:t>
             </a:fld>
             <a:endParaRPr lang="en-US"/>
           </a:p>
@@ -3287,7 +3287,7 @@
           <a:p>
             <a:fld id="{F24EF5F4-8F03-4ABB-88B3-7880A17E3B42}" type="datetimeFigureOut">
               <a:rPr lang="en-US" smtClean="0"/>
-              <a:t>2/13/2024</a:t>
+              <a:t>2/14/2024</a:t>
             </a:fld>
             <a:endParaRPr lang="en-US"/>
           </a:p>
@@ -3467,7 +3467,7 @@
           <a:p>
             <a:fld id="{F24EF5F4-8F03-4ABB-88B3-7880A17E3B42}" type="datetimeFigureOut">
               <a:rPr lang="en-US" smtClean="0"/>
-              <a:t>2/13/2024</a:t>
+              <a:t>2/14/2024</a:t>
             </a:fld>
             <a:endParaRPr lang="en-US"/>
           </a:p>
@@ -3643,7 +3643,7 @@
           <a:p>
             <a:fld id="{F24EF5F4-8F03-4ABB-88B3-7880A17E3B42}" type="datetimeFigureOut">
               <a:rPr lang="en-US" smtClean="0"/>
-              <a:t>2/13/2024</a:t>
+              <a:t>2/14/2024</a:t>
             </a:fld>
             <a:endParaRPr lang="en-US"/>
           </a:p>
@@ -3890,7 +3890,7 @@
           <a:p>
             <a:fld id="{F24EF5F4-8F03-4ABB-88B3-7880A17E3B42}" type="datetimeFigureOut">
               <a:rPr lang="en-US" smtClean="0"/>
-              <a:t>2/13/2024</a:t>
+              <a:t>2/14/2024</a:t>
             </a:fld>
             <a:endParaRPr lang="en-US"/>
           </a:p>
@@ -4122,7 +4122,7 @@
           <a:p>
             <a:fld id="{F24EF5F4-8F03-4ABB-88B3-7880A17E3B42}" type="datetimeFigureOut">
               <a:rPr lang="en-US" smtClean="0"/>
-              <a:t>2/13/2024</a:t>
+              <a:t>2/14/2024</a:t>
             </a:fld>
             <a:endParaRPr lang="en-US"/>
           </a:p>
@@ -4496,7 +4496,7 @@
           <a:p>
             <a:fld id="{F24EF5F4-8F03-4ABB-88B3-7880A17E3B42}" type="datetimeFigureOut">
               <a:rPr lang="en-US" smtClean="0"/>
-              <a:t>2/13/2024</a:t>
+              <a:t>2/14/2024</a:t>
             </a:fld>
             <a:endParaRPr lang="en-US"/>
           </a:p>
@@ -4619,7 +4619,7 @@
           <a:p>
             <a:fld id="{F24EF5F4-8F03-4ABB-88B3-7880A17E3B42}" type="datetimeFigureOut">
               <a:rPr lang="en-US" smtClean="0"/>
-              <a:t>2/13/2024</a:t>
+              <a:t>2/14/2024</a:t>
             </a:fld>
             <a:endParaRPr lang="en-US"/>
           </a:p>
@@ -4714,7 +4714,7 @@
           <a:p>
             <a:fld id="{F24EF5F4-8F03-4ABB-88B3-7880A17E3B42}" type="datetimeFigureOut">
               <a:rPr lang="en-US" smtClean="0"/>
-              <a:t>2/13/2024</a:t>
+              <a:t>2/14/2024</a:t>
             </a:fld>
             <a:endParaRPr lang="en-US"/>
           </a:p>
@@ -4969,7 +4969,7 @@
           <a:p>
             <a:fld id="{F24EF5F4-8F03-4ABB-88B3-7880A17E3B42}" type="datetimeFigureOut">
               <a:rPr lang="en-US" smtClean="0"/>
-              <a:t>2/13/2024</a:t>
+              <a:t>2/14/2024</a:t>
             </a:fld>
             <a:endParaRPr lang="en-US"/>
           </a:p>
@@ -5232,7 +5232,7 @@
           <a:p>
             <a:fld id="{F24EF5F4-8F03-4ABB-88B3-7880A17E3B42}" type="datetimeFigureOut">
               <a:rPr lang="en-US" smtClean="0"/>
-              <a:t>2/13/2024</a:t>
+              <a:t>2/14/2024</a:t>
             </a:fld>
             <a:endParaRPr lang="en-US"/>
           </a:p>
@@ -5975,7 +5975,7 @@
           <a:p>
             <a:fld id="{F24EF5F4-8F03-4ABB-88B3-7880A17E3B42}" type="datetimeFigureOut">
               <a:rPr lang="en-US" smtClean="0"/>
-              <a:t>2/13/2024</a:t>
+              <a:t>2/14/2024</a:t>
             </a:fld>
             <a:endParaRPr lang="en-US"/>
           </a:p>
@@ -8405,7 +8405,7 @@
       </p:grpSpPr>
       <p:sp>
         <p:nvSpPr>
-          <p:cNvPr id="2" name="Title 1">
+          <p:cNvPr id="10" name="Title 1">
             <a:extLst>
               <a:ext uri="{FF2B5EF4-FFF2-40B4-BE49-F238E27FC236}">
                 <a16:creationId xmlns:a16="http://schemas.microsoft.com/office/drawing/2014/main" id="{3F7EFF7F-C277-D600-91A7-5605A64BF3BA}"/>
@@ -8415,14 +8415,93 @@
           <p:cNvSpPr>
             <a:spLocks noGrp="1"/>
           </p:cNvSpPr>
-          <p:nvPr>
-            <p:ph type="title"/>
-          </p:nvPr>
-        </p:nvSpPr>
-        <p:spPr/>
-        <p:txBody>
-          <a:bodyPr/>
-          <a:lstStyle/>
+          <p:nvPr/>
+        </p:nvSpPr>
+        <p:spPr>
+          <a:xfrm>
+            <a:off x="722295" y="685800"/>
+            <a:ext cx="8596668" cy="1320800"/>
+          </a:xfrm>
+          <a:prstGeom prst="rect">
+            <a:avLst/>
+          </a:prstGeom>
+        </p:spPr>
+        <p:txBody>
+          <a:bodyPr vert="horz" lIns="91440" tIns="45720" rIns="91440" bIns="45720" rtlCol="0" anchor="t">
+            <a:normAutofit/>
+          </a:bodyPr>
+          <a:lstStyle>
+            <a:lvl1pPr algn="l" defTabSz="457200" rtl="0" eaLnBrk="1" latinLnBrk="0" hangingPunct="1">
+              <a:spcBef>
+                <a:spcPct val="0"/>
+              </a:spcBef>
+              <a:buNone/>
+              <a:defRPr sz="3600" kern="1200">
+                <a:solidFill>
+                  <a:schemeClr val="accent1"/>
+                </a:solidFill>
+                <a:latin typeface="+mj-lt"/>
+                <a:ea typeface="+mj-ea"/>
+                <a:cs typeface="+mj-cs"/>
+              </a:defRPr>
+            </a:lvl1pPr>
+            <a:lvl2pPr eaLnBrk="1" hangingPunct="1">
+              <a:defRPr>
+                <a:solidFill>
+                  <a:schemeClr val="tx2"/>
+                </a:solidFill>
+              </a:defRPr>
+            </a:lvl2pPr>
+            <a:lvl3pPr eaLnBrk="1" hangingPunct="1">
+              <a:defRPr>
+                <a:solidFill>
+                  <a:schemeClr val="tx2"/>
+                </a:solidFill>
+              </a:defRPr>
+            </a:lvl3pPr>
+            <a:lvl4pPr eaLnBrk="1" hangingPunct="1">
+              <a:defRPr>
+                <a:solidFill>
+                  <a:schemeClr val="tx2"/>
+                </a:solidFill>
+              </a:defRPr>
+            </a:lvl4pPr>
+            <a:lvl5pPr eaLnBrk="1" hangingPunct="1">
+              <a:defRPr>
+                <a:solidFill>
+                  <a:schemeClr val="tx2"/>
+                </a:solidFill>
+              </a:defRPr>
+            </a:lvl5pPr>
+            <a:lvl6pPr eaLnBrk="1" hangingPunct="1">
+              <a:defRPr>
+                <a:solidFill>
+                  <a:schemeClr val="tx2"/>
+                </a:solidFill>
+              </a:defRPr>
+            </a:lvl6pPr>
+            <a:lvl7pPr eaLnBrk="1" hangingPunct="1">
+              <a:defRPr>
+                <a:solidFill>
+                  <a:schemeClr val="tx2"/>
+                </a:solidFill>
+              </a:defRPr>
+            </a:lvl7pPr>
+            <a:lvl8pPr eaLnBrk="1" hangingPunct="1">
+              <a:defRPr>
+                <a:solidFill>
+                  <a:schemeClr val="tx2"/>
+                </a:solidFill>
+              </a:defRPr>
+            </a:lvl8pPr>
+            <a:lvl9pPr eaLnBrk="1" hangingPunct="1">
+              <a:defRPr>
+                <a:solidFill>
+                  <a:schemeClr val="tx2"/>
+                </a:solidFill>
+              </a:defRPr>
+            </a:lvl9pPr>
+          </a:lstStyle>
           <a:p>
             <a:r>
               <a:rPr lang="en-US" dirty="0"/>
@@ -8433,7 +8512,7 @@
       </p:sp>
       <p:sp>
         <p:nvSpPr>
-          <p:cNvPr id="3" name="Content Placeholder 2">
+          <p:cNvPr id="11" name="Content Placeholder 2">
             <a:extLst>
               <a:ext uri="{FF2B5EF4-FFF2-40B4-BE49-F238E27FC236}">
                 <a16:creationId xmlns:a16="http://schemas.microsoft.com/office/drawing/2014/main" id="{903B2701-2AEC-CB78-3C90-07AF349EA07E}"/>
@@ -8443,16 +8522,248 @@
           <p:cNvSpPr>
             <a:spLocks noGrp="1"/>
           </p:cNvSpPr>
-          <p:nvPr>
-            <p:ph idx="1"/>
-          </p:nvPr>
-        </p:nvSpPr>
-        <p:spPr/>
-        <p:txBody>
-          <a:bodyPr>
-            <a:normAutofit fontScale="77500" lnSpcReduction="20000"/>
+          <p:nvPr/>
+        </p:nvSpPr>
+        <p:spPr>
+          <a:xfrm>
+            <a:off x="722294" y="1631731"/>
+            <a:ext cx="9044735" cy="4330262"/>
+          </a:xfrm>
+          <a:prstGeom prst="rect">
+            <a:avLst/>
+          </a:prstGeom>
+        </p:spPr>
+        <p:txBody>
+          <a:bodyPr vert="horz" lIns="91440" tIns="45720" rIns="91440" bIns="45720" rtlCol="0">
+            <a:normAutofit fontScale="85000" lnSpcReduction="20000"/>
           </a:bodyPr>
-          <a:lstStyle/>
+          <a:lstStyle>
+            <a:lvl1pPr marL="342900" indent="-342900" algn="l" defTabSz="457200" rtl="0" eaLnBrk="1" latinLnBrk="0" hangingPunct="1">
+              <a:spcBef>
+                <a:spcPts val="1000"/>
+              </a:spcBef>
+              <a:spcAft>
+                <a:spcPts val="0"/>
+              </a:spcAft>
+              <a:buClr>
+                <a:schemeClr val="accent1"/>
+              </a:buClr>
+              <a:buSzPct val="80000"/>
+              <a:buFont typeface="Wingdings 3" charset="2"/>
+              <a:buChar char=""/>
+              <a:defRPr sz="1800" kern="1200">
+                <a:solidFill>
+                  <a:schemeClr val="tx1">
+                    <a:lumMod val="75000"/>
+                    <a:lumOff val="25000"/>
+                  </a:schemeClr>
+                </a:solidFill>
+                <a:latin typeface="+mn-lt"/>
+                <a:ea typeface="+mn-ea"/>
+                <a:cs typeface="+mn-cs"/>
+              </a:defRPr>
+            </a:lvl1pPr>
+            <a:lvl2pPr marL="742950" indent="-285750" algn="l" defTabSz="457200" rtl="0" eaLnBrk="1" latinLnBrk="0" hangingPunct="1">
+              <a:spcBef>
+                <a:spcPts val="1000"/>
+              </a:spcBef>
+              <a:spcAft>
+                <a:spcPts val="0"/>
+              </a:spcAft>
+              <a:buClr>
+                <a:schemeClr val="accent1"/>
+              </a:buClr>
+              <a:buSzPct val="80000"/>
+              <a:buFont typeface="Wingdings 3" charset="2"/>
+              <a:buChar char=""/>
+              <a:defRPr sz="1600" kern="1200">
+                <a:solidFill>
+                  <a:schemeClr val="tx1">
+                    <a:lumMod val="75000"/>
+                    <a:lumOff val="25000"/>
+                  </a:schemeClr>
+                </a:solidFill>
+                <a:latin typeface="+mn-lt"/>
+                <a:ea typeface="+mn-ea"/>
+                <a:cs typeface="+mn-cs"/>
+              </a:defRPr>
+            </a:lvl2pPr>
+            <a:lvl3pPr marL="1143000" indent="-228600" algn="l" defTabSz="457200" rtl="0" eaLnBrk="1" latinLnBrk="0" hangingPunct="1">
+              <a:spcBef>
+                <a:spcPts val="1000"/>
+              </a:spcBef>
+              <a:spcAft>
+                <a:spcPts val="0"/>
+              </a:spcAft>
+              <a:buClr>
+                <a:schemeClr val="accent1"/>
+              </a:buClr>
+              <a:buSzPct val="80000"/>
+              <a:buFont typeface="Wingdings 3" charset="2"/>
+              <a:buChar char=""/>
+              <a:defRPr sz="1400" kern="1200">
+                <a:solidFill>
+                  <a:schemeClr val="tx1">
+                    <a:lumMod val="75000"/>
+                    <a:lumOff val="25000"/>
+                  </a:schemeClr>
+                </a:solidFill>
+                <a:latin typeface="+mn-lt"/>
+                <a:ea typeface="+mn-ea"/>
+                <a:cs typeface="+mn-cs"/>
+              </a:defRPr>
+            </a:lvl3pPr>
+            <a:lvl4pPr marL="1600200" indent="-228600" algn="l" defTabSz="457200" rtl="0" eaLnBrk="1" latinLnBrk="0" hangingPunct="1">
+              <a:spcBef>
+                <a:spcPts val="1000"/>
+              </a:spcBef>
+              <a:spcAft>
+                <a:spcPts val="0"/>
+              </a:spcAft>
+              <a:buClr>
+                <a:schemeClr val="accent1"/>
+              </a:buClr>
+              <a:buSzPct val="80000"/>
+              <a:buFont typeface="Wingdings 3" charset="2"/>
+              <a:buChar char=""/>
+              <a:defRPr sz="1200" kern="1200">
+                <a:solidFill>
+                  <a:schemeClr val="tx1">
+                    <a:lumMod val="75000"/>
+                    <a:lumOff val="25000"/>
+                  </a:schemeClr>
+                </a:solidFill>
+                <a:latin typeface="+mn-lt"/>
+                <a:ea typeface="+mn-ea"/>
+                <a:cs typeface="+mn-cs"/>
+              </a:defRPr>
+            </a:lvl4pPr>
+            <a:lvl5pPr marL="2057400" indent="-228600" algn="l" defTabSz="457200" rtl="0" eaLnBrk="1" latinLnBrk="0" hangingPunct="1">
+              <a:spcBef>
+                <a:spcPts val="1000"/>
+              </a:spcBef>
+              <a:spcAft>
+                <a:spcPts val="0"/>
+              </a:spcAft>
+              <a:buClr>
+                <a:schemeClr val="accent1"/>
+              </a:buClr>
+              <a:buSzPct val="80000"/>
+              <a:buFont typeface="Wingdings 3" charset="2"/>
+              <a:buChar char=""/>
+              <a:defRPr sz="1200" kern="1200">
+                <a:solidFill>
+                  <a:schemeClr val="tx1">
+                    <a:lumMod val="75000"/>
+                    <a:lumOff val="25000"/>
+                  </a:schemeClr>
+                </a:solidFill>
+                <a:latin typeface="+mn-lt"/>
+                <a:ea typeface="+mn-ea"/>
+                <a:cs typeface="+mn-cs"/>
+              </a:defRPr>
+            </a:lvl5pPr>
+            <a:lvl6pPr marL="2514600" indent="-228600" algn="l" defTabSz="457200" rtl="0" eaLnBrk="1" latinLnBrk="0" hangingPunct="1">
+              <a:spcBef>
+                <a:spcPts val="1000"/>
+              </a:spcBef>
+              <a:spcAft>
+                <a:spcPts val="0"/>
+              </a:spcAft>
+              <a:buClr>
+                <a:schemeClr val="accent1"/>
+              </a:buClr>
+              <a:buSzPct val="80000"/>
+              <a:buFont typeface="Wingdings 3" charset="2"/>
+              <a:buChar char=""/>
+              <a:defRPr sz="1200" kern="1200">
+                <a:solidFill>
+                  <a:schemeClr val="tx1">
+                    <a:lumMod val="75000"/>
+                    <a:lumOff val="25000"/>
+                  </a:schemeClr>
+                </a:solidFill>
+                <a:latin typeface="+mn-lt"/>
+                <a:ea typeface="+mn-ea"/>
+                <a:cs typeface="+mn-cs"/>
+              </a:defRPr>
+            </a:lvl6pPr>
+            <a:lvl7pPr marL="2971800" indent="-228600" algn="l" defTabSz="457200" rtl="0" eaLnBrk="1" latinLnBrk="0" hangingPunct="1">
+              <a:spcBef>
+                <a:spcPts val="1000"/>
+              </a:spcBef>
+              <a:spcAft>
+                <a:spcPts val="0"/>
+              </a:spcAft>
+              <a:buClr>
+                <a:schemeClr val="accent1"/>
+              </a:buClr>
+              <a:buSzPct val="80000"/>
+              <a:buFont typeface="Wingdings 3" charset="2"/>
+              <a:buChar char=""/>
+              <a:defRPr sz="1200" kern="1200">
+                <a:solidFill>
+                  <a:schemeClr val="tx1">
+                    <a:lumMod val="75000"/>
+                    <a:lumOff val="25000"/>
+                  </a:schemeClr>
+                </a:solidFill>
+                <a:latin typeface="+mn-lt"/>
+                <a:ea typeface="+mn-ea"/>
+                <a:cs typeface="+mn-cs"/>
+              </a:defRPr>
+            </a:lvl7pPr>
+            <a:lvl8pPr marL="3429000" indent="-228600" algn="l" defTabSz="457200" rtl="0" eaLnBrk="1" latinLnBrk="0" hangingPunct="1">
+              <a:spcBef>
+                <a:spcPts val="1000"/>
+              </a:spcBef>
+              <a:spcAft>
+                <a:spcPts val="0"/>
+              </a:spcAft>
+              <a:buClr>
+                <a:schemeClr val="accent1"/>
+              </a:buClr>
+              <a:buSzPct val="80000"/>
+              <a:buFont typeface="Wingdings 3" charset="2"/>
+              <a:buChar char=""/>
+              <a:defRPr sz="1200" kern="1200">
+                <a:solidFill>
+                  <a:schemeClr val="tx1">
+                    <a:lumMod val="75000"/>
+                    <a:lumOff val="25000"/>
+                  </a:schemeClr>
+                </a:solidFill>
+                <a:latin typeface="+mn-lt"/>
+                <a:ea typeface="+mn-ea"/>
+                <a:cs typeface="+mn-cs"/>
+              </a:defRPr>
+            </a:lvl8pPr>
+            <a:lvl9pPr marL="3886200" indent="-228600" algn="l" defTabSz="457200" rtl="0" eaLnBrk="1" latinLnBrk="0" hangingPunct="1">
+              <a:spcBef>
+                <a:spcPts val="1000"/>
+              </a:spcBef>
+              <a:spcAft>
+                <a:spcPts val="0"/>
+              </a:spcAft>
+              <a:buClr>
+                <a:schemeClr val="accent1"/>
+              </a:buClr>
+              <a:buSzPct val="80000"/>
+              <a:buFont typeface="Wingdings 3" charset="2"/>
+              <a:buChar char=""/>
+              <a:defRPr sz="1200" kern="1200">
+                <a:solidFill>
+                  <a:schemeClr val="tx1">
+                    <a:lumMod val="75000"/>
+                    <a:lumOff val="25000"/>
+                  </a:schemeClr>
+                </a:solidFill>
+                <a:latin typeface="+mn-lt"/>
+                <a:ea typeface="+mn-ea"/>
+                <a:cs typeface="+mn-cs"/>
+              </a:defRPr>
+            </a:lvl9pPr>
+          </a:lstStyle>
           <a:p>
             <a:r>
               <a:rPr lang="en-US" dirty="0"/>
@@ -8474,21 +8785,17 @@
             </a:r>
           </a:p>
           <a:p>
-            <a:pPr marL="457200" lvl="1" indent="0">
-              <a:buNone/>
-            </a:pPr>
+            <a:pPr lvl="1"/>
             <a:r>
               <a:rPr lang="en-US" dirty="0"/>
               <a:t>Study specific artists’ data entries more specifically in comparison to the population</a:t>
             </a:r>
           </a:p>
           <a:p>
-            <a:pPr marL="457200" lvl="1" indent="0">
-              <a:buNone/>
-            </a:pPr>
+            <a:pPr lvl="2"/>
             <a:r>
               <a:rPr lang="en-US" dirty="0"/>
-              <a:t>	Example: Fully analyze all Taylor Swift or the </a:t>
+              <a:t>Example: Fully analyze all Taylor Swift or the </a:t>
             </a:r>
             <a:r>
               <a:rPr lang="en-US" dirty="0" err="1"/>
@@ -8500,6 +8807,27 @@
             </a:r>
           </a:p>
           <a:p>
+            <a:pPr lvl="1"/>
+            <a:r>
+              <a:rPr lang="en-US" dirty="0"/>
+              <a:t>Further Analysis of Tempo Selection Normal Distribution</a:t>
+            </a:r>
+          </a:p>
+          <a:p>
+            <a:pPr lvl="2"/>
+            <a:r>
+              <a:rPr lang="en-US" dirty="0"/>
+              <a:t>Study songs outside the standard deviations and how they compare in popularity</a:t>
+            </a:r>
+          </a:p>
+          <a:p>
+            <a:pPr lvl="2"/>
+            <a:r>
+              <a:rPr lang="en-US" dirty="0"/>
+              <a:t>Cross reference to most popular artists/songs</a:t>
+            </a:r>
+          </a:p>
+          <a:p>
             <a:pPr marL="457200" lvl="1" indent="0">
               <a:buNone/>
             </a:pPr>
@@ -8536,7 +8864,7 @@
             <a:pPr lvl="2"/>
             <a:r>
               <a:rPr lang="en-US" dirty="0"/>
-              <a:t>Cannot correlate song choices to activities</a:t>
+              <a:t>Qualitative data and/or user surveys could be helpful in this case</a:t>
             </a:r>
           </a:p>
           <a:p>
@@ -8544,13 +8872,6 @@
             <a:r>
               <a:rPr lang="en-US" dirty="0"/>
               <a:t>This leads to assumptions of why certain characteristics are more popular than others</a:t>
-            </a:r>
-          </a:p>
-          <a:p>
-            <a:pPr lvl="2"/>
-            <a:r>
-              <a:rPr lang="en-US" dirty="0"/>
-              <a:t>Qualitative data and/or user surveys could be helpful in this case</a:t>
             </a:r>
           </a:p>
         </p:txBody>

</xml_diff>

<commit_message>
ppt in 2 spots
</commit_message>
<xml_diff>
--- a/Project_1_Spotify_2023_Analysis.pptx
+++ b/Project_1_Spotify_2023_Analysis.pptx
@@ -7,15 +7,20 @@
   <p:sldIdLst>
     <p:sldId id="256" r:id="rId2"/>
     <p:sldId id="257" r:id="rId3"/>
-    <p:sldId id="259" r:id="rId4"/>
-    <p:sldId id="260" r:id="rId5"/>
-    <p:sldId id="261" r:id="rId6"/>
-    <p:sldId id="262" r:id="rId7"/>
-    <p:sldId id="263" r:id="rId8"/>
-    <p:sldId id="264" r:id="rId9"/>
-    <p:sldId id="265" r:id="rId10"/>
-    <p:sldId id="266" r:id="rId11"/>
-    <p:sldId id="267" r:id="rId12"/>
+    <p:sldId id="268" r:id="rId4"/>
+    <p:sldId id="269" r:id="rId5"/>
+    <p:sldId id="258" r:id="rId6"/>
+    <p:sldId id="270" r:id="rId7"/>
+    <p:sldId id="271" r:id="rId8"/>
+    <p:sldId id="272" r:id="rId9"/>
+    <p:sldId id="260" r:id="rId10"/>
+    <p:sldId id="261" r:id="rId11"/>
+    <p:sldId id="262" r:id="rId12"/>
+    <p:sldId id="263" r:id="rId13"/>
+    <p:sldId id="264" r:id="rId14"/>
+    <p:sldId id="265" r:id="rId15"/>
+    <p:sldId id="266" r:id="rId16"/>
+    <p:sldId id="267" r:id="rId17"/>
   </p:sldIdLst>
   <p:sldSz cx="12192000" cy="6858000"/>
   <p:notesSz cx="6858000" cy="9144000"/>
@@ -844,7 +849,7 @@
           <a:p>
             <a:fld id="{F24EF5F4-8F03-4ABB-88B3-7880A17E3B42}" type="datetimeFigureOut">
               <a:rPr lang="en-US" smtClean="0"/>
-              <a:t>2/13/2024</a:t>
+              <a:t>2/14/2024</a:t>
             </a:fld>
             <a:endParaRPr lang="en-US"/>
           </a:p>
@@ -1095,7 +1100,7 @@
           <a:p>
             <a:fld id="{F24EF5F4-8F03-4ABB-88B3-7880A17E3B42}" type="datetimeFigureOut">
               <a:rPr lang="en-US" smtClean="0"/>
-              <a:t>2/13/2024</a:t>
+              <a:t>2/14/2024</a:t>
             </a:fld>
             <a:endParaRPr lang="en-US"/>
           </a:p>
@@ -1409,7 +1414,7 @@
           <a:p>
             <a:fld id="{F24EF5F4-8F03-4ABB-88B3-7880A17E3B42}" type="datetimeFigureOut">
               <a:rPr lang="en-US" smtClean="0"/>
-              <a:t>2/13/2024</a:t>
+              <a:t>2/14/2024</a:t>
             </a:fld>
             <a:endParaRPr lang="en-US"/>
           </a:p>
@@ -1750,7 +1755,7 @@
           <a:p>
             <a:fld id="{F24EF5F4-8F03-4ABB-88B3-7880A17E3B42}" type="datetimeFigureOut">
               <a:rPr lang="en-US" smtClean="0"/>
-              <a:t>2/13/2024</a:t>
+              <a:t>2/14/2024</a:t>
             </a:fld>
             <a:endParaRPr lang="en-US"/>
           </a:p>
@@ -2064,7 +2069,7 @@
           <a:p>
             <a:fld id="{F24EF5F4-8F03-4ABB-88B3-7880A17E3B42}" type="datetimeFigureOut">
               <a:rPr lang="en-US" smtClean="0"/>
-              <a:t>2/13/2024</a:t>
+              <a:t>2/14/2024</a:t>
             </a:fld>
             <a:endParaRPr lang="en-US"/>
           </a:p>
@@ -2457,7 +2462,7 @@
           <a:p>
             <a:fld id="{F24EF5F4-8F03-4ABB-88B3-7880A17E3B42}" type="datetimeFigureOut">
               <a:rPr lang="en-US" smtClean="0"/>
-              <a:t>2/13/2024</a:t>
+              <a:t>2/14/2024</a:t>
             </a:fld>
             <a:endParaRPr lang="en-US"/>
           </a:p>
@@ -2627,7 +2632,7 @@
           <a:p>
             <a:fld id="{F24EF5F4-8F03-4ABB-88B3-7880A17E3B42}" type="datetimeFigureOut">
               <a:rPr lang="en-US" smtClean="0"/>
-              <a:t>2/13/2024</a:t>
+              <a:t>2/14/2024</a:t>
             </a:fld>
             <a:endParaRPr lang="en-US"/>
           </a:p>
@@ -2807,7 +2812,7 @@
           <a:p>
             <a:fld id="{F24EF5F4-8F03-4ABB-88B3-7880A17E3B42}" type="datetimeFigureOut">
               <a:rPr lang="en-US" smtClean="0"/>
-              <a:t>2/13/2024</a:t>
+              <a:t>2/14/2024</a:t>
             </a:fld>
             <a:endParaRPr lang="en-US"/>
           </a:p>
@@ -2983,7 +2988,7 @@
           <a:p>
             <a:fld id="{F24EF5F4-8F03-4ABB-88B3-7880A17E3B42}" type="datetimeFigureOut">
               <a:rPr lang="en-US" smtClean="0"/>
-              <a:t>2/13/2024</a:t>
+              <a:t>2/14/2024</a:t>
             </a:fld>
             <a:endParaRPr lang="en-US"/>
           </a:p>
@@ -3230,7 +3235,7 @@
           <a:p>
             <a:fld id="{F24EF5F4-8F03-4ABB-88B3-7880A17E3B42}" type="datetimeFigureOut">
               <a:rPr lang="en-US" smtClean="0"/>
-              <a:t>2/13/2024</a:t>
+              <a:t>2/14/2024</a:t>
             </a:fld>
             <a:endParaRPr lang="en-US"/>
           </a:p>
@@ -3462,7 +3467,7 @@
           <a:p>
             <a:fld id="{F24EF5F4-8F03-4ABB-88B3-7880A17E3B42}" type="datetimeFigureOut">
               <a:rPr lang="en-US" smtClean="0"/>
-              <a:t>2/13/2024</a:t>
+              <a:t>2/14/2024</a:t>
             </a:fld>
             <a:endParaRPr lang="en-US"/>
           </a:p>
@@ -3836,7 +3841,7 @@
           <a:p>
             <a:fld id="{F24EF5F4-8F03-4ABB-88B3-7880A17E3B42}" type="datetimeFigureOut">
               <a:rPr lang="en-US" smtClean="0"/>
-              <a:t>2/13/2024</a:t>
+              <a:t>2/14/2024</a:t>
             </a:fld>
             <a:endParaRPr lang="en-US"/>
           </a:p>
@@ -3959,7 +3964,7 @@
           <a:p>
             <a:fld id="{F24EF5F4-8F03-4ABB-88B3-7880A17E3B42}" type="datetimeFigureOut">
               <a:rPr lang="en-US" smtClean="0"/>
-              <a:t>2/13/2024</a:t>
+              <a:t>2/14/2024</a:t>
             </a:fld>
             <a:endParaRPr lang="en-US"/>
           </a:p>
@@ -4054,7 +4059,7 @@
           <a:p>
             <a:fld id="{F24EF5F4-8F03-4ABB-88B3-7880A17E3B42}" type="datetimeFigureOut">
               <a:rPr lang="en-US" smtClean="0"/>
-              <a:t>2/13/2024</a:t>
+              <a:t>2/14/2024</a:t>
             </a:fld>
             <a:endParaRPr lang="en-US"/>
           </a:p>
@@ -4309,7 +4314,7 @@
           <a:p>
             <a:fld id="{F24EF5F4-8F03-4ABB-88B3-7880A17E3B42}" type="datetimeFigureOut">
               <a:rPr lang="en-US" smtClean="0"/>
-              <a:t>2/13/2024</a:t>
+              <a:t>2/14/2024</a:t>
             </a:fld>
             <a:endParaRPr lang="en-US"/>
           </a:p>
@@ -4572,7 +4577,7 @@
           <a:p>
             <a:fld id="{F24EF5F4-8F03-4ABB-88B3-7880A17E3B42}" type="datetimeFigureOut">
               <a:rPr lang="en-US" smtClean="0"/>
-              <a:t>2/13/2024</a:t>
+              <a:t>2/14/2024</a:t>
             </a:fld>
             <a:endParaRPr lang="en-US"/>
           </a:p>
@@ -5315,7 +5320,7 @@
           <a:p>
             <a:fld id="{F24EF5F4-8F03-4ABB-88B3-7880A17E3B42}" type="datetimeFigureOut">
               <a:rPr lang="en-US" smtClean="0"/>
-              <a:t>2/13/2024</a:t>
+              <a:t>2/14/2024</a:t>
             </a:fld>
             <a:endParaRPr lang="en-US"/>
           </a:p>
@@ -5951,7 +5956,7 @@
           <p:cNvPr id="2" name="Title 1">
             <a:extLst>
               <a:ext uri="{FF2B5EF4-FFF2-40B4-BE49-F238E27FC236}">
-                <a16:creationId xmlns:a16="http://schemas.microsoft.com/office/drawing/2014/main" id="{D80C9E53-14B0-BF06-F809-B221E06FB08C}"/>
+                <a16:creationId xmlns:a16="http://schemas.microsoft.com/office/drawing/2014/main" id="{1B24E665-5B89-EB78-C0E2-7832422881BA}"/>
               </a:ext>
             </a:extLst>
           </p:cNvPr>
@@ -5969,78 +5974,193 @@
           <a:p>
             <a:r>
               <a:rPr lang="en-US" dirty="0"/>
-              <a:t>Characteristics - Takeaways</a:t>
-            </a:r>
-          </a:p>
-        </p:txBody>
-      </p:sp>
-      <p:sp>
-        <p:nvSpPr>
-          <p:cNvPr id="3" name="Content Placeholder 2">
+              <a:t>Song Speeds (BPM – Beats Per Minute)</a:t>
+            </a:r>
+          </a:p>
+        </p:txBody>
+      </p:sp>
+      <p:sp>
+        <p:nvSpPr>
+          <p:cNvPr id="6" name="TextBox 5">
             <a:extLst>
               <a:ext uri="{FF2B5EF4-FFF2-40B4-BE49-F238E27FC236}">
-                <a16:creationId xmlns:a16="http://schemas.microsoft.com/office/drawing/2014/main" id="{BF18E217-5ED2-6D7F-FD5E-8526F56CE97C}"/>
+                <a16:creationId xmlns:a16="http://schemas.microsoft.com/office/drawing/2014/main" id="{642D8BB6-B6BA-F68E-72A4-85A48931554D}"/>
               </a:ext>
             </a:extLst>
           </p:cNvPr>
-          <p:cNvSpPr>
-            <a:spLocks noGrp="1"/>
-          </p:cNvSpPr>
+          <p:cNvSpPr txBox="1"/>
+          <p:nvPr/>
+        </p:nvSpPr>
+        <p:spPr>
+          <a:xfrm>
+            <a:off x="7956331" y="1690688"/>
+            <a:ext cx="4056994" cy="4524315"/>
+          </a:xfrm>
+          <a:prstGeom prst="rect">
+            <a:avLst/>
+          </a:prstGeom>
+          <a:noFill/>
+        </p:spPr>
+        <p:txBody>
+          <a:bodyPr wrap="square" rtlCol="0">
+            <a:spAutoFit/>
+          </a:bodyPr>
+          <a:lstStyle/>
+          <a:p>
+            <a:pPr marL="285750" indent="-285750">
+              <a:buFont typeface="Arial" panose="020B0604020202020204" pitchFamily="34" charset="0"/>
+              <a:buChar char="•"/>
+            </a:pPr>
+            <a:r>
+              <a:rPr lang="en-US" dirty="0"/>
+              <a:t>The Top 20 Artist sample is very similar in structure to the data population.</a:t>
+            </a:r>
+          </a:p>
+          <a:p>
+            <a:pPr marL="285750" indent="-285750">
+              <a:buFont typeface="Arial" panose="020B0604020202020204" pitchFamily="34" charset="0"/>
+              <a:buChar char="•"/>
+            </a:pPr>
+            <a:endParaRPr lang="en-US" dirty="0"/>
+          </a:p>
+          <a:p>
+            <a:pPr marL="285750" indent="-285750">
+              <a:buFont typeface="Arial" panose="020B0604020202020204" pitchFamily="34" charset="0"/>
+              <a:buChar char="•"/>
+            </a:pPr>
+            <a:r>
+              <a:rPr lang="en-US" dirty="0"/>
+              <a:t>The median BPM for the sample (120bpm) is extremely close to the median BPM of the population (121bpm).</a:t>
+            </a:r>
+          </a:p>
+          <a:p>
+            <a:pPr marL="285750" indent="-285750">
+              <a:buFont typeface="Arial" panose="020B0604020202020204" pitchFamily="34" charset="0"/>
+              <a:buChar char="•"/>
+            </a:pPr>
+            <a:endParaRPr lang="en-US" dirty="0"/>
+          </a:p>
+          <a:p>
+            <a:pPr marL="285750" indent="-285750">
+              <a:buFont typeface="Arial" panose="020B0604020202020204" pitchFamily="34" charset="0"/>
+              <a:buChar char="•"/>
+            </a:pPr>
+            <a:r>
+              <a:rPr lang="en-US" dirty="0"/>
+              <a:t>The mode for Top Artists is considerably lower</a:t>
+            </a:r>
+          </a:p>
+          <a:p>
+            <a:pPr marL="742950" lvl="1" indent="-285750">
+              <a:buFont typeface="Arial" panose="020B0604020202020204" pitchFamily="34" charset="0"/>
+              <a:buChar char="•"/>
+            </a:pPr>
+            <a:r>
+              <a:rPr lang="en-US" dirty="0"/>
+              <a:t>Top Artists Mode: 90bpm, 7 songs (2.7% of songs in sample)</a:t>
+            </a:r>
+          </a:p>
+          <a:p>
+            <a:pPr marL="742950" lvl="1" indent="-285750">
+              <a:buFont typeface="Arial" panose="020B0604020202020204" pitchFamily="34" charset="0"/>
+              <a:buChar char="•"/>
+            </a:pPr>
+            <a:endParaRPr lang="en-US" dirty="0"/>
+          </a:p>
+          <a:p>
+            <a:pPr marL="742950" lvl="1" indent="-285750">
+              <a:buFont typeface="Arial" panose="020B0604020202020204" pitchFamily="34" charset="0"/>
+              <a:buChar char="•"/>
+            </a:pPr>
+            <a:r>
+              <a:rPr lang="en-US" dirty="0"/>
+              <a:t>All Songs: 120bpm, 34 songs (3.6% of songs in population)</a:t>
+            </a:r>
+          </a:p>
+        </p:txBody>
+      </p:sp>
+      <p:pic>
+        <p:nvPicPr>
+          <p:cNvPr id="8" name="Content Placeholder 7">
+            <a:extLst>
+              <a:ext uri="{FF2B5EF4-FFF2-40B4-BE49-F238E27FC236}">
+                <a16:creationId xmlns:a16="http://schemas.microsoft.com/office/drawing/2014/main" id="{04D86521-6FBA-DB49-BD3C-CAC4A64E1817}"/>
+              </a:ext>
+            </a:extLst>
+          </p:cNvPr>
+          <p:cNvPicPr>
+            <a:picLocks noGrp="1" noChangeAspect="1"/>
+          </p:cNvPicPr>
           <p:nvPr>
             <p:ph idx="1"/>
           </p:nvPr>
-        </p:nvSpPr>
-        <p:spPr/>
-        <p:txBody>
-          <a:bodyPr/>
-          <a:lstStyle/>
-          <a:p>
-            <a:r>
-              <a:rPr lang="en-US" dirty="0"/>
-              <a:t>The average song listeners streamed most in 2023 was energetic and danceable, often featuring positive vibes and a major modality.</a:t>
-            </a:r>
-          </a:p>
-          <a:p>
-            <a:r>
-              <a:rPr lang="en-US" dirty="0"/>
-              <a:t>The average song hovered around 120bpm, which is 2 beats per second – a very comfortable tempo for dancing, without being too demanding.</a:t>
-            </a:r>
-          </a:p>
-          <a:p>
-            <a:r>
-              <a:rPr lang="en-US" dirty="0"/>
-              <a:t>Top artists’ songs had a little more leeway from the median average, but generally fell in line with the population data.</a:t>
-            </a:r>
-          </a:p>
-          <a:p>
-            <a:pPr lvl="1"/>
-            <a:r>
-              <a:rPr lang="en-US" dirty="0"/>
-              <a:t>The most streamed artists may highlight these characteristics, as they captured over a 1/3</a:t>
-            </a:r>
-            <a:r>
-              <a:rPr lang="en-US" baseline="30000" dirty="0"/>
-              <a:t>rd</a:t>
-            </a:r>
-            <a:r>
-              <a:rPr lang="en-US" dirty="0"/>
-              <a:t> of total streams while making up roughly 1/4</a:t>
-            </a:r>
-            <a:r>
-              <a:rPr lang="en-US" baseline="30000" dirty="0"/>
-              <a:t>th</a:t>
-            </a:r>
-            <a:r>
-              <a:rPr lang="en-US" dirty="0"/>
-              <a:t> of the data entries.</a:t>
-            </a:r>
+        </p:nvPicPr>
+        <p:blipFill>
+          <a:blip r:embed="rId2">
+            <a:extLst>
+              <a:ext uri="{28A0092B-C50C-407E-A947-70E740481C1C}">
+                <a14:useLocalDpi xmlns:a14="http://schemas.microsoft.com/office/drawing/2010/main" val="0"/>
+              </a:ext>
+            </a:extLst>
+          </a:blip>
+          <a:stretch>
+            <a:fillRect/>
+          </a:stretch>
+        </p:blipFill>
+        <p:spPr>
+          <a:xfrm>
+            <a:off x="677334" y="1331467"/>
+            <a:ext cx="6555910" cy="4916933"/>
+          </a:xfrm>
+        </p:spPr>
+      </p:pic>
+      <p:sp>
+        <p:nvSpPr>
+          <p:cNvPr id="9" name="TextBox 8">
+            <a:extLst>
+              <a:ext uri="{FF2B5EF4-FFF2-40B4-BE49-F238E27FC236}">
+                <a16:creationId xmlns:a16="http://schemas.microsoft.com/office/drawing/2014/main" id="{1B766D9F-F1B3-8EE3-B481-5F93AE61601E}"/>
+              </a:ext>
+            </a:extLst>
+          </p:cNvPr>
+          <p:cNvSpPr txBox="1"/>
+          <p:nvPr/>
+        </p:nvSpPr>
+        <p:spPr>
+          <a:xfrm>
+            <a:off x="1075058" y="6248400"/>
+            <a:ext cx="7178565" cy="276999"/>
+          </a:xfrm>
+          <a:prstGeom prst="rect">
+            <a:avLst/>
+          </a:prstGeom>
+          <a:noFill/>
+        </p:spPr>
+        <p:txBody>
+          <a:bodyPr wrap="square" rtlCol="0">
+            <a:spAutoFit/>
+          </a:bodyPr>
+          <a:lstStyle/>
+          <a:p>
+            <a:r>
+              <a:rPr lang="en-US" sz="1200" b="0" i="0" dirty="0">
+                <a:effectLst/>
+                <a:ea typeface="Calibri" panose="020F0502020204030204" pitchFamily="34" charset="0"/>
+                <a:cs typeface="Calibri" panose="020F0502020204030204" pitchFamily="34" charset="0"/>
+              </a:rPr>
+              <a:t>Standard Deviation of tempos: 37.462117528776375. p-value=3.927199818891401e-06)</a:t>
+            </a:r>
+            <a:endParaRPr lang="en-US" sz="1200" dirty="0">
+              <a:ea typeface="Calibri" panose="020F0502020204030204" pitchFamily="34" charset="0"/>
+              <a:cs typeface="Calibri" panose="020F0502020204030204" pitchFamily="34" charset="0"/>
+            </a:endParaRPr>
           </a:p>
         </p:txBody>
       </p:sp>
     </p:spTree>
     <p:extLst>
       <p:ext uri="{BB962C8B-B14F-4D97-AF65-F5344CB8AC3E}">
-        <p14:creationId xmlns:p14="http://schemas.microsoft.com/office/powerpoint/2010/main" val="4061737574"/>
+        <p14:creationId xmlns:p14="http://schemas.microsoft.com/office/powerpoint/2010/main" val="1136602678"/>
       </p:ext>
     </p:extLst>
   </p:cSld>
@@ -6072,791 +6192,6 @@
           <p:cNvPr id="2" name="Title 1">
             <a:extLst>
               <a:ext uri="{FF2B5EF4-FFF2-40B4-BE49-F238E27FC236}">
-                <a16:creationId xmlns:a16="http://schemas.microsoft.com/office/drawing/2014/main" id="{3F7EFF7F-C277-D600-91A7-5605A64BF3BA}"/>
-              </a:ext>
-            </a:extLst>
-          </p:cNvPr>
-          <p:cNvSpPr>
-            <a:spLocks noGrp="1"/>
-          </p:cNvSpPr>
-          <p:nvPr>
-            <p:ph type="title"/>
-          </p:nvPr>
-        </p:nvSpPr>
-        <p:spPr/>
-        <p:txBody>
-          <a:bodyPr/>
-          <a:lstStyle/>
-          <a:p>
-            <a:r>
-              <a:rPr lang="en-US" dirty="0"/>
-              <a:t>Next Steps and Limitations</a:t>
-            </a:r>
-          </a:p>
-        </p:txBody>
-      </p:sp>
-      <p:sp>
-        <p:nvSpPr>
-          <p:cNvPr id="3" name="Content Placeholder 2">
-            <a:extLst>
-              <a:ext uri="{FF2B5EF4-FFF2-40B4-BE49-F238E27FC236}">
-                <a16:creationId xmlns:a16="http://schemas.microsoft.com/office/drawing/2014/main" id="{903B2701-2AEC-CB78-3C90-07AF349EA07E}"/>
-              </a:ext>
-            </a:extLst>
-          </p:cNvPr>
-          <p:cNvSpPr>
-            <a:spLocks noGrp="1"/>
-          </p:cNvSpPr>
-          <p:nvPr>
-            <p:ph idx="1"/>
-          </p:nvPr>
-        </p:nvSpPr>
-        <p:spPr/>
-        <p:txBody>
-          <a:bodyPr>
-            <a:normAutofit fontScale="77500" lnSpcReduction="20000"/>
-          </a:bodyPr>
-          <a:lstStyle/>
-          <a:p>
-            <a:r>
-              <a:rPr lang="en-US" dirty="0"/>
-              <a:t>Next Steps for Characteristics</a:t>
-            </a:r>
-          </a:p>
-          <a:p>
-            <a:pPr lvl="1"/>
-            <a:r>
-              <a:rPr lang="en-US" dirty="0"/>
-              <a:t>Consider focusing on slices of data to study variations in median</a:t>
-            </a:r>
-          </a:p>
-          <a:p>
-            <a:pPr lvl="2"/>
-            <a:r>
-              <a:rPr lang="en-US" dirty="0"/>
-              <a:t>Example: Remove tracks under/over a certain BPM or characteristic % threshold</a:t>
-            </a:r>
-          </a:p>
-          <a:p>
-            <a:pPr marL="457200" lvl="1" indent="0">
-              <a:buNone/>
-            </a:pPr>
-            <a:r>
-              <a:rPr lang="en-US" dirty="0"/>
-              <a:t>Study specific artists’ data entries more specifically in comparison to the population</a:t>
-            </a:r>
-          </a:p>
-          <a:p>
-            <a:pPr marL="457200" lvl="1" indent="0">
-              <a:buNone/>
-            </a:pPr>
-            <a:r>
-              <a:rPr lang="en-US" dirty="0"/>
-              <a:t>	Example: Fully analyze all Taylor Swift or the </a:t>
-            </a:r>
-            <a:r>
-              <a:rPr lang="en-US" dirty="0" err="1"/>
-              <a:t>Weeknd</a:t>
-            </a:r>
-            <a:r>
-              <a:rPr lang="en-US" dirty="0"/>
-              <a:t> tracks to see if trends deviate from the population</a:t>
-            </a:r>
-          </a:p>
-          <a:p>
-            <a:pPr marL="457200" lvl="1" indent="0">
-              <a:buNone/>
-            </a:pPr>
-            <a:endParaRPr lang="en-US" dirty="0"/>
-          </a:p>
-          <a:p>
-            <a:r>
-              <a:rPr lang="en-US" dirty="0"/>
-              <a:t>Limitations for Characteristics </a:t>
-            </a:r>
-          </a:p>
-          <a:p>
-            <a:pPr lvl="1"/>
-            <a:r>
-              <a:rPr lang="en-US" dirty="0"/>
-              <a:t>Definition and assigned percentage of characteristics is not transparent</a:t>
-            </a:r>
-          </a:p>
-          <a:p>
-            <a:pPr lvl="2"/>
-            <a:r>
-              <a:rPr lang="en-US" dirty="0"/>
-              <a:t>How can we be certain of these values?</a:t>
-            </a:r>
-          </a:p>
-          <a:p>
-            <a:pPr lvl="1"/>
-            <a:r>
-              <a:rPr lang="en-US" dirty="0"/>
-              <a:t>No data available regarding user activity while streaming</a:t>
-            </a:r>
-          </a:p>
-          <a:p>
-            <a:pPr lvl="2"/>
-            <a:r>
-              <a:rPr lang="en-US" dirty="0"/>
-              <a:t>Cannot correlate song choices to activities</a:t>
-            </a:r>
-          </a:p>
-          <a:p>
-            <a:pPr lvl="2"/>
-            <a:r>
-              <a:rPr lang="en-US" dirty="0"/>
-              <a:t>This leads to assumptions of why certain characteristics are more popular than others</a:t>
-            </a:r>
-          </a:p>
-          <a:p>
-            <a:pPr lvl="2"/>
-            <a:r>
-              <a:rPr lang="en-US" dirty="0"/>
-              <a:t>Qualitative data and/or user surveys could be helpful in this case</a:t>
-            </a:r>
-          </a:p>
-        </p:txBody>
-      </p:sp>
-    </p:spTree>
-    <p:extLst>
-      <p:ext uri="{BB962C8B-B14F-4D97-AF65-F5344CB8AC3E}">
-        <p14:creationId xmlns:p14="http://schemas.microsoft.com/office/powerpoint/2010/main" val="3539150390"/>
-      </p:ext>
-    </p:extLst>
-  </p:cSld>
-  <p:clrMapOvr>
-    <a:masterClrMapping/>
-  </p:clrMapOvr>
-</p:sld>
-</file>
-
-<file path=ppt/slides/slide2.xml><?xml version="1.0" encoding="utf-8"?>
-<p:sld xmlns:a="http://schemas.openxmlformats.org/drawingml/2006/main" xmlns:r="http://schemas.openxmlformats.org/officeDocument/2006/relationships" xmlns:p="http://schemas.openxmlformats.org/presentationml/2006/main">
-  <p:cSld>
-    <p:spTree>
-      <p:nvGrpSpPr>
-        <p:cNvPr id="1" name=""/>
-        <p:cNvGrpSpPr/>
-        <p:nvPr/>
-      </p:nvGrpSpPr>
-      <p:grpSpPr>
-        <a:xfrm>
-          <a:off x="0" y="0"/>
-          <a:ext cx="0" cy="0"/>
-          <a:chOff x="0" y="0"/>
-          <a:chExt cx="0" cy="0"/>
-        </a:xfrm>
-      </p:grpSpPr>
-      <p:sp>
-        <p:nvSpPr>
-          <p:cNvPr id="2" name="Title 1">
-            <a:extLst>
-              <a:ext uri="{FF2B5EF4-FFF2-40B4-BE49-F238E27FC236}">
-                <a16:creationId xmlns:a16="http://schemas.microsoft.com/office/drawing/2014/main" id="{0DD7A117-3037-94A7-25E9-4BCC4CC995B2}"/>
-              </a:ext>
-            </a:extLst>
-          </p:cNvPr>
-          <p:cNvSpPr>
-            <a:spLocks noGrp="1"/>
-          </p:cNvSpPr>
-          <p:nvPr>
-            <p:ph type="title"/>
-          </p:nvPr>
-        </p:nvSpPr>
-        <p:spPr/>
-        <p:txBody>
-          <a:bodyPr/>
-          <a:lstStyle/>
-          <a:p>
-            <a:r>
-              <a:rPr lang="en-US" dirty="0"/>
-              <a:t>The Data</a:t>
-            </a:r>
-          </a:p>
-        </p:txBody>
-      </p:sp>
-      <p:sp>
-        <p:nvSpPr>
-          <p:cNvPr id="3" name="Content Placeholder 2">
-            <a:extLst>
-              <a:ext uri="{FF2B5EF4-FFF2-40B4-BE49-F238E27FC236}">
-                <a16:creationId xmlns:a16="http://schemas.microsoft.com/office/drawing/2014/main" id="{5437F0F2-0E92-4B24-B46F-72CB653192D5}"/>
-              </a:ext>
-            </a:extLst>
-          </p:cNvPr>
-          <p:cNvSpPr>
-            <a:spLocks noGrp="1"/>
-          </p:cNvSpPr>
-          <p:nvPr>
-            <p:ph idx="1"/>
-          </p:nvPr>
-        </p:nvSpPr>
-        <p:spPr/>
-        <p:txBody>
-          <a:bodyPr>
-            <a:normAutofit fontScale="92500" lnSpcReduction="20000"/>
-          </a:bodyPr>
-          <a:lstStyle/>
-          <a:p>
-            <a:r>
-              <a:rPr lang="en-US" dirty="0"/>
-              <a:t>Procured from Kaggle</a:t>
-            </a:r>
-          </a:p>
-          <a:p>
-            <a:pPr lvl="1"/>
-            <a:r>
-              <a:rPr lang="en-US" dirty="0">
-                <a:hlinkClick r:id="rId2"/>
-              </a:rPr>
-              <a:t>https://www.kaggle.com/datasets/nelgiriyewithana/top-spotify-songs-2023</a:t>
-            </a:r>
-            <a:endParaRPr lang="en-US" dirty="0"/>
-          </a:p>
-          <a:p>
-            <a:pPr lvl="1"/>
-            <a:endParaRPr lang="en-US" dirty="0"/>
-          </a:p>
-          <a:p>
-            <a:r>
-              <a:rPr lang="en-US" dirty="0"/>
-              <a:t>Data was collected via the Spotify API</a:t>
-            </a:r>
-          </a:p>
-          <a:p>
-            <a:endParaRPr lang="en-US" dirty="0"/>
-          </a:p>
-          <a:p>
-            <a:r>
-              <a:rPr lang="en-US" dirty="0"/>
-              <a:t>Included characteristics</a:t>
-            </a:r>
-          </a:p>
-          <a:p>
-            <a:pPr lvl="1"/>
-            <a:r>
-              <a:rPr lang="en-US" dirty="0"/>
-              <a:t>Track Name </a:t>
-            </a:r>
-          </a:p>
-          <a:p>
-            <a:pPr lvl="1"/>
-            <a:r>
-              <a:rPr lang="en-US" dirty="0"/>
-              <a:t>Artist(s) </a:t>
-            </a:r>
-          </a:p>
-          <a:p>
-            <a:pPr lvl="1"/>
-            <a:r>
-              <a:rPr lang="en-US" dirty="0"/>
-              <a:t>Release Date </a:t>
-            </a:r>
-          </a:p>
-          <a:p>
-            <a:pPr lvl="1"/>
-            <a:r>
-              <a:rPr lang="en-US" dirty="0"/>
-              <a:t># Streams</a:t>
-            </a:r>
-          </a:p>
-          <a:p>
-            <a:pPr lvl="1"/>
-            <a:r>
-              <a:rPr lang="en-US" dirty="0"/>
-              <a:t>Playlists/Charts presence (Spotify, Apple, Deezer, Shazam)</a:t>
-            </a:r>
-          </a:p>
-          <a:p>
-            <a:pPr lvl="1"/>
-            <a:r>
-              <a:rPr lang="en-US" dirty="0"/>
-              <a:t>Audio/Musical Features and Characteristics</a:t>
-            </a:r>
-          </a:p>
-          <a:p>
-            <a:pPr lvl="1"/>
-            <a:endParaRPr lang="en-US" dirty="0"/>
-          </a:p>
-        </p:txBody>
-      </p:sp>
-    </p:spTree>
-    <p:extLst>
-      <p:ext uri="{BB962C8B-B14F-4D97-AF65-F5344CB8AC3E}">
-        <p14:creationId xmlns:p14="http://schemas.microsoft.com/office/powerpoint/2010/main" val="615754371"/>
-      </p:ext>
-    </p:extLst>
-  </p:cSld>
-  <p:clrMapOvr>
-    <a:masterClrMapping/>
-  </p:clrMapOvr>
-</p:sld>
-</file>
-
-<file path=ppt/slides/slide3.xml><?xml version="1.0" encoding="utf-8"?>
-<p:sld xmlns:a="http://schemas.openxmlformats.org/drawingml/2006/main" xmlns:r="http://schemas.openxmlformats.org/officeDocument/2006/relationships" xmlns:p="http://schemas.openxmlformats.org/presentationml/2006/main">
-  <p:cSld>
-    <p:spTree>
-      <p:nvGrpSpPr>
-        <p:cNvPr id="1" name=""/>
-        <p:cNvGrpSpPr/>
-        <p:nvPr/>
-      </p:nvGrpSpPr>
-      <p:grpSpPr>
-        <a:xfrm>
-          <a:off x="0" y="0"/>
-          <a:ext cx="0" cy="0"/>
-          <a:chOff x="0" y="0"/>
-          <a:chExt cx="0" cy="0"/>
-        </a:xfrm>
-      </p:grpSpPr>
-      <p:sp>
-        <p:nvSpPr>
-          <p:cNvPr id="2" name="Title 1">
-            <a:extLst>
-              <a:ext uri="{FF2B5EF4-FFF2-40B4-BE49-F238E27FC236}">
-                <a16:creationId xmlns:a16="http://schemas.microsoft.com/office/drawing/2014/main" id="{1E3020E4-13AD-D731-20D0-237E1C1B2DF1}"/>
-              </a:ext>
-            </a:extLst>
-          </p:cNvPr>
-          <p:cNvSpPr>
-            <a:spLocks noGrp="1"/>
-          </p:cNvSpPr>
-          <p:nvPr>
-            <p:ph type="title"/>
-          </p:nvPr>
-        </p:nvSpPr>
-        <p:spPr/>
-        <p:txBody>
-          <a:bodyPr/>
-          <a:lstStyle/>
-          <a:p>
-            <a:r>
-              <a:rPr lang="en-US" dirty="0"/>
-              <a:t>The Effect of Charts and Playlists</a:t>
-            </a:r>
-          </a:p>
-        </p:txBody>
-      </p:sp>
-      <p:sp>
-        <p:nvSpPr>
-          <p:cNvPr id="3" name="Content Placeholder 2">
-            <a:extLst>
-              <a:ext uri="{FF2B5EF4-FFF2-40B4-BE49-F238E27FC236}">
-                <a16:creationId xmlns:a16="http://schemas.microsoft.com/office/drawing/2014/main" id="{34F528BB-A567-F207-F019-3F6A56503126}"/>
-              </a:ext>
-            </a:extLst>
-          </p:cNvPr>
-          <p:cNvSpPr>
-            <a:spLocks noGrp="1"/>
-          </p:cNvSpPr>
-          <p:nvPr>
-            <p:ph idx="1"/>
-          </p:nvPr>
-        </p:nvSpPr>
-        <p:spPr/>
-        <p:txBody>
-          <a:bodyPr/>
-          <a:lstStyle/>
-          <a:p>
-            <a:endParaRPr lang="en-US"/>
-          </a:p>
-        </p:txBody>
-      </p:sp>
-    </p:spTree>
-    <p:extLst>
-      <p:ext uri="{BB962C8B-B14F-4D97-AF65-F5344CB8AC3E}">
-        <p14:creationId xmlns:p14="http://schemas.microsoft.com/office/powerpoint/2010/main" val="2072924615"/>
-      </p:ext>
-    </p:extLst>
-  </p:cSld>
-  <p:clrMapOvr>
-    <a:masterClrMapping/>
-  </p:clrMapOvr>
-</p:sld>
-</file>
-
-<file path=ppt/slides/slide4.xml><?xml version="1.0" encoding="utf-8"?>
-<p:sld xmlns:a="http://schemas.openxmlformats.org/drawingml/2006/main" xmlns:r="http://schemas.openxmlformats.org/officeDocument/2006/relationships" xmlns:p="http://schemas.openxmlformats.org/presentationml/2006/main">
-  <p:cSld>
-    <p:spTree>
-      <p:nvGrpSpPr>
-        <p:cNvPr id="1" name=""/>
-        <p:cNvGrpSpPr/>
-        <p:nvPr/>
-      </p:nvGrpSpPr>
-      <p:grpSpPr>
-        <a:xfrm>
-          <a:off x="0" y="0"/>
-          <a:ext cx="0" cy="0"/>
-          <a:chOff x="0" y="0"/>
-          <a:chExt cx="0" cy="0"/>
-        </a:xfrm>
-      </p:grpSpPr>
-      <p:sp>
-        <p:nvSpPr>
-          <p:cNvPr id="2" name="Title 1">
-            <a:extLst>
-              <a:ext uri="{FF2B5EF4-FFF2-40B4-BE49-F238E27FC236}">
-                <a16:creationId xmlns:a16="http://schemas.microsoft.com/office/drawing/2014/main" id="{C3D942C1-F821-163F-7497-06F9A11642B9}"/>
-              </a:ext>
-            </a:extLst>
-          </p:cNvPr>
-          <p:cNvSpPr>
-            <a:spLocks noGrp="1"/>
-          </p:cNvSpPr>
-          <p:nvPr>
-            <p:ph type="title"/>
-          </p:nvPr>
-        </p:nvSpPr>
-        <p:spPr/>
-        <p:txBody>
-          <a:bodyPr/>
-          <a:lstStyle/>
-          <a:p>
-            <a:r>
-              <a:rPr lang="en-US" dirty="0"/>
-              <a:t>Analysis of Musical Characteristics</a:t>
-            </a:r>
-          </a:p>
-        </p:txBody>
-      </p:sp>
-      <p:sp>
-        <p:nvSpPr>
-          <p:cNvPr id="3" name="Content Placeholder 2">
-            <a:extLst>
-              <a:ext uri="{FF2B5EF4-FFF2-40B4-BE49-F238E27FC236}">
-                <a16:creationId xmlns:a16="http://schemas.microsoft.com/office/drawing/2014/main" id="{AD1D5CB7-F90B-DA38-79C8-2A61393B40B9}"/>
-              </a:ext>
-            </a:extLst>
-          </p:cNvPr>
-          <p:cNvSpPr>
-            <a:spLocks noGrp="1"/>
-          </p:cNvSpPr>
-          <p:nvPr>
-            <p:ph idx="1"/>
-          </p:nvPr>
-        </p:nvSpPr>
-        <p:spPr/>
-        <p:txBody>
-          <a:bodyPr/>
-          <a:lstStyle/>
-          <a:p>
-            <a:r>
-              <a:rPr lang="en-US" dirty="0"/>
-              <a:t>Comparing the Top 20 Most Streamed Artists vs. the Entire Dataset</a:t>
-            </a:r>
-          </a:p>
-          <a:p>
-            <a:pPr lvl="1"/>
-            <a:r>
-              <a:rPr lang="en-US" dirty="0"/>
-              <a:t>Top Artists account for approximately 27% of included tracks, but received over 36% of streams</a:t>
-            </a:r>
-          </a:p>
-          <a:p>
-            <a:pPr lvl="1"/>
-            <a:endParaRPr lang="en-US" dirty="0"/>
-          </a:p>
-          <a:p>
-            <a:pPr lvl="1"/>
-            <a:r>
-              <a:rPr lang="en-US" dirty="0"/>
-              <a:t>Do Top Artists mimic the population, or forge their own path?</a:t>
-            </a:r>
-          </a:p>
-          <a:p>
-            <a:pPr lvl="1"/>
-            <a:endParaRPr lang="en-US" dirty="0"/>
-          </a:p>
-          <a:p>
-            <a:r>
-              <a:rPr lang="en-US" dirty="0"/>
-              <a:t>Considering Averages</a:t>
-            </a:r>
-          </a:p>
-          <a:p>
-            <a:pPr lvl="1"/>
-            <a:r>
-              <a:rPr lang="en-US" dirty="0"/>
-              <a:t>Due to the nature of songs as discrete pieces of content, analysis focuses on median and mode averages vs. mean calculations</a:t>
-            </a:r>
-          </a:p>
-        </p:txBody>
-      </p:sp>
-    </p:spTree>
-    <p:extLst>
-      <p:ext uri="{BB962C8B-B14F-4D97-AF65-F5344CB8AC3E}">
-        <p14:creationId xmlns:p14="http://schemas.microsoft.com/office/powerpoint/2010/main" val="855427616"/>
-      </p:ext>
-    </p:extLst>
-  </p:cSld>
-  <p:clrMapOvr>
-    <a:masterClrMapping/>
-  </p:clrMapOvr>
-</p:sld>
-</file>
-
-<file path=ppt/slides/slide5.xml><?xml version="1.0" encoding="utf-8"?>
-<p:sld xmlns:a="http://schemas.openxmlformats.org/drawingml/2006/main" xmlns:r="http://schemas.openxmlformats.org/officeDocument/2006/relationships" xmlns:p="http://schemas.openxmlformats.org/presentationml/2006/main">
-  <p:cSld>
-    <p:spTree>
-      <p:nvGrpSpPr>
-        <p:cNvPr id="1" name=""/>
-        <p:cNvGrpSpPr/>
-        <p:nvPr/>
-      </p:nvGrpSpPr>
-      <p:grpSpPr>
-        <a:xfrm>
-          <a:off x="0" y="0"/>
-          <a:ext cx="0" cy="0"/>
-          <a:chOff x="0" y="0"/>
-          <a:chExt cx="0" cy="0"/>
-        </a:xfrm>
-      </p:grpSpPr>
-      <p:sp>
-        <p:nvSpPr>
-          <p:cNvPr id="2" name="Title 1">
-            <a:extLst>
-              <a:ext uri="{FF2B5EF4-FFF2-40B4-BE49-F238E27FC236}">
-                <a16:creationId xmlns:a16="http://schemas.microsoft.com/office/drawing/2014/main" id="{1B24E665-5B89-EB78-C0E2-7832422881BA}"/>
-              </a:ext>
-            </a:extLst>
-          </p:cNvPr>
-          <p:cNvSpPr>
-            <a:spLocks noGrp="1"/>
-          </p:cNvSpPr>
-          <p:nvPr>
-            <p:ph type="title"/>
-          </p:nvPr>
-        </p:nvSpPr>
-        <p:spPr/>
-        <p:txBody>
-          <a:bodyPr/>
-          <a:lstStyle/>
-          <a:p>
-            <a:r>
-              <a:rPr lang="en-US" dirty="0"/>
-              <a:t>Song Speeds (BPM – Beats Per Minute)</a:t>
-            </a:r>
-          </a:p>
-        </p:txBody>
-      </p:sp>
-      <p:sp>
-        <p:nvSpPr>
-          <p:cNvPr id="6" name="TextBox 5">
-            <a:extLst>
-              <a:ext uri="{FF2B5EF4-FFF2-40B4-BE49-F238E27FC236}">
-                <a16:creationId xmlns:a16="http://schemas.microsoft.com/office/drawing/2014/main" id="{642D8BB6-B6BA-F68E-72A4-85A48931554D}"/>
-              </a:ext>
-            </a:extLst>
-          </p:cNvPr>
-          <p:cNvSpPr txBox="1"/>
-          <p:nvPr/>
-        </p:nvSpPr>
-        <p:spPr>
-          <a:xfrm>
-            <a:off x="7956331" y="1690688"/>
-            <a:ext cx="4056994" cy="4524315"/>
-          </a:xfrm>
-          <a:prstGeom prst="rect">
-            <a:avLst/>
-          </a:prstGeom>
-          <a:noFill/>
-        </p:spPr>
-        <p:txBody>
-          <a:bodyPr wrap="square" rtlCol="0">
-            <a:spAutoFit/>
-          </a:bodyPr>
-          <a:lstStyle/>
-          <a:p>
-            <a:pPr marL="285750" indent="-285750">
-              <a:buFont typeface="Arial" panose="020B0604020202020204" pitchFamily="34" charset="0"/>
-              <a:buChar char="•"/>
-            </a:pPr>
-            <a:r>
-              <a:rPr lang="en-US" dirty="0"/>
-              <a:t>The Top 20 Artist sample is very similar in structure to the data population.</a:t>
-            </a:r>
-          </a:p>
-          <a:p>
-            <a:pPr marL="285750" indent="-285750">
-              <a:buFont typeface="Arial" panose="020B0604020202020204" pitchFamily="34" charset="0"/>
-              <a:buChar char="•"/>
-            </a:pPr>
-            <a:endParaRPr lang="en-US" dirty="0"/>
-          </a:p>
-          <a:p>
-            <a:pPr marL="285750" indent="-285750">
-              <a:buFont typeface="Arial" panose="020B0604020202020204" pitchFamily="34" charset="0"/>
-              <a:buChar char="•"/>
-            </a:pPr>
-            <a:r>
-              <a:rPr lang="en-US" dirty="0"/>
-              <a:t>The median BPM for the sample (120bpm) is extremely close to the median BPM of the population (121bpm).</a:t>
-            </a:r>
-          </a:p>
-          <a:p>
-            <a:pPr marL="285750" indent="-285750">
-              <a:buFont typeface="Arial" panose="020B0604020202020204" pitchFamily="34" charset="0"/>
-              <a:buChar char="•"/>
-            </a:pPr>
-            <a:endParaRPr lang="en-US" dirty="0"/>
-          </a:p>
-          <a:p>
-            <a:pPr marL="285750" indent="-285750">
-              <a:buFont typeface="Arial" panose="020B0604020202020204" pitchFamily="34" charset="0"/>
-              <a:buChar char="•"/>
-            </a:pPr>
-            <a:r>
-              <a:rPr lang="en-US" dirty="0"/>
-              <a:t>The mode for Top Artists is considerably lower</a:t>
-            </a:r>
-          </a:p>
-          <a:p>
-            <a:pPr marL="742950" lvl="1" indent="-285750">
-              <a:buFont typeface="Arial" panose="020B0604020202020204" pitchFamily="34" charset="0"/>
-              <a:buChar char="•"/>
-            </a:pPr>
-            <a:r>
-              <a:rPr lang="en-US" dirty="0"/>
-              <a:t>Top Artists Mode: 90bpm, 7 songs (2.7% of songs in sample)</a:t>
-            </a:r>
-          </a:p>
-          <a:p>
-            <a:pPr marL="742950" lvl="1" indent="-285750">
-              <a:buFont typeface="Arial" panose="020B0604020202020204" pitchFamily="34" charset="0"/>
-              <a:buChar char="•"/>
-            </a:pPr>
-            <a:endParaRPr lang="en-US" dirty="0"/>
-          </a:p>
-          <a:p>
-            <a:pPr marL="742950" lvl="1" indent="-285750">
-              <a:buFont typeface="Arial" panose="020B0604020202020204" pitchFamily="34" charset="0"/>
-              <a:buChar char="•"/>
-            </a:pPr>
-            <a:r>
-              <a:rPr lang="en-US" dirty="0"/>
-              <a:t>All Songs: 120bpm, 34 songs (3.6% of songs in population)</a:t>
-            </a:r>
-          </a:p>
-        </p:txBody>
-      </p:sp>
-      <p:pic>
-        <p:nvPicPr>
-          <p:cNvPr id="8" name="Content Placeholder 7">
-            <a:extLst>
-              <a:ext uri="{FF2B5EF4-FFF2-40B4-BE49-F238E27FC236}">
-                <a16:creationId xmlns:a16="http://schemas.microsoft.com/office/drawing/2014/main" id="{04D86521-6FBA-DB49-BD3C-CAC4A64E1817}"/>
-              </a:ext>
-            </a:extLst>
-          </p:cNvPr>
-          <p:cNvPicPr>
-            <a:picLocks noGrp="1" noChangeAspect="1"/>
-          </p:cNvPicPr>
-          <p:nvPr>
-            <p:ph idx="1"/>
-          </p:nvPr>
-        </p:nvPicPr>
-        <p:blipFill>
-          <a:blip r:embed="rId2">
-            <a:extLst>
-              <a:ext uri="{28A0092B-C50C-407E-A947-70E740481C1C}">
-                <a14:useLocalDpi xmlns:a14="http://schemas.microsoft.com/office/drawing/2010/main" val="0"/>
-              </a:ext>
-            </a:extLst>
-          </a:blip>
-          <a:stretch>
-            <a:fillRect/>
-          </a:stretch>
-        </p:blipFill>
-        <p:spPr>
-          <a:xfrm>
-            <a:off x="677334" y="1331467"/>
-            <a:ext cx="6555910" cy="4916933"/>
-          </a:xfrm>
-        </p:spPr>
-      </p:pic>
-      <p:sp>
-        <p:nvSpPr>
-          <p:cNvPr id="9" name="TextBox 8">
-            <a:extLst>
-              <a:ext uri="{FF2B5EF4-FFF2-40B4-BE49-F238E27FC236}">
-                <a16:creationId xmlns:a16="http://schemas.microsoft.com/office/drawing/2014/main" id="{1B766D9F-F1B3-8EE3-B481-5F93AE61601E}"/>
-              </a:ext>
-            </a:extLst>
-          </p:cNvPr>
-          <p:cNvSpPr txBox="1"/>
-          <p:nvPr/>
-        </p:nvSpPr>
-        <p:spPr>
-          <a:xfrm>
-            <a:off x="1075058" y="6248400"/>
-            <a:ext cx="7178565" cy="276999"/>
-          </a:xfrm>
-          <a:prstGeom prst="rect">
-            <a:avLst/>
-          </a:prstGeom>
-          <a:noFill/>
-        </p:spPr>
-        <p:txBody>
-          <a:bodyPr wrap="square" rtlCol="0">
-            <a:spAutoFit/>
-          </a:bodyPr>
-          <a:lstStyle/>
-          <a:p>
-            <a:r>
-              <a:rPr lang="en-US" sz="1200" b="0" i="0" dirty="0">
-                <a:effectLst/>
-                <a:ea typeface="Calibri" panose="020F0502020204030204" pitchFamily="34" charset="0"/>
-                <a:cs typeface="Calibri" panose="020F0502020204030204" pitchFamily="34" charset="0"/>
-              </a:rPr>
-              <a:t>Standard Deviation of tempos: 37.462117528776375. p-value=3.927199818891401e-06)</a:t>
-            </a:r>
-            <a:endParaRPr lang="en-US" sz="1200" dirty="0">
-              <a:ea typeface="Calibri" panose="020F0502020204030204" pitchFamily="34" charset="0"/>
-              <a:cs typeface="Calibri" panose="020F0502020204030204" pitchFamily="34" charset="0"/>
-            </a:endParaRPr>
-          </a:p>
-        </p:txBody>
-      </p:sp>
-    </p:spTree>
-    <p:extLst>
-      <p:ext uri="{BB962C8B-B14F-4D97-AF65-F5344CB8AC3E}">
-        <p14:creationId xmlns:p14="http://schemas.microsoft.com/office/powerpoint/2010/main" val="1136602678"/>
-      </p:ext>
-    </p:extLst>
-  </p:cSld>
-  <p:clrMapOvr>
-    <a:masterClrMapping/>
-  </p:clrMapOvr>
-</p:sld>
-</file>
-
-<file path=ppt/slides/slide6.xml><?xml version="1.0" encoding="utf-8"?>
-<p:sld xmlns:a="http://schemas.openxmlformats.org/drawingml/2006/main" xmlns:r="http://schemas.openxmlformats.org/officeDocument/2006/relationships" xmlns:p="http://schemas.openxmlformats.org/presentationml/2006/main">
-  <p:cSld>
-    <p:spTree>
-      <p:nvGrpSpPr>
-        <p:cNvPr id="1" name=""/>
-        <p:cNvGrpSpPr/>
-        <p:nvPr/>
-      </p:nvGrpSpPr>
-      <p:grpSpPr>
-        <a:xfrm>
-          <a:off x="0" y="0"/>
-          <a:ext cx="0" cy="0"/>
-          <a:chOff x="0" y="0"/>
-          <a:chExt cx="0" cy="0"/>
-        </a:xfrm>
-      </p:grpSpPr>
-      <p:sp>
-        <p:nvSpPr>
-          <p:cNvPr id="2" name="Title 1">
-            <a:extLst>
-              <a:ext uri="{FF2B5EF4-FFF2-40B4-BE49-F238E27FC236}">
                 <a16:creationId xmlns:a16="http://schemas.microsoft.com/office/drawing/2014/main" id="{EAEE6358-0693-987A-8D91-0A483DB12C51}"/>
               </a:ext>
             </a:extLst>
@@ -6989,7 +6324,7 @@
 </p:sld>
 </file>
 
-<file path=ppt/slides/slide7.xml><?xml version="1.0" encoding="utf-8"?>
+<file path=ppt/slides/slide12.xml><?xml version="1.0" encoding="utf-8"?>
 <p:sld xmlns:a="http://schemas.openxmlformats.org/drawingml/2006/main" xmlns:r="http://schemas.openxmlformats.org/officeDocument/2006/relationships" xmlns:p="http://schemas.openxmlformats.org/presentationml/2006/main">
   <p:cSld>
     <p:spTree>
@@ -7159,7 +6494,7 @@
 </p:sld>
 </file>
 
-<file path=ppt/slides/slide8.xml><?xml version="1.0" encoding="utf-8"?>
+<file path=ppt/slides/slide13.xml><?xml version="1.0" encoding="utf-8"?>
 <p:sld xmlns:a="http://schemas.openxmlformats.org/drawingml/2006/main" xmlns:r="http://schemas.openxmlformats.org/officeDocument/2006/relationships" xmlns:p="http://schemas.openxmlformats.org/presentationml/2006/main">
   <p:cSld>
     <p:spTree>
@@ -7701,7 +7036,7 @@
 </p:sld>
 </file>
 
-<file path=ppt/slides/slide9.xml><?xml version="1.0" encoding="utf-8"?>
+<file path=ppt/slides/slide14.xml><?xml version="1.0" encoding="utf-8"?>
 <p:sld xmlns:a="http://schemas.openxmlformats.org/drawingml/2006/main" xmlns:r="http://schemas.openxmlformats.org/officeDocument/2006/relationships" xmlns:p="http://schemas.openxmlformats.org/presentationml/2006/main">
   <p:cSld>
     <p:spTree>
@@ -7863,6 +7198,1455 @@
     <p:extLst>
       <p:ext uri="{BB962C8B-B14F-4D97-AF65-F5344CB8AC3E}">
         <p14:creationId xmlns:p14="http://schemas.microsoft.com/office/powerpoint/2010/main" val="2233289340"/>
+      </p:ext>
+    </p:extLst>
+  </p:cSld>
+  <p:clrMapOvr>
+    <a:masterClrMapping/>
+  </p:clrMapOvr>
+</p:sld>
+</file>
+
+<file path=ppt/slides/slide15.xml><?xml version="1.0" encoding="utf-8"?>
+<p:sld xmlns:a="http://schemas.openxmlformats.org/drawingml/2006/main" xmlns:r="http://schemas.openxmlformats.org/officeDocument/2006/relationships" xmlns:p="http://schemas.openxmlformats.org/presentationml/2006/main">
+  <p:cSld>
+    <p:spTree>
+      <p:nvGrpSpPr>
+        <p:cNvPr id="1" name=""/>
+        <p:cNvGrpSpPr/>
+        <p:nvPr/>
+      </p:nvGrpSpPr>
+      <p:grpSpPr>
+        <a:xfrm>
+          <a:off x="0" y="0"/>
+          <a:ext cx="0" cy="0"/>
+          <a:chOff x="0" y="0"/>
+          <a:chExt cx="0" cy="0"/>
+        </a:xfrm>
+      </p:grpSpPr>
+      <p:sp>
+        <p:nvSpPr>
+          <p:cNvPr id="2" name="Title 1">
+            <a:extLst>
+              <a:ext uri="{FF2B5EF4-FFF2-40B4-BE49-F238E27FC236}">
+                <a16:creationId xmlns:a16="http://schemas.microsoft.com/office/drawing/2014/main" id="{D80C9E53-14B0-BF06-F809-B221E06FB08C}"/>
+              </a:ext>
+            </a:extLst>
+          </p:cNvPr>
+          <p:cNvSpPr>
+            <a:spLocks noGrp="1"/>
+          </p:cNvSpPr>
+          <p:nvPr>
+            <p:ph type="title"/>
+          </p:nvPr>
+        </p:nvSpPr>
+        <p:spPr/>
+        <p:txBody>
+          <a:bodyPr/>
+          <a:lstStyle/>
+          <a:p>
+            <a:r>
+              <a:rPr lang="en-US" dirty="0"/>
+              <a:t>Characteristics - Takeaways</a:t>
+            </a:r>
+          </a:p>
+        </p:txBody>
+      </p:sp>
+      <p:sp>
+        <p:nvSpPr>
+          <p:cNvPr id="3" name="Content Placeholder 2">
+            <a:extLst>
+              <a:ext uri="{FF2B5EF4-FFF2-40B4-BE49-F238E27FC236}">
+                <a16:creationId xmlns:a16="http://schemas.microsoft.com/office/drawing/2014/main" id="{BF18E217-5ED2-6D7F-FD5E-8526F56CE97C}"/>
+              </a:ext>
+            </a:extLst>
+          </p:cNvPr>
+          <p:cNvSpPr>
+            <a:spLocks noGrp="1"/>
+          </p:cNvSpPr>
+          <p:nvPr>
+            <p:ph idx="1"/>
+          </p:nvPr>
+        </p:nvSpPr>
+        <p:spPr/>
+        <p:txBody>
+          <a:bodyPr/>
+          <a:lstStyle/>
+          <a:p>
+            <a:r>
+              <a:rPr lang="en-US" dirty="0"/>
+              <a:t>The average song listeners streamed most in 2023 was energetic and danceable, often featuring positive vibes and a major modality.</a:t>
+            </a:r>
+          </a:p>
+          <a:p>
+            <a:r>
+              <a:rPr lang="en-US" dirty="0"/>
+              <a:t>The average song hovered around 120bpm, which is 2 beats per second – a very comfortable tempo for dancing, without being too demanding.</a:t>
+            </a:r>
+          </a:p>
+          <a:p>
+            <a:r>
+              <a:rPr lang="en-US" dirty="0"/>
+              <a:t>Top artists’ songs had a little more leeway from the median average, but generally fell in line with the population data.</a:t>
+            </a:r>
+          </a:p>
+          <a:p>
+            <a:pPr lvl="1"/>
+            <a:r>
+              <a:rPr lang="en-US" dirty="0"/>
+              <a:t>The most streamed artists may highlight these characteristics, as they captured over a 1/3</a:t>
+            </a:r>
+            <a:r>
+              <a:rPr lang="en-US" baseline="30000" dirty="0"/>
+              <a:t>rd</a:t>
+            </a:r>
+            <a:r>
+              <a:rPr lang="en-US" dirty="0"/>
+              <a:t> of total streams while making up roughly 1/4</a:t>
+            </a:r>
+            <a:r>
+              <a:rPr lang="en-US" baseline="30000" dirty="0"/>
+              <a:t>th</a:t>
+            </a:r>
+            <a:r>
+              <a:rPr lang="en-US" dirty="0"/>
+              <a:t> of the data entries.</a:t>
+            </a:r>
+          </a:p>
+        </p:txBody>
+      </p:sp>
+    </p:spTree>
+    <p:extLst>
+      <p:ext uri="{BB962C8B-B14F-4D97-AF65-F5344CB8AC3E}">
+        <p14:creationId xmlns:p14="http://schemas.microsoft.com/office/powerpoint/2010/main" val="4061737574"/>
+      </p:ext>
+    </p:extLst>
+  </p:cSld>
+  <p:clrMapOvr>
+    <a:masterClrMapping/>
+  </p:clrMapOvr>
+</p:sld>
+</file>
+
+<file path=ppt/slides/slide16.xml><?xml version="1.0" encoding="utf-8"?>
+<p:sld xmlns:a="http://schemas.openxmlformats.org/drawingml/2006/main" xmlns:r="http://schemas.openxmlformats.org/officeDocument/2006/relationships" xmlns:p="http://schemas.openxmlformats.org/presentationml/2006/main">
+  <p:cSld>
+    <p:spTree>
+      <p:nvGrpSpPr>
+        <p:cNvPr id="1" name=""/>
+        <p:cNvGrpSpPr/>
+        <p:nvPr/>
+      </p:nvGrpSpPr>
+      <p:grpSpPr>
+        <a:xfrm>
+          <a:off x="0" y="0"/>
+          <a:ext cx="0" cy="0"/>
+          <a:chOff x="0" y="0"/>
+          <a:chExt cx="0" cy="0"/>
+        </a:xfrm>
+      </p:grpSpPr>
+      <p:sp>
+        <p:nvSpPr>
+          <p:cNvPr id="2" name="Title 1">
+            <a:extLst>
+              <a:ext uri="{FF2B5EF4-FFF2-40B4-BE49-F238E27FC236}">
+                <a16:creationId xmlns:a16="http://schemas.microsoft.com/office/drawing/2014/main" id="{3F7EFF7F-C277-D600-91A7-5605A64BF3BA}"/>
+              </a:ext>
+            </a:extLst>
+          </p:cNvPr>
+          <p:cNvSpPr>
+            <a:spLocks noGrp="1"/>
+          </p:cNvSpPr>
+          <p:nvPr>
+            <p:ph type="title"/>
+          </p:nvPr>
+        </p:nvSpPr>
+        <p:spPr/>
+        <p:txBody>
+          <a:bodyPr/>
+          <a:lstStyle/>
+          <a:p>
+            <a:r>
+              <a:rPr lang="en-US" dirty="0"/>
+              <a:t>Next Steps and Limitations</a:t>
+            </a:r>
+          </a:p>
+        </p:txBody>
+      </p:sp>
+      <p:sp>
+        <p:nvSpPr>
+          <p:cNvPr id="3" name="Content Placeholder 2">
+            <a:extLst>
+              <a:ext uri="{FF2B5EF4-FFF2-40B4-BE49-F238E27FC236}">
+                <a16:creationId xmlns:a16="http://schemas.microsoft.com/office/drawing/2014/main" id="{903B2701-2AEC-CB78-3C90-07AF349EA07E}"/>
+              </a:ext>
+            </a:extLst>
+          </p:cNvPr>
+          <p:cNvSpPr>
+            <a:spLocks noGrp="1"/>
+          </p:cNvSpPr>
+          <p:nvPr>
+            <p:ph idx="1"/>
+          </p:nvPr>
+        </p:nvSpPr>
+        <p:spPr/>
+        <p:txBody>
+          <a:bodyPr>
+            <a:normAutofit fontScale="77500" lnSpcReduction="20000"/>
+          </a:bodyPr>
+          <a:lstStyle/>
+          <a:p>
+            <a:r>
+              <a:rPr lang="en-US" dirty="0"/>
+              <a:t>Next Steps for Characteristics</a:t>
+            </a:r>
+          </a:p>
+          <a:p>
+            <a:pPr lvl="1"/>
+            <a:r>
+              <a:rPr lang="en-US" dirty="0"/>
+              <a:t>Consider focusing on slices of data to study variations in median</a:t>
+            </a:r>
+          </a:p>
+          <a:p>
+            <a:pPr lvl="2"/>
+            <a:r>
+              <a:rPr lang="en-US" dirty="0"/>
+              <a:t>Example: Remove tracks under/over a certain BPM or characteristic % threshold</a:t>
+            </a:r>
+          </a:p>
+          <a:p>
+            <a:pPr marL="457200" lvl="1" indent="0">
+              <a:buNone/>
+            </a:pPr>
+            <a:r>
+              <a:rPr lang="en-US" dirty="0"/>
+              <a:t>Study specific artists’ data entries more specifically in comparison to the population</a:t>
+            </a:r>
+          </a:p>
+          <a:p>
+            <a:pPr marL="457200" lvl="1" indent="0">
+              <a:buNone/>
+            </a:pPr>
+            <a:r>
+              <a:rPr lang="en-US" dirty="0"/>
+              <a:t>	Example: Fully analyze all Taylor Swift or the </a:t>
+            </a:r>
+            <a:r>
+              <a:rPr lang="en-US" dirty="0" err="1"/>
+              <a:t>Weeknd</a:t>
+            </a:r>
+            <a:r>
+              <a:rPr lang="en-US" dirty="0"/>
+              <a:t> tracks to see if trends deviate from the population</a:t>
+            </a:r>
+          </a:p>
+          <a:p>
+            <a:pPr marL="457200" lvl="1" indent="0">
+              <a:buNone/>
+            </a:pPr>
+            <a:endParaRPr lang="en-US" dirty="0"/>
+          </a:p>
+          <a:p>
+            <a:r>
+              <a:rPr lang="en-US" dirty="0"/>
+              <a:t>Limitations for Characteristics </a:t>
+            </a:r>
+          </a:p>
+          <a:p>
+            <a:pPr lvl="1"/>
+            <a:r>
+              <a:rPr lang="en-US" dirty="0"/>
+              <a:t>Definition and assigned percentage of characteristics is not transparent</a:t>
+            </a:r>
+          </a:p>
+          <a:p>
+            <a:pPr lvl="2"/>
+            <a:r>
+              <a:rPr lang="en-US" dirty="0"/>
+              <a:t>How can we be certain of these values?</a:t>
+            </a:r>
+          </a:p>
+          <a:p>
+            <a:pPr lvl="1"/>
+            <a:r>
+              <a:rPr lang="en-US" dirty="0"/>
+              <a:t>No data available regarding user activity while streaming</a:t>
+            </a:r>
+          </a:p>
+          <a:p>
+            <a:pPr lvl="2"/>
+            <a:r>
+              <a:rPr lang="en-US" dirty="0"/>
+              <a:t>Cannot correlate song choices to activities</a:t>
+            </a:r>
+          </a:p>
+          <a:p>
+            <a:pPr lvl="2"/>
+            <a:r>
+              <a:rPr lang="en-US" dirty="0"/>
+              <a:t>This leads to assumptions of why certain characteristics are more popular than others</a:t>
+            </a:r>
+          </a:p>
+          <a:p>
+            <a:pPr lvl="2"/>
+            <a:r>
+              <a:rPr lang="en-US" dirty="0"/>
+              <a:t>Qualitative data and/or user surveys could be helpful in this case</a:t>
+            </a:r>
+          </a:p>
+        </p:txBody>
+      </p:sp>
+    </p:spTree>
+    <p:extLst>
+      <p:ext uri="{BB962C8B-B14F-4D97-AF65-F5344CB8AC3E}">
+        <p14:creationId xmlns:p14="http://schemas.microsoft.com/office/powerpoint/2010/main" val="3539150390"/>
+      </p:ext>
+    </p:extLst>
+  </p:cSld>
+  <p:clrMapOvr>
+    <a:masterClrMapping/>
+  </p:clrMapOvr>
+</p:sld>
+</file>
+
+<file path=ppt/slides/slide2.xml><?xml version="1.0" encoding="utf-8"?>
+<p:sld xmlns:a="http://schemas.openxmlformats.org/drawingml/2006/main" xmlns:r="http://schemas.openxmlformats.org/officeDocument/2006/relationships" xmlns:p="http://schemas.openxmlformats.org/presentationml/2006/main">
+  <p:cSld>
+    <p:spTree>
+      <p:nvGrpSpPr>
+        <p:cNvPr id="1" name=""/>
+        <p:cNvGrpSpPr/>
+        <p:nvPr/>
+      </p:nvGrpSpPr>
+      <p:grpSpPr>
+        <a:xfrm>
+          <a:off x="0" y="0"/>
+          <a:ext cx="0" cy="0"/>
+          <a:chOff x="0" y="0"/>
+          <a:chExt cx="0" cy="0"/>
+        </a:xfrm>
+      </p:grpSpPr>
+      <p:sp>
+        <p:nvSpPr>
+          <p:cNvPr id="2" name="Title 1">
+            <a:extLst>
+              <a:ext uri="{FF2B5EF4-FFF2-40B4-BE49-F238E27FC236}">
+                <a16:creationId xmlns:a16="http://schemas.microsoft.com/office/drawing/2014/main" id="{0DD7A117-3037-94A7-25E9-4BCC4CC995B2}"/>
+              </a:ext>
+            </a:extLst>
+          </p:cNvPr>
+          <p:cNvSpPr>
+            <a:spLocks noGrp="1"/>
+          </p:cNvSpPr>
+          <p:nvPr>
+            <p:ph type="title"/>
+          </p:nvPr>
+        </p:nvSpPr>
+        <p:spPr/>
+        <p:txBody>
+          <a:bodyPr/>
+          <a:lstStyle/>
+          <a:p>
+            <a:r>
+              <a:rPr lang="en-US" dirty="0"/>
+              <a:t>The Data</a:t>
+            </a:r>
+          </a:p>
+        </p:txBody>
+      </p:sp>
+      <p:sp>
+        <p:nvSpPr>
+          <p:cNvPr id="3" name="Content Placeholder 2">
+            <a:extLst>
+              <a:ext uri="{FF2B5EF4-FFF2-40B4-BE49-F238E27FC236}">
+                <a16:creationId xmlns:a16="http://schemas.microsoft.com/office/drawing/2014/main" id="{5437F0F2-0E92-4B24-B46F-72CB653192D5}"/>
+              </a:ext>
+            </a:extLst>
+          </p:cNvPr>
+          <p:cNvSpPr>
+            <a:spLocks noGrp="1"/>
+          </p:cNvSpPr>
+          <p:nvPr>
+            <p:ph idx="1"/>
+          </p:nvPr>
+        </p:nvSpPr>
+        <p:spPr/>
+        <p:txBody>
+          <a:bodyPr>
+            <a:normAutofit fontScale="92500" lnSpcReduction="20000"/>
+          </a:bodyPr>
+          <a:lstStyle/>
+          <a:p>
+            <a:r>
+              <a:rPr lang="en-US" dirty="0"/>
+              <a:t>Procured from Kaggle</a:t>
+            </a:r>
+          </a:p>
+          <a:p>
+            <a:pPr lvl="1"/>
+            <a:r>
+              <a:rPr lang="en-US" dirty="0">
+                <a:hlinkClick r:id="rId2"/>
+              </a:rPr>
+              <a:t>https://www.kaggle.com/datasets/nelgiriyewithana/top-spotify-songs-2023</a:t>
+            </a:r>
+            <a:endParaRPr lang="en-US" dirty="0"/>
+          </a:p>
+          <a:p>
+            <a:pPr lvl="1"/>
+            <a:endParaRPr lang="en-US" dirty="0"/>
+          </a:p>
+          <a:p>
+            <a:r>
+              <a:rPr lang="en-US" dirty="0"/>
+              <a:t>Data was collected via the Spotify API</a:t>
+            </a:r>
+          </a:p>
+          <a:p>
+            <a:endParaRPr lang="en-US" dirty="0"/>
+          </a:p>
+          <a:p>
+            <a:r>
+              <a:rPr lang="en-US" dirty="0"/>
+              <a:t>Included characteristics</a:t>
+            </a:r>
+          </a:p>
+          <a:p>
+            <a:pPr lvl="1"/>
+            <a:r>
+              <a:rPr lang="en-US" dirty="0"/>
+              <a:t>Track Name </a:t>
+            </a:r>
+          </a:p>
+          <a:p>
+            <a:pPr lvl="1"/>
+            <a:r>
+              <a:rPr lang="en-US" dirty="0"/>
+              <a:t>Artist(s) </a:t>
+            </a:r>
+          </a:p>
+          <a:p>
+            <a:pPr lvl="1"/>
+            <a:r>
+              <a:rPr lang="en-US" dirty="0"/>
+              <a:t>Release Date </a:t>
+            </a:r>
+          </a:p>
+          <a:p>
+            <a:pPr lvl="1"/>
+            <a:r>
+              <a:rPr lang="en-US" dirty="0"/>
+              <a:t># Streams</a:t>
+            </a:r>
+          </a:p>
+          <a:p>
+            <a:pPr lvl="1"/>
+            <a:r>
+              <a:rPr lang="en-US" dirty="0"/>
+              <a:t>Playlists/Charts presence (Spotify, Apple, Deezer, Shazam)</a:t>
+            </a:r>
+          </a:p>
+          <a:p>
+            <a:pPr lvl="1"/>
+            <a:r>
+              <a:rPr lang="en-US" dirty="0"/>
+              <a:t>Audio/Musical Features and Characteristics</a:t>
+            </a:r>
+          </a:p>
+          <a:p>
+            <a:pPr lvl="1"/>
+            <a:endParaRPr lang="en-US" dirty="0"/>
+          </a:p>
+        </p:txBody>
+      </p:sp>
+    </p:spTree>
+    <p:extLst>
+      <p:ext uri="{BB962C8B-B14F-4D97-AF65-F5344CB8AC3E}">
+        <p14:creationId xmlns:p14="http://schemas.microsoft.com/office/powerpoint/2010/main" val="615754371"/>
+      </p:ext>
+    </p:extLst>
+  </p:cSld>
+  <p:clrMapOvr>
+    <a:masterClrMapping/>
+  </p:clrMapOvr>
+</p:sld>
+</file>
+
+<file path=ppt/slides/slide3.xml><?xml version="1.0" encoding="utf-8"?>
+<p:sld xmlns:a="http://schemas.openxmlformats.org/drawingml/2006/main" xmlns:r="http://schemas.openxmlformats.org/officeDocument/2006/relationships" xmlns:p="http://schemas.openxmlformats.org/presentationml/2006/main">
+  <p:cSld>
+    <p:spTree>
+      <p:nvGrpSpPr>
+        <p:cNvPr id="1" name="">
+          <a:extLst>
+            <a:ext uri="{FF2B5EF4-FFF2-40B4-BE49-F238E27FC236}">
+              <a16:creationId xmlns:a16="http://schemas.microsoft.com/office/drawing/2014/main" id="{A6456A4E-F149-8B7A-7145-6E298E6C72D2}"/>
+            </a:ext>
+          </a:extLst>
+        </p:cNvPr>
+        <p:cNvGrpSpPr/>
+        <p:nvPr/>
+      </p:nvGrpSpPr>
+      <p:grpSpPr>
+        <a:xfrm>
+          <a:off x="0" y="0"/>
+          <a:ext cx="0" cy="0"/>
+          <a:chOff x="0" y="0"/>
+          <a:chExt cx="0" cy="0"/>
+        </a:xfrm>
+      </p:grpSpPr>
+      <p:sp>
+        <p:nvSpPr>
+          <p:cNvPr id="2" name="Title 1">
+            <a:extLst>
+              <a:ext uri="{FF2B5EF4-FFF2-40B4-BE49-F238E27FC236}">
+                <a16:creationId xmlns:a16="http://schemas.microsoft.com/office/drawing/2014/main" id="{B61C3A81-D136-54BE-4904-3A5F97764E75}"/>
+              </a:ext>
+            </a:extLst>
+          </p:cNvPr>
+          <p:cNvSpPr>
+            <a:spLocks noGrp="1"/>
+          </p:cNvSpPr>
+          <p:nvPr>
+            <p:ph type="title"/>
+          </p:nvPr>
+        </p:nvSpPr>
+        <p:spPr/>
+        <p:txBody>
+          <a:bodyPr/>
+          <a:lstStyle/>
+          <a:p>
+            <a:r>
+              <a:rPr lang="en-US" dirty="0"/>
+              <a:t>Artist Popularity</a:t>
+            </a:r>
+          </a:p>
+        </p:txBody>
+      </p:sp>
+      <p:pic>
+        <p:nvPicPr>
+          <p:cNvPr id="5" name="Content Placeholder 4">
+            <a:extLst>
+              <a:ext uri="{FF2B5EF4-FFF2-40B4-BE49-F238E27FC236}">
+                <a16:creationId xmlns:a16="http://schemas.microsoft.com/office/drawing/2014/main" id="{55C9C96B-C612-0029-B270-DBF2ED7A2430}"/>
+              </a:ext>
+            </a:extLst>
+          </p:cNvPr>
+          <p:cNvPicPr>
+            <a:picLocks noGrp="1" noChangeAspect="1"/>
+          </p:cNvPicPr>
+          <p:nvPr>
+            <p:ph sz="half" idx="1"/>
+          </p:nvPr>
+        </p:nvPicPr>
+        <p:blipFill>
+          <a:blip r:embed="rId2">
+            <a:extLst>
+              <a:ext uri="{28A0092B-C50C-407E-A947-70E740481C1C}">
+                <a14:useLocalDpi xmlns:a14="http://schemas.microsoft.com/office/drawing/2010/main" val="0"/>
+              </a:ext>
+            </a:extLst>
+          </a:blip>
+          <a:stretch>
+            <a:fillRect/>
+          </a:stretch>
+        </p:blipFill>
+        <p:spPr>
+          <a:xfrm>
+            <a:off x="409144" y="1360558"/>
+            <a:ext cx="5913167" cy="4434876"/>
+          </a:xfrm>
+        </p:spPr>
+      </p:pic>
+      <p:sp>
+        <p:nvSpPr>
+          <p:cNvPr id="7" name="Content Placeholder 6">
+            <a:extLst>
+              <a:ext uri="{FF2B5EF4-FFF2-40B4-BE49-F238E27FC236}">
+                <a16:creationId xmlns:a16="http://schemas.microsoft.com/office/drawing/2014/main" id="{0440479D-D52D-597D-F48D-F4B442920112}"/>
+              </a:ext>
+            </a:extLst>
+          </p:cNvPr>
+          <p:cNvSpPr>
+            <a:spLocks noGrp="1"/>
+          </p:cNvSpPr>
+          <p:nvPr>
+            <p:ph sz="half" idx="2"/>
+          </p:nvPr>
+        </p:nvSpPr>
+        <p:spPr>
+          <a:xfrm>
+            <a:off x="6216350" y="1930400"/>
+            <a:ext cx="4184034" cy="3880773"/>
+          </a:xfrm>
+        </p:spPr>
+        <p:txBody>
+          <a:bodyPr/>
+          <a:lstStyle/>
+          <a:p>
+            <a:r>
+              <a:rPr lang="en-US" dirty="0"/>
+              <a:t>Songs in the Sample</a:t>
+            </a:r>
+          </a:p>
+          <a:p>
+            <a:pPr lvl="1"/>
+            <a:r>
+              <a:rPr lang="en-US" dirty="0"/>
+              <a:t>952 songs</a:t>
+            </a:r>
+          </a:p>
+          <a:p>
+            <a:pPr lvl="1"/>
+            <a:r>
+              <a:rPr lang="en-US" dirty="0"/>
+              <a:t>802 unique artists</a:t>
+            </a:r>
+          </a:p>
+        </p:txBody>
+      </p:sp>
+    </p:spTree>
+    <p:extLst>
+      <p:ext uri="{BB962C8B-B14F-4D97-AF65-F5344CB8AC3E}">
+        <p14:creationId xmlns:p14="http://schemas.microsoft.com/office/powerpoint/2010/main" val="2767989472"/>
+      </p:ext>
+    </p:extLst>
+  </p:cSld>
+  <p:clrMapOvr>
+    <a:masterClrMapping/>
+  </p:clrMapOvr>
+</p:sld>
+</file>
+
+<file path=ppt/slides/slide4.xml><?xml version="1.0" encoding="utf-8"?>
+<p:sld xmlns:a="http://schemas.openxmlformats.org/drawingml/2006/main" xmlns:r="http://schemas.openxmlformats.org/officeDocument/2006/relationships" xmlns:p="http://schemas.openxmlformats.org/presentationml/2006/main">
+  <p:cSld>
+    <p:spTree>
+      <p:nvGrpSpPr>
+        <p:cNvPr id="1" name=""/>
+        <p:cNvGrpSpPr/>
+        <p:nvPr/>
+      </p:nvGrpSpPr>
+      <p:grpSpPr>
+        <a:xfrm>
+          <a:off x="0" y="0"/>
+          <a:ext cx="0" cy="0"/>
+          <a:chOff x="0" y="0"/>
+          <a:chExt cx="0" cy="0"/>
+        </a:xfrm>
+      </p:grpSpPr>
+      <p:sp>
+        <p:nvSpPr>
+          <p:cNvPr id="2" name="Title 1">
+            <a:extLst>
+              <a:ext uri="{FF2B5EF4-FFF2-40B4-BE49-F238E27FC236}">
+                <a16:creationId xmlns:a16="http://schemas.microsoft.com/office/drawing/2014/main" id="{3708A23A-0F6D-EC8F-AB62-CFB7D4384151}"/>
+              </a:ext>
+            </a:extLst>
+          </p:cNvPr>
+          <p:cNvSpPr>
+            <a:spLocks noGrp="1"/>
+          </p:cNvSpPr>
+          <p:nvPr>
+            <p:ph type="title"/>
+          </p:nvPr>
+        </p:nvSpPr>
+        <p:spPr/>
+        <p:txBody>
+          <a:bodyPr/>
+          <a:lstStyle/>
+          <a:p>
+            <a:r>
+              <a:rPr lang="en-US" dirty="0"/>
+              <a:t>Artist Popularity</a:t>
+            </a:r>
+          </a:p>
+        </p:txBody>
+      </p:sp>
+      <p:pic>
+        <p:nvPicPr>
+          <p:cNvPr id="5" name="Content Placeholder 4">
+            <a:extLst>
+              <a:ext uri="{FF2B5EF4-FFF2-40B4-BE49-F238E27FC236}">
+                <a16:creationId xmlns:a16="http://schemas.microsoft.com/office/drawing/2014/main" id="{DF07D2E1-0C5E-E36D-D65E-8545547D6A26}"/>
+              </a:ext>
+            </a:extLst>
+          </p:cNvPr>
+          <p:cNvPicPr>
+            <a:picLocks noGrp="1" noChangeAspect="1"/>
+          </p:cNvPicPr>
+          <p:nvPr>
+            <p:ph sz="half" idx="1"/>
+          </p:nvPr>
+        </p:nvPicPr>
+        <p:blipFill>
+          <a:blip r:embed="rId2">
+            <a:extLst>
+              <a:ext uri="{28A0092B-C50C-407E-A947-70E740481C1C}">
+                <a14:useLocalDpi xmlns:a14="http://schemas.microsoft.com/office/drawing/2010/main" val="0"/>
+              </a:ext>
+            </a:extLst>
+          </a:blip>
+          <a:stretch>
+            <a:fillRect/>
+          </a:stretch>
+        </p:blipFill>
+        <p:spPr>
+          <a:xfrm>
+            <a:off x="259709" y="1318258"/>
+            <a:ext cx="6035130" cy="4526347"/>
+          </a:xfrm>
+        </p:spPr>
+      </p:pic>
+      <p:sp>
+        <p:nvSpPr>
+          <p:cNvPr id="6" name="Content Placeholder 5">
+            <a:extLst>
+              <a:ext uri="{FF2B5EF4-FFF2-40B4-BE49-F238E27FC236}">
+                <a16:creationId xmlns:a16="http://schemas.microsoft.com/office/drawing/2014/main" id="{453A14E1-DCEF-779D-47FD-81A27CA19EA3}"/>
+              </a:ext>
+            </a:extLst>
+          </p:cNvPr>
+          <p:cNvSpPr>
+            <a:spLocks noGrp="1"/>
+          </p:cNvSpPr>
+          <p:nvPr>
+            <p:ph sz="half" idx="2"/>
+          </p:nvPr>
+        </p:nvSpPr>
+        <p:spPr>
+          <a:xfrm>
+            <a:off x="6174841" y="1998170"/>
+            <a:ext cx="4184034" cy="3880773"/>
+          </a:xfrm>
+        </p:spPr>
+        <p:txBody>
+          <a:bodyPr/>
+          <a:lstStyle/>
+          <a:p>
+            <a:r>
+              <a:rPr lang="en-US" dirty="0"/>
+              <a:t>Songs with over 1 billion streams</a:t>
+            </a:r>
+          </a:p>
+          <a:p>
+            <a:pPr lvl="1"/>
+            <a:r>
+              <a:rPr lang="en-US" dirty="0"/>
+              <a:t>152 songs</a:t>
+            </a:r>
+          </a:p>
+          <a:p>
+            <a:pPr lvl="1"/>
+            <a:r>
+              <a:rPr lang="en-US" dirty="0"/>
+              <a:t>137 unique artists </a:t>
+            </a:r>
+          </a:p>
+          <a:p>
+            <a:pPr marL="457200" lvl="1" indent="0">
+              <a:buNone/>
+            </a:pPr>
+            <a:endParaRPr lang="en-US" dirty="0"/>
+          </a:p>
+        </p:txBody>
+      </p:sp>
+    </p:spTree>
+    <p:extLst>
+      <p:ext uri="{BB962C8B-B14F-4D97-AF65-F5344CB8AC3E}">
+        <p14:creationId xmlns:p14="http://schemas.microsoft.com/office/powerpoint/2010/main" val="3016040021"/>
+      </p:ext>
+    </p:extLst>
+  </p:cSld>
+  <p:clrMapOvr>
+    <a:masterClrMapping/>
+  </p:clrMapOvr>
+</p:sld>
+</file>
+
+<file path=ppt/slides/slide5.xml><?xml version="1.0" encoding="utf-8"?>
+<p:sld xmlns:a="http://schemas.openxmlformats.org/drawingml/2006/main" xmlns:r="http://schemas.openxmlformats.org/officeDocument/2006/relationships" xmlns:p="http://schemas.openxmlformats.org/presentationml/2006/main">
+  <p:cSld>
+    <p:spTree>
+      <p:nvGrpSpPr>
+        <p:cNvPr id="1" name=""/>
+        <p:cNvGrpSpPr/>
+        <p:nvPr/>
+      </p:nvGrpSpPr>
+      <p:grpSpPr>
+        <a:xfrm>
+          <a:off x="0" y="0"/>
+          <a:ext cx="0" cy="0"/>
+          <a:chOff x="0" y="0"/>
+          <a:chExt cx="0" cy="0"/>
+        </a:xfrm>
+      </p:grpSpPr>
+      <p:sp>
+        <p:nvSpPr>
+          <p:cNvPr id="2" name="Title 1">
+            <a:extLst>
+              <a:ext uri="{FF2B5EF4-FFF2-40B4-BE49-F238E27FC236}">
+                <a16:creationId xmlns:a16="http://schemas.microsoft.com/office/drawing/2014/main" id="{58F6C283-FEB8-7D5D-9068-A5C216F8AD45}"/>
+              </a:ext>
+            </a:extLst>
+          </p:cNvPr>
+          <p:cNvSpPr>
+            <a:spLocks noGrp="1"/>
+          </p:cNvSpPr>
+          <p:nvPr>
+            <p:ph type="title"/>
+          </p:nvPr>
+        </p:nvSpPr>
+        <p:spPr/>
+        <p:txBody>
+          <a:bodyPr/>
+          <a:lstStyle/>
+          <a:p>
+            <a:r>
+              <a:rPr lang="en-US" dirty="0"/>
+              <a:t>Artist Popularity</a:t>
+            </a:r>
+          </a:p>
+        </p:txBody>
+      </p:sp>
+      <p:pic>
+        <p:nvPicPr>
+          <p:cNvPr id="11" name="Content Placeholder 10">
+            <a:extLst>
+              <a:ext uri="{FF2B5EF4-FFF2-40B4-BE49-F238E27FC236}">
+                <a16:creationId xmlns:a16="http://schemas.microsoft.com/office/drawing/2014/main" id="{5B0A9B2C-AFE0-8A18-964E-32D2B5504E81}"/>
+              </a:ext>
+            </a:extLst>
+          </p:cNvPr>
+          <p:cNvPicPr>
+            <a:picLocks noGrp="1" noChangeAspect="1"/>
+          </p:cNvPicPr>
+          <p:nvPr>
+            <p:ph sz="half" idx="1"/>
+          </p:nvPr>
+        </p:nvPicPr>
+        <p:blipFill>
+          <a:blip r:embed="rId2">
+            <a:extLst>
+              <a:ext uri="{28A0092B-C50C-407E-A947-70E740481C1C}">
+                <a14:useLocalDpi xmlns:a14="http://schemas.microsoft.com/office/drawing/2010/main" val="0"/>
+              </a:ext>
+            </a:extLst>
+          </a:blip>
+          <a:stretch>
+            <a:fillRect/>
+          </a:stretch>
+        </p:blipFill>
+        <p:spPr>
+          <a:xfrm>
+            <a:off x="179089" y="1401193"/>
+            <a:ext cx="6056883" cy="4542661"/>
+          </a:xfrm>
+        </p:spPr>
+      </p:pic>
+      <p:sp>
+        <p:nvSpPr>
+          <p:cNvPr id="15" name="Content Placeholder 14">
+            <a:extLst>
+              <a:ext uri="{FF2B5EF4-FFF2-40B4-BE49-F238E27FC236}">
+                <a16:creationId xmlns:a16="http://schemas.microsoft.com/office/drawing/2014/main" id="{03B4DEB2-CD3D-5670-1DF5-E89517D0F88F}"/>
+              </a:ext>
+            </a:extLst>
+          </p:cNvPr>
+          <p:cNvSpPr>
+            <a:spLocks noGrp="1"/>
+          </p:cNvSpPr>
+          <p:nvPr>
+            <p:ph sz="half" idx="2"/>
+          </p:nvPr>
+        </p:nvSpPr>
+        <p:spPr>
+          <a:xfrm>
+            <a:off x="6096000" y="1930400"/>
+            <a:ext cx="4184034" cy="3880773"/>
+          </a:xfrm>
+        </p:spPr>
+        <p:txBody>
+          <a:bodyPr/>
+          <a:lstStyle/>
+          <a:p>
+            <a:r>
+              <a:rPr lang="en-US" dirty="0"/>
+              <a:t>Songs with over 2 billion streams</a:t>
+            </a:r>
+          </a:p>
+          <a:p>
+            <a:pPr lvl="1"/>
+            <a:r>
+              <a:rPr lang="en-US" dirty="0"/>
+              <a:t>31 songs</a:t>
+            </a:r>
+          </a:p>
+          <a:p>
+            <a:pPr lvl="1"/>
+            <a:r>
+              <a:rPr lang="en-US" dirty="0"/>
+              <a:t>33 unique artists</a:t>
+            </a:r>
+          </a:p>
+          <a:p>
+            <a:endParaRPr lang="en-US" dirty="0"/>
+          </a:p>
+          <a:p>
+            <a:r>
+              <a:rPr lang="en-US" dirty="0"/>
+              <a:t>Most streamed song:</a:t>
+            </a:r>
+          </a:p>
+          <a:p>
+            <a:pPr lvl="1"/>
+            <a:r>
+              <a:rPr lang="en-US" dirty="0"/>
+              <a:t>Blinding Lights by The </a:t>
+            </a:r>
+            <a:r>
+              <a:rPr lang="en-US" dirty="0" err="1"/>
+              <a:t>Weeknd</a:t>
+            </a:r>
+            <a:endParaRPr lang="en-US" dirty="0"/>
+          </a:p>
+          <a:p>
+            <a:pPr lvl="1"/>
+            <a:endParaRPr lang="en-US" dirty="0"/>
+          </a:p>
+        </p:txBody>
+      </p:sp>
+    </p:spTree>
+    <p:extLst>
+      <p:ext uri="{BB962C8B-B14F-4D97-AF65-F5344CB8AC3E}">
+        <p14:creationId xmlns:p14="http://schemas.microsoft.com/office/powerpoint/2010/main" val="2613100583"/>
+      </p:ext>
+    </p:extLst>
+  </p:cSld>
+  <p:clrMapOvr>
+    <a:masterClrMapping/>
+  </p:clrMapOvr>
+</p:sld>
+</file>
+
+<file path=ppt/slides/slide6.xml><?xml version="1.0" encoding="utf-8"?>
+<p:sld xmlns:a="http://schemas.openxmlformats.org/drawingml/2006/main" xmlns:r="http://schemas.openxmlformats.org/officeDocument/2006/relationships" xmlns:p="http://schemas.openxmlformats.org/presentationml/2006/main">
+  <p:cSld>
+    <p:spTree>
+      <p:nvGrpSpPr>
+        <p:cNvPr id="1" name=""/>
+        <p:cNvGrpSpPr/>
+        <p:nvPr/>
+      </p:nvGrpSpPr>
+      <p:grpSpPr>
+        <a:xfrm>
+          <a:off x="0" y="0"/>
+          <a:ext cx="0" cy="0"/>
+          <a:chOff x="0" y="0"/>
+          <a:chExt cx="0" cy="0"/>
+        </a:xfrm>
+      </p:grpSpPr>
+      <p:sp>
+        <p:nvSpPr>
+          <p:cNvPr id="4" name="Title 3">
+            <a:extLst>
+              <a:ext uri="{FF2B5EF4-FFF2-40B4-BE49-F238E27FC236}">
+                <a16:creationId xmlns:a16="http://schemas.microsoft.com/office/drawing/2014/main" id="{64B241C1-2226-457D-A9FA-1063C18817E7}"/>
+              </a:ext>
+            </a:extLst>
+          </p:cNvPr>
+          <p:cNvSpPr>
+            <a:spLocks noGrp="1"/>
+          </p:cNvSpPr>
+          <p:nvPr>
+            <p:ph type="title"/>
+          </p:nvPr>
+        </p:nvSpPr>
+        <p:spPr/>
+        <p:txBody>
+          <a:bodyPr/>
+          <a:lstStyle/>
+          <a:p>
+            <a:r>
+              <a:rPr lang="en-US" dirty="0"/>
+              <a:t>Distribution of Streams by Year</a:t>
+            </a:r>
+            <a:br>
+              <a:rPr lang="en-US" dirty="0"/>
+            </a:br>
+            <a:r>
+              <a:rPr lang="en-US" dirty="0"/>
+              <a:t>Total Sample</a:t>
+            </a:r>
+          </a:p>
+        </p:txBody>
+      </p:sp>
+      <p:pic>
+        <p:nvPicPr>
+          <p:cNvPr id="10" name="Content Placeholder 9">
+            <a:extLst>
+              <a:ext uri="{FF2B5EF4-FFF2-40B4-BE49-F238E27FC236}">
+                <a16:creationId xmlns:a16="http://schemas.microsoft.com/office/drawing/2014/main" id="{1A009D60-BD8D-17DB-6799-D03C8E95742D}"/>
+              </a:ext>
+            </a:extLst>
+          </p:cNvPr>
+          <p:cNvPicPr>
+            <a:picLocks noGrp="1" noChangeAspect="1"/>
+          </p:cNvPicPr>
+          <p:nvPr>
+            <p:ph sz="half" idx="1"/>
+          </p:nvPr>
+        </p:nvPicPr>
+        <p:blipFill>
+          <a:blip r:embed="rId2">
+            <a:extLst>
+              <a:ext uri="{28A0092B-C50C-407E-A947-70E740481C1C}">
+                <a14:useLocalDpi xmlns:a14="http://schemas.microsoft.com/office/drawing/2010/main" val="0"/>
+              </a:ext>
+            </a:extLst>
+          </a:blip>
+          <a:stretch>
+            <a:fillRect/>
+          </a:stretch>
+        </p:blipFill>
+        <p:spPr>
+          <a:xfrm>
+            <a:off x="147530" y="2134909"/>
+            <a:ext cx="4713396" cy="3535046"/>
+          </a:xfrm>
+        </p:spPr>
+      </p:pic>
+      <p:pic>
+        <p:nvPicPr>
+          <p:cNvPr id="12" name="Content Placeholder 11">
+            <a:extLst>
+              <a:ext uri="{FF2B5EF4-FFF2-40B4-BE49-F238E27FC236}">
+                <a16:creationId xmlns:a16="http://schemas.microsoft.com/office/drawing/2014/main" id="{8A0461F6-65B6-1EFB-FDB9-951F84715E9C}"/>
+              </a:ext>
+            </a:extLst>
+          </p:cNvPr>
+          <p:cNvPicPr>
+            <a:picLocks noGrp="1" noChangeAspect="1"/>
+          </p:cNvPicPr>
+          <p:nvPr>
+            <p:ph sz="half" idx="2"/>
+          </p:nvPr>
+        </p:nvPicPr>
+        <p:blipFill>
+          <a:blip r:embed="rId3">
+            <a:extLst>
+              <a:ext uri="{28A0092B-C50C-407E-A947-70E740481C1C}">
+                <a14:useLocalDpi xmlns:a14="http://schemas.microsoft.com/office/drawing/2010/main" val="0"/>
+              </a:ext>
+            </a:extLst>
+          </a:blip>
+          <a:stretch>
+            <a:fillRect/>
+          </a:stretch>
+        </p:blipFill>
+        <p:spPr>
+          <a:xfrm>
+            <a:off x="4764679" y="2287962"/>
+            <a:ext cx="4509324" cy="3381993"/>
+          </a:xfrm>
+        </p:spPr>
+      </p:pic>
+    </p:spTree>
+    <p:extLst>
+      <p:ext uri="{BB962C8B-B14F-4D97-AF65-F5344CB8AC3E}">
+        <p14:creationId xmlns:p14="http://schemas.microsoft.com/office/powerpoint/2010/main" val="3450215092"/>
+      </p:ext>
+    </p:extLst>
+  </p:cSld>
+  <p:clrMapOvr>
+    <a:masterClrMapping/>
+  </p:clrMapOvr>
+</p:sld>
+</file>
+
+<file path=ppt/slides/slide7.xml><?xml version="1.0" encoding="utf-8"?>
+<p:sld xmlns:a="http://schemas.openxmlformats.org/drawingml/2006/main" xmlns:r="http://schemas.openxmlformats.org/officeDocument/2006/relationships" xmlns:p="http://schemas.openxmlformats.org/presentationml/2006/main">
+  <p:cSld>
+    <p:spTree>
+      <p:nvGrpSpPr>
+        <p:cNvPr id="1" name=""/>
+        <p:cNvGrpSpPr/>
+        <p:nvPr/>
+      </p:nvGrpSpPr>
+      <p:grpSpPr>
+        <a:xfrm>
+          <a:off x="0" y="0"/>
+          <a:ext cx="0" cy="0"/>
+          <a:chOff x="0" y="0"/>
+          <a:chExt cx="0" cy="0"/>
+        </a:xfrm>
+      </p:grpSpPr>
+      <p:sp>
+        <p:nvSpPr>
+          <p:cNvPr id="2" name="Title 1">
+            <a:extLst>
+              <a:ext uri="{FF2B5EF4-FFF2-40B4-BE49-F238E27FC236}">
+                <a16:creationId xmlns:a16="http://schemas.microsoft.com/office/drawing/2014/main" id="{3E1B9736-7512-5349-9B14-884B0F10BE08}"/>
+              </a:ext>
+            </a:extLst>
+          </p:cNvPr>
+          <p:cNvSpPr>
+            <a:spLocks noGrp="1"/>
+          </p:cNvSpPr>
+          <p:nvPr>
+            <p:ph type="title"/>
+          </p:nvPr>
+        </p:nvSpPr>
+        <p:spPr/>
+        <p:txBody>
+          <a:bodyPr/>
+          <a:lstStyle/>
+          <a:p>
+            <a:r>
+              <a:rPr lang="en-US" dirty="0"/>
+              <a:t>Distribution of Streams by Year</a:t>
+            </a:r>
+            <a:br>
+              <a:rPr lang="en-US" dirty="0"/>
+            </a:br>
+            <a:r>
+              <a:rPr lang="en-US" dirty="0"/>
+              <a:t>Streams over 1 Billion</a:t>
+            </a:r>
+          </a:p>
+        </p:txBody>
+      </p:sp>
+      <p:pic>
+        <p:nvPicPr>
+          <p:cNvPr id="6" name="Content Placeholder 5">
+            <a:extLst>
+              <a:ext uri="{FF2B5EF4-FFF2-40B4-BE49-F238E27FC236}">
+                <a16:creationId xmlns:a16="http://schemas.microsoft.com/office/drawing/2014/main" id="{D14AECA5-2F00-7B99-CC1E-903A48B2E56E}"/>
+              </a:ext>
+            </a:extLst>
+          </p:cNvPr>
+          <p:cNvPicPr>
+            <a:picLocks noGrp="1" noChangeAspect="1"/>
+          </p:cNvPicPr>
+          <p:nvPr>
+            <p:ph sz="half" idx="1"/>
+          </p:nvPr>
+        </p:nvPicPr>
+        <p:blipFill>
+          <a:blip r:embed="rId2">
+            <a:extLst>
+              <a:ext uri="{28A0092B-C50C-407E-A947-70E740481C1C}">
+                <a14:useLocalDpi xmlns:a14="http://schemas.microsoft.com/office/drawing/2010/main" val="0"/>
+              </a:ext>
+            </a:extLst>
+          </a:blip>
+          <a:stretch>
+            <a:fillRect/>
+          </a:stretch>
+        </p:blipFill>
+        <p:spPr>
+          <a:xfrm>
+            <a:off x="86338" y="2089015"/>
+            <a:ext cx="4774588" cy="3580940"/>
+          </a:xfrm>
+        </p:spPr>
+      </p:pic>
+      <p:pic>
+        <p:nvPicPr>
+          <p:cNvPr id="8" name="Content Placeholder 7">
+            <a:extLst>
+              <a:ext uri="{FF2B5EF4-FFF2-40B4-BE49-F238E27FC236}">
+                <a16:creationId xmlns:a16="http://schemas.microsoft.com/office/drawing/2014/main" id="{8BD7F944-A7C1-CFFC-A56D-B43691DD0E10}"/>
+              </a:ext>
+            </a:extLst>
+          </p:cNvPr>
+          <p:cNvPicPr>
+            <a:picLocks noGrp="1" noChangeAspect="1"/>
+          </p:cNvPicPr>
+          <p:nvPr>
+            <p:ph sz="half" idx="2"/>
+          </p:nvPr>
+        </p:nvPicPr>
+        <p:blipFill>
+          <a:blip r:embed="rId3">
+            <a:extLst>
+              <a:ext uri="{28A0092B-C50C-407E-A947-70E740481C1C}">
+                <a14:useLocalDpi xmlns:a14="http://schemas.microsoft.com/office/drawing/2010/main" val="0"/>
+              </a:ext>
+            </a:extLst>
+          </a:blip>
+          <a:stretch>
+            <a:fillRect/>
+          </a:stretch>
+        </p:blipFill>
+        <p:spPr>
+          <a:xfrm>
+            <a:off x="4732660" y="2260491"/>
+            <a:ext cx="4541515" cy="3406136"/>
+          </a:xfrm>
+        </p:spPr>
+      </p:pic>
+    </p:spTree>
+    <p:extLst>
+      <p:ext uri="{BB962C8B-B14F-4D97-AF65-F5344CB8AC3E}">
+        <p14:creationId xmlns:p14="http://schemas.microsoft.com/office/powerpoint/2010/main" val="1147069204"/>
+      </p:ext>
+    </p:extLst>
+  </p:cSld>
+  <p:clrMapOvr>
+    <a:masterClrMapping/>
+  </p:clrMapOvr>
+</p:sld>
+</file>
+
+<file path=ppt/slides/slide8.xml><?xml version="1.0" encoding="utf-8"?>
+<p:sld xmlns:a="http://schemas.openxmlformats.org/drawingml/2006/main" xmlns:r="http://schemas.openxmlformats.org/officeDocument/2006/relationships" xmlns:p="http://schemas.openxmlformats.org/presentationml/2006/main">
+  <p:cSld>
+    <p:spTree>
+      <p:nvGrpSpPr>
+        <p:cNvPr id="1" name=""/>
+        <p:cNvGrpSpPr/>
+        <p:nvPr/>
+      </p:nvGrpSpPr>
+      <p:grpSpPr>
+        <a:xfrm>
+          <a:off x="0" y="0"/>
+          <a:ext cx="0" cy="0"/>
+          <a:chOff x="0" y="0"/>
+          <a:chExt cx="0" cy="0"/>
+        </a:xfrm>
+      </p:grpSpPr>
+      <p:sp>
+        <p:nvSpPr>
+          <p:cNvPr id="2" name="Title 1">
+            <a:extLst>
+              <a:ext uri="{FF2B5EF4-FFF2-40B4-BE49-F238E27FC236}">
+                <a16:creationId xmlns:a16="http://schemas.microsoft.com/office/drawing/2014/main" id="{587C39AB-38F1-C60C-97E3-C7278D9CFF4B}"/>
+              </a:ext>
+            </a:extLst>
+          </p:cNvPr>
+          <p:cNvSpPr>
+            <a:spLocks noGrp="1"/>
+          </p:cNvSpPr>
+          <p:nvPr>
+            <p:ph type="title"/>
+          </p:nvPr>
+        </p:nvSpPr>
+        <p:spPr/>
+        <p:txBody>
+          <a:bodyPr/>
+          <a:lstStyle/>
+          <a:p>
+            <a:r>
+              <a:rPr lang="en-US" dirty="0"/>
+              <a:t>Distribution of Streams by Year</a:t>
+            </a:r>
+            <a:br>
+              <a:rPr lang="en-US" dirty="0"/>
+            </a:br>
+            <a:r>
+              <a:rPr lang="en-US" dirty="0"/>
+              <a:t>Streams over 2 Billion</a:t>
+            </a:r>
+          </a:p>
+        </p:txBody>
+      </p:sp>
+      <p:pic>
+        <p:nvPicPr>
+          <p:cNvPr id="8" name="Content Placeholder 7">
+            <a:extLst>
+              <a:ext uri="{FF2B5EF4-FFF2-40B4-BE49-F238E27FC236}">
+                <a16:creationId xmlns:a16="http://schemas.microsoft.com/office/drawing/2014/main" id="{0D57B322-741C-A656-A135-B419EF0FB936}"/>
+              </a:ext>
+            </a:extLst>
+          </p:cNvPr>
+          <p:cNvPicPr>
+            <a:picLocks noGrp="1" noChangeAspect="1"/>
+          </p:cNvPicPr>
+          <p:nvPr>
+            <p:ph sz="half" idx="2"/>
+          </p:nvPr>
+        </p:nvPicPr>
+        <p:blipFill>
+          <a:blip r:embed="rId2">
+            <a:extLst>
+              <a:ext uri="{28A0092B-C50C-407E-A947-70E740481C1C}">
+                <a14:useLocalDpi xmlns:a14="http://schemas.microsoft.com/office/drawing/2010/main" val="0"/>
+              </a:ext>
+            </a:extLst>
+          </a:blip>
+          <a:stretch>
+            <a:fillRect/>
+          </a:stretch>
+        </p:blipFill>
+        <p:spPr>
+          <a:xfrm>
+            <a:off x="4690800" y="2233020"/>
+            <a:ext cx="4583375" cy="3437531"/>
+          </a:xfrm>
+        </p:spPr>
+      </p:pic>
+      <p:pic>
+        <p:nvPicPr>
+          <p:cNvPr id="7" name="Content Placeholder 6">
+            <a:extLst>
+              <a:ext uri="{FF2B5EF4-FFF2-40B4-BE49-F238E27FC236}">
+                <a16:creationId xmlns:a16="http://schemas.microsoft.com/office/drawing/2014/main" id="{BD7DAF19-D0F6-E2FA-1A42-75E96B70285D}"/>
+              </a:ext>
+            </a:extLst>
+          </p:cNvPr>
+          <p:cNvPicPr>
+            <a:picLocks noGrp="1" noChangeAspect="1"/>
+          </p:cNvPicPr>
+          <p:nvPr>
+            <p:ph sz="half" idx="1"/>
+          </p:nvPr>
+        </p:nvPicPr>
+        <p:blipFill>
+          <a:blip r:embed="rId3">
+            <a:extLst>
+              <a:ext uri="{28A0092B-C50C-407E-A947-70E740481C1C}">
+                <a14:useLocalDpi xmlns:a14="http://schemas.microsoft.com/office/drawing/2010/main" val="0"/>
+              </a:ext>
+            </a:extLst>
+          </a:blip>
+          <a:stretch>
+            <a:fillRect/>
+          </a:stretch>
+        </p:blipFill>
+        <p:spPr>
+          <a:xfrm>
+            <a:off x="132045" y="2056420"/>
+            <a:ext cx="4813473" cy="3610104"/>
+          </a:xfrm>
+        </p:spPr>
+      </p:pic>
+    </p:spTree>
+    <p:extLst>
+      <p:ext uri="{BB962C8B-B14F-4D97-AF65-F5344CB8AC3E}">
+        <p14:creationId xmlns:p14="http://schemas.microsoft.com/office/powerpoint/2010/main" val="1774457953"/>
+      </p:ext>
+    </p:extLst>
+  </p:cSld>
+  <p:clrMapOvr>
+    <a:masterClrMapping/>
+  </p:clrMapOvr>
+</p:sld>
+</file>
+
+<file path=ppt/slides/slide9.xml><?xml version="1.0" encoding="utf-8"?>
+<p:sld xmlns:a="http://schemas.openxmlformats.org/drawingml/2006/main" xmlns:r="http://schemas.openxmlformats.org/officeDocument/2006/relationships" xmlns:p="http://schemas.openxmlformats.org/presentationml/2006/main">
+  <p:cSld>
+    <p:spTree>
+      <p:nvGrpSpPr>
+        <p:cNvPr id="1" name=""/>
+        <p:cNvGrpSpPr/>
+        <p:nvPr/>
+      </p:nvGrpSpPr>
+      <p:grpSpPr>
+        <a:xfrm>
+          <a:off x="0" y="0"/>
+          <a:ext cx="0" cy="0"/>
+          <a:chOff x="0" y="0"/>
+          <a:chExt cx="0" cy="0"/>
+        </a:xfrm>
+      </p:grpSpPr>
+      <p:sp>
+        <p:nvSpPr>
+          <p:cNvPr id="2" name="Title 1">
+            <a:extLst>
+              <a:ext uri="{FF2B5EF4-FFF2-40B4-BE49-F238E27FC236}">
+                <a16:creationId xmlns:a16="http://schemas.microsoft.com/office/drawing/2014/main" id="{C3D942C1-F821-163F-7497-06F9A11642B9}"/>
+              </a:ext>
+            </a:extLst>
+          </p:cNvPr>
+          <p:cNvSpPr>
+            <a:spLocks noGrp="1"/>
+          </p:cNvSpPr>
+          <p:nvPr>
+            <p:ph type="title"/>
+          </p:nvPr>
+        </p:nvSpPr>
+        <p:spPr/>
+        <p:txBody>
+          <a:bodyPr/>
+          <a:lstStyle/>
+          <a:p>
+            <a:r>
+              <a:rPr lang="en-US" dirty="0"/>
+              <a:t>Analysis of Musical Characteristics</a:t>
+            </a:r>
+          </a:p>
+        </p:txBody>
+      </p:sp>
+      <p:sp>
+        <p:nvSpPr>
+          <p:cNvPr id="3" name="Content Placeholder 2">
+            <a:extLst>
+              <a:ext uri="{FF2B5EF4-FFF2-40B4-BE49-F238E27FC236}">
+                <a16:creationId xmlns:a16="http://schemas.microsoft.com/office/drawing/2014/main" id="{AD1D5CB7-F90B-DA38-79C8-2A61393B40B9}"/>
+              </a:ext>
+            </a:extLst>
+          </p:cNvPr>
+          <p:cNvSpPr>
+            <a:spLocks noGrp="1"/>
+          </p:cNvSpPr>
+          <p:nvPr>
+            <p:ph idx="1"/>
+          </p:nvPr>
+        </p:nvSpPr>
+        <p:spPr/>
+        <p:txBody>
+          <a:bodyPr/>
+          <a:lstStyle/>
+          <a:p>
+            <a:r>
+              <a:rPr lang="en-US" dirty="0"/>
+              <a:t>Comparing the Top 20 Most Streamed Artists vs. the Entire Dataset</a:t>
+            </a:r>
+          </a:p>
+          <a:p>
+            <a:pPr lvl="1"/>
+            <a:r>
+              <a:rPr lang="en-US" dirty="0"/>
+              <a:t>Top Artists account for approximately 27% of included tracks, but received over 36% of streams</a:t>
+            </a:r>
+          </a:p>
+          <a:p>
+            <a:pPr lvl="1"/>
+            <a:endParaRPr lang="en-US" dirty="0"/>
+          </a:p>
+          <a:p>
+            <a:pPr lvl="1"/>
+            <a:r>
+              <a:rPr lang="en-US" dirty="0"/>
+              <a:t>Do Top Artists mimic the population, or forge their own path?</a:t>
+            </a:r>
+          </a:p>
+          <a:p>
+            <a:pPr lvl="1"/>
+            <a:endParaRPr lang="en-US" dirty="0"/>
+          </a:p>
+          <a:p>
+            <a:r>
+              <a:rPr lang="en-US" dirty="0"/>
+              <a:t>Considering Averages</a:t>
+            </a:r>
+          </a:p>
+          <a:p>
+            <a:pPr lvl="1"/>
+            <a:r>
+              <a:rPr lang="en-US" dirty="0"/>
+              <a:t>Due to the nature of songs as discrete pieces of content, analysis focuses on median and mode averages vs. mean calculations</a:t>
+            </a:r>
+          </a:p>
+        </p:txBody>
+      </p:sp>
+    </p:spTree>
+    <p:extLst>
+      <p:ext uri="{BB962C8B-B14F-4D97-AF65-F5344CB8AC3E}">
+        <p14:creationId xmlns:p14="http://schemas.microsoft.com/office/powerpoint/2010/main" val="855427616"/>
       </p:ext>
     </p:extLst>
   </p:cSld>

</xml_diff>